<commit_message>
ToC and GitHub Desktop
Added a table of contents slide and began a new section over using GitHub Desktop.
</commit_message>
<xml_diff>
--- a/Using R Notebook with Version Control.pptx
+++ b/Using R Notebook with Version Control.pptx
@@ -6,24 +6,28 @@
   </p:sldMasterIdLst>
   <p:sldIdLst>
     <p:sldId id="256" r:id="rId2"/>
-    <p:sldId id="258" r:id="rId3"/>
-    <p:sldId id="266" r:id="rId4"/>
-    <p:sldId id="259" r:id="rId5"/>
-    <p:sldId id="260" r:id="rId6"/>
-    <p:sldId id="261" r:id="rId7"/>
-    <p:sldId id="265" r:id="rId8"/>
-    <p:sldId id="262" r:id="rId9"/>
-    <p:sldId id="263" r:id="rId10"/>
-    <p:sldId id="269" r:id="rId11"/>
-    <p:sldId id="270" r:id="rId12"/>
-    <p:sldId id="271" r:id="rId13"/>
-    <p:sldId id="272" r:id="rId14"/>
-    <p:sldId id="273" r:id="rId15"/>
-    <p:sldId id="274" r:id="rId16"/>
-    <p:sldId id="275" r:id="rId17"/>
-    <p:sldId id="276" r:id="rId18"/>
-    <p:sldId id="268" r:id="rId19"/>
-    <p:sldId id="264" r:id="rId20"/>
+    <p:sldId id="277" r:id="rId3"/>
+    <p:sldId id="278" r:id="rId4"/>
+    <p:sldId id="258" r:id="rId5"/>
+    <p:sldId id="266" r:id="rId6"/>
+    <p:sldId id="259" r:id="rId7"/>
+    <p:sldId id="260" r:id="rId8"/>
+    <p:sldId id="261" r:id="rId9"/>
+    <p:sldId id="265" r:id="rId10"/>
+    <p:sldId id="262" r:id="rId11"/>
+    <p:sldId id="263" r:id="rId12"/>
+    <p:sldId id="268" r:id="rId13"/>
+    <p:sldId id="279" r:id="rId14"/>
+    <p:sldId id="269" r:id="rId15"/>
+    <p:sldId id="270" r:id="rId16"/>
+    <p:sldId id="271" r:id="rId17"/>
+    <p:sldId id="272" r:id="rId18"/>
+    <p:sldId id="273" r:id="rId19"/>
+    <p:sldId id="274" r:id="rId20"/>
+    <p:sldId id="275" r:id="rId21"/>
+    <p:sldId id="276" r:id="rId22"/>
+    <p:sldId id="280" r:id="rId23"/>
+    <p:sldId id="264" r:id="rId24"/>
   </p:sldIdLst>
   <p:sldSz cx="12192000" cy="6858000"/>
   <p:notesSz cx="6858000" cy="9144000"/>
@@ -462,7 +466,7 @@
             <a:fld id="{B61BEF0D-F0BB-DE4B-95CE-6DB70DBA9567}" type="datetimeFigureOut">
               <a:rPr lang="en-US" dirty="0"/>
               <a:pPr/>
-              <a:t>12/1/2018</a:t>
+              <a:t>1/2/2019</a:t>
             </a:fld>
             <a:endParaRPr lang="en-US" dirty="0"/>
           </a:p>
@@ -783,7 +787,7 @@
             <a:fld id="{B61BEF0D-F0BB-DE4B-95CE-6DB70DBA9567}" type="datetimeFigureOut">
               <a:rPr lang="en-US" dirty="0"/>
               <a:pPr/>
-              <a:t>12/1/2018</a:t>
+              <a:t>1/2/2019</a:t>
             </a:fld>
             <a:endParaRPr lang="en-US" dirty="0"/>
           </a:p>
@@ -1028,7 +1032,7 @@
             <a:fld id="{B61BEF0D-F0BB-DE4B-95CE-6DB70DBA9567}" type="datetimeFigureOut">
               <a:rPr lang="en-US" dirty="0"/>
               <a:pPr/>
-              <a:t>12/1/2018</a:t>
+              <a:t>1/2/2019</a:t>
             </a:fld>
             <a:endParaRPr lang="en-US" dirty="0"/>
           </a:p>
@@ -1364,7 +1368,7 @@
             <a:fld id="{B61BEF0D-F0BB-DE4B-95CE-6DB70DBA9567}" type="datetimeFigureOut">
               <a:rPr lang="en-US" dirty="0"/>
               <a:pPr/>
-              <a:t>12/1/2018</a:t>
+              <a:t>1/2/2019</a:t>
             </a:fld>
             <a:endParaRPr lang="en-US" dirty="0"/>
           </a:p>
@@ -1708,7 +1712,7 @@
             <a:fld id="{B61BEF0D-F0BB-DE4B-95CE-6DB70DBA9567}" type="datetimeFigureOut">
               <a:rPr lang="en-US" dirty="0"/>
               <a:pPr/>
-              <a:t>12/1/2018</a:t>
+              <a:t>1/2/2019</a:t>
             </a:fld>
             <a:endParaRPr lang="en-US" dirty="0"/>
           </a:p>
@@ -2079,7 +2083,7 @@
             <a:fld id="{B61BEF0D-F0BB-DE4B-95CE-6DB70DBA9567}" type="datetimeFigureOut">
               <a:rPr lang="en-US" dirty="0"/>
               <a:pPr/>
-              <a:t>12/1/2018</a:t>
+              <a:t>1/2/2019</a:t>
             </a:fld>
             <a:endParaRPr lang="en-US" dirty="0"/>
           </a:p>
@@ -2546,7 +2550,7 @@
             <a:fld id="{B61BEF0D-F0BB-DE4B-95CE-6DB70DBA9567}" type="datetimeFigureOut">
               <a:rPr lang="en-US" dirty="0"/>
               <a:pPr/>
-              <a:t>12/1/2018</a:t>
+              <a:t>1/2/2019</a:t>
             </a:fld>
             <a:endParaRPr lang="en-US" dirty="0"/>
           </a:p>
@@ -2748,7 +2752,7 @@
             <a:fld id="{B61BEF0D-F0BB-DE4B-95CE-6DB70DBA9567}" type="datetimeFigureOut">
               <a:rPr lang="en-US" dirty="0"/>
               <a:pPr/>
-              <a:t>12/1/2018</a:t>
+              <a:t>1/2/2019</a:t>
             </a:fld>
             <a:endParaRPr lang="en-US" dirty="0"/>
           </a:p>
@@ -2956,7 +2960,7 @@
             <a:fld id="{B61BEF0D-F0BB-DE4B-95CE-6DB70DBA9567}" type="datetimeFigureOut">
               <a:rPr lang="en-US" dirty="0"/>
               <a:pPr/>
-              <a:t>12/1/2018</a:t>
+              <a:t>1/2/2019</a:t>
             </a:fld>
             <a:endParaRPr lang="en-US" dirty="0"/>
           </a:p>
@@ -3184,7 +3188,7 @@
           <a:p>
             <a:fld id="{52647F38-B617-4D2F-AE0A-013F0C4D2C57}" type="datetimeFigureOut">
               <a:rPr lang="en-US" dirty="0"/>
-              <a:t>12/1/2018</a:t>
+              <a:t>1/2/2019</a:t>
             </a:fld>
             <a:endParaRPr lang="en-US" dirty="0"/>
           </a:p>
@@ -3428,7 +3432,7 @@
             <a:fld id="{B61BEF0D-F0BB-DE4B-95CE-6DB70DBA9567}" type="datetimeFigureOut">
               <a:rPr lang="en-US" dirty="0"/>
               <a:pPr/>
-              <a:t>12/1/2018</a:t>
+              <a:t>1/2/2019</a:t>
             </a:fld>
             <a:endParaRPr lang="en-US" dirty="0"/>
           </a:p>
@@ -3722,7 +3726,7 @@
           <a:p>
             <a:fld id="{05BFA754-D5C3-4E66-96A6-867B257F58DC}" type="datetimeFigureOut">
               <a:rPr lang="en-US" dirty="0"/>
-              <a:t>12/1/2018</a:t>
+              <a:t>1/2/2019</a:t>
             </a:fld>
             <a:endParaRPr lang="en-US" dirty="0"/>
           </a:p>
@@ -4112,7 +4116,7 @@
             <a:fld id="{B61BEF0D-F0BB-DE4B-95CE-6DB70DBA9567}" type="datetimeFigureOut">
               <a:rPr lang="en-US" dirty="0"/>
               <a:pPr/>
-              <a:t>12/1/2018</a:t>
+              <a:t>1/2/2019</a:t>
             </a:fld>
             <a:endParaRPr lang="en-US" dirty="0"/>
           </a:p>
@@ -4258,7 +4262,7 @@
             <a:fld id="{B61BEF0D-F0BB-DE4B-95CE-6DB70DBA9567}" type="datetimeFigureOut">
               <a:rPr lang="en-US" dirty="0"/>
               <a:pPr/>
-              <a:t>12/1/2018</a:t>
+              <a:t>1/2/2019</a:t>
             </a:fld>
             <a:endParaRPr lang="en-US" dirty="0"/>
           </a:p>
@@ -4381,7 +4385,7 @@
             <a:fld id="{B61BEF0D-F0BB-DE4B-95CE-6DB70DBA9567}" type="datetimeFigureOut">
               <a:rPr lang="en-US" dirty="0"/>
               <a:pPr/>
-              <a:t>12/1/2018</a:t>
+              <a:t>1/2/2019</a:t>
             </a:fld>
             <a:endParaRPr lang="en-US" dirty="0"/>
           </a:p>
@@ -4633,7 +4637,7 @@
             <a:fld id="{B61BEF0D-F0BB-DE4B-95CE-6DB70DBA9567}" type="datetimeFigureOut">
               <a:rPr lang="en-US" dirty="0"/>
               <a:pPr/>
-              <a:t>12/1/2018</a:t>
+              <a:t>1/2/2019</a:t>
             </a:fld>
             <a:endParaRPr lang="en-US" dirty="0"/>
           </a:p>
@@ -4945,7 +4949,7 @@
             <a:fld id="{B61BEF0D-F0BB-DE4B-95CE-6DB70DBA9567}" type="datetimeFigureOut">
               <a:rPr lang="en-US" dirty="0"/>
               <a:pPr/>
-              <a:t>12/1/2018</a:t>
+              <a:t>1/2/2019</a:t>
             </a:fld>
             <a:endParaRPr lang="en-US" dirty="0"/>
           </a:p>
@@ -5293,7 +5297,7 @@
             <a:fld id="{B61BEF0D-F0BB-DE4B-95CE-6DB70DBA9567}" type="datetimeFigureOut">
               <a:rPr lang="en-US" dirty="0"/>
               <a:pPr/>
-              <a:t>12/1/2018</a:t>
+              <a:t>1/2/2019</a:t>
             </a:fld>
             <a:endParaRPr lang="en-US" dirty="0"/>
           </a:p>
@@ -5949,21 +5953,12 @@
         </p:nvSpPr>
         <p:spPr/>
         <p:txBody>
-          <a:bodyPr>
-            <a:normAutofit fontScale="90000"/>
-          </a:bodyPr>
+          <a:bodyPr/>
           <a:lstStyle/>
           <a:p>
             <a:r>
               <a:rPr lang="en-US" dirty="0" smtClean="0"/>
-              <a:t>Version Control:</a:t>
-            </a:r>
-            <a:br>
-              <a:rPr lang="en-US" dirty="0" smtClean="0"/>
-            </a:br>
-            <a:r>
-              <a:rPr lang="en-US" dirty="0" smtClean="0"/>
-              <a:t>Organizational Saving and History Tracking</a:t>
+              <a:t>Previewing Output</a:t>
             </a:r>
             <a:endParaRPr lang="en-US" dirty="0"/>
           </a:p>
@@ -5981,182 +5976,116 @@
         </p:nvSpPr>
         <p:spPr>
           <a:xfrm>
-            <a:off x="1173192" y="2560320"/>
-            <a:ext cx="4843560" cy="3624820"/>
+            <a:off x="871268" y="2560320"/>
+            <a:ext cx="5145484" cy="3548136"/>
           </a:xfrm>
         </p:spPr>
         <p:txBody>
           <a:bodyPr>
-            <a:noAutofit/>
+            <a:normAutofit/>
           </a:bodyPr>
           <a:lstStyle/>
           <a:p>
             <a:r>
-              <a:rPr lang="en-US" sz="1800" dirty="0" smtClean="0"/>
-              <a:t>Have you ever edited a document “doc” and then saved it as “doc_V2”? And then “doc_V3”?</a:t>
-            </a:r>
-          </a:p>
-          <a:p>
-            <a:r>
-              <a:rPr lang="en-US" sz="1800" dirty="0" smtClean="0"/>
-              <a:t>This is called </a:t>
-            </a:r>
-            <a:r>
-              <a:rPr lang="en-US" sz="1800" b="1" dirty="0" smtClean="0"/>
-              <a:t>version control</a:t>
-            </a:r>
-          </a:p>
-          <a:p>
-            <a:r>
-              <a:rPr lang="en-US" sz="1800" dirty="0" smtClean="0"/>
-              <a:t>Drawbacks:</a:t>
-            </a:r>
-          </a:p>
-          <a:p>
-            <a:pPr lvl="1"/>
-            <a:r>
-              <a:rPr lang="en-US" sz="1400" dirty="0" smtClean="0"/>
-              <a:t>Saving new edits quickly becomes tedious</a:t>
-            </a:r>
-          </a:p>
-          <a:p>
-            <a:pPr lvl="1"/>
-            <a:r>
-              <a:rPr lang="en-US" sz="1400" dirty="0" smtClean="0"/>
-              <a:t>You might accidentally save over old versions</a:t>
-            </a:r>
-          </a:p>
-          <a:p>
-            <a:r>
-              <a:rPr lang="en-US" sz="1800" dirty="0"/>
-              <a:t>Introducing </a:t>
-            </a:r>
-            <a:r>
-              <a:rPr lang="en-US" sz="1800" dirty="0" err="1"/>
-              <a:t>Github</a:t>
-            </a:r>
-            <a:r>
-              <a:rPr lang="en-US" sz="1800" dirty="0"/>
-              <a:t>: a website that streamlines the procedure of version </a:t>
-            </a:r>
-            <a:r>
-              <a:rPr lang="en-US" sz="1800" dirty="0" smtClean="0"/>
-              <a:t>control</a:t>
-            </a:r>
-          </a:p>
-          <a:p>
-            <a:r>
-              <a:rPr lang="en-US" sz="1800" dirty="0" smtClean="0"/>
-              <a:t>Formatting in </a:t>
-            </a:r>
-            <a:r>
-              <a:rPr lang="en-US" sz="1800" dirty="0" err="1" smtClean="0"/>
-              <a:t>Github</a:t>
-            </a:r>
-            <a:r>
-              <a:rPr lang="en-US" sz="1800" dirty="0" smtClean="0"/>
-              <a:t> uses the markdown formatting language – the same as R Notebook! </a:t>
-            </a:r>
-            <a:endParaRPr lang="en-US" sz="1800" dirty="0"/>
-          </a:p>
-          <a:p>
-            <a:endParaRPr lang="en-US" sz="1800" dirty="0" smtClean="0"/>
-          </a:p>
-        </p:txBody>
-      </p:sp>
-      <p:sp>
-        <p:nvSpPr>
-          <p:cNvPr id="4" name="Content Placeholder 3"/>
-          <p:cNvSpPr>
-            <a:spLocks noGrp="1"/>
-          </p:cNvSpPr>
-          <p:nvPr>
-            <p:ph sz="half" idx="2"/>
-          </p:nvPr>
+              <a:rPr lang="en-US" sz="2000" dirty="0" smtClean="0"/>
+              <a:t>An R Notebook document can be “previewed” as output, displaying data as a rendered R Markdown document without executing any of your chunks</a:t>
+            </a:r>
+          </a:p>
+          <a:p>
+            <a:r>
+              <a:rPr lang="en-US" sz="2000" dirty="0" smtClean="0"/>
+              <a:t>However, all currently inline-displayed chunks that are showing will appear in the previewed document</a:t>
+            </a:r>
+          </a:p>
+          <a:p>
+            <a:r>
+              <a:rPr lang="en-US" sz="2000" dirty="0" smtClean="0"/>
+              <a:t>The “preview” option is just to the left of the small gear icon displayed earlier</a:t>
+            </a:r>
+          </a:p>
+          <a:p>
+            <a:endParaRPr lang="en-US" sz="3200" dirty="0"/>
+          </a:p>
+        </p:txBody>
+      </p:sp>
+      <p:sp>
+        <p:nvSpPr>
+          <p:cNvPr id="19" name="TextBox 18"/>
+          <p:cNvSpPr txBox="1"/>
+          <p:nvPr/>
         </p:nvSpPr>
         <p:spPr>
           <a:xfrm>
-            <a:off x="6016753" y="2560319"/>
-            <a:ext cx="5378742" cy="3564435"/>
+            <a:off x="6612328" y="5831457"/>
+            <a:ext cx="4161641" cy="276999"/>
           </a:xfrm>
+          <a:prstGeom prst="rect">
+            <a:avLst/>
+          </a:prstGeom>
+          <a:solidFill>
+            <a:schemeClr val="bg2"/>
+          </a:solidFill>
+          <a:ln w="9525">
+            <a:solidFill>
+              <a:schemeClr val="tx1"/>
+            </a:solidFill>
+          </a:ln>
         </p:spPr>
         <p:txBody>
-          <a:bodyPr>
-            <a:noAutofit/>
+          <a:bodyPr wrap="square" rtlCol="0">
+            <a:spAutoFit/>
           </a:bodyPr>
           <a:lstStyle/>
           <a:p>
-            <a:r>
-              <a:rPr lang="en-US" sz="1800" dirty="0" smtClean="0"/>
-              <a:t>In addition to keeping track of your document’s history, using </a:t>
-            </a:r>
-            <a:r>
-              <a:rPr lang="en-US" sz="1800" dirty="0" err="1" smtClean="0"/>
-              <a:t>Github</a:t>
-            </a:r>
-            <a:r>
-              <a:rPr lang="en-US" sz="1800" dirty="0" smtClean="0"/>
-              <a:t> for version control also offers the following benefits:</a:t>
-            </a:r>
-          </a:p>
-          <a:p>
-            <a:pPr lvl="1"/>
-            <a:r>
-              <a:rPr lang="en-US" sz="1600" dirty="0" smtClean="0"/>
-              <a:t>Creates an off-site copy of your document in the cloud</a:t>
-            </a:r>
-          </a:p>
-          <a:p>
-            <a:pPr lvl="1"/>
-            <a:r>
-              <a:rPr lang="en-US" sz="1600" dirty="0" smtClean="0"/>
-              <a:t>Allows for multiple “branches” of update history</a:t>
-            </a:r>
-          </a:p>
-          <a:p>
-            <a:pPr lvl="2"/>
-            <a:r>
-              <a:rPr lang="en-US" sz="1400" dirty="0" smtClean="0"/>
-              <a:t>Opens up ability to take a project down </a:t>
-            </a:r>
-            <a:r>
-              <a:rPr lang="en-US" sz="1400" dirty="0"/>
-              <a:t>different paths </a:t>
-            </a:r>
-            <a:r>
-              <a:rPr lang="en-US" sz="1400" dirty="0" smtClean="0"/>
-              <a:t>synchronously</a:t>
-            </a:r>
-          </a:p>
-          <a:p>
-            <a:pPr lvl="2"/>
-            <a:r>
-              <a:rPr lang="en-US" sz="1400" dirty="0" smtClean="0"/>
-              <a:t>Maintains a sensible “direction” of edits two-dimensionally in a way that is not easily replicable by simply </a:t>
-            </a:r>
-            <a:r>
-              <a:rPr lang="en-US" sz="1400" dirty="0" err="1" smtClean="0"/>
-              <a:t>addending</a:t>
-            </a:r>
-            <a:r>
-              <a:rPr lang="en-US" sz="1400" dirty="0" smtClean="0"/>
-              <a:t> endings manually</a:t>
-            </a:r>
-          </a:p>
-          <a:p>
-            <a:pPr lvl="1"/>
-            <a:r>
-              <a:rPr lang="en-US" sz="1600" dirty="0" smtClean="0"/>
-              <a:t>Allows other users to collaborate and submit updated versions of your files</a:t>
-            </a:r>
-            <a:endParaRPr lang="en-US" sz="1600" dirty="0"/>
-          </a:p>
-        </p:txBody>
-      </p:sp>
+            <a:pPr algn="ctr"/>
+            <a:r>
+              <a:rPr lang="en-US" sz="1200" dirty="0" smtClean="0">
+                <a:latin typeface="Arial" panose="020B0604020202020204" pitchFamily="34" charset="0"/>
+                <a:cs typeface="Arial" panose="020B0604020202020204" pitchFamily="34" charset="0"/>
+              </a:rPr>
+              <a:t>An example of output from an R Notebook document</a:t>
+            </a:r>
+            <a:endParaRPr lang="en-US" sz="1200" dirty="0">
+              <a:latin typeface="Arial" panose="020B0604020202020204" pitchFamily="34" charset="0"/>
+              <a:cs typeface="Arial" panose="020B0604020202020204" pitchFamily="34" charset="0"/>
+            </a:endParaRPr>
+          </a:p>
+        </p:txBody>
+      </p:sp>
+      <p:pic>
+        <p:nvPicPr>
+          <p:cNvPr id="4" name="Picture 3"/>
+          <p:cNvPicPr>
+            <a:picLocks noChangeAspect="1"/>
+          </p:cNvPicPr>
+          <p:nvPr/>
+        </p:nvPicPr>
+        <p:blipFill>
+          <a:blip r:embed="rId2">
+            <a:extLst>
+              <a:ext uri="{28A0092B-C50C-407E-A947-70E740481C1C}">
+                <a14:useLocalDpi xmlns:a14="http://schemas.microsoft.com/office/drawing/2010/main" val="0"/>
+              </a:ext>
+            </a:extLst>
+          </a:blip>
+          <a:stretch>
+            <a:fillRect/>
+          </a:stretch>
+        </p:blipFill>
+        <p:spPr>
+          <a:xfrm>
+            <a:off x="6612327" y="2466122"/>
+            <a:ext cx="4161641" cy="3365335"/>
+          </a:xfrm>
+          <a:prstGeom prst="rect">
+            <a:avLst/>
+          </a:prstGeom>
+        </p:spPr>
+      </p:pic>
     </p:spTree>
     <p:extLst>
       <p:ext uri="{BB962C8B-B14F-4D97-AF65-F5344CB8AC3E}">
-        <p14:creationId xmlns:p14="http://schemas.microsoft.com/office/powerpoint/2010/main" val="1440525949"/>
+        <p14:creationId xmlns:p14="http://schemas.microsoft.com/office/powerpoint/2010/main" val="203816899"/>
       </p:ext>
     </p:extLst>
   </p:cSld>
@@ -6206,6 +6135,1352 @@
           <a:lstStyle/>
           <a:p>
             <a:r>
+              <a:rPr lang="en-US" dirty="0" smtClean="0"/>
+              <a:t>Saving and Additional Concerns</a:t>
+            </a:r>
+            <a:endParaRPr lang="en-US" dirty="0"/>
+          </a:p>
+        </p:txBody>
+      </p:sp>
+      <p:sp>
+        <p:nvSpPr>
+          <p:cNvPr id="3" name="Content Placeholder 2"/>
+          <p:cNvSpPr>
+            <a:spLocks noGrp="1"/>
+          </p:cNvSpPr>
+          <p:nvPr>
+            <p:ph sz="half" idx="1"/>
+          </p:nvPr>
+        </p:nvSpPr>
+        <p:spPr>
+          <a:xfrm>
+            <a:off x="1298448" y="2560320"/>
+            <a:ext cx="4718304" cy="2176978"/>
+          </a:xfrm>
+        </p:spPr>
+        <p:txBody>
+          <a:bodyPr>
+            <a:normAutofit fontScale="85000" lnSpcReduction="10000"/>
+          </a:bodyPr>
+          <a:lstStyle/>
+          <a:p>
+            <a:r>
+              <a:rPr lang="en-US" dirty="0" smtClean="0"/>
+              <a:t>Whenever you save your document, alongside the .</a:t>
+            </a:r>
+            <a:r>
+              <a:rPr lang="en-US" dirty="0" err="1" smtClean="0"/>
+              <a:t>rmd</a:t>
+            </a:r>
+            <a:r>
+              <a:rPr lang="en-US" dirty="0" smtClean="0"/>
+              <a:t> file you are currently working on, a .nb.html file is created</a:t>
+            </a:r>
+          </a:p>
+          <a:p>
+            <a:r>
+              <a:rPr lang="en-US" dirty="0" smtClean="0"/>
+              <a:t>This document is simply an html file displaying exactly what clicking “preview” would have done at the time of saving</a:t>
+            </a:r>
+          </a:p>
+        </p:txBody>
+      </p:sp>
+      <p:sp>
+        <p:nvSpPr>
+          <p:cNvPr id="4" name="Content Placeholder 3"/>
+          <p:cNvSpPr>
+            <a:spLocks noGrp="1"/>
+          </p:cNvSpPr>
+          <p:nvPr>
+            <p:ph sz="half" idx="2"/>
+          </p:nvPr>
+        </p:nvSpPr>
+        <p:spPr>
+          <a:xfrm>
+            <a:off x="1295402" y="4633811"/>
+            <a:ext cx="3748005" cy="1268082"/>
+          </a:xfrm>
+        </p:spPr>
+        <p:txBody>
+          <a:bodyPr numCol="1">
+            <a:normAutofit fontScale="85000" lnSpcReduction="10000"/>
+          </a:bodyPr>
+          <a:lstStyle/>
+          <a:p>
+            <a:r>
+              <a:rPr lang="en-US" dirty="0"/>
+              <a:t>This document can be shared with others and opened either within a web browser or within </a:t>
+            </a:r>
+            <a:r>
+              <a:rPr lang="en-US" dirty="0" err="1"/>
+              <a:t>RStudio</a:t>
+            </a:r>
+            <a:r>
+              <a:rPr lang="en-US" dirty="0"/>
+              <a:t> itself</a:t>
+            </a:r>
+          </a:p>
+          <a:p>
+            <a:endParaRPr lang="en-US" dirty="0"/>
+          </a:p>
+        </p:txBody>
+      </p:sp>
+      <p:sp>
+        <p:nvSpPr>
+          <p:cNvPr id="6" name="Content Placeholder 2"/>
+          <p:cNvSpPr txBox="1">
+            <a:spLocks/>
+          </p:cNvSpPr>
+          <p:nvPr/>
+        </p:nvSpPr>
+        <p:spPr>
+          <a:xfrm>
+            <a:off x="6178294" y="1786890"/>
+            <a:ext cx="4718304" cy="3310128"/>
+          </a:xfrm>
+          <a:prstGeom prst="rect">
+            <a:avLst/>
+          </a:prstGeom>
+        </p:spPr>
+        <p:txBody>
+          <a:bodyPr vert="horz" lIns="91440" tIns="45720" rIns="91440" bIns="45720" rtlCol="0" anchor="t">
+            <a:normAutofit/>
+          </a:bodyPr>
+          <a:lstStyle>
+            <a:lvl1pPr marL="285750" indent="-285750" algn="l" defTabSz="457200" rtl="0" eaLnBrk="1" latinLnBrk="0" hangingPunct="1">
+              <a:spcBef>
+                <a:spcPct val="20000"/>
+              </a:spcBef>
+              <a:spcAft>
+                <a:spcPts val="600"/>
+              </a:spcAft>
+              <a:buClr>
+                <a:schemeClr val="accent1"/>
+              </a:buClr>
+              <a:buSzPct val="115000"/>
+              <a:buFont typeface="Arial"/>
+              <a:buChar char="•"/>
+              <a:defRPr sz="2400" kern="1200" cap="none">
+                <a:solidFill>
+                  <a:schemeClr val="tx1">
+                    <a:lumMod val="85000"/>
+                    <a:lumOff val="15000"/>
+                  </a:schemeClr>
+                </a:solidFill>
+                <a:effectLst/>
+                <a:latin typeface="+mn-lt"/>
+                <a:ea typeface="+mn-ea"/>
+                <a:cs typeface="+mn-cs"/>
+              </a:defRPr>
+            </a:lvl1pPr>
+            <a:lvl2pPr marL="742950" indent="-285750" algn="l" defTabSz="457200" rtl="0" eaLnBrk="1" latinLnBrk="0" hangingPunct="1">
+              <a:spcBef>
+                <a:spcPct val="20000"/>
+              </a:spcBef>
+              <a:spcAft>
+                <a:spcPts val="600"/>
+              </a:spcAft>
+              <a:buClr>
+                <a:schemeClr val="accent1"/>
+              </a:buClr>
+              <a:buSzPct val="115000"/>
+              <a:buFont typeface="Arial"/>
+              <a:buChar char="•"/>
+              <a:defRPr sz="2000" kern="1200" cap="none">
+                <a:solidFill>
+                  <a:schemeClr val="tx1">
+                    <a:lumMod val="85000"/>
+                    <a:lumOff val="15000"/>
+                  </a:schemeClr>
+                </a:solidFill>
+                <a:effectLst/>
+                <a:latin typeface="+mn-lt"/>
+                <a:ea typeface="+mn-ea"/>
+                <a:cs typeface="+mn-cs"/>
+              </a:defRPr>
+            </a:lvl2pPr>
+            <a:lvl3pPr marL="1200150" indent="-285750" algn="l" defTabSz="457200" rtl="0" eaLnBrk="1" latinLnBrk="0" hangingPunct="1">
+              <a:spcBef>
+                <a:spcPct val="20000"/>
+              </a:spcBef>
+              <a:spcAft>
+                <a:spcPts val="600"/>
+              </a:spcAft>
+              <a:buClr>
+                <a:schemeClr val="accent1"/>
+              </a:buClr>
+              <a:buSzPct val="115000"/>
+              <a:buFont typeface="Arial"/>
+              <a:buChar char="•"/>
+              <a:defRPr sz="1800" kern="1200" cap="none">
+                <a:solidFill>
+                  <a:schemeClr val="tx1">
+                    <a:lumMod val="85000"/>
+                    <a:lumOff val="15000"/>
+                  </a:schemeClr>
+                </a:solidFill>
+                <a:effectLst/>
+                <a:latin typeface="+mn-lt"/>
+                <a:ea typeface="+mn-ea"/>
+                <a:cs typeface="+mn-cs"/>
+              </a:defRPr>
+            </a:lvl3pPr>
+            <a:lvl4pPr marL="1543050" indent="-171450" algn="l" defTabSz="457200" rtl="0" eaLnBrk="1" latinLnBrk="0" hangingPunct="1">
+              <a:spcBef>
+                <a:spcPct val="20000"/>
+              </a:spcBef>
+              <a:spcAft>
+                <a:spcPts val="600"/>
+              </a:spcAft>
+              <a:buClr>
+                <a:schemeClr val="accent1"/>
+              </a:buClr>
+              <a:buSzPct val="115000"/>
+              <a:buFont typeface="Arial"/>
+              <a:buChar char="•"/>
+              <a:defRPr sz="1600" kern="1200" cap="none">
+                <a:solidFill>
+                  <a:schemeClr val="tx1">
+                    <a:lumMod val="85000"/>
+                    <a:lumOff val="15000"/>
+                  </a:schemeClr>
+                </a:solidFill>
+                <a:effectLst/>
+                <a:latin typeface="+mn-lt"/>
+                <a:ea typeface="+mn-ea"/>
+                <a:cs typeface="+mn-cs"/>
+              </a:defRPr>
+            </a:lvl4pPr>
+            <a:lvl5pPr marL="2000250" indent="-171450" algn="l" defTabSz="457200" rtl="0" eaLnBrk="1" latinLnBrk="0" hangingPunct="1">
+              <a:spcBef>
+                <a:spcPct val="20000"/>
+              </a:spcBef>
+              <a:spcAft>
+                <a:spcPts val="600"/>
+              </a:spcAft>
+              <a:buClr>
+                <a:schemeClr val="accent1"/>
+              </a:buClr>
+              <a:buSzPct val="115000"/>
+              <a:buFont typeface="Arial"/>
+              <a:buChar char="•"/>
+              <a:defRPr sz="1400" kern="1200" cap="none">
+                <a:solidFill>
+                  <a:schemeClr val="tx1">
+                    <a:lumMod val="85000"/>
+                    <a:lumOff val="15000"/>
+                  </a:schemeClr>
+                </a:solidFill>
+                <a:effectLst/>
+                <a:latin typeface="+mn-lt"/>
+                <a:ea typeface="+mn-ea"/>
+                <a:cs typeface="+mn-cs"/>
+              </a:defRPr>
+            </a:lvl5pPr>
+            <a:lvl6pPr marL="2514600" indent="-228600" algn="l" defTabSz="457200" rtl="0" eaLnBrk="1" latinLnBrk="0" hangingPunct="1">
+              <a:spcBef>
+                <a:spcPct val="20000"/>
+              </a:spcBef>
+              <a:spcAft>
+                <a:spcPts val="600"/>
+              </a:spcAft>
+              <a:buClr>
+                <a:schemeClr val="accent1"/>
+              </a:buClr>
+              <a:buSzPct val="115000"/>
+              <a:buFont typeface="Arial"/>
+              <a:buChar char="•"/>
+              <a:defRPr sz="1400" kern="1200" cap="none">
+                <a:solidFill>
+                  <a:schemeClr val="tx1">
+                    <a:lumMod val="85000"/>
+                    <a:lumOff val="15000"/>
+                  </a:schemeClr>
+                </a:solidFill>
+                <a:effectLst/>
+                <a:latin typeface="+mn-lt"/>
+                <a:ea typeface="+mn-ea"/>
+                <a:cs typeface="+mn-cs"/>
+              </a:defRPr>
+            </a:lvl6pPr>
+            <a:lvl7pPr marL="2971800" indent="-228600" algn="l" defTabSz="457200" rtl="0" eaLnBrk="1" latinLnBrk="0" hangingPunct="1">
+              <a:spcBef>
+                <a:spcPct val="20000"/>
+              </a:spcBef>
+              <a:spcAft>
+                <a:spcPts val="600"/>
+              </a:spcAft>
+              <a:buClr>
+                <a:schemeClr val="accent1"/>
+              </a:buClr>
+              <a:buSzPct val="115000"/>
+              <a:buFont typeface="Arial"/>
+              <a:buChar char="•"/>
+              <a:defRPr sz="1400" kern="1200" cap="none">
+                <a:solidFill>
+                  <a:schemeClr val="tx1">
+                    <a:lumMod val="85000"/>
+                    <a:lumOff val="15000"/>
+                  </a:schemeClr>
+                </a:solidFill>
+                <a:effectLst/>
+                <a:latin typeface="+mn-lt"/>
+                <a:ea typeface="+mn-ea"/>
+                <a:cs typeface="+mn-cs"/>
+              </a:defRPr>
+            </a:lvl7pPr>
+            <a:lvl8pPr marL="3429000" indent="-228600" algn="l" defTabSz="457200" rtl="0" eaLnBrk="1" latinLnBrk="0" hangingPunct="1">
+              <a:spcBef>
+                <a:spcPct val="20000"/>
+              </a:spcBef>
+              <a:spcAft>
+                <a:spcPts val="600"/>
+              </a:spcAft>
+              <a:buClr>
+                <a:schemeClr val="accent1"/>
+              </a:buClr>
+              <a:buSzPct val="115000"/>
+              <a:buFont typeface="Arial"/>
+              <a:buChar char="•"/>
+              <a:defRPr sz="1400" kern="1200" cap="none">
+                <a:solidFill>
+                  <a:schemeClr val="tx1">
+                    <a:lumMod val="85000"/>
+                    <a:lumOff val="15000"/>
+                  </a:schemeClr>
+                </a:solidFill>
+                <a:effectLst/>
+                <a:latin typeface="+mn-lt"/>
+                <a:ea typeface="+mn-ea"/>
+                <a:cs typeface="+mn-cs"/>
+              </a:defRPr>
+            </a:lvl8pPr>
+            <a:lvl9pPr marL="3886200" indent="-228600" algn="l" defTabSz="457200" rtl="0" eaLnBrk="1" latinLnBrk="0" hangingPunct="1">
+              <a:spcBef>
+                <a:spcPct val="20000"/>
+              </a:spcBef>
+              <a:spcAft>
+                <a:spcPts val="600"/>
+              </a:spcAft>
+              <a:buClr>
+                <a:schemeClr val="accent1"/>
+              </a:buClr>
+              <a:buSzPct val="115000"/>
+              <a:buFont typeface="Arial"/>
+              <a:buChar char="•"/>
+              <a:defRPr sz="1400" kern="1200" cap="none">
+                <a:solidFill>
+                  <a:schemeClr val="tx1">
+                    <a:lumMod val="85000"/>
+                    <a:lumOff val="15000"/>
+                  </a:schemeClr>
+                </a:solidFill>
+                <a:effectLst/>
+                <a:latin typeface="+mn-lt"/>
+                <a:ea typeface="+mn-ea"/>
+                <a:cs typeface="+mn-cs"/>
+              </a:defRPr>
+            </a:lvl9pPr>
+          </a:lstStyle>
+          <a:p>
+            <a:endParaRPr lang="en-US" dirty="0"/>
+          </a:p>
+        </p:txBody>
+      </p:sp>
+      <p:sp>
+        <p:nvSpPr>
+          <p:cNvPr id="7" name="Content Placeholder 3"/>
+          <p:cNvSpPr txBox="1">
+            <a:spLocks/>
+          </p:cNvSpPr>
+          <p:nvPr/>
+        </p:nvSpPr>
+        <p:spPr>
+          <a:xfrm>
+            <a:off x="6016752" y="2558625"/>
+            <a:ext cx="5188961" cy="2075186"/>
+          </a:xfrm>
+          <a:prstGeom prst="rect">
+            <a:avLst/>
+          </a:prstGeom>
+        </p:spPr>
+        <p:txBody>
+          <a:bodyPr vert="horz" lIns="91440" tIns="45720" rIns="91440" bIns="45720" numCol="1" rtlCol="0" anchor="t">
+            <a:normAutofit fontScale="47500" lnSpcReduction="20000"/>
+          </a:bodyPr>
+          <a:lstStyle>
+            <a:lvl1pPr marL="285750" indent="-285750" algn="l" defTabSz="457200" rtl="0" eaLnBrk="1" latinLnBrk="0" hangingPunct="1">
+              <a:spcBef>
+                <a:spcPct val="20000"/>
+              </a:spcBef>
+              <a:spcAft>
+                <a:spcPts val="600"/>
+              </a:spcAft>
+              <a:buClr>
+                <a:schemeClr val="accent1"/>
+              </a:buClr>
+              <a:buSzPct val="115000"/>
+              <a:buFont typeface="Arial"/>
+              <a:buChar char="•"/>
+              <a:defRPr sz="2400" kern="1200" cap="none">
+                <a:solidFill>
+                  <a:schemeClr val="tx1">
+                    <a:lumMod val="85000"/>
+                    <a:lumOff val="15000"/>
+                  </a:schemeClr>
+                </a:solidFill>
+                <a:effectLst/>
+                <a:latin typeface="+mn-lt"/>
+                <a:ea typeface="+mn-ea"/>
+                <a:cs typeface="+mn-cs"/>
+              </a:defRPr>
+            </a:lvl1pPr>
+            <a:lvl2pPr marL="742950" indent="-285750" algn="l" defTabSz="457200" rtl="0" eaLnBrk="1" latinLnBrk="0" hangingPunct="1">
+              <a:spcBef>
+                <a:spcPct val="20000"/>
+              </a:spcBef>
+              <a:spcAft>
+                <a:spcPts val="600"/>
+              </a:spcAft>
+              <a:buClr>
+                <a:schemeClr val="accent1"/>
+              </a:buClr>
+              <a:buSzPct val="115000"/>
+              <a:buFont typeface="Arial"/>
+              <a:buChar char="•"/>
+              <a:defRPr sz="2000" kern="1200" cap="none">
+                <a:solidFill>
+                  <a:schemeClr val="tx1">
+                    <a:lumMod val="85000"/>
+                    <a:lumOff val="15000"/>
+                  </a:schemeClr>
+                </a:solidFill>
+                <a:effectLst/>
+                <a:latin typeface="+mn-lt"/>
+                <a:ea typeface="+mn-ea"/>
+                <a:cs typeface="+mn-cs"/>
+              </a:defRPr>
+            </a:lvl2pPr>
+            <a:lvl3pPr marL="1200150" indent="-285750" algn="l" defTabSz="457200" rtl="0" eaLnBrk="1" latinLnBrk="0" hangingPunct="1">
+              <a:spcBef>
+                <a:spcPct val="20000"/>
+              </a:spcBef>
+              <a:spcAft>
+                <a:spcPts val="600"/>
+              </a:spcAft>
+              <a:buClr>
+                <a:schemeClr val="accent1"/>
+              </a:buClr>
+              <a:buSzPct val="115000"/>
+              <a:buFont typeface="Arial"/>
+              <a:buChar char="•"/>
+              <a:defRPr sz="1800" kern="1200" cap="none">
+                <a:solidFill>
+                  <a:schemeClr val="tx1">
+                    <a:lumMod val="85000"/>
+                    <a:lumOff val="15000"/>
+                  </a:schemeClr>
+                </a:solidFill>
+                <a:effectLst/>
+                <a:latin typeface="+mn-lt"/>
+                <a:ea typeface="+mn-ea"/>
+                <a:cs typeface="+mn-cs"/>
+              </a:defRPr>
+            </a:lvl3pPr>
+            <a:lvl4pPr marL="1543050" indent="-171450" algn="l" defTabSz="457200" rtl="0" eaLnBrk="1" latinLnBrk="0" hangingPunct="1">
+              <a:spcBef>
+                <a:spcPct val="20000"/>
+              </a:spcBef>
+              <a:spcAft>
+                <a:spcPts val="600"/>
+              </a:spcAft>
+              <a:buClr>
+                <a:schemeClr val="accent1"/>
+              </a:buClr>
+              <a:buSzPct val="115000"/>
+              <a:buFont typeface="Arial"/>
+              <a:buChar char="•"/>
+              <a:defRPr sz="1600" kern="1200" cap="none">
+                <a:solidFill>
+                  <a:schemeClr val="tx1">
+                    <a:lumMod val="85000"/>
+                    <a:lumOff val="15000"/>
+                  </a:schemeClr>
+                </a:solidFill>
+                <a:effectLst/>
+                <a:latin typeface="+mn-lt"/>
+                <a:ea typeface="+mn-ea"/>
+                <a:cs typeface="+mn-cs"/>
+              </a:defRPr>
+            </a:lvl4pPr>
+            <a:lvl5pPr marL="2000250" indent="-171450" algn="l" defTabSz="457200" rtl="0" eaLnBrk="1" latinLnBrk="0" hangingPunct="1">
+              <a:spcBef>
+                <a:spcPct val="20000"/>
+              </a:spcBef>
+              <a:spcAft>
+                <a:spcPts val="600"/>
+              </a:spcAft>
+              <a:buClr>
+                <a:schemeClr val="accent1"/>
+              </a:buClr>
+              <a:buSzPct val="115000"/>
+              <a:buFont typeface="Arial"/>
+              <a:buChar char="•"/>
+              <a:defRPr sz="1400" kern="1200" cap="none">
+                <a:solidFill>
+                  <a:schemeClr val="tx1">
+                    <a:lumMod val="85000"/>
+                    <a:lumOff val="15000"/>
+                  </a:schemeClr>
+                </a:solidFill>
+                <a:effectLst/>
+                <a:latin typeface="+mn-lt"/>
+                <a:ea typeface="+mn-ea"/>
+                <a:cs typeface="+mn-cs"/>
+              </a:defRPr>
+            </a:lvl5pPr>
+            <a:lvl6pPr marL="2514600" indent="-228600" algn="l" defTabSz="457200" rtl="0" eaLnBrk="1" latinLnBrk="0" hangingPunct="1">
+              <a:spcBef>
+                <a:spcPct val="20000"/>
+              </a:spcBef>
+              <a:spcAft>
+                <a:spcPts val="600"/>
+              </a:spcAft>
+              <a:buClr>
+                <a:schemeClr val="accent1"/>
+              </a:buClr>
+              <a:buSzPct val="115000"/>
+              <a:buFont typeface="Arial"/>
+              <a:buChar char="•"/>
+              <a:defRPr sz="1400" kern="1200" cap="none">
+                <a:solidFill>
+                  <a:schemeClr val="tx1">
+                    <a:lumMod val="85000"/>
+                    <a:lumOff val="15000"/>
+                  </a:schemeClr>
+                </a:solidFill>
+                <a:effectLst/>
+                <a:latin typeface="+mn-lt"/>
+                <a:ea typeface="+mn-ea"/>
+                <a:cs typeface="+mn-cs"/>
+              </a:defRPr>
+            </a:lvl6pPr>
+            <a:lvl7pPr marL="2971800" indent="-228600" algn="l" defTabSz="457200" rtl="0" eaLnBrk="1" latinLnBrk="0" hangingPunct="1">
+              <a:spcBef>
+                <a:spcPct val="20000"/>
+              </a:spcBef>
+              <a:spcAft>
+                <a:spcPts val="600"/>
+              </a:spcAft>
+              <a:buClr>
+                <a:schemeClr val="accent1"/>
+              </a:buClr>
+              <a:buSzPct val="115000"/>
+              <a:buFont typeface="Arial"/>
+              <a:buChar char="•"/>
+              <a:defRPr sz="1400" kern="1200" cap="none">
+                <a:solidFill>
+                  <a:schemeClr val="tx1">
+                    <a:lumMod val="85000"/>
+                    <a:lumOff val="15000"/>
+                  </a:schemeClr>
+                </a:solidFill>
+                <a:effectLst/>
+                <a:latin typeface="+mn-lt"/>
+                <a:ea typeface="+mn-ea"/>
+                <a:cs typeface="+mn-cs"/>
+              </a:defRPr>
+            </a:lvl7pPr>
+            <a:lvl8pPr marL="3429000" indent="-228600" algn="l" defTabSz="457200" rtl="0" eaLnBrk="1" latinLnBrk="0" hangingPunct="1">
+              <a:spcBef>
+                <a:spcPct val="20000"/>
+              </a:spcBef>
+              <a:spcAft>
+                <a:spcPts val="600"/>
+              </a:spcAft>
+              <a:buClr>
+                <a:schemeClr val="accent1"/>
+              </a:buClr>
+              <a:buSzPct val="115000"/>
+              <a:buFont typeface="Arial"/>
+              <a:buChar char="•"/>
+              <a:defRPr sz="1400" kern="1200" cap="none">
+                <a:solidFill>
+                  <a:schemeClr val="tx1">
+                    <a:lumMod val="85000"/>
+                    <a:lumOff val="15000"/>
+                  </a:schemeClr>
+                </a:solidFill>
+                <a:effectLst/>
+                <a:latin typeface="+mn-lt"/>
+                <a:ea typeface="+mn-ea"/>
+                <a:cs typeface="+mn-cs"/>
+              </a:defRPr>
+            </a:lvl8pPr>
+            <a:lvl9pPr marL="3886200" indent="-228600" algn="l" defTabSz="457200" rtl="0" eaLnBrk="1" latinLnBrk="0" hangingPunct="1">
+              <a:spcBef>
+                <a:spcPct val="20000"/>
+              </a:spcBef>
+              <a:spcAft>
+                <a:spcPts val="600"/>
+              </a:spcAft>
+              <a:buClr>
+                <a:schemeClr val="accent1"/>
+              </a:buClr>
+              <a:buSzPct val="115000"/>
+              <a:buFont typeface="Arial"/>
+              <a:buChar char="•"/>
+              <a:defRPr sz="1400" kern="1200" cap="none">
+                <a:solidFill>
+                  <a:schemeClr val="tx1">
+                    <a:lumMod val="85000"/>
+                    <a:lumOff val="15000"/>
+                  </a:schemeClr>
+                </a:solidFill>
+                <a:effectLst/>
+                <a:latin typeface="+mn-lt"/>
+                <a:ea typeface="+mn-ea"/>
+                <a:cs typeface="+mn-cs"/>
+              </a:defRPr>
+            </a:lvl9pPr>
+          </a:lstStyle>
+          <a:p>
+            <a:r>
+              <a:rPr lang="en-US" sz="3800" dirty="0" smtClean="0"/>
+              <a:t>File formatting within an R Notebook document is done in the </a:t>
+            </a:r>
+            <a:r>
+              <a:rPr lang="en-US" sz="3800" b="1" dirty="0" smtClean="0"/>
+              <a:t>markdown</a:t>
+            </a:r>
+            <a:r>
+              <a:rPr lang="en-US" sz="3800" dirty="0" smtClean="0"/>
+              <a:t> formatting language</a:t>
+            </a:r>
+          </a:p>
+          <a:p>
+            <a:pPr lvl="1">
+              <a:buFont typeface="Wingdings" panose="05000000000000000000" pitchFamily="2" charset="2"/>
+              <a:buChar char="ü"/>
+            </a:pPr>
+            <a:r>
+              <a:rPr lang="en-US" sz="3400" dirty="0" smtClean="0"/>
+              <a:t>Markdown is an easy-to-use text formatting language that allows for the creation of rich text using plain text</a:t>
+            </a:r>
+          </a:p>
+          <a:p>
+            <a:pPr lvl="1">
+              <a:buFont typeface="Wingdings" panose="05000000000000000000" pitchFamily="2" charset="2"/>
+              <a:buChar char="ü"/>
+            </a:pPr>
+            <a:r>
+              <a:rPr lang="en-US" sz="3400" dirty="0" smtClean="0"/>
+              <a:t>For more information on formatting using markdown</a:t>
+            </a:r>
+            <a:r>
+              <a:rPr lang="en-US" sz="3400" dirty="0"/>
+              <a:t>, consult </a:t>
+            </a:r>
+            <a:r>
+              <a:rPr lang="en-US" sz="3400" dirty="0">
+                <a:hlinkClick r:id="rId2"/>
+              </a:rPr>
+              <a:t>https://</a:t>
+            </a:r>
+            <a:r>
+              <a:rPr lang="en-US" sz="3400" dirty="0" smtClean="0">
+                <a:hlinkClick r:id="rId2"/>
+              </a:rPr>
+              <a:t>daringfireball.net/projects/markdown/basics</a:t>
+            </a:r>
+            <a:endParaRPr lang="en-US" sz="3400" dirty="0" smtClean="0"/>
+          </a:p>
+          <a:p>
+            <a:endParaRPr lang="en-US" sz="2600" dirty="0"/>
+          </a:p>
+        </p:txBody>
+      </p:sp>
+      <p:pic>
+        <p:nvPicPr>
+          <p:cNvPr id="8" name="Picture 7"/>
+          <p:cNvPicPr>
+            <a:picLocks noChangeAspect="1"/>
+          </p:cNvPicPr>
+          <p:nvPr/>
+        </p:nvPicPr>
+        <p:blipFill>
+          <a:blip r:embed="rId3">
+            <a:extLst>
+              <a:ext uri="{28A0092B-C50C-407E-A947-70E740481C1C}">
+                <a14:useLocalDpi xmlns:a14="http://schemas.microsoft.com/office/drawing/2010/main" val="0"/>
+              </a:ext>
+            </a:extLst>
+          </a:blip>
+          <a:stretch>
+            <a:fillRect/>
+          </a:stretch>
+        </p:blipFill>
+        <p:spPr>
+          <a:xfrm>
+            <a:off x="5043407" y="4586064"/>
+            <a:ext cx="6409100" cy="1568993"/>
+          </a:xfrm>
+          <a:prstGeom prst="rect">
+            <a:avLst/>
+          </a:prstGeom>
+        </p:spPr>
+      </p:pic>
+    </p:spTree>
+    <p:extLst>
+      <p:ext uri="{BB962C8B-B14F-4D97-AF65-F5344CB8AC3E}">
+        <p14:creationId xmlns:p14="http://schemas.microsoft.com/office/powerpoint/2010/main" val="2969344793"/>
+      </p:ext>
+    </p:extLst>
+  </p:cSld>
+  <p:clrMapOvr>
+    <a:masterClrMapping/>
+  </p:clrMapOvr>
+  <p:timing>
+    <p:tnLst>
+      <p:par>
+        <p:cTn id="1" dur="indefinite" restart="never" nodeType="tmRoot"/>
+      </p:par>
+    </p:tnLst>
+  </p:timing>
+</p:sld>
+</file>
+
+<file path=ppt/slides/slide12.xml><?xml version="1.0" encoding="utf-8"?>
+<p:sld xmlns:a="http://schemas.openxmlformats.org/drawingml/2006/main" xmlns:r="http://schemas.openxmlformats.org/officeDocument/2006/relationships" xmlns:p="http://schemas.openxmlformats.org/presentationml/2006/main">
+  <p:cSld>
+    <p:spTree>
+      <p:nvGrpSpPr>
+        <p:cNvPr id="1" name=""/>
+        <p:cNvGrpSpPr/>
+        <p:nvPr/>
+      </p:nvGrpSpPr>
+      <p:grpSpPr>
+        <a:xfrm>
+          <a:off x="0" y="0"/>
+          <a:ext cx="0" cy="0"/>
+          <a:chOff x="0" y="0"/>
+          <a:chExt cx="0" cy="0"/>
+        </a:xfrm>
+      </p:grpSpPr>
+      <p:sp>
+        <p:nvSpPr>
+          <p:cNvPr id="2" name="Title 1"/>
+          <p:cNvSpPr>
+            <a:spLocks noGrp="1"/>
+          </p:cNvSpPr>
+          <p:nvPr>
+            <p:ph type="title"/>
+          </p:nvPr>
+        </p:nvSpPr>
+        <p:spPr/>
+        <p:txBody>
+          <a:bodyPr/>
+          <a:lstStyle/>
+          <a:p>
+            <a:r>
+              <a:rPr lang="en-US" dirty="0" smtClean="0"/>
+              <a:t>Common Errors</a:t>
+            </a:r>
+            <a:endParaRPr lang="en-US" dirty="0"/>
+          </a:p>
+        </p:txBody>
+      </p:sp>
+      <p:sp>
+        <p:nvSpPr>
+          <p:cNvPr id="3" name="Content Placeholder 2"/>
+          <p:cNvSpPr>
+            <a:spLocks noGrp="1"/>
+          </p:cNvSpPr>
+          <p:nvPr>
+            <p:ph idx="1"/>
+          </p:nvPr>
+        </p:nvSpPr>
+        <p:spPr/>
+        <p:txBody>
+          <a:bodyPr>
+            <a:normAutofit/>
+          </a:bodyPr>
+          <a:lstStyle/>
+          <a:p>
+            <a:r>
+              <a:rPr lang="en-US" b="1" dirty="0">
+                <a:solidFill>
+                  <a:schemeClr val="tx1"/>
+                </a:solidFill>
+              </a:rPr>
+              <a:t>Error: </a:t>
+            </a:r>
+            <a:r>
+              <a:rPr lang="en-US" b="1" u="sng" dirty="0">
+                <a:solidFill>
+                  <a:schemeClr val="tx1"/>
+                </a:solidFill>
+              </a:rPr>
+              <a:t>'</a:t>
+            </a:r>
+            <a:r>
+              <a:rPr lang="en-US" b="1" u="sng" dirty="0" err="1">
+                <a:solidFill>
+                  <a:schemeClr val="tx1"/>
+                </a:solidFill>
+              </a:rPr>
+              <a:t>is_latex_output</a:t>
+            </a:r>
+            <a:r>
+              <a:rPr lang="en-US" b="1" u="sng" dirty="0">
+                <a:solidFill>
+                  <a:schemeClr val="tx1"/>
+                </a:solidFill>
+              </a:rPr>
+              <a:t>' is not an exported object from '</a:t>
+            </a:r>
+            <a:r>
+              <a:rPr lang="en-US" b="1" u="sng" dirty="0" err="1">
+                <a:solidFill>
+                  <a:schemeClr val="tx1"/>
+                </a:solidFill>
+              </a:rPr>
+              <a:t>namespace:knitr</a:t>
+            </a:r>
+            <a:r>
+              <a:rPr lang="en-US" b="1" u="sng" dirty="0">
+                <a:solidFill>
+                  <a:schemeClr val="tx1"/>
+                </a:solidFill>
+              </a:rPr>
+              <a:t>' Execution </a:t>
+            </a:r>
+            <a:r>
+              <a:rPr lang="en-US" b="1" u="sng" dirty="0" smtClean="0">
+                <a:solidFill>
+                  <a:schemeClr val="tx1"/>
+                </a:solidFill>
+              </a:rPr>
+              <a:t>halted</a:t>
+            </a:r>
+          </a:p>
+          <a:p>
+            <a:pPr lvl="1"/>
+            <a:r>
+              <a:rPr lang="en-US" b="1" dirty="0" smtClean="0">
+                <a:solidFill>
+                  <a:schemeClr val="tx1"/>
+                </a:solidFill>
+              </a:rPr>
+              <a:t>Solution:</a:t>
+            </a:r>
+            <a:r>
+              <a:rPr lang="en-US" dirty="0" smtClean="0">
+                <a:solidFill>
+                  <a:schemeClr val="tx1"/>
+                </a:solidFill>
+              </a:rPr>
+              <a:t> Run the following code in your R console: </a:t>
+            </a:r>
+          </a:p>
+          <a:p>
+            <a:pPr marL="457200" lvl="1" indent="0">
+              <a:buNone/>
+            </a:pPr>
+            <a:r>
+              <a:rPr lang="en-US" sz="1800" dirty="0" err="1" smtClean="0">
+                <a:solidFill>
+                  <a:srgbClr val="7030A0"/>
+                </a:solidFill>
+              </a:rPr>
+              <a:t>install.packages</a:t>
+            </a:r>
+            <a:r>
+              <a:rPr lang="en-US" sz="1800" dirty="0">
+                <a:solidFill>
+                  <a:srgbClr val="7030A0"/>
+                </a:solidFill>
+              </a:rPr>
+              <a:t>('</a:t>
+            </a:r>
+            <a:r>
+              <a:rPr lang="en-US" sz="1800" dirty="0" err="1">
+                <a:solidFill>
+                  <a:srgbClr val="7030A0"/>
+                </a:solidFill>
+              </a:rPr>
+              <a:t>knitr</a:t>
+            </a:r>
+            <a:r>
+              <a:rPr lang="en-US" sz="1800" dirty="0">
+                <a:solidFill>
+                  <a:srgbClr val="7030A0"/>
+                </a:solidFill>
+              </a:rPr>
+              <a:t>', repos = c('http://rforge.net', 'http://cran.rstudio.org'), type = 'source</a:t>
+            </a:r>
+            <a:r>
+              <a:rPr lang="en-US" sz="1800" dirty="0" smtClean="0">
+                <a:solidFill>
+                  <a:srgbClr val="7030A0"/>
+                </a:solidFill>
+              </a:rPr>
+              <a:t>')</a:t>
+            </a:r>
+            <a:endParaRPr lang="en-US" sz="1800" b="1" dirty="0" smtClean="0">
+              <a:solidFill>
+                <a:schemeClr val="tx1"/>
+              </a:solidFill>
+            </a:endParaRPr>
+          </a:p>
+          <a:p>
+            <a:r>
+              <a:rPr lang="en-US" dirty="0" smtClean="0">
+                <a:solidFill>
+                  <a:schemeClr val="tx1"/>
+                </a:solidFill>
+              </a:rPr>
+              <a:t>_</a:t>
+            </a:r>
+          </a:p>
+          <a:p>
+            <a:pPr lvl="1"/>
+            <a:r>
+              <a:rPr lang="en-US" b="1" dirty="0" smtClean="0">
+                <a:solidFill>
+                  <a:schemeClr val="tx1"/>
+                </a:solidFill>
+              </a:rPr>
+              <a:t>Solution:</a:t>
+            </a:r>
+            <a:r>
+              <a:rPr lang="en-US" dirty="0" smtClean="0">
+                <a:solidFill>
+                  <a:schemeClr val="tx1"/>
+                </a:solidFill>
+              </a:rPr>
+              <a:t> Give a unique name to all of your unnamed chunks</a:t>
+            </a:r>
+            <a:endParaRPr lang="en-US" b="1" dirty="0" smtClean="0">
+              <a:solidFill>
+                <a:schemeClr val="tx1"/>
+              </a:solidFill>
+            </a:endParaRPr>
+          </a:p>
+          <a:p>
+            <a:pPr lvl="1"/>
+            <a:endParaRPr lang="en-US" dirty="0"/>
+          </a:p>
+        </p:txBody>
+      </p:sp>
+      <p:pic>
+        <p:nvPicPr>
+          <p:cNvPr id="4" name="Picture 3"/>
+          <p:cNvPicPr>
+            <a:picLocks noChangeAspect="1"/>
+          </p:cNvPicPr>
+          <p:nvPr/>
+        </p:nvPicPr>
+        <p:blipFill rotWithShape="1">
+          <a:blip r:embed="rId2"/>
+          <a:srcRect l="614" t="13331" r="80401" b="84809"/>
+          <a:stretch/>
+        </p:blipFill>
+        <p:spPr>
+          <a:xfrm>
+            <a:off x="1577471" y="4283512"/>
+            <a:ext cx="8386039" cy="462004"/>
+          </a:xfrm>
+          <a:prstGeom prst="rect">
+            <a:avLst/>
+          </a:prstGeom>
+        </p:spPr>
+      </p:pic>
+    </p:spTree>
+    <p:extLst>
+      <p:ext uri="{BB962C8B-B14F-4D97-AF65-F5344CB8AC3E}">
+        <p14:creationId xmlns:p14="http://schemas.microsoft.com/office/powerpoint/2010/main" val="1336641114"/>
+      </p:ext>
+    </p:extLst>
+  </p:cSld>
+  <p:clrMapOvr>
+    <a:masterClrMapping/>
+  </p:clrMapOvr>
+  <p:timing>
+    <p:tnLst>
+      <p:par>
+        <p:cTn id="1" dur="indefinite" restart="never" nodeType="tmRoot"/>
+      </p:par>
+    </p:tnLst>
+  </p:timing>
+</p:sld>
+</file>
+
+<file path=ppt/slides/slide13.xml><?xml version="1.0" encoding="utf-8"?>
+<p:sld xmlns:a="http://schemas.openxmlformats.org/drawingml/2006/main" xmlns:r="http://schemas.openxmlformats.org/officeDocument/2006/relationships" xmlns:p="http://schemas.openxmlformats.org/presentationml/2006/main">
+  <p:cSld>
+    <p:spTree>
+      <p:nvGrpSpPr>
+        <p:cNvPr id="1" name=""/>
+        <p:cNvGrpSpPr/>
+        <p:nvPr/>
+      </p:nvGrpSpPr>
+      <p:grpSpPr>
+        <a:xfrm>
+          <a:off x="0" y="0"/>
+          <a:ext cx="0" cy="0"/>
+          <a:chOff x="0" y="0"/>
+          <a:chExt cx="0" cy="0"/>
+        </a:xfrm>
+      </p:grpSpPr>
+      <p:sp>
+        <p:nvSpPr>
+          <p:cNvPr id="2" name="Title 1"/>
+          <p:cNvSpPr>
+            <a:spLocks noGrp="1"/>
+          </p:cNvSpPr>
+          <p:nvPr>
+            <p:ph type="title"/>
+          </p:nvPr>
+        </p:nvSpPr>
+        <p:spPr/>
+        <p:txBody>
+          <a:bodyPr/>
+          <a:lstStyle/>
+          <a:p>
+            <a:r>
+              <a:rPr lang="en-US" dirty="0" smtClean="0"/>
+              <a:t>GitHub Basics</a:t>
+            </a:r>
+            <a:endParaRPr lang="en-US" dirty="0"/>
+          </a:p>
+        </p:txBody>
+      </p:sp>
+      <p:sp>
+        <p:nvSpPr>
+          <p:cNvPr id="3" name="Text Placeholder 2"/>
+          <p:cNvSpPr>
+            <a:spLocks noGrp="1"/>
+          </p:cNvSpPr>
+          <p:nvPr>
+            <p:ph type="body" idx="1"/>
+          </p:nvPr>
+        </p:nvSpPr>
+        <p:spPr/>
+        <p:txBody>
+          <a:bodyPr/>
+          <a:lstStyle/>
+          <a:p>
+            <a:endParaRPr lang="en-US"/>
+          </a:p>
+        </p:txBody>
+      </p:sp>
+    </p:spTree>
+    <p:extLst>
+      <p:ext uri="{BB962C8B-B14F-4D97-AF65-F5344CB8AC3E}">
+        <p14:creationId xmlns:p14="http://schemas.microsoft.com/office/powerpoint/2010/main" val="1762263840"/>
+      </p:ext>
+    </p:extLst>
+  </p:cSld>
+  <p:clrMapOvr>
+    <a:masterClrMapping/>
+  </p:clrMapOvr>
+  <p:timing>
+    <p:tnLst>
+      <p:par>
+        <p:cTn id="1" dur="indefinite" restart="never" nodeType="tmRoot"/>
+      </p:par>
+    </p:tnLst>
+  </p:timing>
+</p:sld>
+</file>
+
+<file path=ppt/slides/slide14.xml><?xml version="1.0" encoding="utf-8"?>
+<p:sld xmlns:a="http://schemas.openxmlformats.org/drawingml/2006/main" xmlns:r="http://schemas.openxmlformats.org/officeDocument/2006/relationships" xmlns:p="http://schemas.openxmlformats.org/presentationml/2006/main">
+  <p:cSld>
+    <p:spTree>
+      <p:nvGrpSpPr>
+        <p:cNvPr id="1" name=""/>
+        <p:cNvGrpSpPr/>
+        <p:nvPr/>
+      </p:nvGrpSpPr>
+      <p:grpSpPr>
+        <a:xfrm>
+          <a:off x="0" y="0"/>
+          <a:ext cx="0" cy="0"/>
+          <a:chOff x="0" y="0"/>
+          <a:chExt cx="0" cy="0"/>
+        </a:xfrm>
+      </p:grpSpPr>
+      <p:sp>
+        <p:nvSpPr>
+          <p:cNvPr id="2" name="Title 1"/>
+          <p:cNvSpPr>
+            <a:spLocks noGrp="1"/>
+          </p:cNvSpPr>
+          <p:nvPr>
+            <p:ph type="title"/>
+          </p:nvPr>
+        </p:nvSpPr>
+        <p:spPr/>
+        <p:txBody>
+          <a:bodyPr>
+            <a:normAutofit fontScale="90000"/>
+          </a:bodyPr>
+          <a:lstStyle/>
+          <a:p>
+            <a:r>
+              <a:rPr lang="en-US" dirty="0" smtClean="0"/>
+              <a:t>Version Control:</a:t>
+            </a:r>
+            <a:br>
+              <a:rPr lang="en-US" dirty="0" smtClean="0"/>
+            </a:br>
+            <a:r>
+              <a:rPr lang="en-US" dirty="0" smtClean="0"/>
+              <a:t>Organizational Saving and History Tracking</a:t>
+            </a:r>
+            <a:endParaRPr lang="en-US" dirty="0"/>
+          </a:p>
+        </p:txBody>
+      </p:sp>
+      <p:sp>
+        <p:nvSpPr>
+          <p:cNvPr id="3" name="Content Placeholder 2"/>
+          <p:cNvSpPr>
+            <a:spLocks noGrp="1"/>
+          </p:cNvSpPr>
+          <p:nvPr>
+            <p:ph sz="half" idx="1"/>
+          </p:nvPr>
+        </p:nvSpPr>
+        <p:spPr>
+          <a:xfrm>
+            <a:off x="1173192" y="2560320"/>
+            <a:ext cx="4843560" cy="3624820"/>
+          </a:xfrm>
+        </p:spPr>
+        <p:txBody>
+          <a:bodyPr>
+            <a:noAutofit/>
+          </a:bodyPr>
+          <a:lstStyle/>
+          <a:p>
+            <a:r>
+              <a:rPr lang="en-US" sz="1800" dirty="0" smtClean="0"/>
+              <a:t>Have you ever edited a document “doc” and then saved it as “doc_V2”? And then “doc_V3”?</a:t>
+            </a:r>
+          </a:p>
+          <a:p>
+            <a:r>
+              <a:rPr lang="en-US" sz="1800" dirty="0" smtClean="0"/>
+              <a:t>This is called </a:t>
+            </a:r>
+            <a:r>
+              <a:rPr lang="en-US" sz="1800" b="1" dirty="0" smtClean="0"/>
+              <a:t>version control</a:t>
+            </a:r>
+          </a:p>
+          <a:p>
+            <a:r>
+              <a:rPr lang="en-US" sz="1800" dirty="0" smtClean="0"/>
+              <a:t>Drawbacks:</a:t>
+            </a:r>
+          </a:p>
+          <a:p>
+            <a:pPr lvl="1"/>
+            <a:r>
+              <a:rPr lang="en-US" sz="1400" dirty="0" smtClean="0"/>
+              <a:t>Saving new edits quickly becomes tedious</a:t>
+            </a:r>
+          </a:p>
+          <a:p>
+            <a:pPr lvl="1"/>
+            <a:r>
+              <a:rPr lang="en-US" sz="1400" dirty="0" smtClean="0"/>
+              <a:t>You might accidentally save over old versions</a:t>
+            </a:r>
+          </a:p>
+          <a:p>
+            <a:r>
+              <a:rPr lang="en-US" sz="1800" dirty="0"/>
+              <a:t>Introducing </a:t>
+            </a:r>
+            <a:r>
+              <a:rPr lang="en-US" sz="1800" dirty="0" err="1"/>
+              <a:t>Github</a:t>
+            </a:r>
+            <a:r>
+              <a:rPr lang="en-US" sz="1800" dirty="0"/>
+              <a:t>: a website that streamlines the procedure of version </a:t>
+            </a:r>
+            <a:r>
+              <a:rPr lang="en-US" sz="1800" dirty="0" smtClean="0"/>
+              <a:t>control</a:t>
+            </a:r>
+          </a:p>
+          <a:p>
+            <a:r>
+              <a:rPr lang="en-US" sz="1800" dirty="0" smtClean="0"/>
+              <a:t>Formatting in </a:t>
+            </a:r>
+            <a:r>
+              <a:rPr lang="en-US" sz="1800" dirty="0" err="1" smtClean="0"/>
+              <a:t>Github</a:t>
+            </a:r>
+            <a:r>
+              <a:rPr lang="en-US" sz="1800" dirty="0" smtClean="0"/>
+              <a:t> uses the markdown formatting language – the same as R Notebook! </a:t>
+            </a:r>
+            <a:endParaRPr lang="en-US" sz="1800" dirty="0"/>
+          </a:p>
+          <a:p>
+            <a:endParaRPr lang="en-US" sz="1800" dirty="0" smtClean="0"/>
+          </a:p>
+        </p:txBody>
+      </p:sp>
+      <p:sp>
+        <p:nvSpPr>
+          <p:cNvPr id="4" name="Content Placeholder 3"/>
+          <p:cNvSpPr>
+            <a:spLocks noGrp="1"/>
+          </p:cNvSpPr>
+          <p:nvPr>
+            <p:ph sz="half" idx="2"/>
+          </p:nvPr>
+        </p:nvSpPr>
+        <p:spPr>
+          <a:xfrm>
+            <a:off x="6016753" y="2560319"/>
+            <a:ext cx="5378742" cy="3564435"/>
+          </a:xfrm>
+        </p:spPr>
+        <p:txBody>
+          <a:bodyPr>
+            <a:noAutofit/>
+          </a:bodyPr>
+          <a:lstStyle/>
+          <a:p>
+            <a:r>
+              <a:rPr lang="en-US" sz="1800" dirty="0" smtClean="0"/>
+              <a:t>In addition to keeping track of your document’s history, using </a:t>
+            </a:r>
+            <a:r>
+              <a:rPr lang="en-US" sz="1800" dirty="0" err="1" smtClean="0"/>
+              <a:t>Github</a:t>
+            </a:r>
+            <a:r>
+              <a:rPr lang="en-US" sz="1800" dirty="0" smtClean="0"/>
+              <a:t> for version control also offers the following benefits:</a:t>
+            </a:r>
+          </a:p>
+          <a:p>
+            <a:pPr lvl="1"/>
+            <a:r>
+              <a:rPr lang="en-US" sz="1600" dirty="0" smtClean="0"/>
+              <a:t>Creates an off-site copy of your document in the cloud</a:t>
+            </a:r>
+          </a:p>
+          <a:p>
+            <a:pPr lvl="1"/>
+            <a:r>
+              <a:rPr lang="en-US" sz="1600" dirty="0" smtClean="0"/>
+              <a:t>Allows for multiple “branches” of update history</a:t>
+            </a:r>
+          </a:p>
+          <a:p>
+            <a:pPr lvl="2"/>
+            <a:r>
+              <a:rPr lang="en-US" sz="1400" dirty="0" smtClean="0"/>
+              <a:t>Opens up ability to take a project down </a:t>
+            </a:r>
+            <a:r>
+              <a:rPr lang="en-US" sz="1400" dirty="0"/>
+              <a:t>different paths </a:t>
+            </a:r>
+            <a:r>
+              <a:rPr lang="en-US" sz="1400" dirty="0" smtClean="0"/>
+              <a:t>synchronously</a:t>
+            </a:r>
+          </a:p>
+          <a:p>
+            <a:pPr lvl="2"/>
+            <a:r>
+              <a:rPr lang="en-US" sz="1400" dirty="0" smtClean="0"/>
+              <a:t>Maintains a sensible “direction” of edits two-dimensionally in a way that is not easily replicable by simply </a:t>
+            </a:r>
+            <a:r>
+              <a:rPr lang="en-US" sz="1400" dirty="0" err="1" smtClean="0"/>
+              <a:t>addending</a:t>
+            </a:r>
+            <a:r>
+              <a:rPr lang="en-US" sz="1400" dirty="0" smtClean="0"/>
+              <a:t> endings manually</a:t>
+            </a:r>
+          </a:p>
+          <a:p>
+            <a:pPr lvl="1"/>
+            <a:r>
+              <a:rPr lang="en-US" sz="1600" dirty="0" smtClean="0"/>
+              <a:t>Allows other users to collaborate and submit updated versions of your files</a:t>
+            </a:r>
+            <a:endParaRPr lang="en-US" sz="1600" dirty="0"/>
+          </a:p>
+        </p:txBody>
+      </p:sp>
+    </p:spTree>
+    <p:extLst>
+      <p:ext uri="{BB962C8B-B14F-4D97-AF65-F5344CB8AC3E}">
+        <p14:creationId xmlns:p14="http://schemas.microsoft.com/office/powerpoint/2010/main" val="1440525949"/>
+      </p:ext>
+    </p:extLst>
+  </p:cSld>
+  <p:clrMapOvr>
+    <a:masterClrMapping/>
+  </p:clrMapOvr>
+  <p:timing>
+    <p:tnLst>
+      <p:par>
+        <p:cTn id="1" dur="indefinite" restart="never" nodeType="tmRoot"/>
+      </p:par>
+    </p:tnLst>
+  </p:timing>
+</p:sld>
+</file>
+
+<file path=ppt/slides/slide15.xml><?xml version="1.0" encoding="utf-8"?>
+<p:sld xmlns:a="http://schemas.openxmlformats.org/drawingml/2006/main" xmlns:r="http://schemas.openxmlformats.org/officeDocument/2006/relationships" xmlns:p="http://schemas.openxmlformats.org/presentationml/2006/main">
+  <p:cSld>
+    <p:spTree>
+      <p:nvGrpSpPr>
+        <p:cNvPr id="1" name=""/>
+        <p:cNvGrpSpPr/>
+        <p:nvPr/>
+      </p:nvGrpSpPr>
+      <p:grpSpPr>
+        <a:xfrm>
+          <a:off x="0" y="0"/>
+          <a:ext cx="0" cy="0"/>
+          <a:chOff x="0" y="0"/>
+          <a:chExt cx="0" cy="0"/>
+        </a:xfrm>
+      </p:grpSpPr>
+      <p:sp>
+        <p:nvSpPr>
+          <p:cNvPr id="2" name="Title 1"/>
+          <p:cNvSpPr>
+            <a:spLocks noGrp="1"/>
+          </p:cNvSpPr>
+          <p:nvPr>
+            <p:ph type="title"/>
+          </p:nvPr>
+        </p:nvSpPr>
+        <p:spPr/>
+        <p:txBody>
+          <a:bodyPr/>
+          <a:lstStyle/>
+          <a:p>
+            <a:r>
               <a:rPr lang="en-US" dirty="0" err="1" smtClean="0"/>
               <a:t>Github</a:t>
             </a:r>
@@ -6858,7 +8133,7 @@
 </p:sld>
 </file>
 
-<file path=ppt/slides/slide12.xml><?xml version="1.0" encoding="utf-8"?>
+<file path=ppt/slides/slide16.xml><?xml version="1.0" encoding="utf-8"?>
 <p:sld xmlns:a="http://schemas.openxmlformats.org/drawingml/2006/main" xmlns:r="http://schemas.openxmlformats.org/officeDocument/2006/relationships" xmlns:p="http://schemas.openxmlformats.org/presentationml/2006/main">
   <p:cSld>
     <p:spTree>
@@ -7291,7 +8566,7 @@
 </p:sld>
 </file>
 
-<file path=ppt/slides/slide13.xml><?xml version="1.0" encoding="utf-8"?>
+<file path=ppt/slides/slide17.xml><?xml version="1.0" encoding="utf-8"?>
 <p:sld xmlns:a="http://schemas.openxmlformats.org/drawingml/2006/main" xmlns:r="http://schemas.openxmlformats.org/officeDocument/2006/relationships" xmlns:p="http://schemas.openxmlformats.org/presentationml/2006/main">
   <p:cSld>
     <p:spTree>
@@ -8263,7 +9538,7 @@
 </p:sld>
 </file>
 
-<file path=ppt/slides/slide14.xml><?xml version="1.0" encoding="utf-8"?>
+<file path=ppt/slides/slide18.xml><?xml version="1.0" encoding="utf-8"?>
 <p:sld xmlns:a="http://schemas.openxmlformats.org/drawingml/2006/main" xmlns:r="http://schemas.openxmlformats.org/officeDocument/2006/relationships" xmlns:p="http://schemas.openxmlformats.org/presentationml/2006/main">
   <p:cSld>
     <p:spTree>
@@ -8470,7 +9745,7 @@
 </p:sld>
 </file>
 
-<file path=ppt/slides/slide15.xml><?xml version="1.0" encoding="utf-8"?>
+<file path=ppt/slides/slide19.xml><?xml version="1.0" encoding="utf-8"?>
 <p:sld xmlns:a="http://schemas.openxmlformats.org/drawingml/2006/main" xmlns:r="http://schemas.openxmlformats.org/officeDocument/2006/relationships" xmlns:p="http://schemas.openxmlformats.org/presentationml/2006/main">
   <p:cSld>
     <p:spTree>
@@ -10242,7 +11517,140 @@
 </p:sld>
 </file>
 
-<file path=ppt/slides/slide16.xml><?xml version="1.0" encoding="utf-8"?>
+<file path=ppt/slides/slide2.xml><?xml version="1.0" encoding="utf-8"?>
+<p:sld xmlns:a="http://schemas.openxmlformats.org/drawingml/2006/main" xmlns:r="http://schemas.openxmlformats.org/officeDocument/2006/relationships" xmlns:p="http://schemas.openxmlformats.org/presentationml/2006/main">
+  <p:cSld>
+    <p:spTree>
+      <p:nvGrpSpPr>
+        <p:cNvPr id="1" name=""/>
+        <p:cNvGrpSpPr/>
+        <p:nvPr/>
+      </p:nvGrpSpPr>
+      <p:grpSpPr>
+        <a:xfrm>
+          <a:off x="0" y="0"/>
+          <a:ext cx="0" cy="0"/>
+          <a:chOff x="0" y="0"/>
+          <a:chExt cx="0" cy="0"/>
+        </a:xfrm>
+      </p:grpSpPr>
+      <p:sp>
+        <p:nvSpPr>
+          <p:cNvPr id="2" name="Title 1"/>
+          <p:cNvSpPr>
+            <a:spLocks noGrp="1"/>
+          </p:cNvSpPr>
+          <p:nvPr>
+            <p:ph type="title"/>
+          </p:nvPr>
+        </p:nvSpPr>
+        <p:spPr/>
+        <p:txBody>
+          <a:bodyPr/>
+          <a:lstStyle/>
+          <a:p>
+            <a:r>
+              <a:rPr lang="en-US" smtClean="0"/>
+              <a:t>Table of Contents</a:t>
+            </a:r>
+            <a:endParaRPr lang="en-US" dirty="0"/>
+          </a:p>
+        </p:txBody>
+      </p:sp>
+      <p:sp>
+        <p:nvSpPr>
+          <p:cNvPr id="3" name="Content Placeholder 2"/>
+          <p:cNvSpPr>
+            <a:spLocks noGrp="1"/>
+          </p:cNvSpPr>
+          <p:nvPr>
+            <p:ph idx="1"/>
+          </p:nvPr>
+        </p:nvSpPr>
+        <p:spPr/>
+        <p:txBody>
+          <a:bodyPr>
+            <a:normAutofit/>
+          </a:bodyPr>
+          <a:lstStyle/>
+          <a:p>
+            <a:pPr algn="just">
+              <a:lnSpc>
+                <a:spcPct val="150000"/>
+              </a:lnSpc>
+            </a:pPr>
+            <a:r>
+              <a:rPr lang="en-US" dirty="0" smtClean="0"/>
+              <a:t>R Notebook..........................................................................................................3-12</a:t>
+            </a:r>
+          </a:p>
+          <a:p>
+            <a:pPr algn="just">
+              <a:lnSpc>
+                <a:spcPct val="150000"/>
+              </a:lnSpc>
+            </a:pPr>
+            <a:r>
+              <a:rPr lang="en-US" dirty="0" smtClean="0"/>
+              <a:t>GitHub Basics.....................................................................................................13-21</a:t>
+            </a:r>
+          </a:p>
+          <a:p>
+            <a:pPr algn="just">
+              <a:lnSpc>
+                <a:spcPct val="150000"/>
+              </a:lnSpc>
+            </a:pPr>
+            <a:r>
+              <a:rPr lang="en-US" dirty="0" smtClean="0"/>
+              <a:t>GitHub Desktop...............................................................................................22-2X</a:t>
+            </a:r>
+          </a:p>
+          <a:p>
+            <a:pPr algn="just">
+              <a:lnSpc>
+                <a:spcPct val="150000"/>
+              </a:lnSpc>
+            </a:pPr>
+            <a:r>
+              <a:rPr lang="en-US" dirty="0" smtClean="0"/>
+              <a:t>Credits.......................................................................................................................2X</a:t>
+            </a:r>
+          </a:p>
+          <a:p>
+            <a:pPr>
+              <a:lnSpc>
+                <a:spcPct val="150000"/>
+              </a:lnSpc>
+            </a:pPr>
+            <a:endParaRPr lang="en-US" dirty="0" smtClean="0"/>
+          </a:p>
+          <a:p>
+            <a:endParaRPr lang="en-US" dirty="0"/>
+          </a:p>
+        </p:txBody>
+      </p:sp>
+    </p:spTree>
+    <p:extLst>
+      <p:ext uri="{BB962C8B-B14F-4D97-AF65-F5344CB8AC3E}">
+        <p14:creationId xmlns:p14="http://schemas.microsoft.com/office/powerpoint/2010/main" val="1682343245"/>
+      </p:ext>
+    </p:extLst>
+  </p:cSld>
+  <p:clrMapOvr>
+    <a:masterClrMapping/>
+  </p:clrMapOvr>
+  <p:timing>
+    <p:tnLst>
+      <p:par>
+        <p:cTn id="1" dur="indefinite" restart="never" nodeType="tmRoot"/>
+      </p:par>
+    </p:tnLst>
+  </p:timing>
+</p:sld>
+</file>
+
+<file path=ppt/slides/slide20.xml><?xml version="1.0" encoding="utf-8"?>
 <p:sld xmlns:a="http://schemas.openxmlformats.org/drawingml/2006/main" xmlns:r="http://schemas.openxmlformats.org/officeDocument/2006/relationships" xmlns:p="http://schemas.openxmlformats.org/presentationml/2006/main">
   <p:cSld>
     <p:spTree>
@@ -10727,7 +12135,7 @@
 </p:sld>
 </file>
 
-<file path=ppt/slides/slide17.xml><?xml version="1.0" encoding="utf-8"?>
+<file path=ppt/slides/slide21.xml><?xml version="1.0" encoding="utf-8"?>
 <p:sld xmlns:a="http://schemas.openxmlformats.org/drawingml/2006/main" xmlns:r="http://schemas.openxmlformats.org/officeDocument/2006/relationships" xmlns:p="http://schemas.openxmlformats.org/presentationml/2006/main">
   <p:cSld>
     <p:spTree>
@@ -11713,7 +13121,7 @@
 </p:sld>
 </file>
 
-<file path=ppt/slides/slide18.xml><?xml version="1.0" encoding="utf-8"?>
+<file path=ppt/slides/slide22.xml><?xml version="1.0" encoding="utf-8"?>
 <p:sld xmlns:a="http://schemas.openxmlformats.org/drawingml/2006/main" xmlns:r="http://schemas.openxmlformats.org/officeDocument/2006/relationships" xmlns:p="http://schemas.openxmlformats.org/presentationml/2006/main">
   <p:cSld>
     <p:spTree>
@@ -11747,7 +13155,7 @@
           <a:p>
             <a:r>
               <a:rPr lang="en-US" dirty="0" smtClean="0"/>
-              <a:t>Common Errors</a:t>
+              <a:t>GitHub Desktop</a:t>
             </a:r>
             <a:endParaRPr lang="en-US" dirty="0"/>
           </a:p>
@@ -11755,214 +13163,27 @@
       </p:sp>
       <p:sp>
         <p:nvSpPr>
-          <p:cNvPr id="3" name="Content Placeholder 2"/>
+          <p:cNvPr id="3" name="Text Placeholder 2"/>
           <p:cNvSpPr>
             <a:spLocks noGrp="1"/>
           </p:cNvSpPr>
           <p:nvPr>
-            <p:ph idx="1"/>
+            <p:ph type="body" idx="1"/>
           </p:nvPr>
         </p:nvSpPr>
         <p:spPr/>
         <p:txBody>
-          <a:bodyPr>
-            <a:normAutofit/>
-          </a:bodyPr>
+          <a:bodyPr/>
           <a:lstStyle/>
           <a:p>
-            <a:r>
-              <a:rPr lang="en-US" b="1" dirty="0">
-                <a:solidFill>
-                  <a:schemeClr val="tx1"/>
-                </a:solidFill>
-              </a:rPr>
-              <a:t>Error: </a:t>
-            </a:r>
-            <a:r>
-              <a:rPr lang="en-US" b="1" u="sng" dirty="0">
-                <a:solidFill>
-                  <a:schemeClr val="tx1"/>
-                </a:solidFill>
-              </a:rPr>
-              <a:t>'</a:t>
-            </a:r>
-            <a:r>
-              <a:rPr lang="en-US" b="1" u="sng" dirty="0" err="1">
-                <a:solidFill>
-                  <a:schemeClr val="tx1"/>
-                </a:solidFill>
-              </a:rPr>
-              <a:t>is_latex_output</a:t>
-            </a:r>
-            <a:r>
-              <a:rPr lang="en-US" b="1" u="sng" dirty="0">
-                <a:solidFill>
-                  <a:schemeClr val="tx1"/>
-                </a:solidFill>
-              </a:rPr>
-              <a:t>' is not an exported object from '</a:t>
-            </a:r>
-            <a:r>
-              <a:rPr lang="en-US" b="1" u="sng" dirty="0" err="1">
-                <a:solidFill>
-                  <a:schemeClr val="tx1"/>
-                </a:solidFill>
-              </a:rPr>
-              <a:t>namespace:knitr</a:t>
-            </a:r>
-            <a:r>
-              <a:rPr lang="en-US" b="1" u="sng" dirty="0">
-                <a:solidFill>
-                  <a:schemeClr val="tx1"/>
-                </a:solidFill>
-              </a:rPr>
-              <a:t>' Execution </a:t>
-            </a:r>
-            <a:r>
-              <a:rPr lang="en-US" b="1" u="sng" dirty="0" smtClean="0">
-                <a:solidFill>
-                  <a:schemeClr val="tx1"/>
-                </a:solidFill>
-              </a:rPr>
-              <a:t>halted</a:t>
-            </a:r>
-          </a:p>
-          <a:p>
-            <a:pPr lvl="1"/>
-            <a:r>
-              <a:rPr lang="en-US" b="1" dirty="0" smtClean="0">
-                <a:solidFill>
-                  <a:schemeClr val="tx1"/>
-                </a:solidFill>
-              </a:rPr>
-              <a:t>Solution:</a:t>
-            </a:r>
-            <a:r>
-              <a:rPr lang="en-US" dirty="0" smtClean="0">
-                <a:solidFill>
-                  <a:schemeClr val="tx1"/>
-                </a:solidFill>
-              </a:rPr>
-              <a:t> Run the following code in your R console: </a:t>
-            </a:r>
-          </a:p>
-          <a:p>
-            <a:pPr marL="457200" lvl="1" indent="0">
-              <a:buNone/>
-            </a:pPr>
-            <a:r>
-              <a:rPr lang="en-US" sz="1800" dirty="0" err="1" smtClean="0">
-                <a:solidFill>
-                  <a:srgbClr val="7030A0"/>
-                </a:solidFill>
-              </a:rPr>
-              <a:t>install.packages</a:t>
-            </a:r>
-            <a:r>
-              <a:rPr lang="en-US" sz="1800" dirty="0">
-                <a:solidFill>
-                  <a:srgbClr val="7030A0"/>
-                </a:solidFill>
-              </a:rPr>
-              <a:t>('</a:t>
-            </a:r>
-            <a:r>
-              <a:rPr lang="en-US" sz="1800" dirty="0" err="1">
-                <a:solidFill>
-                  <a:srgbClr val="7030A0"/>
-                </a:solidFill>
-              </a:rPr>
-              <a:t>knitr</a:t>
-            </a:r>
-            <a:r>
-              <a:rPr lang="en-US" sz="1800" dirty="0">
-                <a:solidFill>
-                  <a:srgbClr val="7030A0"/>
-                </a:solidFill>
-              </a:rPr>
-              <a:t>', repos = c('http://rforge.net', 'http://cran.rstudio.org'), type = 'source</a:t>
-            </a:r>
-            <a:r>
-              <a:rPr lang="en-US" sz="1800" dirty="0" smtClean="0">
-                <a:solidFill>
-                  <a:srgbClr val="7030A0"/>
-                </a:solidFill>
-              </a:rPr>
-              <a:t>')</a:t>
-            </a:r>
-            <a:endParaRPr lang="en-US" sz="1800" b="1" dirty="0" smtClean="0">
-              <a:solidFill>
-                <a:schemeClr val="tx1"/>
-              </a:solidFill>
-            </a:endParaRPr>
-          </a:p>
-          <a:p>
-            <a:r>
-              <a:rPr lang="en-US" dirty="0" smtClean="0">
-                <a:solidFill>
-                  <a:schemeClr val="tx1"/>
-                </a:solidFill>
-              </a:rPr>
-              <a:t>_</a:t>
-            </a:r>
-          </a:p>
-          <a:p>
-            <a:pPr lvl="1"/>
-            <a:r>
-              <a:rPr lang="en-US" b="1" dirty="0" smtClean="0">
-                <a:solidFill>
-                  <a:schemeClr val="tx1"/>
-                </a:solidFill>
-              </a:rPr>
-              <a:t>Solution:</a:t>
-            </a:r>
-            <a:r>
-              <a:rPr lang="en-US" dirty="0" smtClean="0">
-                <a:solidFill>
-                  <a:schemeClr val="tx1"/>
-                </a:solidFill>
-              </a:rPr>
-              <a:t> Give a unique name to all of your unnamed chunks</a:t>
-            </a:r>
-            <a:endParaRPr lang="en-US" b="1" dirty="0" smtClean="0">
-              <a:solidFill>
-                <a:schemeClr val="tx1"/>
-              </a:solidFill>
-            </a:endParaRPr>
-          </a:p>
-          <a:p>
-            <a:pPr lvl="1"/>
-            <a:endParaRPr lang="en-US" dirty="0"/>
-          </a:p>
-        </p:txBody>
-      </p:sp>
-      <p:pic>
-        <p:nvPicPr>
-          <p:cNvPr id="4" name="Picture 3"/>
-          <p:cNvPicPr>
-            <a:picLocks noChangeAspect="1"/>
-          </p:cNvPicPr>
-          <p:nvPr/>
-        </p:nvPicPr>
-        <p:blipFill rotWithShape="1">
-          <a:blip r:embed="rId2"/>
-          <a:srcRect l="614" t="13331" r="80401" b="84809"/>
-          <a:stretch/>
-        </p:blipFill>
-        <p:spPr>
-          <a:xfrm>
-            <a:off x="1577471" y="4283512"/>
-            <a:ext cx="8386039" cy="462004"/>
-          </a:xfrm>
-          <a:prstGeom prst="rect">
-            <a:avLst/>
-          </a:prstGeom>
-        </p:spPr>
-      </p:pic>
+            <a:endParaRPr lang="en-US"/>
+          </a:p>
+        </p:txBody>
+      </p:sp>
     </p:spTree>
     <p:extLst>
       <p:ext uri="{BB962C8B-B14F-4D97-AF65-F5344CB8AC3E}">
-        <p14:creationId xmlns:p14="http://schemas.microsoft.com/office/powerpoint/2010/main" val="1336641114"/>
+        <p14:creationId xmlns:p14="http://schemas.microsoft.com/office/powerpoint/2010/main" val="3640014618"/>
       </p:ext>
     </p:extLst>
   </p:cSld>
@@ -11979,7 +13200,7 @@
 </p:sld>
 </file>
 
-<file path=ppt/slides/slide19.xml><?xml version="1.0" encoding="utf-8"?>
+<file path=ppt/slides/slide23.xml><?xml version="1.0" encoding="utf-8"?>
 <p:sld xmlns:a="http://schemas.openxmlformats.org/drawingml/2006/main" xmlns:r="http://schemas.openxmlformats.org/officeDocument/2006/relationships" xmlns:p="http://schemas.openxmlformats.org/presentationml/2006/main">
   <p:cSld>
     <p:spTree>
@@ -12194,7 +13415,86 @@
 </p:sld>
 </file>
 
-<file path=ppt/slides/slide2.xml><?xml version="1.0" encoding="utf-8"?>
+<file path=ppt/slides/slide3.xml><?xml version="1.0" encoding="utf-8"?>
+<p:sld xmlns:a="http://schemas.openxmlformats.org/drawingml/2006/main" xmlns:r="http://schemas.openxmlformats.org/officeDocument/2006/relationships" xmlns:p="http://schemas.openxmlformats.org/presentationml/2006/main">
+  <p:cSld>
+    <p:spTree>
+      <p:nvGrpSpPr>
+        <p:cNvPr id="1" name=""/>
+        <p:cNvGrpSpPr/>
+        <p:nvPr/>
+      </p:nvGrpSpPr>
+      <p:grpSpPr>
+        <a:xfrm>
+          <a:off x="0" y="0"/>
+          <a:ext cx="0" cy="0"/>
+          <a:chOff x="0" y="0"/>
+          <a:chExt cx="0" cy="0"/>
+        </a:xfrm>
+      </p:grpSpPr>
+      <p:sp>
+        <p:nvSpPr>
+          <p:cNvPr id="2" name="Title 1"/>
+          <p:cNvSpPr>
+            <a:spLocks noGrp="1"/>
+          </p:cNvSpPr>
+          <p:nvPr>
+            <p:ph type="title"/>
+          </p:nvPr>
+        </p:nvSpPr>
+        <p:spPr/>
+        <p:txBody>
+          <a:bodyPr/>
+          <a:lstStyle/>
+          <a:p>
+            <a:r>
+              <a:rPr lang="en-US" dirty="0" smtClean="0"/>
+              <a:t>R Notebook</a:t>
+            </a:r>
+            <a:endParaRPr lang="en-US" dirty="0"/>
+          </a:p>
+        </p:txBody>
+      </p:sp>
+      <p:sp>
+        <p:nvSpPr>
+          <p:cNvPr id="3" name="Text Placeholder 2"/>
+          <p:cNvSpPr>
+            <a:spLocks noGrp="1"/>
+          </p:cNvSpPr>
+          <p:nvPr>
+            <p:ph type="body" idx="1"/>
+          </p:nvPr>
+        </p:nvSpPr>
+        <p:spPr/>
+        <p:txBody>
+          <a:bodyPr/>
+          <a:lstStyle/>
+          <a:p>
+            <a:endParaRPr lang="en-US" dirty="0"/>
+          </a:p>
+        </p:txBody>
+      </p:sp>
+    </p:spTree>
+    <p:extLst>
+      <p:ext uri="{BB962C8B-B14F-4D97-AF65-F5344CB8AC3E}">
+        <p14:creationId xmlns:p14="http://schemas.microsoft.com/office/powerpoint/2010/main" val="2276742590"/>
+      </p:ext>
+    </p:extLst>
+  </p:cSld>
+  <p:clrMapOvr>
+    <a:masterClrMapping/>
+  </p:clrMapOvr>
+  <p:timing>
+    <p:tnLst>
+      <p:par>
+        <p:cTn id="1" dur="indefinite" restart="never" nodeType="tmRoot"/>
+      </p:par>
+    </p:tnLst>
+  </p:timing>
+</p:sld>
+</file>
+
+<file path=ppt/slides/slide4.xml><?xml version="1.0" encoding="utf-8"?>
 <p:sld xmlns:a="http://schemas.openxmlformats.org/drawingml/2006/main" xmlns:r="http://schemas.openxmlformats.org/officeDocument/2006/relationships" xmlns:p="http://schemas.openxmlformats.org/presentationml/2006/main">
   <p:cSld>
     <p:spTree>
@@ -12933,7 +14233,7 @@
 </p:sld>
 </file>
 
-<file path=ppt/slides/slide3.xml><?xml version="1.0" encoding="utf-8"?>
+<file path=ppt/slides/slide5.xml><?xml version="1.0" encoding="utf-8"?>
 <p:sld xmlns:a="http://schemas.openxmlformats.org/drawingml/2006/main" xmlns:r="http://schemas.openxmlformats.org/officeDocument/2006/relationships" xmlns:p="http://schemas.openxmlformats.org/presentationml/2006/main">
   <p:cSld>
     <p:spTree>
@@ -13173,7 +14473,7 @@
 </p:sld>
 </file>
 
-<file path=ppt/slides/slide4.xml><?xml version="1.0" encoding="utf-8"?>
+<file path=ppt/slides/slide6.xml><?xml version="1.0" encoding="utf-8"?>
 <p:sld xmlns:a="http://schemas.openxmlformats.org/drawingml/2006/main" xmlns:r="http://schemas.openxmlformats.org/officeDocument/2006/relationships" xmlns:p="http://schemas.openxmlformats.org/presentationml/2006/main">
   <p:cSld>
     <p:spTree>
@@ -13743,7 +15043,7 @@
 </p:sld>
 </file>
 
-<file path=ppt/slides/slide5.xml><?xml version="1.0" encoding="utf-8"?>
+<file path=ppt/slides/slide7.xml><?xml version="1.0" encoding="utf-8"?>
 <p:sld xmlns:a="http://schemas.openxmlformats.org/drawingml/2006/main" xmlns:r="http://schemas.openxmlformats.org/officeDocument/2006/relationships" xmlns:p="http://schemas.openxmlformats.org/presentationml/2006/main">
   <p:cSld>
     <p:spTree>
@@ -14279,7 +15579,7 @@
 </p:sld>
 </file>
 
-<file path=ppt/slides/slide6.xml><?xml version="1.0" encoding="utf-8"?>
+<file path=ppt/slides/slide8.xml><?xml version="1.0" encoding="utf-8"?>
 <p:sld xmlns:a="http://schemas.openxmlformats.org/drawingml/2006/main" xmlns:r="http://schemas.openxmlformats.org/officeDocument/2006/relationships" xmlns:p="http://schemas.openxmlformats.org/presentationml/2006/main">
   <p:cSld>
     <p:spTree>
@@ -14348,11 +15648,7 @@
           <a:p>
             <a:r>
               <a:rPr lang="en-US" sz="2800" dirty="0" smtClean="0"/>
-              <a:t>To access this, </a:t>
-            </a:r>
-            <a:r>
-              <a:rPr lang="en-US" sz="2800" dirty="0" smtClean="0"/>
-              <a:t>click Tools -&gt; Global Options, then select ‘R Markdown’ 6</a:t>
+              <a:t>To access this, click Tools -&gt; Global Options, then select ‘R Markdown’ 6</a:t>
             </a:r>
             <a:r>
               <a:rPr lang="en-US" sz="2800" baseline="30000" dirty="0" smtClean="0"/>
@@ -14414,7 +15710,7 @@
 </p:sld>
 </file>
 
-<file path=ppt/slides/slide7.xml><?xml version="1.0" encoding="utf-8"?>
+<file path=ppt/slides/slide9.xml><?xml version="1.0" encoding="utf-8"?>
 <p:sld xmlns:a="http://schemas.openxmlformats.org/drawingml/2006/main" xmlns:r="http://schemas.openxmlformats.org/officeDocument/2006/relationships" xmlns:p="http://schemas.openxmlformats.org/presentationml/2006/main">
   <p:cSld>
     <p:spTree>
@@ -14642,932 +15938,6 @@
     <p:extLst>
       <p:ext uri="{BB962C8B-B14F-4D97-AF65-F5344CB8AC3E}">
         <p14:creationId xmlns:p14="http://schemas.microsoft.com/office/powerpoint/2010/main" val="3081263647"/>
-      </p:ext>
-    </p:extLst>
-  </p:cSld>
-  <p:clrMapOvr>
-    <a:masterClrMapping/>
-  </p:clrMapOvr>
-  <p:timing>
-    <p:tnLst>
-      <p:par>
-        <p:cTn id="1" dur="indefinite" restart="never" nodeType="tmRoot"/>
-      </p:par>
-    </p:tnLst>
-  </p:timing>
-</p:sld>
-</file>
-
-<file path=ppt/slides/slide8.xml><?xml version="1.0" encoding="utf-8"?>
-<p:sld xmlns:a="http://schemas.openxmlformats.org/drawingml/2006/main" xmlns:r="http://schemas.openxmlformats.org/officeDocument/2006/relationships" xmlns:p="http://schemas.openxmlformats.org/presentationml/2006/main">
-  <p:cSld>
-    <p:spTree>
-      <p:nvGrpSpPr>
-        <p:cNvPr id="1" name=""/>
-        <p:cNvGrpSpPr/>
-        <p:nvPr/>
-      </p:nvGrpSpPr>
-      <p:grpSpPr>
-        <a:xfrm>
-          <a:off x="0" y="0"/>
-          <a:ext cx="0" cy="0"/>
-          <a:chOff x="0" y="0"/>
-          <a:chExt cx="0" cy="0"/>
-        </a:xfrm>
-      </p:grpSpPr>
-      <p:sp>
-        <p:nvSpPr>
-          <p:cNvPr id="2" name="Title 1"/>
-          <p:cNvSpPr>
-            <a:spLocks noGrp="1"/>
-          </p:cNvSpPr>
-          <p:nvPr>
-            <p:ph type="title"/>
-          </p:nvPr>
-        </p:nvSpPr>
-        <p:spPr/>
-        <p:txBody>
-          <a:bodyPr/>
-          <a:lstStyle/>
-          <a:p>
-            <a:r>
-              <a:rPr lang="en-US" dirty="0" smtClean="0"/>
-              <a:t>Previewing Output</a:t>
-            </a:r>
-            <a:endParaRPr lang="en-US" dirty="0"/>
-          </a:p>
-        </p:txBody>
-      </p:sp>
-      <p:sp>
-        <p:nvSpPr>
-          <p:cNvPr id="3" name="Content Placeholder 2"/>
-          <p:cNvSpPr>
-            <a:spLocks noGrp="1"/>
-          </p:cNvSpPr>
-          <p:nvPr>
-            <p:ph sz="half" idx="1"/>
-          </p:nvPr>
-        </p:nvSpPr>
-        <p:spPr>
-          <a:xfrm>
-            <a:off x="871268" y="2560320"/>
-            <a:ext cx="5145484" cy="3548136"/>
-          </a:xfrm>
-        </p:spPr>
-        <p:txBody>
-          <a:bodyPr>
-            <a:normAutofit/>
-          </a:bodyPr>
-          <a:lstStyle/>
-          <a:p>
-            <a:r>
-              <a:rPr lang="en-US" sz="2000" dirty="0" smtClean="0"/>
-              <a:t>An R Notebook document can be “previewed” as output, displaying data as a rendered R Markdown document without executing any of your chunks</a:t>
-            </a:r>
-          </a:p>
-          <a:p>
-            <a:r>
-              <a:rPr lang="en-US" sz="2000" dirty="0" smtClean="0"/>
-              <a:t>However, all currently inline-displayed chunks that are showing will appear in the previewed document</a:t>
-            </a:r>
-          </a:p>
-          <a:p>
-            <a:r>
-              <a:rPr lang="en-US" sz="2000" dirty="0" smtClean="0"/>
-              <a:t>The “preview” option is just to the left of the small gear icon displayed earlier</a:t>
-            </a:r>
-          </a:p>
-          <a:p>
-            <a:endParaRPr lang="en-US" sz="3200" dirty="0"/>
-          </a:p>
-        </p:txBody>
-      </p:sp>
-      <p:sp>
-        <p:nvSpPr>
-          <p:cNvPr id="19" name="TextBox 18"/>
-          <p:cNvSpPr txBox="1"/>
-          <p:nvPr/>
-        </p:nvSpPr>
-        <p:spPr>
-          <a:xfrm>
-            <a:off x="6612328" y="5831457"/>
-            <a:ext cx="4161641" cy="276999"/>
-          </a:xfrm>
-          <a:prstGeom prst="rect">
-            <a:avLst/>
-          </a:prstGeom>
-          <a:solidFill>
-            <a:schemeClr val="bg2"/>
-          </a:solidFill>
-          <a:ln w="9525">
-            <a:solidFill>
-              <a:schemeClr val="tx1"/>
-            </a:solidFill>
-          </a:ln>
-        </p:spPr>
-        <p:txBody>
-          <a:bodyPr wrap="square" rtlCol="0">
-            <a:spAutoFit/>
-          </a:bodyPr>
-          <a:lstStyle/>
-          <a:p>
-            <a:pPr algn="ctr"/>
-            <a:r>
-              <a:rPr lang="en-US" sz="1200" dirty="0" smtClean="0">
-                <a:latin typeface="Arial" panose="020B0604020202020204" pitchFamily="34" charset="0"/>
-                <a:cs typeface="Arial" panose="020B0604020202020204" pitchFamily="34" charset="0"/>
-              </a:rPr>
-              <a:t>An example of output from an R Notebook document</a:t>
-            </a:r>
-            <a:endParaRPr lang="en-US" sz="1200" dirty="0">
-              <a:latin typeface="Arial" panose="020B0604020202020204" pitchFamily="34" charset="0"/>
-              <a:cs typeface="Arial" panose="020B0604020202020204" pitchFamily="34" charset="0"/>
-            </a:endParaRPr>
-          </a:p>
-        </p:txBody>
-      </p:sp>
-      <p:pic>
-        <p:nvPicPr>
-          <p:cNvPr id="4" name="Picture 3"/>
-          <p:cNvPicPr>
-            <a:picLocks noChangeAspect="1"/>
-          </p:cNvPicPr>
-          <p:nvPr/>
-        </p:nvPicPr>
-        <p:blipFill>
-          <a:blip r:embed="rId2">
-            <a:extLst>
-              <a:ext uri="{28A0092B-C50C-407E-A947-70E740481C1C}">
-                <a14:useLocalDpi xmlns:a14="http://schemas.microsoft.com/office/drawing/2010/main" val="0"/>
-              </a:ext>
-            </a:extLst>
-          </a:blip>
-          <a:stretch>
-            <a:fillRect/>
-          </a:stretch>
-        </p:blipFill>
-        <p:spPr>
-          <a:xfrm>
-            <a:off x="6612327" y="2466122"/>
-            <a:ext cx="4161641" cy="3365335"/>
-          </a:xfrm>
-          <a:prstGeom prst="rect">
-            <a:avLst/>
-          </a:prstGeom>
-        </p:spPr>
-      </p:pic>
-    </p:spTree>
-    <p:extLst>
-      <p:ext uri="{BB962C8B-B14F-4D97-AF65-F5344CB8AC3E}">
-        <p14:creationId xmlns:p14="http://schemas.microsoft.com/office/powerpoint/2010/main" val="203816899"/>
-      </p:ext>
-    </p:extLst>
-  </p:cSld>
-  <p:clrMapOvr>
-    <a:masterClrMapping/>
-  </p:clrMapOvr>
-  <p:timing>
-    <p:tnLst>
-      <p:par>
-        <p:cTn id="1" dur="indefinite" restart="never" nodeType="tmRoot"/>
-      </p:par>
-    </p:tnLst>
-  </p:timing>
-</p:sld>
-</file>
-
-<file path=ppt/slides/slide9.xml><?xml version="1.0" encoding="utf-8"?>
-<p:sld xmlns:a="http://schemas.openxmlformats.org/drawingml/2006/main" xmlns:r="http://schemas.openxmlformats.org/officeDocument/2006/relationships" xmlns:p="http://schemas.openxmlformats.org/presentationml/2006/main">
-  <p:cSld>
-    <p:spTree>
-      <p:nvGrpSpPr>
-        <p:cNvPr id="1" name=""/>
-        <p:cNvGrpSpPr/>
-        <p:nvPr/>
-      </p:nvGrpSpPr>
-      <p:grpSpPr>
-        <a:xfrm>
-          <a:off x="0" y="0"/>
-          <a:ext cx="0" cy="0"/>
-          <a:chOff x="0" y="0"/>
-          <a:chExt cx="0" cy="0"/>
-        </a:xfrm>
-      </p:grpSpPr>
-      <p:sp>
-        <p:nvSpPr>
-          <p:cNvPr id="2" name="Title 1"/>
-          <p:cNvSpPr>
-            <a:spLocks noGrp="1"/>
-          </p:cNvSpPr>
-          <p:nvPr>
-            <p:ph type="title"/>
-          </p:nvPr>
-        </p:nvSpPr>
-        <p:spPr/>
-        <p:txBody>
-          <a:bodyPr/>
-          <a:lstStyle/>
-          <a:p>
-            <a:r>
-              <a:rPr lang="en-US" dirty="0" smtClean="0"/>
-              <a:t>Saving and Additional Concerns</a:t>
-            </a:r>
-            <a:endParaRPr lang="en-US" dirty="0"/>
-          </a:p>
-        </p:txBody>
-      </p:sp>
-      <p:sp>
-        <p:nvSpPr>
-          <p:cNvPr id="3" name="Content Placeholder 2"/>
-          <p:cNvSpPr>
-            <a:spLocks noGrp="1"/>
-          </p:cNvSpPr>
-          <p:nvPr>
-            <p:ph sz="half" idx="1"/>
-          </p:nvPr>
-        </p:nvSpPr>
-        <p:spPr>
-          <a:xfrm>
-            <a:off x="1298448" y="2560320"/>
-            <a:ext cx="4718304" cy="2176978"/>
-          </a:xfrm>
-        </p:spPr>
-        <p:txBody>
-          <a:bodyPr>
-            <a:normAutofit fontScale="85000" lnSpcReduction="10000"/>
-          </a:bodyPr>
-          <a:lstStyle/>
-          <a:p>
-            <a:r>
-              <a:rPr lang="en-US" dirty="0" smtClean="0"/>
-              <a:t>Whenever you save your document, alongside the .</a:t>
-            </a:r>
-            <a:r>
-              <a:rPr lang="en-US" dirty="0" err="1" smtClean="0"/>
-              <a:t>rmd</a:t>
-            </a:r>
-            <a:r>
-              <a:rPr lang="en-US" dirty="0" smtClean="0"/>
-              <a:t> file you are currently working on, a .nb.html file is created</a:t>
-            </a:r>
-          </a:p>
-          <a:p>
-            <a:r>
-              <a:rPr lang="en-US" dirty="0" smtClean="0"/>
-              <a:t>This document is simply an html file displaying exactly what clicking “preview” would have done at the time of saving</a:t>
-            </a:r>
-          </a:p>
-        </p:txBody>
-      </p:sp>
-      <p:sp>
-        <p:nvSpPr>
-          <p:cNvPr id="4" name="Content Placeholder 3"/>
-          <p:cNvSpPr>
-            <a:spLocks noGrp="1"/>
-          </p:cNvSpPr>
-          <p:nvPr>
-            <p:ph sz="half" idx="2"/>
-          </p:nvPr>
-        </p:nvSpPr>
-        <p:spPr>
-          <a:xfrm>
-            <a:off x="1295402" y="4633811"/>
-            <a:ext cx="3748005" cy="1268082"/>
-          </a:xfrm>
-        </p:spPr>
-        <p:txBody>
-          <a:bodyPr numCol="1">
-            <a:normAutofit fontScale="85000" lnSpcReduction="10000"/>
-          </a:bodyPr>
-          <a:lstStyle/>
-          <a:p>
-            <a:r>
-              <a:rPr lang="en-US" dirty="0"/>
-              <a:t>This document can be shared with others and opened either within a web browser or within </a:t>
-            </a:r>
-            <a:r>
-              <a:rPr lang="en-US" dirty="0" err="1"/>
-              <a:t>RStudio</a:t>
-            </a:r>
-            <a:r>
-              <a:rPr lang="en-US" dirty="0"/>
-              <a:t> itself</a:t>
-            </a:r>
-          </a:p>
-          <a:p>
-            <a:endParaRPr lang="en-US" dirty="0"/>
-          </a:p>
-        </p:txBody>
-      </p:sp>
-      <p:sp>
-        <p:nvSpPr>
-          <p:cNvPr id="6" name="Content Placeholder 2"/>
-          <p:cNvSpPr txBox="1">
-            <a:spLocks/>
-          </p:cNvSpPr>
-          <p:nvPr/>
-        </p:nvSpPr>
-        <p:spPr>
-          <a:xfrm>
-            <a:off x="6178294" y="1786890"/>
-            <a:ext cx="4718304" cy="3310128"/>
-          </a:xfrm>
-          <a:prstGeom prst="rect">
-            <a:avLst/>
-          </a:prstGeom>
-        </p:spPr>
-        <p:txBody>
-          <a:bodyPr vert="horz" lIns="91440" tIns="45720" rIns="91440" bIns="45720" rtlCol="0" anchor="t">
-            <a:normAutofit/>
-          </a:bodyPr>
-          <a:lstStyle>
-            <a:lvl1pPr marL="285750" indent="-285750" algn="l" defTabSz="457200" rtl="0" eaLnBrk="1" latinLnBrk="0" hangingPunct="1">
-              <a:spcBef>
-                <a:spcPct val="20000"/>
-              </a:spcBef>
-              <a:spcAft>
-                <a:spcPts val="600"/>
-              </a:spcAft>
-              <a:buClr>
-                <a:schemeClr val="accent1"/>
-              </a:buClr>
-              <a:buSzPct val="115000"/>
-              <a:buFont typeface="Arial"/>
-              <a:buChar char="•"/>
-              <a:defRPr sz="2400" kern="1200" cap="none">
-                <a:solidFill>
-                  <a:schemeClr val="tx1">
-                    <a:lumMod val="85000"/>
-                    <a:lumOff val="15000"/>
-                  </a:schemeClr>
-                </a:solidFill>
-                <a:effectLst/>
-                <a:latin typeface="+mn-lt"/>
-                <a:ea typeface="+mn-ea"/>
-                <a:cs typeface="+mn-cs"/>
-              </a:defRPr>
-            </a:lvl1pPr>
-            <a:lvl2pPr marL="742950" indent="-285750" algn="l" defTabSz="457200" rtl="0" eaLnBrk="1" latinLnBrk="0" hangingPunct="1">
-              <a:spcBef>
-                <a:spcPct val="20000"/>
-              </a:spcBef>
-              <a:spcAft>
-                <a:spcPts val="600"/>
-              </a:spcAft>
-              <a:buClr>
-                <a:schemeClr val="accent1"/>
-              </a:buClr>
-              <a:buSzPct val="115000"/>
-              <a:buFont typeface="Arial"/>
-              <a:buChar char="•"/>
-              <a:defRPr sz="2000" kern="1200" cap="none">
-                <a:solidFill>
-                  <a:schemeClr val="tx1">
-                    <a:lumMod val="85000"/>
-                    <a:lumOff val="15000"/>
-                  </a:schemeClr>
-                </a:solidFill>
-                <a:effectLst/>
-                <a:latin typeface="+mn-lt"/>
-                <a:ea typeface="+mn-ea"/>
-                <a:cs typeface="+mn-cs"/>
-              </a:defRPr>
-            </a:lvl2pPr>
-            <a:lvl3pPr marL="1200150" indent="-285750" algn="l" defTabSz="457200" rtl="0" eaLnBrk="1" latinLnBrk="0" hangingPunct="1">
-              <a:spcBef>
-                <a:spcPct val="20000"/>
-              </a:spcBef>
-              <a:spcAft>
-                <a:spcPts val="600"/>
-              </a:spcAft>
-              <a:buClr>
-                <a:schemeClr val="accent1"/>
-              </a:buClr>
-              <a:buSzPct val="115000"/>
-              <a:buFont typeface="Arial"/>
-              <a:buChar char="•"/>
-              <a:defRPr sz="1800" kern="1200" cap="none">
-                <a:solidFill>
-                  <a:schemeClr val="tx1">
-                    <a:lumMod val="85000"/>
-                    <a:lumOff val="15000"/>
-                  </a:schemeClr>
-                </a:solidFill>
-                <a:effectLst/>
-                <a:latin typeface="+mn-lt"/>
-                <a:ea typeface="+mn-ea"/>
-                <a:cs typeface="+mn-cs"/>
-              </a:defRPr>
-            </a:lvl3pPr>
-            <a:lvl4pPr marL="1543050" indent="-171450" algn="l" defTabSz="457200" rtl="0" eaLnBrk="1" latinLnBrk="0" hangingPunct="1">
-              <a:spcBef>
-                <a:spcPct val="20000"/>
-              </a:spcBef>
-              <a:spcAft>
-                <a:spcPts val="600"/>
-              </a:spcAft>
-              <a:buClr>
-                <a:schemeClr val="accent1"/>
-              </a:buClr>
-              <a:buSzPct val="115000"/>
-              <a:buFont typeface="Arial"/>
-              <a:buChar char="•"/>
-              <a:defRPr sz="1600" kern="1200" cap="none">
-                <a:solidFill>
-                  <a:schemeClr val="tx1">
-                    <a:lumMod val="85000"/>
-                    <a:lumOff val="15000"/>
-                  </a:schemeClr>
-                </a:solidFill>
-                <a:effectLst/>
-                <a:latin typeface="+mn-lt"/>
-                <a:ea typeface="+mn-ea"/>
-                <a:cs typeface="+mn-cs"/>
-              </a:defRPr>
-            </a:lvl4pPr>
-            <a:lvl5pPr marL="2000250" indent="-171450" algn="l" defTabSz="457200" rtl="0" eaLnBrk="1" latinLnBrk="0" hangingPunct="1">
-              <a:spcBef>
-                <a:spcPct val="20000"/>
-              </a:spcBef>
-              <a:spcAft>
-                <a:spcPts val="600"/>
-              </a:spcAft>
-              <a:buClr>
-                <a:schemeClr val="accent1"/>
-              </a:buClr>
-              <a:buSzPct val="115000"/>
-              <a:buFont typeface="Arial"/>
-              <a:buChar char="•"/>
-              <a:defRPr sz="1400" kern="1200" cap="none">
-                <a:solidFill>
-                  <a:schemeClr val="tx1">
-                    <a:lumMod val="85000"/>
-                    <a:lumOff val="15000"/>
-                  </a:schemeClr>
-                </a:solidFill>
-                <a:effectLst/>
-                <a:latin typeface="+mn-lt"/>
-                <a:ea typeface="+mn-ea"/>
-                <a:cs typeface="+mn-cs"/>
-              </a:defRPr>
-            </a:lvl5pPr>
-            <a:lvl6pPr marL="2514600" indent="-228600" algn="l" defTabSz="457200" rtl="0" eaLnBrk="1" latinLnBrk="0" hangingPunct="1">
-              <a:spcBef>
-                <a:spcPct val="20000"/>
-              </a:spcBef>
-              <a:spcAft>
-                <a:spcPts val="600"/>
-              </a:spcAft>
-              <a:buClr>
-                <a:schemeClr val="accent1"/>
-              </a:buClr>
-              <a:buSzPct val="115000"/>
-              <a:buFont typeface="Arial"/>
-              <a:buChar char="•"/>
-              <a:defRPr sz="1400" kern="1200" cap="none">
-                <a:solidFill>
-                  <a:schemeClr val="tx1">
-                    <a:lumMod val="85000"/>
-                    <a:lumOff val="15000"/>
-                  </a:schemeClr>
-                </a:solidFill>
-                <a:effectLst/>
-                <a:latin typeface="+mn-lt"/>
-                <a:ea typeface="+mn-ea"/>
-                <a:cs typeface="+mn-cs"/>
-              </a:defRPr>
-            </a:lvl6pPr>
-            <a:lvl7pPr marL="2971800" indent="-228600" algn="l" defTabSz="457200" rtl="0" eaLnBrk="1" latinLnBrk="0" hangingPunct="1">
-              <a:spcBef>
-                <a:spcPct val="20000"/>
-              </a:spcBef>
-              <a:spcAft>
-                <a:spcPts val="600"/>
-              </a:spcAft>
-              <a:buClr>
-                <a:schemeClr val="accent1"/>
-              </a:buClr>
-              <a:buSzPct val="115000"/>
-              <a:buFont typeface="Arial"/>
-              <a:buChar char="•"/>
-              <a:defRPr sz="1400" kern="1200" cap="none">
-                <a:solidFill>
-                  <a:schemeClr val="tx1">
-                    <a:lumMod val="85000"/>
-                    <a:lumOff val="15000"/>
-                  </a:schemeClr>
-                </a:solidFill>
-                <a:effectLst/>
-                <a:latin typeface="+mn-lt"/>
-                <a:ea typeface="+mn-ea"/>
-                <a:cs typeface="+mn-cs"/>
-              </a:defRPr>
-            </a:lvl7pPr>
-            <a:lvl8pPr marL="3429000" indent="-228600" algn="l" defTabSz="457200" rtl="0" eaLnBrk="1" latinLnBrk="0" hangingPunct="1">
-              <a:spcBef>
-                <a:spcPct val="20000"/>
-              </a:spcBef>
-              <a:spcAft>
-                <a:spcPts val="600"/>
-              </a:spcAft>
-              <a:buClr>
-                <a:schemeClr val="accent1"/>
-              </a:buClr>
-              <a:buSzPct val="115000"/>
-              <a:buFont typeface="Arial"/>
-              <a:buChar char="•"/>
-              <a:defRPr sz="1400" kern="1200" cap="none">
-                <a:solidFill>
-                  <a:schemeClr val="tx1">
-                    <a:lumMod val="85000"/>
-                    <a:lumOff val="15000"/>
-                  </a:schemeClr>
-                </a:solidFill>
-                <a:effectLst/>
-                <a:latin typeface="+mn-lt"/>
-                <a:ea typeface="+mn-ea"/>
-                <a:cs typeface="+mn-cs"/>
-              </a:defRPr>
-            </a:lvl8pPr>
-            <a:lvl9pPr marL="3886200" indent="-228600" algn="l" defTabSz="457200" rtl="0" eaLnBrk="1" latinLnBrk="0" hangingPunct="1">
-              <a:spcBef>
-                <a:spcPct val="20000"/>
-              </a:spcBef>
-              <a:spcAft>
-                <a:spcPts val="600"/>
-              </a:spcAft>
-              <a:buClr>
-                <a:schemeClr val="accent1"/>
-              </a:buClr>
-              <a:buSzPct val="115000"/>
-              <a:buFont typeface="Arial"/>
-              <a:buChar char="•"/>
-              <a:defRPr sz="1400" kern="1200" cap="none">
-                <a:solidFill>
-                  <a:schemeClr val="tx1">
-                    <a:lumMod val="85000"/>
-                    <a:lumOff val="15000"/>
-                  </a:schemeClr>
-                </a:solidFill>
-                <a:effectLst/>
-                <a:latin typeface="+mn-lt"/>
-                <a:ea typeface="+mn-ea"/>
-                <a:cs typeface="+mn-cs"/>
-              </a:defRPr>
-            </a:lvl9pPr>
-          </a:lstStyle>
-          <a:p>
-            <a:endParaRPr lang="en-US" dirty="0"/>
-          </a:p>
-        </p:txBody>
-      </p:sp>
-      <p:sp>
-        <p:nvSpPr>
-          <p:cNvPr id="7" name="Content Placeholder 3"/>
-          <p:cNvSpPr txBox="1">
-            <a:spLocks/>
-          </p:cNvSpPr>
-          <p:nvPr/>
-        </p:nvSpPr>
-        <p:spPr>
-          <a:xfrm>
-            <a:off x="6016752" y="2558625"/>
-            <a:ext cx="5188961" cy="2075186"/>
-          </a:xfrm>
-          <a:prstGeom prst="rect">
-            <a:avLst/>
-          </a:prstGeom>
-        </p:spPr>
-        <p:txBody>
-          <a:bodyPr vert="horz" lIns="91440" tIns="45720" rIns="91440" bIns="45720" numCol="1" rtlCol="0" anchor="t">
-            <a:normAutofit fontScale="47500" lnSpcReduction="20000"/>
-          </a:bodyPr>
-          <a:lstStyle>
-            <a:lvl1pPr marL="285750" indent="-285750" algn="l" defTabSz="457200" rtl="0" eaLnBrk="1" latinLnBrk="0" hangingPunct="1">
-              <a:spcBef>
-                <a:spcPct val="20000"/>
-              </a:spcBef>
-              <a:spcAft>
-                <a:spcPts val="600"/>
-              </a:spcAft>
-              <a:buClr>
-                <a:schemeClr val="accent1"/>
-              </a:buClr>
-              <a:buSzPct val="115000"/>
-              <a:buFont typeface="Arial"/>
-              <a:buChar char="•"/>
-              <a:defRPr sz="2400" kern="1200" cap="none">
-                <a:solidFill>
-                  <a:schemeClr val="tx1">
-                    <a:lumMod val="85000"/>
-                    <a:lumOff val="15000"/>
-                  </a:schemeClr>
-                </a:solidFill>
-                <a:effectLst/>
-                <a:latin typeface="+mn-lt"/>
-                <a:ea typeface="+mn-ea"/>
-                <a:cs typeface="+mn-cs"/>
-              </a:defRPr>
-            </a:lvl1pPr>
-            <a:lvl2pPr marL="742950" indent="-285750" algn="l" defTabSz="457200" rtl="0" eaLnBrk="1" latinLnBrk="0" hangingPunct="1">
-              <a:spcBef>
-                <a:spcPct val="20000"/>
-              </a:spcBef>
-              <a:spcAft>
-                <a:spcPts val="600"/>
-              </a:spcAft>
-              <a:buClr>
-                <a:schemeClr val="accent1"/>
-              </a:buClr>
-              <a:buSzPct val="115000"/>
-              <a:buFont typeface="Arial"/>
-              <a:buChar char="•"/>
-              <a:defRPr sz="2000" kern="1200" cap="none">
-                <a:solidFill>
-                  <a:schemeClr val="tx1">
-                    <a:lumMod val="85000"/>
-                    <a:lumOff val="15000"/>
-                  </a:schemeClr>
-                </a:solidFill>
-                <a:effectLst/>
-                <a:latin typeface="+mn-lt"/>
-                <a:ea typeface="+mn-ea"/>
-                <a:cs typeface="+mn-cs"/>
-              </a:defRPr>
-            </a:lvl2pPr>
-            <a:lvl3pPr marL="1200150" indent="-285750" algn="l" defTabSz="457200" rtl="0" eaLnBrk="1" latinLnBrk="0" hangingPunct="1">
-              <a:spcBef>
-                <a:spcPct val="20000"/>
-              </a:spcBef>
-              <a:spcAft>
-                <a:spcPts val="600"/>
-              </a:spcAft>
-              <a:buClr>
-                <a:schemeClr val="accent1"/>
-              </a:buClr>
-              <a:buSzPct val="115000"/>
-              <a:buFont typeface="Arial"/>
-              <a:buChar char="•"/>
-              <a:defRPr sz="1800" kern="1200" cap="none">
-                <a:solidFill>
-                  <a:schemeClr val="tx1">
-                    <a:lumMod val="85000"/>
-                    <a:lumOff val="15000"/>
-                  </a:schemeClr>
-                </a:solidFill>
-                <a:effectLst/>
-                <a:latin typeface="+mn-lt"/>
-                <a:ea typeface="+mn-ea"/>
-                <a:cs typeface="+mn-cs"/>
-              </a:defRPr>
-            </a:lvl3pPr>
-            <a:lvl4pPr marL="1543050" indent="-171450" algn="l" defTabSz="457200" rtl="0" eaLnBrk="1" latinLnBrk="0" hangingPunct="1">
-              <a:spcBef>
-                <a:spcPct val="20000"/>
-              </a:spcBef>
-              <a:spcAft>
-                <a:spcPts val="600"/>
-              </a:spcAft>
-              <a:buClr>
-                <a:schemeClr val="accent1"/>
-              </a:buClr>
-              <a:buSzPct val="115000"/>
-              <a:buFont typeface="Arial"/>
-              <a:buChar char="•"/>
-              <a:defRPr sz="1600" kern="1200" cap="none">
-                <a:solidFill>
-                  <a:schemeClr val="tx1">
-                    <a:lumMod val="85000"/>
-                    <a:lumOff val="15000"/>
-                  </a:schemeClr>
-                </a:solidFill>
-                <a:effectLst/>
-                <a:latin typeface="+mn-lt"/>
-                <a:ea typeface="+mn-ea"/>
-                <a:cs typeface="+mn-cs"/>
-              </a:defRPr>
-            </a:lvl4pPr>
-            <a:lvl5pPr marL="2000250" indent="-171450" algn="l" defTabSz="457200" rtl="0" eaLnBrk="1" latinLnBrk="0" hangingPunct="1">
-              <a:spcBef>
-                <a:spcPct val="20000"/>
-              </a:spcBef>
-              <a:spcAft>
-                <a:spcPts val="600"/>
-              </a:spcAft>
-              <a:buClr>
-                <a:schemeClr val="accent1"/>
-              </a:buClr>
-              <a:buSzPct val="115000"/>
-              <a:buFont typeface="Arial"/>
-              <a:buChar char="•"/>
-              <a:defRPr sz="1400" kern="1200" cap="none">
-                <a:solidFill>
-                  <a:schemeClr val="tx1">
-                    <a:lumMod val="85000"/>
-                    <a:lumOff val="15000"/>
-                  </a:schemeClr>
-                </a:solidFill>
-                <a:effectLst/>
-                <a:latin typeface="+mn-lt"/>
-                <a:ea typeface="+mn-ea"/>
-                <a:cs typeface="+mn-cs"/>
-              </a:defRPr>
-            </a:lvl5pPr>
-            <a:lvl6pPr marL="2514600" indent="-228600" algn="l" defTabSz="457200" rtl="0" eaLnBrk="1" latinLnBrk="0" hangingPunct="1">
-              <a:spcBef>
-                <a:spcPct val="20000"/>
-              </a:spcBef>
-              <a:spcAft>
-                <a:spcPts val="600"/>
-              </a:spcAft>
-              <a:buClr>
-                <a:schemeClr val="accent1"/>
-              </a:buClr>
-              <a:buSzPct val="115000"/>
-              <a:buFont typeface="Arial"/>
-              <a:buChar char="•"/>
-              <a:defRPr sz="1400" kern="1200" cap="none">
-                <a:solidFill>
-                  <a:schemeClr val="tx1">
-                    <a:lumMod val="85000"/>
-                    <a:lumOff val="15000"/>
-                  </a:schemeClr>
-                </a:solidFill>
-                <a:effectLst/>
-                <a:latin typeface="+mn-lt"/>
-                <a:ea typeface="+mn-ea"/>
-                <a:cs typeface="+mn-cs"/>
-              </a:defRPr>
-            </a:lvl6pPr>
-            <a:lvl7pPr marL="2971800" indent="-228600" algn="l" defTabSz="457200" rtl="0" eaLnBrk="1" latinLnBrk="0" hangingPunct="1">
-              <a:spcBef>
-                <a:spcPct val="20000"/>
-              </a:spcBef>
-              <a:spcAft>
-                <a:spcPts val="600"/>
-              </a:spcAft>
-              <a:buClr>
-                <a:schemeClr val="accent1"/>
-              </a:buClr>
-              <a:buSzPct val="115000"/>
-              <a:buFont typeface="Arial"/>
-              <a:buChar char="•"/>
-              <a:defRPr sz="1400" kern="1200" cap="none">
-                <a:solidFill>
-                  <a:schemeClr val="tx1">
-                    <a:lumMod val="85000"/>
-                    <a:lumOff val="15000"/>
-                  </a:schemeClr>
-                </a:solidFill>
-                <a:effectLst/>
-                <a:latin typeface="+mn-lt"/>
-                <a:ea typeface="+mn-ea"/>
-                <a:cs typeface="+mn-cs"/>
-              </a:defRPr>
-            </a:lvl7pPr>
-            <a:lvl8pPr marL="3429000" indent="-228600" algn="l" defTabSz="457200" rtl="0" eaLnBrk="1" latinLnBrk="0" hangingPunct="1">
-              <a:spcBef>
-                <a:spcPct val="20000"/>
-              </a:spcBef>
-              <a:spcAft>
-                <a:spcPts val="600"/>
-              </a:spcAft>
-              <a:buClr>
-                <a:schemeClr val="accent1"/>
-              </a:buClr>
-              <a:buSzPct val="115000"/>
-              <a:buFont typeface="Arial"/>
-              <a:buChar char="•"/>
-              <a:defRPr sz="1400" kern="1200" cap="none">
-                <a:solidFill>
-                  <a:schemeClr val="tx1">
-                    <a:lumMod val="85000"/>
-                    <a:lumOff val="15000"/>
-                  </a:schemeClr>
-                </a:solidFill>
-                <a:effectLst/>
-                <a:latin typeface="+mn-lt"/>
-                <a:ea typeface="+mn-ea"/>
-                <a:cs typeface="+mn-cs"/>
-              </a:defRPr>
-            </a:lvl8pPr>
-            <a:lvl9pPr marL="3886200" indent="-228600" algn="l" defTabSz="457200" rtl="0" eaLnBrk="1" latinLnBrk="0" hangingPunct="1">
-              <a:spcBef>
-                <a:spcPct val="20000"/>
-              </a:spcBef>
-              <a:spcAft>
-                <a:spcPts val="600"/>
-              </a:spcAft>
-              <a:buClr>
-                <a:schemeClr val="accent1"/>
-              </a:buClr>
-              <a:buSzPct val="115000"/>
-              <a:buFont typeface="Arial"/>
-              <a:buChar char="•"/>
-              <a:defRPr sz="1400" kern="1200" cap="none">
-                <a:solidFill>
-                  <a:schemeClr val="tx1">
-                    <a:lumMod val="85000"/>
-                    <a:lumOff val="15000"/>
-                  </a:schemeClr>
-                </a:solidFill>
-                <a:effectLst/>
-                <a:latin typeface="+mn-lt"/>
-                <a:ea typeface="+mn-ea"/>
-                <a:cs typeface="+mn-cs"/>
-              </a:defRPr>
-            </a:lvl9pPr>
-          </a:lstStyle>
-          <a:p>
-            <a:r>
-              <a:rPr lang="en-US" sz="3800" dirty="0" smtClean="0"/>
-              <a:t>File formatting within an R Notebook document is done in the </a:t>
-            </a:r>
-            <a:r>
-              <a:rPr lang="en-US" sz="3800" b="1" dirty="0" smtClean="0"/>
-              <a:t>markdown</a:t>
-            </a:r>
-            <a:r>
-              <a:rPr lang="en-US" sz="3800" dirty="0" smtClean="0"/>
-              <a:t> formatting language</a:t>
-            </a:r>
-          </a:p>
-          <a:p>
-            <a:pPr lvl="1">
-              <a:buFont typeface="Wingdings" panose="05000000000000000000" pitchFamily="2" charset="2"/>
-              <a:buChar char="ü"/>
-            </a:pPr>
-            <a:r>
-              <a:rPr lang="en-US" sz="3400" dirty="0" smtClean="0"/>
-              <a:t>Markdown is an easy-to-use text formatting language that allows for the creation of rich text using plain text</a:t>
-            </a:r>
-          </a:p>
-          <a:p>
-            <a:pPr lvl="1">
-              <a:buFont typeface="Wingdings" panose="05000000000000000000" pitchFamily="2" charset="2"/>
-              <a:buChar char="ü"/>
-            </a:pPr>
-            <a:r>
-              <a:rPr lang="en-US" sz="3400" dirty="0" smtClean="0"/>
-              <a:t>For more information on formatting using markdown</a:t>
-            </a:r>
-            <a:r>
-              <a:rPr lang="en-US" sz="3400" dirty="0"/>
-              <a:t>, consult </a:t>
-            </a:r>
-            <a:r>
-              <a:rPr lang="en-US" sz="3400" dirty="0">
-                <a:hlinkClick r:id="rId2"/>
-              </a:rPr>
-              <a:t>https://</a:t>
-            </a:r>
-            <a:r>
-              <a:rPr lang="en-US" sz="3400" dirty="0" smtClean="0">
-                <a:hlinkClick r:id="rId2"/>
-              </a:rPr>
-              <a:t>daringfireball.net/projects/markdown/basics</a:t>
-            </a:r>
-            <a:endParaRPr lang="en-US" sz="3400" dirty="0" smtClean="0"/>
-          </a:p>
-          <a:p>
-            <a:endParaRPr lang="en-US" sz="2600" dirty="0"/>
-          </a:p>
-        </p:txBody>
-      </p:sp>
-      <p:pic>
-        <p:nvPicPr>
-          <p:cNvPr id="8" name="Picture 7"/>
-          <p:cNvPicPr>
-            <a:picLocks noChangeAspect="1"/>
-          </p:cNvPicPr>
-          <p:nvPr/>
-        </p:nvPicPr>
-        <p:blipFill>
-          <a:blip r:embed="rId3">
-            <a:extLst>
-              <a:ext uri="{28A0092B-C50C-407E-A947-70E740481C1C}">
-                <a14:useLocalDpi xmlns:a14="http://schemas.microsoft.com/office/drawing/2010/main" val="0"/>
-              </a:ext>
-            </a:extLst>
-          </a:blip>
-          <a:stretch>
-            <a:fillRect/>
-          </a:stretch>
-        </p:blipFill>
-        <p:spPr>
-          <a:xfrm>
-            <a:off x="5043407" y="4586064"/>
-            <a:ext cx="6409100" cy="1568993"/>
-          </a:xfrm>
-          <a:prstGeom prst="rect">
-            <a:avLst/>
-          </a:prstGeom>
-        </p:spPr>
-      </p:pic>
-    </p:spTree>
-    <p:extLst>
-      <p:ext uri="{BB962C8B-B14F-4D97-AF65-F5344CB8AC3E}">
-        <p14:creationId xmlns:p14="http://schemas.microsoft.com/office/powerpoint/2010/main" val="2969344793"/>
       </p:ext>
     </p:extLst>
   </p:cSld>

</xml_diff>

<commit_message>
Added Section "GitHub Desktop"
Added several new slides explaining how to work with your GitHub account remotely using GitHub desktop.
</commit_message>
<xml_diff>
--- a/Using R Notebook with Version Control.pptx
+++ b/Using R Notebook with Version Control.pptx
@@ -29,7 +29,9 @@
     <p:sldId id="280" r:id="rId23"/>
     <p:sldId id="281" r:id="rId24"/>
     <p:sldId id="282" r:id="rId25"/>
-    <p:sldId id="264" r:id="rId26"/>
+    <p:sldId id="284" r:id="rId26"/>
+    <p:sldId id="264" r:id="rId27"/>
+    <p:sldId id="283" r:id="rId28"/>
   </p:sldIdLst>
   <p:sldSz cx="12192000" cy="6858000"/>
   <p:notesSz cx="6858000" cy="9144000"/>
@@ -11775,6 +11777,14 @@
             <a:off x="1298702" y="5200440"/>
             <a:ext cx="4718050" cy="827264"/>
           </a:xfrm>
+          <a:ln>
+            <a:solidFill>
+              <a:schemeClr val="tx1">
+                <a:lumMod val="50000"/>
+                <a:lumOff val="50000"/>
+              </a:schemeClr>
+            </a:solidFill>
+          </a:ln>
         </p:spPr>
       </p:pic>
       <p:sp>
@@ -13302,6 +13312,13 @@
   <p:clrMapOvr>
     <a:masterClrMapping/>
   </p:clrMapOvr>
+  <p:timing>
+    <p:tnLst>
+      <p:par>
+        <p:cTn id="1" dur="indefinite" restart="never" nodeType="tmRoot"/>
+      </p:par>
+    </p:tnLst>
+  </p:timing>
 </p:sld>
 </file>
 
@@ -13345,7 +13362,11 @@
             </a:r>
             <a:r>
               <a:rPr lang="en-US" dirty="0" smtClean="0"/>
-              <a:t>Retrieving our Repositories</a:t>
+              <a:t>Retrieving our </a:t>
+            </a:r>
+            <a:r>
+              <a:rPr lang="en-US" dirty="0" smtClean="0"/>
+              <a:t>First Repository</a:t>
             </a:r>
             <a:endParaRPr lang="en-US" dirty="0"/>
           </a:p>
@@ -13363,24 +13384,33 @@
         </p:nvSpPr>
         <p:spPr>
           <a:xfrm>
-            <a:off x="1298448" y="2560320"/>
-            <a:ext cx="4718304" cy="1288097"/>
+            <a:off x="1295402" y="2465000"/>
+            <a:ext cx="5710910" cy="901891"/>
           </a:xfrm>
         </p:spPr>
         <p:txBody>
-          <a:bodyPr/>
+          <a:bodyPr>
+            <a:noAutofit/>
+          </a:bodyPr>
           <a:lstStyle/>
           <a:p>
             <a:r>
-              <a:rPr lang="en-US" dirty="0" smtClean="0"/>
-              <a:t>Repositories in GitHub Desktop are essentially local copies of your online repositories</a:t>
-            </a:r>
+              <a:rPr lang="en-US" sz="1600" dirty="0" smtClean="0"/>
+              <a:t>After signing in, you are greeted with an initialization menu</a:t>
+            </a:r>
+          </a:p>
+          <a:p>
+            <a:r>
+              <a:rPr lang="en-US" sz="1600" dirty="0" smtClean="0"/>
+              <a:t>Select the “Clone a repository from the Internet…” option (shown below)</a:t>
+            </a:r>
+            <a:endParaRPr lang="en-US" sz="1600" dirty="0" smtClean="0"/>
           </a:p>
         </p:txBody>
       </p:sp>
       <p:pic>
         <p:nvPicPr>
-          <p:cNvPr id="5" name="Content Placeholder 4"/>
+          <p:cNvPr id="7" name="Content Placeholder 6"/>
           <p:cNvPicPr>
             <a:picLocks noGrp="1" noChangeAspect="1"/>
           </p:cNvPicPr>
@@ -13388,8 +13418,903 @@
             <p:ph sz="half" idx="2"/>
           </p:nvPr>
         </p:nvPicPr>
+        <p:blipFill rotWithShape="1">
+          <a:blip r:embed="rId2">
+            <a:extLst>
+              <a:ext uri="{28A0092B-C50C-407E-A947-70E740481C1C}">
+                <a14:useLocalDpi xmlns:a14="http://schemas.microsoft.com/office/drawing/2010/main" val="0"/>
+              </a:ext>
+            </a:extLst>
+          </a:blip>
+          <a:srcRect t="13877" b="24987"/>
+          <a:stretch/>
+        </p:blipFill>
+        <p:spPr>
+          <a:xfrm>
+            <a:off x="1295402" y="3429000"/>
+            <a:ext cx="5710910" cy="1188722"/>
+          </a:xfrm>
+          <a:ln>
+            <a:solidFill>
+              <a:schemeClr val="tx1">
+                <a:lumMod val="50000"/>
+                <a:lumOff val="50000"/>
+              </a:schemeClr>
+            </a:solidFill>
+          </a:ln>
+        </p:spPr>
+      </p:pic>
+      <p:sp>
+        <p:nvSpPr>
+          <p:cNvPr id="10" name="Content Placeholder 2"/>
+          <p:cNvSpPr txBox="1">
+            <a:spLocks/>
+          </p:cNvSpPr>
+          <p:nvPr/>
+        </p:nvSpPr>
+        <p:spPr>
+          <a:xfrm>
+            <a:off x="1295403" y="4665203"/>
+            <a:ext cx="5553971" cy="1519938"/>
+          </a:xfrm>
+          <a:prstGeom prst="rect">
+            <a:avLst/>
+          </a:prstGeom>
+        </p:spPr>
+        <p:txBody>
+          <a:bodyPr vert="horz" lIns="91440" tIns="45720" rIns="91440" bIns="45720" rtlCol="0" anchor="t">
+            <a:normAutofit fontScale="40000" lnSpcReduction="20000"/>
+          </a:bodyPr>
+          <a:lstStyle>
+            <a:lvl1pPr marL="285750" indent="-285750" algn="l" defTabSz="457200" rtl="0" eaLnBrk="1" latinLnBrk="0" hangingPunct="1">
+              <a:spcBef>
+                <a:spcPct val="20000"/>
+              </a:spcBef>
+              <a:spcAft>
+                <a:spcPts val="600"/>
+              </a:spcAft>
+              <a:buClr>
+                <a:schemeClr val="accent1"/>
+              </a:buClr>
+              <a:buSzPct val="115000"/>
+              <a:buFont typeface="Arial"/>
+              <a:buChar char="•"/>
+              <a:defRPr sz="2400" kern="1200" cap="none">
+                <a:solidFill>
+                  <a:schemeClr val="tx1">
+                    <a:lumMod val="85000"/>
+                    <a:lumOff val="15000"/>
+                  </a:schemeClr>
+                </a:solidFill>
+                <a:effectLst/>
+                <a:latin typeface="+mn-lt"/>
+                <a:ea typeface="+mn-ea"/>
+                <a:cs typeface="+mn-cs"/>
+              </a:defRPr>
+            </a:lvl1pPr>
+            <a:lvl2pPr marL="742950" indent="-285750" algn="l" defTabSz="457200" rtl="0" eaLnBrk="1" latinLnBrk="0" hangingPunct="1">
+              <a:spcBef>
+                <a:spcPct val="20000"/>
+              </a:spcBef>
+              <a:spcAft>
+                <a:spcPts val="600"/>
+              </a:spcAft>
+              <a:buClr>
+                <a:schemeClr val="accent1"/>
+              </a:buClr>
+              <a:buSzPct val="115000"/>
+              <a:buFont typeface="Arial"/>
+              <a:buChar char="•"/>
+              <a:defRPr sz="2000" kern="1200" cap="none">
+                <a:solidFill>
+                  <a:schemeClr val="tx1">
+                    <a:lumMod val="85000"/>
+                    <a:lumOff val="15000"/>
+                  </a:schemeClr>
+                </a:solidFill>
+                <a:effectLst/>
+                <a:latin typeface="+mn-lt"/>
+                <a:ea typeface="+mn-ea"/>
+                <a:cs typeface="+mn-cs"/>
+              </a:defRPr>
+            </a:lvl2pPr>
+            <a:lvl3pPr marL="1200150" indent="-285750" algn="l" defTabSz="457200" rtl="0" eaLnBrk="1" latinLnBrk="0" hangingPunct="1">
+              <a:spcBef>
+                <a:spcPct val="20000"/>
+              </a:spcBef>
+              <a:spcAft>
+                <a:spcPts val="600"/>
+              </a:spcAft>
+              <a:buClr>
+                <a:schemeClr val="accent1"/>
+              </a:buClr>
+              <a:buSzPct val="115000"/>
+              <a:buFont typeface="Arial"/>
+              <a:buChar char="•"/>
+              <a:defRPr sz="1800" kern="1200" cap="none">
+                <a:solidFill>
+                  <a:schemeClr val="tx1">
+                    <a:lumMod val="85000"/>
+                    <a:lumOff val="15000"/>
+                  </a:schemeClr>
+                </a:solidFill>
+                <a:effectLst/>
+                <a:latin typeface="+mn-lt"/>
+                <a:ea typeface="+mn-ea"/>
+                <a:cs typeface="+mn-cs"/>
+              </a:defRPr>
+            </a:lvl3pPr>
+            <a:lvl4pPr marL="1543050" indent="-171450" algn="l" defTabSz="457200" rtl="0" eaLnBrk="1" latinLnBrk="0" hangingPunct="1">
+              <a:spcBef>
+                <a:spcPct val="20000"/>
+              </a:spcBef>
+              <a:spcAft>
+                <a:spcPts val="600"/>
+              </a:spcAft>
+              <a:buClr>
+                <a:schemeClr val="accent1"/>
+              </a:buClr>
+              <a:buSzPct val="115000"/>
+              <a:buFont typeface="Arial"/>
+              <a:buChar char="•"/>
+              <a:defRPr sz="1600" kern="1200" cap="none">
+                <a:solidFill>
+                  <a:schemeClr val="tx1">
+                    <a:lumMod val="85000"/>
+                    <a:lumOff val="15000"/>
+                  </a:schemeClr>
+                </a:solidFill>
+                <a:effectLst/>
+                <a:latin typeface="+mn-lt"/>
+                <a:ea typeface="+mn-ea"/>
+                <a:cs typeface="+mn-cs"/>
+              </a:defRPr>
+            </a:lvl4pPr>
+            <a:lvl5pPr marL="2000250" indent="-171450" algn="l" defTabSz="457200" rtl="0" eaLnBrk="1" latinLnBrk="0" hangingPunct="1">
+              <a:spcBef>
+                <a:spcPct val="20000"/>
+              </a:spcBef>
+              <a:spcAft>
+                <a:spcPts val="600"/>
+              </a:spcAft>
+              <a:buClr>
+                <a:schemeClr val="accent1"/>
+              </a:buClr>
+              <a:buSzPct val="115000"/>
+              <a:buFont typeface="Arial"/>
+              <a:buChar char="•"/>
+              <a:defRPr sz="1400" kern="1200" cap="none">
+                <a:solidFill>
+                  <a:schemeClr val="tx1">
+                    <a:lumMod val="85000"/>
+                    <a:lumOff val="15000"/>
+                  </a:schemeClr>
+                </a:solidFill>
+                <a:effectLst/>
+                <a:latin typeface="+mn-lt"/>
+                <a:ea typeface="+mn-ea"/>
+                <a:cs typeface="+mn-cs"/>
+              </a:defRPr>
+            </a:lvl5pPr>
+            <a:lvl6pPr marL="2514600" indent="-228600" algn="l" defTabSz="457200" rtl="0" eaLnBrk="1" latinLnBrk="0" hangingPunct="1">
+              <a:spcBef>
+                <a:spcPct val="20000"/>
+              </a:spcBef>
+              <a:spcAft>
+                <a:spcPts val="600"/>
+              </a:spcAft>
+              <a:buClr>
+                <a:schemeClr val="accent1"/>
+              </a:buClr>
+              <a:buSzPct val="115000"/>
+              <a:buFont typeface="Arial"/>
+              <a:buChar char="•"/>
+              <a:defRPr sz="1400" kern="1200" cap="none">
+                <a:solidFill>
+                  <a:schemeClr val="tx1">
+                    <a:lumMod val="85000"/>
+                    <a:lumOff val="15000"/>
+                  </a:schemeClr>
+                </a:solidFill>
+                <a:effectLst/>
+                <a:latin typeface="+mn-lt"/>
+                <a:ea typeface="+mn-ea"/>
+                <a:cs typeface="+mn-cs"/>
+              </a:defRPr>
+            </a:lvl6pPr>
+            <a:lvl7pPr marL="2971800" indent="-228600" algn="l" defTabSz="457200" rtl="0" eaLnBrk="1" latinLnBrk="0" hangingPunct="1">
+              <a:spcBef>
+                <a:spcPct val="20000"/>
+              </a:spcBef>
+              <a:spcAft>
+                <a:spcPts val="600"/>
+              </a:spcAft>
+              <a:buClr>
+                <a:schemeClr val="accent1"/>
+              </a:buClr>
+              <a:buSzPct val="115000"/>
+              <a:buFont typeface="Arial"/>
+              <a:buChar char="•"/>
+              <a:defRPr sz="1400" kern="1200" cap="none">
+                <a:solidFill>
+                  <a:schemeClr val="tx1">
+                    <a:lumMod val="85000"/>
+                    <a:lumOff val="15000"/>
+                  </a:schemeClr>
+                </a:solidFill>
+                <a:effectLst/>
+                <a:latin typeface="+mn-lt"/>
+                <a:ea typeface="+mn-ea"/>
+                <a:cs typeface="+mn-cs"/>
+              </a:defRPr>
+            </a:lvl7pPr>
+            <a:lvl8pPr marL="3429000" indent="-228600" algn="l" defTabSz="457200" rtl="0" eaLnBrk="1" latinLnBrk="0" hangingPunct="1">
+              <a:spcBef>
+                <a:spcPct val="20000"/>
+              </a:spcBef>
+              <a:spcAft>
+                <a:spcPts val="600"/>
+              </a:spcAft>
+              <a:buClr>
+                <a:schemeClr val="accent1"/>
+              </a:buClr>
+              <a:buSzPct val="115000"/>
+              <a:buFont typeface="Arial"/>
+              <a:buChar char="•"/>
+              <a:defRPr sz="1400" kern="1200" cap="none">
+                <a:solidFill>
+                  <a:schemeClr val="tx1">
+                    <a:lumMod val="85000"/>
+                    <a:lumOff val="15000"/>
+                  </a:schemeClr>
+                </a:solidFill>
+                <a:effectLst/>
+                <a:latin typeface="+mn-lt"/>
+                <a:ea typeface="+mn-ea"/>
+                <a:cs typeface="+mn-cs"/>
+              </a:defRPr>
+            </a:lvl8pPr>
+            <a:lvl9pPr marL="3886200" indent="-228600" algn="l" defTabSz="457200" rtl="0" eaLnBrk="1" latinLnBrk="0" hangingPunct="1">
+              <a:spcBef>
+                <a:spcPct val="20000"/>
+              </a:spcBef>
+              <a:spcAft>
+                <a:spcPts val="600"/>
+              </a:spcAft>
+              <a:buClr>
+                <a:schemeClr val="accent1"/>
+              </a:buClr>
+              <a:buSzPct val="115000"/>
+              <a:buFont typeface="Arial"/>
+              <a:buChar char="•"/>
+              <a:defRPr sz="1400" kern="1200" cap="none">
+                <a:solidFill>
+                  <a:schemeClr val="tx1">
+                    <a:lumMod val="85000"/>
+                    <a:lumOff val="15000"/>
+                  </a:schemeClr>
+                </a:solidFill>
+                <a:effectLst/>
+                <a:latin typeface="+mn-lt"/>
+                <a:ea typeface="+mn-ea"/>
+                <a:cs typeface="+mn-cs"/>
+              </a:defRPr>
+            </a:lvl9pPr>
+          </a:lstStyle>
+          <a:p>
+            <a:r>
+              <a:rPr lang="en-US" sz="4000" dirty="0" smtClean="0"/>
+              <a:t>On the window that appears, select the repository you wish to clone by highlighting it and then push the “Clone” button (shown right)</a:t>
+            </a:r>
+          </a:p>
+          <a:p>
+            <a:pPr lvl="1"/>
+            <a:r>
+              <a:rPr lang="en-US" sz="3500" dirty="0" smtClean="0"/>
+              <a:t>This will create an identical copy of all files within the repository</a:t>
+            </a:r>
+          </a:p>
+          <a:p>
+            <a:pPr lvl="1"/>
+            <a:r>
+              <a:rPr lang="en-US" sz="3500" dirty="0" smtClean="0"/>
+              <a:t>Repository folders will be stored </a:t>
+            </a:r>
+            <a:r>
+              <a:rPr lang="en-US" sz="3500" dirty="0"/>
+              <a:t>under the path “C:\</a:t>
+            </a:r>
+            <a:r>
+              <a:rPr lang="en-US" sz="3500" dirty="0" smtClean="0"/>
+              <a:t>Users</a:t>
+            </a:r>
+            <a:r>
+              <a:rPr lang="en-US" sz="3500" i="1" dirty="0" smtClean="0"/>
+              <a:t>\</a:t>
+            </a:r>
+            <a:r>
+              <a:rPr lang="en-US" sz="3500" b="1" u="sng" dirty="0" err="1" smtClean="0"/>
+              <a:t>YourAccountName</a:t>
+            </a:r>
+            <a:r>
+              <a:rPr lang="en-US" sz="3500" i="1" dirty="0" smtClean="0"/>
+              <a:t>\</a:t>
+            </a:r>
+            <a:r>
+              <a:rPr lang="en-US" sz="3500" dirty="0" smtClean="0"/>
+              <a:t>Documents\GitHub”</a:t>
+            </a:r>
+            <a:endParaRPr lang="en-US" sz="3500" dirty="0" smtClean="0"/>
+          </a:p>
+          <a:p>
+            <a:pPr lvl="1"/>
+            <a:endParaRPr lang="en-US" dirty="0" smtClean="0"/>
+          </a:p>
+          <a:p>
+            <a:pPr lvl="1"/>
+            <a:endParaRPr lang="en-US" dirty="0" smtClean="0"/>
+          </a:p>
+          <a:p>
+            <a:endParaRPr lang="en-US" dirty="0" smtClean="0"/>
+          </a:p>
+          <a:p>
+            <a:pPr lvl="1"/>
+            <a:endParaRPr lang="en-US" dirty="0"/>
+          </a:p>
+        </p:txBody>
+      </p:sp>
+      <p:sp>
+        <p:nvSpPr>
+          <p:cNvPr id="11" name="Content Placeholder 2"/>
+          <p:cNvSpPr txBox="1">
+            <a:spLocks/>
+          </p:cNvSpPr>
+          <p:nvPr/>
+        </p:nvSpPr>
+        <p:spPr>
+          <a:xfrm rot="10800000" flipH="1" flipV="1">
+            <a:off x="6470643" y="4709702"/>
+            <a:ext cx="457200" cy="510574"/>
+          </a:xfrm>
+          <a:prstGeom prst="rect">
+            <a:avLst/>
+          </a:prstGeom>
+        </p:spPr>
+        <p:txBody>
+          <a:bodyPr vert="horz" lIns="91440" tIns="45720" rIns="91440" bIns="45720" rtlCol="0" anchor="t">
+            <a:normAutofit/>
+          </a:bodyPr>
+          <a:lstStyle>
+            <a:lvl1pPr marL="285750" indent="-285750" algn="l" defTabSz="457200" rtl="0" eaLnBrk="1" latinLnBrk="0" hangingPunct="1">
+              <a:spcBef>
+                <a:spcPct val="20000"/>
+              </a:spcBef>
+              <a:spcAft>
+                <a:spcPts val="600"/>
+              </a:spcAft>
+              <a:buClr>
+                <a:schemeClr val="accent1"/>
+              </a:buClr>
+              <a:buSzPct val="115000"/>
+              <a:buFont typeface="Arial"/>
+              <a:buChar char="•"/>
+              <a:defRPr sz="2400" kern="1200" cap="none">
+                <a:solidFill>
+                  <a:schemeClr val="tx1">
+                    <a:lumMod val="85000"/>
+                    <a:lumOff val="15000"/>
+                  </a:schemeClr>
+                </a:solidFill>
+                <a:effectLst/>
+                <a:latin typeface="+mn-lt"/>
+                <a:ea typeface="+mn-ea"/>
+                <a:cs typeface="+mn-cs"/>
+              </a:defRPr>
+            </a:lvl1pPr>
+            <a:lvl2pPr marL="742950" indent="-285750" algn="l" defTabSz="457200" rtl="0" eaLnBrk="1" latinLnBrk="0" hangingPunct="1">
+              <a:spcBef>
+                <a:spcPct val="20000"/>
+              </a:spcBef>
+              <a:spcAft>
+                <a:spcPts val="600"/>
+              </a:spcAft>
+              <a:buClr>
+                <a:schemeClr val="accent1"/>
+              </a:buClr>
+              <a:buSzPct val="115000"/>
+              <a:buFont typeface="Arial"/>
+              <a:buChar char="•"/>
+              <a:defRPr sz="2000" kern="1200" cap="none">
+                <a:solidFill>
+                  <a:schemeClr val="tx1">
+                    <a:lumMod val="85000"/>
+                    <a:lumOff val="15000"/>
+                  </a:schemeClr>
+                </a:solidFill>
+                <a:effectLst/>
+                <a:latin typeface="+mn-lt"/>
+                <a:ea typeface="+mn-ea"/>
+                <a:cs typeface="+mn-cs"/>
+              </a:defRPr>
+            </a:lvl2pPr>
+            <a:lvl3pPr marL="1200150" indent="-285750" algn="l" defTabSz="457200" rtl="0" eaLnBrk="1" latinLnBrk="0" hangingPunct="1">
+              <a:spcBef>
+                <a:spcPct val="20000"/>
+              </a:spcBef>
+              <a:spcAft>
+                <a:spcPts val="600"/>
+              </a:spcAft>
+              <a:buClr>
+                <a:schemeClr val="accent1"/>
+              </a:buClr>
+              <a:buSzPct val="115000"/>
+              <a:buFont typeface="Arial"/>
+              <a:buChar char="•"/>
+              <a:defRPr sz="1800" kern="1200" cap="none">
+                <a:solidFill>
+                  <a:schemeClr val="tx1">
+                    <a:lumMod val="85000"/>
+                    <a:lumOff val="15000"/>
+                  </a:schemeClr>
+                </a:solidFill>
+                <a:effectLst/>
+                <a:latin typeface="+mn-lt"/>
+                <a:ea typeface="+mn-ea"/>
+                <a:cs typeface="+mn-cs"/>
+              </a:defRPr>
+            </a:lvl3pPr>
+            <a:lvl4pPr marL="1543050" indent="-171450" algn="l" defTabSz="457200" rtl="0" eaLnBrk="1" latinLnBrk="0" hangingPunct="1">
+              <a:spcBef>
+                <a:spcPct val="20000"/>
+              </a:spcBef>
+              <a:spcAft>
+                <a:spcPts val="600"/>
+              </a:spcAft>
+              <a:buClr>
+                <a:schemeClr val="accent1"/>
+              </a:buClr>
+              <a:buSzPct val="115000"/>
+              <a:buFont typeface="Arial"/>
+              <a:buChar char="•"/>
+              <a:defRPr sz="1600" kern="1200" cap="none">
+                <a:solidFill>
+                  <a:schemeClr val="tx1">
+                    <a:lumMod val="85000"/>
+                    <a:lumOff val="15000"/>
+                  </a:schemeClr>
+                </a:solidFill>
+                <a:effectLst/>
+                <a:latin typeface="+mn-lt"/>
+                <a:ea typeface="+mn-ea"/>
+                <a:cs typeface="+mn-cs"/>
+              </a:defRPr>
+            </a:lvl4pPr>
+            <a:lvl5pPr marL="2000250" indent="-171450" algn="l" defTabSz="457200" rtl="0" eaLnBrk="1" latinLnBrk="0" hangingPunct="1">
+              <a:spcBef>
+                <a:spcPct val="20000"/>
+              </a:spcBef>
+              <a:spcAft>
+                <a:spcPts val="600"/>
+              </a:spcAft>
+              <a:buClr>
+                <a:schemeClr val="accent1"/>
+              </a:buClr>
+              <a:buSzPct val="115000"/>
+              <a:buFont typeface="Arial"/>
+              <a:buChar char="•"/>
+              <a:defRPr sz="1400" kern="1200" cap="none">
+                <a:solidFill>
+                  <a:schemeClr val="tx1">
+                    <a:lumMod val="85000"/>
+                    <a:lumOff val="15000"/>
+                  </a:schemeClr>
+                </a:solidFill>
+                <a:effectLst/>
+                <a:latin typeface="+mn-lt"/>
+                <a:ea typeface="+mn-ea"/>
+                <a:cs typeface="+mn-cs"/>
+              </a:defRPr>
+            </a:lvl5pPr>
+            <a:lvl6pPr marL="2514600" indent="-228600" algn="l" defTabSz="457200" rtl="0" eaLnBrk="1" latinLnBrk="0" hangingPunct="1">
+              <a:spcBef>
+                <a:spcPct val="20000"/>
+              </a:spcBef>
+              <a:spcAft>
+                <a:spcPts val="600"/>
+              </a:spcAft>
+              <a:buClr>
+                <a:schemeClr val="accent1"/>
+              </a:buClr>
+              <a:buSzPct val="115000"/>
+              <a:buFont typeface="Arial"/>
+              <a:buChar char="•"/>
+              <a:defRPr sz="1400" kern="1200" cap="none">
+                <a:solidFill>
+                  <a:schemeClr val="tx1">
+                    <a:lumMod val="85000"/>
+                    <a:lumOff val="15000"/>
+                  </a:schemeClr>
+                </a:solidFill>
+                <a:effectLst/>
+                <a:latin typeface="+mn-lt"/>
+                <a:ea typeface="+mn-ea"/>
+                <a:cs typeface="+mn-cs"/>
+              </a:defRPr>
+            </a:lvl6pPr>
+            <a:lvl7pPr marL="2971800" indent="-228600" algn="l" defTabSz="457200" rtl="0" eaLnBrk="1" latinLnBrk="0" hangingPunct="1">
+              <a:spcBef>
+                <a:spcPct val="20000"/>
+              </a:spcBef>
+              <a:spcAft>
+                <a:spcPts val="600"/>
+              </a:spcAft>
+              <a:buClr>
+                <a:schemeClr val="accent1"/>
+              </a:buClr>
+              <a:buSzPct val="115000"/>
+              <a:buFont typeface="Arial"/>
+              <a:buChar char="•"/>
+              <a:defRPr sz="1400" kern="1200" cap="none">
+                <a:solidFill>
+                  <a:schemeClr val="tx1">
+                    <a:lumMod val="85000"/>
+                    <a:lumOff val="15000"/>
+                  </a:schemeClr>
+                </a:solidFill>
+                <a:effectLst/>
+                <a:latin typeface="+mn-lt"/>
+                <a:ea typeface="+mn-ea"/>
+                <a:cs typeface="+mn-cs"/>
+              </a:defRPr>
+            </a:lvl7pPr>
+            <a:lvl8pPr marL="3429000" indent="-228600" algn="l" defTabSz="457200" rtl="0" eaLnBrk="1" latinLnBrk="0" hangingPunct="1">
+              <a:spcBef>
+                <a:spcPct val="20000"/>
+              </a:spcBef>
+              <a:spcAft>
+                <a:spcPts val="600"/>
+              </a:spcAft>
+              <a:buClr>
+                <a:schemeClr val="accent1"/>
+              </a:buClr>
+              <a:buSzPct val="115000"/>
+              <a:buFont typeface="Arial"/>
+              <a:buChar char="•"/>
+              <a:defRPr sz="1400" kern="1200" cap="none">
+                <a:solidFill>
+                  <a:schemeClr val="tx1">
+                    <a:lumMod val="85000"/>
+                    <a:lumOff val="15000"/>
+                  </a:schemeClr>
+                </a:solidFill>
+                <a:effectLst/>
+                <a:latin typeface="+mn-lt"/>
+                <a:ea typeface="+mn-ea"/>
+                <a:cs typeface="+mn-cs"/>
+              </a:defRPr>
+            </a:lvl8pPr>
+            <a:lvl9pPr marL="3886200" indent="-228600" algn="l" defTabSz="457200" rtl="0" eaLnBrk="1" latinLnBrk="0" hangingPunct="1">
+              <a:spcBef>
+                <a:spcPct val="20000"/>
+              </a:spcBef>
+              <a:spcAft>
+                <a:spcPts val="600"/>
+              </a:spcAft>
+              <a:buClr>
+                <a:schemeClr val="accent1"/>
+              </a:buClr>
+              <a:buSzPct val="115000"/>
+              <a:buFont typeface="Arial"/>
+              <a:buChar char="•"/>
+              <a:defRPr sz="1400" kern="1200" cap="none">
+                <a:solidFill>
+                  <a:schemeClr val="tx1">
+                    <a:lumMod val="85000"/>
+                    <a:lumOff val="15000"/>
+                  </a:schemeClr>
+                </a:solidFill>
+                <a:effectLst/>
+                <a:latin typeface="+mn-lt"/>
+                <a:ea typeface="+mn-ea"/>
+                <a:cs typeface="+mn-cs"/>
+              </a:defRPr>
+            </a:lvl9pPr>
+          </a:lstStyle>
+          <a:p>
+            <a:pPr marL="0" indent="0">
+              <a:buNone/>
+            </a:pPr>
+            <a:r>
+              <a:rPr lang="en-US" dirty="0" smtClean="0">
+                <a:sym typeface="Wingdings" panose="05000000000000000000" pitchFamily="2" charset="2"/>
+              </a:rPr>
+              <a:t></a:t>
+            </a:r>
+            <a:endParaRPr lang="en-US" dirty="0"/>
+          </a:p>
+        </p:txBody>
+      </p:sp>
+      <p:sp>
+        <p:nvSpPr>
+          <p:cNvPr id="12" name="Content Placeholder 2"/>
+          <p:cNvSpPr txBox="1">
+            <a:spLocks/>
+          </p:cNvSpPr>
+          <p:nvPr/>
+        </p:nvSpPr>
+        <p:spPr>
+          <a:xfrm rot="13818708" flipH="1" flipV="1">
+            <a:off x="2753681" y="3019623"/>
+            <a:ext cx="457200" cy="510574"/>
+          </a:xfrm>
+          <a:prstGeom prst="rect">
+            <a:avLst/>
+          </a:prstGeom>
+        </p:spPr>
+        <p:txBody>
+          <a:bodyPr vert="horz" lIns="91440" tIns="45720" rIns="91440" bIns="45720" rtlCol="0" anchor="t">
+            <a:normAutofit/>
+          </a:bodyPr>
+          <a:lstStyle>
+            <a:lvl1pPr marL="285750" indent="-285750" algn="l" defTabSz="457200" rtl="0" eaLnBrk="1" latinLnBrk="0" hangingPunct="1">
+              <a:spcBef>
+                <a:spcPct val="20000"/>
+              </a:spcBef>
+              <a:spcAft>
+                <a:spcPts val="600"/>
+              </a:spcAft>
+              <a:buClr>
+                <a:schemeClr val="accent1"/>
+              </a:buClr>
+              <a:buSzPct val="115000"/>
+              <a:buFont typeface="Arial"/>
+              <a:buChar char="•"/>
+              <a:defRPr sz="2400" kern="1200" cap="none">
+                <a:solidFill>
+                  <a:schemeClr val="tx1">
+                    <a:lumMod val="85000"/>
+                    <a:lumOff val="15000"/>
+                  </a:schemeClr>
+                </a:solidFill>
+                <a:effectLst/>
+                <a:latin typeface="+mn-lt"/>
+                <a:ea typeface="+mn-ea"/>
+                <a:cs typeface="+mn-cs"/>
+              </a:defRPr>
+            </a:lvl1pPr>
+            <a:lvl2pPr marL="742950" indent="-285750" algn="l" defTabSz="457200" rtl="0" eaLnBrk="1" latinLnBrk="0" hangingPunct="1">
+              <a:spcBef>
+                <a:spcPct val="20000"/>
+              </a:spcBef>
+              <a:spcAft>
+                <a:spcPts val="600"/>
+              </a:spcAft>
+              <a:buClr>
+                <a:schemeClr val="accent1"/>
+              </a:buClr>
+              <a:buSzPct val="115000"/>
+              <a:buFont typeface="Arial"/>
+              <a:buChar char="•"/>
+              <a:defRPr sz="2000" kern="1200" cap="none">
+                <a:solidFill>
+                  <a:schemeClr val="tx1">
+                    <a:lumMod val="85000"/>
+                    <a:lumOff val="15000"/>
+                  </a:schemeClr>
+                </a:solidFill>
+                <a:effectLst/>
+                <a:latin typeface="+mn-lt"/>
+                <a:ea typeface="+mn-ea"/>
+                <a:cs typeface="+mn-cs"/>
+              </a:defRPr>
+            </a:lvl2pPr>
+            <a:lvl3pPr marL="1200150" indent="-285750" algn="l" defTabSz="457200" rtl="0" eaLnBrk="1" latinLnBrk="0" hangingPunct="1">
+              <a:spcBef>
+                <a:spcPct val="20000"/>
+              </a:spcBef>
+              <a:spcAft>
+                <a:spcPts val="600"/>
+              </a:spcAft>
+              <a:buClr>
+                <a:schemeClr val="accent1"/>
+              </a:buClr>
+              <a:buSzPct val="115000"/>
+              <a:buFont typeface="Arial"/>
+              <a:buChar char="•"/>
+              <a:defRPr sz="1800" kern="1200" cap="none">
+                <a:solidFill>
+                  <a:schemeClr val="tx1">
+                    <a:lumMod val="85000"/>
+                    <a:lumOff val="15000"/>
+                  </a:schemeClr>
+                </a:solidFill>
+                <a:effectLst/>
+                <a:latin typeface="+mn-lt"/>
+                <a:ea typeface="+mn-ea"/>
+                <a:cs typeface="+mn-cs"/>
+              </a:defRPr>
+            </a:lvl3pPr>
+            <a:lvl4pPr marL="1543050" indent="-171450" algn="l" defTabSz="457200" rtl="0" eaLnBrk="1" latinLnBrk="0" hangingPunct="1">
+              <a:spcBef>
+                <a:spcPct val="20000"/>
+              </a:spcBef>
+              <a:spcAft>
+                <a:spcPts val="600"/>
+              </a:spcAft>
+              <a:buClr>
+                <a:schemeClr val="accent1"/>
+              </a:buClr>
+              <a:buSzPct val="115000"/>
+              <a:buFont typeface="Arial"/>
+              <a:buChar char="•"/>
+              <a:defRPr sz="1600" kern="1200" cap="none">
+                <a:solidFill>
+                  <a:schemeClr val="tx1">
+                    <a:lumMod val="85000"/>
+                    <a:lumOff val="15000"/>
+                  </a:schemeClr>
+                </a:solidFill>
+                <a:effectLst/>
+                <a:latin typeface="+mn-lt"/>
+                <a:ea typeface="+mn-ea"/>
+                <a:cs typeface="+mn-cs"/>
+              </a:defRPr>
+            </a:lvl4pPr>
+            <a:lvl5pPr marL="2000250" indent="-171450" algn="l" defTabSz="457200" rtl="0" eaLnBrk="1" latinLnBrk="0" hangingPunct="1">
+              <a:spcBef>
+                <a:spcPct val="20000"/>
+              </a:spcBef>
+              <a:spcAft>
+                <a:spcPts val="600"/>
+              </a:spcAft>
+              <a:buClr>
+                <a:schemeClr val="accent1"/>
+              </a:buClr>
+              <a:buSzPct val="115000"/>
+              <a:buFont typeface="Arial"/>
+              <a:buChar char="•"/>
+              <a:defRPr sz="1400" kern="1200" cap="none">
+                <a:solidFill>
+                  <a:schemeClr val="tx1">
+                    <a:lumMod val="85000"/>
+                    <a:lumOff val="15000"/>
+                  </a:schemeClr>
+                </a:solidFill>
+                <a:effectLst/>
+                <a:latin typeface="+mn-lt"/>
+                <a:ea typeface="+mn-ea"/>
+                <a:cs typeface="+mn-cs"/>
+              </a:defRPr>
+            </a:lvl5pPr>
+            <a:lvl6pPr marL="2514600" indent="-228600" algn="l" defTabSz="457200" rtl="0" eaLnBrk="1" latinLnBrk="0" hangingPunct="1">
+              <a:spcBef>
+                <a:spcPct val="20000"/>
+              </a:spcBef>
+              <a:spcAft>
+                <a:spcPts val="600"/>
+              </a:spcAft>
+              <a:buClr>
+                <a:schemeClr val="accent1"/>
+              </a:buClr>
+              <a:buSzPct val="115000"/>
+              <a:buFont typeface="Arial"/>
+              <a:buChar char="•"/>
+              <a:defRPr sz="1400" kern="1200" cap="none">
+                <a:solidFill>
+                  <a:schemeClr val="tx1">
+                    <a:lumMod val="85000"/>
+                    <a:lumOff val="15000"/>
+                  </a:schemeClr>
+                </a:solidFill>
+                <a:effectLst/>
+                <a:latin typeface="+mn-lt"/>
+                <a:ea typeface="+mn-ea"/>
+                <a:cs typeface="+mn-cs"/>
+              </a:defRPr>
+            </a:lvl6pPr>
+            <a:lvl7pPr marL="2971800" indent="-228600" algn="l" defTabSz="457200" rtl="0" eaLnBrk="1" latinLnBrk="0" hangingPunct="1">
+              <a:spcBef>
+                <a:spcPct val="20000"/>
+              </a:spcBef>
+              <a:spcAft>
+                <a:spcPts val="600"/>
+              </a:spcAft>
+              <a:buClr>
+                <a:schemeClr val="accent1"/>
+              </a:buClr>
+              <a:buSzPct val="115000"/>
+              <a:buFont typeface="Arial"/>
+              <a:buChar char="•"/>
+              <a:defRPr sz="1400" kern="1200" cap="none">
+                <a:solidFill>
+                  <a:schemeClr val="tx1">
+                    <a:lumMod val="85000"/>
+                    <a:lumOff val="15000"/>
+                  </a:schemeClr>
+                </a:solidFill>
+                <a:effectLst/>
+                <a:latin typeface="+mn-lt"/>
+                <a:ea typeface="+mn-ea"/>
+                <a:cs typeface="+mn-cs"/>
+              </a:defRPr>
+            </a:lvl7pPr>
+            <a:lvl8pPr marL="3429000" indent="-228600" algn="l" defTabSz="457200" rtl="0" eaLnBrk="1" latinLnBrk="0" hangingPunct="1">
+              <a:spcBef>
+                <a:spcPct val="20000"/>
+              </a:spcBef>
+              <a:spcAft>
+                <a:spcPts val="600"/>
+              </a:spcAft>
+              <a:buClr>
+                <a:schemeClr val="accent1"/>
+              </a:buClr>
+              <a:buSzPct val="115000"/>
+              <a:buFont typeface="Arial"/>
+              <a:buChar char="•"/>
+              <a:defRPr sz="1400" kern="1200" cap="none">
+                <a:solidFill>
+                  <a:schemeClr val="tx1">
+                    <a:lumMod val="85000"/>
+                    <a:lumOff val="15000"/>
+                  </a:schemeClr>
+                </a:solidFill>
+                <a:effectLst/>
+                <a:latin typeface="+mn-lt"/>
+                <a:ea typeface="+mn-ea"/>
+                <a:cs typeface="+mn-cs"/>
+              </a:defRPr>
+            </a:lvl8pPr>
+            <a:lvl9pPr marL="3886200" indent="-228600" algn="l" defTabSz="457200" rtl="0" eaLnBrk="1" latinLnBrk="0" hangingPunct="1">
+              <a:spcBef>
+                <a:spcPct val="20000"/>
+              </a:spcBef>
+              <a:spcAft>
+                <a:spcPts val="600"/>
+              </a:spcAft>
+              <a:buClr>
+                <a:schemeClr val="accent1"/>
+              </a:buClr>
+              <a:buSzPct val="115000"/>
+              <a:buFont typeface="Arial"/>
+              <a:buChar char="•"/>
+              <a:defRPr sz="1400" kern="1200" cap="none">
+                <a:solidFill>
+                  <a:schemeClr val="tx1">
+                    <a:lumMod val="85000"/>
+                    <a:lumOff val="15000"/>
+                  </a:schemeClr>
+                </a:solidFill>
+                <a:effectLst/>
+                <a:latin typeface="+mn-lt"/>
+                <a:ea typeface="+mn-ea"/>
+                <a:cs typeface="+mn-cs"/>
+              </a:defRPr>
+            </a:lvl9pPr>
+          </a:lstStyle>
+          <a:p>
+            <a:pPr marL="0" indent="0">
+              <a:buNone/>
+            </a:pPr>
+            <a:r>
+              <a:rPr lang="en-US" dirty="0" smtClean="0">
+                <a:sym typeface="Wingdings" panose="05000000000000000000" pitchFamily="2" charset="2"/>
+              </a:rPr>
+              <a:t></a:t>
+            </a:r>
+            <a:endParaRPr lang="en-US" dirty="0"/>
+          </a:p>
+        </p:txBody>
+      </p:sp>
+      <p:pic>
+        <p:nvPicPr>
+          <p:cNvPr id="14" name="Picture 13"/>
+          <p:cNvPicPr>
+            <a:picLocks noChangeAspect="1"/>
+          </p:cNvPicPr>
+          <p:nvPr/>
+        </p:nvPicPr>
         <p:blipFill>
-          <a:blip r:embed="rId2">
+          <a:blip r:embed="rId3">
             <a:extLst>
               <a:ext uri="{28A0092B-C50C-407E-A947-70E740481C1C}">
                 <a14:useLocalDpi xmlns:a14="http://schemas.microsoft.com/office/drawing/2010/main" val="0"/>
@@ -13402,294 +14327,22 @@
         </p:blipFill>
         <p:spPr>
           <a:xfrm>
-            <a:off x="1295402" y="3848417"/>
-            <a:ext cx="5027523" cy="2134680"/>
-          </a:xfrm>
-        </p:spPr>
-      </p:pic>
-      <p:sp>
-        <p:nvSpPr>
-          <p:cNvPr id="6" name="Content Placeholder 2"/>
-          <p:cNvSpPr txBox="1">
-            <a:spLocks/>
-          </p:cNvSpPr>
-          <p:nvPr/>
-        </p:nvSpPr>
-        <p:spPr>
-          <a:xfrm>
-            <a:off x="6322925" y="2560320"/>
-            <a:ext cx="4718304" cy="3310128"/>
+            <a:off x="7076222" y="3015899"/>
+            <a:ext cx="4335880" cy="3203646"/>
           </a:xfrm>
           <a:prstGeom prst="rect">
             <a:avLst/>
           </a:prstGeom>
+          <a:ln>
+            <a:solidFill>
+              <a:schemeClr val="tx1">
+                <a:lumMod val="50000"/>
+                <a:lumOff val="50000"/>
+              </a:schemeClr>
+            </a:solidFill>
+          </a:ln>
         </p:spPr>
-        <p:txBody>
-          <a:bodyPr vert="horz" lIns="91440" tIns="45720" rIns="91440" bIns="45720" rtlCol="0" anchor="t">
-            <a:normAutofit/>
-          </a:bodyPr>
-          <a:lstStyle>
-            <a:lvl1pPr marL="285750" indent="-285750" algn="l" defTabSz="457200" rtl="0" eaLnBrk="1" latinLnBrk="0" hangingPunct="1">
-              <a:spcBef>
-                <a:spcPct val="20000"/>
-              </a:spcBef>
-              <a:spcAft>
-                <a:spcPts val="600"/>
-              </a:spcAft>
-              <a:buClr>
-                <a:schemeClr val="accent1"/>
-              </a:buClr>
-              <a:buSzPct val="115000"/>
-              <a:buFont typeface="Arial"/>
-              <a:buChar char="•"/>
-              <a:defRPr sz="2400" kern="1200" cap="none">
-                <a:solidFill>
-                  <a:schemeClr val="tx1">
-                    <a:lumMod val="85000"/>
-                    <a:lumOff val="15000"/>
-                  </a:schemeClr>
-                </a:solidFill>
-                <a:effectLst/>
-                <a:latin typeface="+mn-lt"/>
-                <a:ea typeface="+mn-ea"/>
-                <a:cs typeface="+mn-cs"/>
-              </a:defRPr>
-            </a:lvl1pPr>
-            <a:lvl2pPr marL="742950" indent="-285750" algn="l" defTabSz="457200" rtl="0" eaLnBrk="1" latinLnBrk="0" hangingPunct="1">
-              <a:spcBef>
-                <a:spcPct val="20000"/>
-              </a:spcBef>
-              <a:spcAft>
-                <a:spcPts val="600"/>
-              </a:spcAft>
-              <a:buClr>
-                <a:schemeClr val="accent1"/>
-              </a:buClr>
-              <a:buSzPct val="115000"/>
-              <a:buFont typeface="Arial"/>
-              <a:buChar char="•"/>
-              <a:defRPr sz="2000" kern="1200" cap="none">
-                <a:solidFill>
-                  <a:schemeClr val="tx1">
-                    <a:lumMod val="85000"/>
-                    <a:lumOff val="15000"/>
-                  </a:schemeClr>
-                </a:solidFill>
-                <a:effectLst/>
-                <a:latin typeface="+mn-lt"/>
-                <a:ea typeface="+mn-ea"/>
-                <a:cs typeface="+mn-cs"/>
-              </a:defRPr>
-            </a:lvl2pPr>
-            <a:lvl3pPr marL="1200150" indent="-285750" algn="l" defTabSz="457200" rtl="0" eaLnBrk="1" latinLnBrk="0" hangingPunct="1">
-              <a:spcBef>
-                <a:spcPct val="20000"/>
-              </a:spcBef>
-              <a:spcAft>
-                <a:spcPts val="600"/>
-              </a:spcAft>
-              <a:buClr>
-                <a:schemeClr val="accent1"/>
-              </a:buClr>
-              <a:buSzPct val="115000"/>
-              <a:buFont typeface="Arial"/>
-              <a:buChar char="•"/>
-              <a:defRPr sz="1800" kern="1200" cap="none">
-                <a:solidFill>
-                  <a:schemeClr val="tx1">
-                    <a:lumMod val="85000"/>
-                    <a:lumOff val="15000"/>
-                  </a:schemeClr>
-                </a:solidFill>
-                <a:effectLst/>
-                <a:latin typeface="+mn-lt"/>
-                <a:ea typeface="+mn-ea"/>
-                <a:cs typeface="+mn-cs"/>
-              </a:defRPr>
-            </a:lvl3pPr>
-            <a:lvl4pPr marL="1543050" indent="-171450" algn="l" defTabSz="457200" rtl="0" eaLnBrk="1" latinLnBrk="0" hangingPunct="1">
-              <a:spcBef>
-                <a:spcPct val="20000"/>
-              </a:spcBef>
-              <a:spcAft>
-                <a:spcPts val="600"/>
-              </a:spcAft>
-              <a:buClr>
-                <a:schemeClr val="accent1"/>
-              </a:buClr>
-              <a:buSzPct val="115000"/>
-              <a:buFont typeface="Arial"/>
-              <a:buChar char="•"/>
-              <a:defRPr sz="1600" kern="1200" cap="none">
-                <a:solidFill>
-                  <a:schemeClr val="tx1">
-                    <a:lumMod val="85000"/>
-                    <a:lumOff val="15000"/>
-                  </a:schemeClr>
-                </a:solidFill>
-                <a:effectLst/>
-                <a:latin typeface="+mn-lt"/>
-                <a:ea typeface="+mn-ea"/>
-                <a:cs typeface="+mn-cs"/>
-              </a:defRPr>
-            </a:lvl4pPr>
-            <a:lvl5pPr marL="2000250" indent="-171450" algn="l" defTabSz="457200" rtl="0" eaLnBrk="1" latinLnBrk="0" hangingPunct="1">
-              <a:spcBef>
-                <a:spcPct val="20000"/>
-              </a:spcBef>
-              <a:spcAft>
-                <a:spcPts val="600"/>
-              </a:spcAft>
-              <a:buClr>
-                <a:schemeClr val="accent1"/>
-              </a:buClr>
-              <a:buSzPct val="115000"/>
-              <a:buFont typeface="Arial"/>
-              <a:buChar char="•"/>
-              <a:defRPr sz="1400" kern="1200" cap="none">
-                <a:solidFill>
-                  <a:schemeClr val="tx1">
-                    <a:lumMod val="85000"/>
-                    <a:lumOff val="15000"/>
-                  </a:schemeClr>
-                </a:solidFill>
-                <a:effectLst/>
-                <a:latin typeface="+mn-lt"/>
-                <a:ea typeface="+mn-ea"/>
-                <a:cs typeface="+mn-cs"/>
-              </a:defRPr>
-            </a:lvl5pPr>
-            <a:lvl6pPr marL="2514600" indent="-228600" algn="l" defTabSz="457200" rtl="0" eaLnBrk="1" latinLnBrk="0" hangingPunct="1">
-              <a:spcBef>
-                <a:spcPct val="20000"/>
-              </a:spcBef>
-              <a:spcAft>
-                <a:spcPts val="600"/>
-              </a:spcAft>
-              <a:buClr>
-                <a:schemeClr val="accent1"/>
-              </a:buClr>
-              <a:buSzPct val="115000"/>
-              <a:buFont typeface="Arial"/>
-              <a:buChar char="•"/>
-              <a:defRPr sz="1400" kern="1200" cap="none">
-                <a:solidFill>
-                  <a:schemeClr val="tx1">
-                    <a:lumMod val="85000"/>
-                    <a:lumOff val="15000"/>
-                  </a:schemeClr>
-                </a:solidFill>
-                <a:effectLst/>
-                <a:latin typeface="+mn-lt"/>
-                <a:ea typeface="+mn-ea"/>
-                <a:cs typeface="+mn-cs"/>
-              </a:defRPr>
-            </a:lvl6pPr>
-            <a:lvl7pPr marL="2971800" indent="-228600" algn="l" defTabSz="457200" rtl="0" eaLnBrk="1" latinLnBrk="0" hangingPunct="1">
-              <a:spcBef>
-                <a:spcPct val="20000"/>
-              </a:spcBef>
-              <a:spcAft>
-                <a:spcPts val="600"/>
-              </a:spcAft>
-              <a:buClr>
-                <a:schemeClr val="accent1"/>
-              </a:buClr>
-              <a:buSzPct val="115000"/>
-              <a:buFont typeface="Arial"/>
-              <a:buChar char="•"/>
-              <a:defRPr sz="1400" kern="1200" cap="none">
-                <a:solidFill>
-                  <a:schemeClr val="tx1">
-                    <a:lumMod val="85000"/>
-                    <a:lumOff val="15000"/>
-                  </a:schemeClr>
-                </a:solidFill>
-                <a:effectLst/>
-                <a:latin typeface="+mn-lt"/>
-                <a:ea typeface="+mn-ea"/>
-                <a:cs typeface="+mn-cs"/>
-              </a:defRPr>
-            </a:lvl7pPr>
-            <a:lvl8pPr marL="3429000" indent="-228600" algn="l" defTabSz="457200" rtl="0" eaLnBrk="1" latinLnBrk="0" hangingPunct="1">
-              <a:spcBef>
-                <a:spcPct val="20000"/>
-              </a:spcBef>
-              <a:spcAft>
-                <a:spcPts val="600"/>
-              </a:spcAft>
-              <a:buClr>
-                <a:schemeClr val="accent1"/>
-              </a:buClr>
-              <a:buSzPct val="115000"/>
-              <a:buFont typeface="Arial"/>
-              <a:buChar char="•"/>
-              <a:defRPr sz="1400" kern="1200" cap="none">
-                <a:solidFill>
-                  <a:schemeClr val="tx1">
-                    <a:lumMod val="85000"/>
-                    <a:lumOff val="15000"/>
-                  </a:schemeClr>
-                </a:solidFill>
-                <a:effectLst/>
-                <a:latin typeface="+mn-lt"/>
-                <a:ea typeface="+mn-ea"/>
-                <a:cs typeface="+mn-cs"/>
-              </a:defRPr>
-            </a:lvl8pPr>
-            <a:lvl9pPr marL="3886200" indent="-228600" algn="l" defTabSz="457200" rtl="0" eaLnBrk="1" latinLnBrk="0" hangingPunct="1">
-              <a:spcBef>
-                <a:spcPct val="20000"/>
-              </a:spcBef>
-              <a:spcAft>
-                <a:spcPts val="600"/>
-              </a:spcAft>
-              <a:buClr>
-                <a:schemeClr val="accent1"/>
-              </a:buClr>
-              <a:buSzPct val="115000"/>
-              <a:buFont typeface="Arial"/>
-              <a:buChar char="•"/>
-              <a:defRPr sz="1400" kern="1200" cap="none">
-                <a:solidFill>
-                  <a:schemeClr val="tx1">
-                    <a:lumMod val="85000"/>
-                    <a:lumOff val="15000"/>
-                  </a:schemeClr>
-                </a:solidFill>
-                <a:effectLst/>
-                <a:latin typeface="+mn-lt"/>
-                <a:ea typeface="+mn-ea"/>
-                <a:cs typeface="+mn-cs"/>
-              </a:defRPr>
-            </a:lvl9pPr>
-          </a:lstStyle>
-          <a:p>
-            <a:r>
-              <a:rPr lang="en-US" dirty="0" smtClean="0"/>
-              <a:t>Important Operations -- “Pushing” and “Pulling”:</a:t>
-            </a:r>
-          </a:p>
-          <a:p>
-            <a:pPr lvl="1"/>
-            <a:r>
-              <a:rPr lang="en-US" dirty="0" smtClean="0"/>
-              <a:t>To retrieve your online repositories locally, select “Pull” under the “Repository” heading</a:t>
-            </a:r>
-          </a:p>
-          <a:p>
-            <a:pPr lvl="1"/>
-            <a:r>
-              <a:rPr lang="en-US" dirty="0" smtClean="0"/>
-              <a:t>After </a:t>
-            </a:r>
-          </a:p>
-          <a:p>
-            <a:pPr lvl="1"/>
-            <a:endParaRPr lang="en-US" dirty="0"/>
-          </a:p>
-        </p:txBody>
-      </p:sp>
+      </p:pic>
     </p:spTree>
     <p:extLst>
       <p:ext uri="{BB962C8B-B14F-4D97-AF65-F5344CB8AC3E}">
@@ -13700,6 +14353,13 @@
   <p:clrMapOvr>
     <a:masterClrMapping/>
   </p:clrMapOvr>
+  <p:timing>
+    <p:tnLst>
+      <p:par>
+        <p:cTn id="1" dur="indefinite" restart="never" nodeType="tmRoot"/>
+      </p:par>
+    </p:tnLst>
+  </p:timing>
 </p:sld>
 </file>
 
@@ -13732,6 +14392,1636 @@
         </p:nvSpPr>
         <p:spPr/>
         <p:txBody>
+          <a:bodyPr>
+            <a:normAutofit fontScale="90000"/>
+          </a:bodyPr>
+          <a:lstStyle/>
+          <a:p>
+            <a:r>
+              <a:rPr lang="en-US" dirty="0" smtClean="0"/>
+              <a:t>GitHub Desktop – Retrieving Additional Repositories</a:t>
+            </a:r>
+            <a:endParaRPr lang="en-US" dirty="0"/>
+          </a:p>
+        </p:txBody>
+      </p:sp>
+      <p:sp>
+        <p:nvSpPr>
+          <p:cNvPr id="3" name="Content Placeholder 2"/>
+          <p:cNvSpPr>
+            <a:spLocks noGrp="1"/>
+          </p:cNvSpPr>
+          <p:nvPr>
+            <p:ph sz="half" idx="1"/>
+          </p:nvPr>
+        </p:nvSpPr>
+        <p:spPr>
+          <a:xfrm>
+            <a:off x="1752600" y="2584507"/>
+            <a:ext cx="5689846" cy="3802381"/>
+          </a:xfrm>
+        </p:spPr>
+        <p:txBody>
+          <a:bodyPr>
+            <a:normAutofit fontScale="92500" lnSpcReduction="10000"/>
+          </a:bodyPr>
+          <a:lstStyle/>
+          <a:p>
+            <a:r>
+              <a:rPr lang="en-US" dirty="0" smtClean="0"/>
+              <a:t>To clone additional repositories to your desktop, select the box displaying the current local repository (shown right)</a:t>
+            </a:r>
+          </a:p>
+          <a:p>
+            <a:r>
+              <a:rPr lang="en-US" dirty="0" smtClean="0"/>
+              <a:t>A box displaying all current cloned (local) repositories appears</a:t>
+            </a:r>
+          </a:p>
+          <a:p>
+            <a:pPr lvl="1"/>
+            <a:r>
+              <a:rPr lang="en-US" dirty="0" smtClean="0"/>
+              <a:t>Click the “Add” button (shown in </a:t>
+            </a:r>
+            <a:r>
+              <a:rPr lang="en-US" dirty="0" smtClean="0">
+                <a:solidFill>
+                  <a:srgbClr val="22B14C"/>
+                </a:solidFill>
+              </a:rPr>
+              <a:t>light green</a:t>
+            </a:r>
+            <a:r>
+              <a:rPr lang="en-US" dirty="0" smtClean="0"/>
+              <a:t>)</a:t>
+            </a:r>
+          </a:p>
+          <a:p>
+            <a:pPr lvl="1"/>
+            <a:r>
+              <a:rPr lang="en-US" dirty="0" smtClean="0"/>
+              <a:t>Select “Clone repository…” (shown in </a:t>
+            </a:r>
+            <a:r>
+              <a:rPr lang="en-US" dirty="0" smtClean="0">
+                <a:solidFill>
+                  <a:srgbClr val="125C28"/>
+                </a:solidFill>
+              </a:rPr>
+              <a:t>dark green</a:t>
+            </a:r>
+            <a:r>
+              <a:rPr lang="en-US" dirty="0" smtClean="0"/>
+              <a:t>) to open a </a:t>
+            </a:r>
+            <a:r>
+              <a:rPr lang="en-US" u="sng" dirty="0" smtClean="0"/>
+              <a:t>familiar window</a:t>
+            </a:r>
+          </a:p>
+          <a:p>
+            <a:pPr lvl="1"/>
+            <a:r>
+              <a:rPr lang="en-US" dirty="0" smtClean="0"/>
+              <a:t>Navigate this window identically to the previous slide to select your repository</a:t>
+            </a:r>
+          </a:p>
+          <a:p>
+            <a:pPr lvl="1"/>
+            <a:endParaRPr lang="en-US" dirty="0"/>
+          </a:p>
+        </p:txBody>
+      </p:sp>
+      <p:pic>
+        <p:nvPicPr>
+          <p:cNvPr id="7" name="Content Placeholder 6"/>
+          <p:cNvPicPr>
+            <a:picLocks noGrp="1" noChangeAspect="1"/>
+          </p:cNvPicPr>
+          <p:nvPr>
+            <p:ph sz="half" idx="2"/>
+          </p:nvPr>
+        </p:nvPicPr>
+        <p:blipFill rotWithShape="1">
+          <a:blip r:embed="rId2">
+            <a:extLst>
+              <a:ext uri="{28A0092B-C50C-407E-A947-70E740481C1C}">
+                <a14:useLocalDpi xmlns:a14="http://schemas.microsoft.com/office/drawing/2010/main" val="0"/>
+              </a:ext>
+            </a:extLst>
+          </a:blip>
+          <a:srcRect t="1" r="5471" b="2843"/>
+          <a:stretch/>
+        </p:blipFill>
+        <p:spPr>
+          <a:xfrm>
+            <a:off x="7447186" y="4214577"/>
+            <a:ext cx="3727731" cy="1915667"/>
+          </a:xfrm>
+          <a:ln>
+            <a:solidFill>
+              <a:schemeClr val="tx1">
+                <a:lumMod val="50000"/>
+                <a:lumOff val="50000"/>
+              </a:schemeClr>
+            </a:solidFill>
+          </a:ln>
+        </p:spPr>
+      </p:pic>
+      <p:pic>
+        <p:nvPicPr>
+          <p:cNvPr id="9" name="Picture 8"/>
+          <p:cNvPicPr>
+            <a:picLocks noChangeAspect="1"/>
+          </p:cNvPicPr>
+          <p:nvPr/>
+        </p:nvPicPr>
+        <p:blipFill rotWithShape="1">
+          <a:blip r:embed="rId3">
+            <a:extLst>
+              <a:ext uri="{28A0092B-C50C-407E-A947-70E740481C1C}">
+                <a14:useLocalDpi xmlns:a14="http://schemas.microsoft.com/office/drawing/2010/main" val="0"/>
+              </a:ext>
+            </a:extLst>
+          </a:blip>
+          <a:srcRect b="-660"/>
+          <a:stretch/>
+        </p:blipFill>
+        <p:spPr>
+          <a:xfrm>
+            <a:off x="7442446" y="2586234"/>
+            <a:ext cx="3727731" cy="1462073"/>
+          </a:xfrm>
+          <a:prstGeom prst="rect">
+            <a:avLst/>
+          </a:prstGeom>
+          <a:ln>
+            <a:solidFill>
+              <a:schemeClr val="tx1">
+                <a:lumMod val="50000"/>
+                <a:lumOff val="50000"/>
+              </a:schemeClr>
+            </a:solidFill>
+          </a:ln>
+        </p:spPr>
+      </p:pic>
+      <p:pic>
+        <p:nvPicPr>
+          <p:cNvPr id="10" name="Picture 9"/>
+          <p:cNvPicPr>
+            <a:picLocks noChangeAspect="1"/>
+          </p:cNvPicPr>
+          <p:nvPr/>
+        </p:nvPicPr>
+        <p:blipFill>
+          <a:blip r:embed="rId4">
+            <a:extLst>
+              <a:ext uri="{28A0092B-C50C-407E-A947-70E740481C1C}">
+                <a14:useLocalDpi xmlns:a14="http://schemas.microsoft.com/office/drawing/2010/main" val="0"/>
+              </a:ext>
+            </a:extLst>
+          </a:blip>
+          <a:stretch>
+            <a:fillRect/>
+          </a:stretch>
+        </p:blipFill>
+        <p:spPr>
+          <a:xfrm rot="19755233">
+            <a:off x="796404" y="4628664"/>
+            <a:ext cx="1487351" cy="1098956"/>
+          </a:xfrm>
+          <a:prstGeom prst="rect">
+            <a:avLst/>
+          </a:prstGeom>
+          <a:ln>
+            <a:solidFill>
+              <a:schemeClr val="tx1">
+                <a:lumMod val="50000"/>
+                <a:lumOff val="50000"/>
+              </a:schemeClr>
+            </a:solidFill>
+          </a:ln>
+        </p:spPr>
+      </p:pic>
+      <p:sp>
+        <p:nvSpPr>
+          <p:cNvPr id="13" name="Content Placeholder 2"/>
+          <p:cNvSpPr txBox="1">
+            <a:spLocks/>
+          </p:cNvSpPr>
+          <p:nvPr/>
+        </p:nvSpPr>
+        <p:spPr>
+          <a:xfrm rot="10800000" flipH="1" flipV="1">
+            <a:off x="6952640" y="3108987"/>
+            <a:ext cx="457200" cy="510574"/>
+          </a:xfrm>
+          <a:prstGeom prst="rect">
+            <a:avLst/>
+          </a:prstGeom>
+        </p:spPr>
+        <p:txBody>
+          <a:bodyPr vert="horz" lIns="91440" tIns="45720" rIns="91440" bIns="45720" rtlCol="0" anchor="t">
+            <a:normAutofit/>
+          </a:bodyPr>
+          <a:lstStyle>
+            <a:lvl1pPr marL="285750" indent="-285750" algn="l" defTabSz="457200" rtl="0" eaLnBrk="1" latinLnBrk="0" hangingPunct="1">
+              <a:spcBef>
+                <a:spcPct val="20000"/>
+              </a:spcBef>
+              <a:spcAft>
+                <a:spcPts val="600"/>
+              </a:spcAft>
+              <a:buClr>
+                <a:schemeClr val="accent1"/>
+              </a:buClr>
+              <a:buSzPct val="115000"/>
+              <a:buFont typeface="Arial"/>
+              <a:buChar char="•"/>
+              <a:defRPr sz="2400" kern="1200" cap="none">
+                <a:solidFill>
+                  <a:schemeClr val="tx1">
+                    <a:lumMod val="85000"/>
+                    <a:lumOff val="15000"/>
+                  </a:schemeClr>
+                </a:solidFill>
+                <a:effectLst/>
+                <a:latin typeface="+mn-lt"/>
+                <a:ea typeface="+mn-ea"/>
+                <a:cs typeface="+mn-cs"/>
+              </a:defRPr>
+            </a:lvl1pPr>
+            <a:lvl2pPr marL="742950" indent="-285750" algn="l" defTabSz="457200" rtl="0" eaLnBrk="1" latinLnBrk="0" hangingPunct="1">
+              <a:spcBef>
+                <a:spcPct val="20000"/>
+              </a:spcBef>
+              <a:spcAft>
+                <a:spcPts val="600"/>
+              </a:spcAft>
+              <a:buClr>
+                <a:schemeClr val="accent1"/>
+              </a:buClr>
+              <a:buSzPct val="115000"/>
+              <a:buFont typeface="Arial"/>
+              <a:buChar char="•"/>
+              <a:defRPr sz="2000" kern="1200" cap="none">
+                <a:solidFill>
+                  <a:schemeClr val="tx1">
+                    <a:lumMod val="85000"/>
+                    <a:lumOff val="15000"/>
+                  </a:schemeClr>
+                </a:solidFill>
+                <a:effectLst/>
+                <a:latin typeface="+mn-lt"/>
+                <a:ea typeface="+mn-ea"/>
+                <a:cs typeface="+mn-cs"/>
+              </a:defRPr>
+            </a:lvl2pPr>
+            <a:lvl3pPr marL="1200150" indent="-285750" algn="l" defTabSz="457200" rtl="0" eaLnBrk="1" latinLnBrk="0" hangingPunct="1">
+              <a:spcBef>
+                <a:spcPct val="20000"/>
+              </a:spcBef>
+              <a:spcAft>
+                <a:spcPts val="600"/>
+              </a:spcAft>
+              <a:buClr>
+                <a:schemeClr val="accent1"/>
+              </a:buClr>
+              <a:buSzPct val="115000"/>
+              <a:buFont typeface="Arial"/>
+              <a:buChar char="•"/>
+              <a:defRPr sz="1800" kern="1200" cap="none">
+                <a:solidFill>
+                  <a:schemeClr val="tx1">
+                    <a:lumMod val="85000"/>
+                    <a:lumOff val="15000"/>
+                  </a:schemeClr>
+                </a:solidFill>
+                <a:effectLst/>
+                <a:latin typeface="+mn-lt"/>
+                <a:ea typeface="+mn-ea"/>
+                <a:cs typeface="+mn-cs"/>
+              </a:defRPr>
+            </a:lvl3pPr>
+            <a:lvl4pPr marL="1543050" indent="-171450" algn="l" defTabSz="457200" rtl="0" eaLnBrk="1" latinLnBrk="0" hangingPunct="1">
+              <a:spcBef>
+                <a:spcPct val="20000"/>
+              </a:spcBef>
+              <a:spcAft>
+                <a:spcPts val="600"/>
+              </a:spcAft>
+              <a:buClr>
+                <a:schemeClr val="accent1"/>
+              </a:buClr>
+              <a:buSzPct val="115000"/>
+              <a:buFont typeface="Arial"/>
+              <a:buChar char="•"/>
+              <a:defRPr sz="1600" kern="1200" cap="none">
+                <a:solidFill>
+                  <a:schemeClr val="tx1">
+                    <a:lumMod val="85000"/>
+                    <a:lumOff val="15000"/>
+                  </a:schemeClr>
+                </a:solidFill>
+                <a:effectLst/>
+                <a:latin typeface="+mn-lt"/>
+                <a:ea typeface="+mn-ea"/>
+                <a:cs typeface="+mn-cs"/>
+              </a:defRPr>
+            </a:lvl4pPr>
+            <a:lvl5pPr marL="2000250" indent="-171450" algn="l" defTabSz="457200" rtl="0" eaLnBrk="1" latinLnBrk="0" hangingPunct="1">
+              <a:spcBef>
+                <a:spcPct val="20000"/>
+              </a:spcBef>
+              <a:spcAft>
+                <a:spcPts val="600"/>
+              </a:spcAft>
+              <a:buClr>
+                <a:schemeClr val="accent1"/>
+              </a:buClr>
+              <a:buSzPct val="115000"/>
+              <a:buFont typeface="Arial"/>
+              <a:buChar char="•"/>
+              <a:defRPr sz="1400" kern="1200" cap="none">
+                <a:solidFill>
+                  <a:schemeClr val="tx1">
+                    <a:lumMod val="85000"/>
+                    <a:lumOff val="15000"/>
+                  </a:schemeClr>
+                </a:solidFill>
+                <a:effectLst/>
+                <a:latin typeface="+mn-lt"/>
+                <a:ea typeface="+mn-ea"/>
+                <a:cs typeface="+mn-cs"/>
+              </a:defRPr>
+            </a:lvl5pPr>
+            <a:lvl6pPr marL="2514600" indent="-228600" algn="l" defTabSz="457200" rtl="0" eaLnBrk="1" latinLnBrk="0" hangingPunct="1">
+              <a:spcBef>
+                <a:spcPct val="20000"/>
+              </a:spcBef>
+              <a:spcAft>
+                <a:spcPts val="600"/>
+              </a:spcAft>
+              <a:buClr>
+                <a:schemeClr val="accent1"/>
+              </a:buClr>
+              <a:buSzPct val="115000"/>
+              <a:buFont typeface="Arial"/>
+              <a:buChar char="•"/>
+              <a:defRPr sz="1400" kern="1200" cap="none">
+                <a:solidFill>
+                  <a:schemeClr val="tx1">
+                    <a:lumMod val="85000"/>
+                    <a:lumOff val="15000"/>
+                  </a:schemeClr>
+                </a:solidFill>
+                <a:effectLst/>
+                <a:latin typeface="+mn-lt"/>
+                <a:ea typeface="+mn-ea"/>
+                <a:cs typeface="+mn-cs"/>
+              </a:defRPr>
+            </a:lvl6pPr>
+            <a:lvl7pPr marL="2971800" indent="-228600" algn="l" defTabSz="457200" rtl="0" eaLnBrk="1" latinLnBrk="0" hangingPunct="1">
+              <a:spcBef>
+                <a:spcPct val="20000"/>
+              </a:spcBef>
+              <a:spcAft>
+                <a:spcPts val="600"/>
+              </a:spcAft>
+              <a:buClr>
+                <a:schemeClr val="accent1"/>
+              </a:buClr>
+              <a:buSzPct val="115000"/>
+              <a:buFont typeface="Arial"/>
+              <a:buChar char="•"/>
+              <a:defRPr sz="1400" kern="1200" cap="none">
+                <a:solidFill>
+                  <a:schemeClr val="tx1">
+                    <a:lumMod val="85000"/>
+                    <a:lumOff val="15000"/>
+                  </a:schemeClr>
+                </a:solidFill>
+                <a:effectLst/>
+                <a:latin typeface="+mn-lt"/>
+                <a:ea typeface="+mn-ea"/>
+                <a:cs typeface="+mn-cs"/>
+              </a:defRPr>
+            </a:lvl7pPr>
+            <a:lvl8pPr marL="3429000" indent="-228600" algn="l" defTabSz="457200" rtl="0" eaLnBrk="1" latinLnBrk="0" hangingPunct="1">
+              <a:spcBef>
+                <a:spcPct val="20000"/>
+              </a:spcBef>
+              <a:spcAft>
+                <a:spcPts val="600"/>
+              </a:spcAft>
+              <a:buClr>
+                <a:schemeClr val="accent1"/>
+              </a:buClr>
+              <a:buSzPct val="115000"/>
+              <a:buFont typeface="Arial"/>
+              <a:buChar char="•"/>
+              <a:defRPr sz="1400" kern="1200" cap="none">
+                <a:solidFill>
+                  <a:schemeClr val="tx1">
+                    <a:lumMod val="85000"/>
+                    <a:lumOff val="15000"/>
+                  </a:schemeClr>
+                </a:solidFill>
+                <a:effectLst/>
+                <a:latin typeface="+mn-lt"/>
+                <a:ea typeface="+mn-ea"/>
+                <a:cs typeface="+mn-cs"/>
+              </a:defRPr>
+            </a:lvl8pPr>
+            <a:lvl9pPr marL="3886200" indent="-228600" algn="l" defTabSz="457200" rtl="0" eaLnBrk="1" latinLnBrk="0" hangingPunct="1">
+              <a:spcBef>
+                <a:spcPct val="20000"/>
+              </a:spcBef>
+              <a:spcAft>
+                <a:spcPts val="600"/>
+              </a:spcAft>
+              <a:buClr>
+                <a:schemeClr val="accent1"/>
+              </a:buClr>
+              <a:buSzPct val="115000"/>
+              <a:buFont typeface="Arial"/>
+              <a:buChar char="•"/>
+              <a:defRPr sz="1400" kern="1200" cap="none">
+                <a:solidFill>
+                  <a:schemeClr val="tx1">
+                    <a:lumMod val="85000"/>
+                    <a:lumOff val="15000"/>
+                  </a:schemeClr>
+                </a:solidFill>
+                <a:effectLst/>
+                <a:latin typeface="+mn-lt"/>
+                <a:ea typeface="+mn-ea"/>
+                <a:cs typeface="+mn-cs"/>
+              </a:defRPr>
+            </a:lvl9pPr>
+          </a:lstStyle>
+          <a:p>
+            <a:pPr marL="0" indent="0">
+              <a:buNone/>
+            </a:pPr>
+            <a:r>
+              <a:rPr lang="en-US" dirty="0" smtClean="0">
+                <a:sym typeface="Wingdings" panose="05000000000000000000" pitchFamily="2" charset="2"/>
+              </a:rPr>
+              <a:t></a:t>
+            </a:r>
+            <a:endParaRPr lang="en-US" dirty="0"/>
+          </a:p>
+        </p:txBody>
+      </p:sp>
+      <p:sp>
+        <p:nvSpPr>
+          <p:cNvPr id="14" name="Content Placeholder 2"/>
+          <p:cNvSpPr txBox="1">
+            <a:spLocks/>
+          </p:cNvSpPr>
+          <p:nvPr/>
+        </p:nvSpPr>
+        <p:spPr>
+          <a:xfrm rot="10800000" flipH="1" flipV="1">
+            <a:off x="6884402" y="4326685"/>
+            <a:ext cx="457200" cy="510574"/>
+          </a:xfrm>
+          <a:prstGeom prst="rect">
+            <a:avLst/>
+          </a:prstGeom>
+        </p:spPr>
+        <p:txBody>
+          <a:bodyPr vert="horz" lIns="91440" tIns="45720" rIns="91440" bIns="45720" rtlCol="0" anchor="t">
+            <a:normAutofit/>
+          </a:bodyPr>
+          <a:lstStyle>
+            <a:lvl1pPr marL="285750" indent="-285750" algn="l" defTabSz="457200" rtl="0" eaLnBrk="1" latinLnBrk="0" hangingPunct="1">
+              <a:spcBef>
+                <a:spcPct val="20000"/>
+              </a:spcBef>
+              <a:spcAft>
+                <a:spcPts val="600"/>
+              </a:spcAft>
+              <a:buClr>
+                <a:schemeClr val="accent1"/>
+              </a:buClr>
+              <a:buSzPct val="115000"/>
+              <a:buFont typeface="Arial"/>
+              <a:buChar char="•"/>
+              <a:defRPr sz="2400" kern="1200" cap="none">
+                <a:solidFill>
+                  <a:schemeClr val="tx1">
+                    <a:lumMod val="85000"/>
+                    <a:lumOff val="15000"/>
+                  </a:schemeClr>
+                </a:solidFill>
+                <a:effectLst/>
+                <a:latin typeface="+mn-lt"/>
+                <a:ea typeface="+mn-ea"/>
+                <a:cs typeface="+mn-cs"/>
+              </a:defRPr>
+            </a:lvl1pPr>
+            <a:lvl2pPr marL="742950" indent="-285750" algn="l" defTabSz="457200" rtl="0" eaLnBrk="1" latinLnBrk="0" hangingPunct="1">
+              <a:spcBef>
+                <a:spcPct val="20000"/>
+              </a:spcBef>
+              <a:spcAft>
+                <a:spcPts val="600"/>
+              </a:spcAft>
+              <a:buClr>
+                <a:schemeClr val="accent1"/>
+              </a:buClr>
+              <a:buSzPct val="115000"/>
+              <a:buFont typeface="Arial"/>
+              <a:buChar char="•"/>
+              <a:defRPr sz="2000" kern="1200" cap="none">
+                <a:solidFill>
+                  <a:schemeClr val="tx1">
+                    <a:lumMod val="85000"/>
+                    <a:lumOff val="15000"/>
+                  </a:schemeClr>
+                </a:solidFill>
+                <a:effectLst/>
+                <a:latin typeface="+mn-lt"/>
+                <a:ea typeface="+mn-ea"/>
+                <a:cs typeface="+mn-cs"/>
+              </a:defRPr>
+            </a:lvl2pPr>
+            <a:lvl3pPr marL="1200150" indent="-285750" algn="l" defTabSz="457200" rtl="0" eaLnBrk="1" latinLnBrk="0" hangingPunct="1">
+              <a:spcBef>
+                <a:spcPct val="20000"/>
+              </a:spcBef>
+              <a:spcAft>
+                <a:spcPts val="600"/>
+              </a:spcAft>
+              <a:buClr>
+                <a:schemeClr val="accent1"/>
+              </a:buClr>
+              <a:buSzPct val="115000"/>
+              <a:buFont typeface="Arial"/>
+              <a:buChar char="•"/>
+              <a:defRPr sz="1800" kern="1200" cap="none">
+                <a:solidFill>
+                  <a:schemeClr val="tx1">
+                    <a:lumMod val="85000"/>
+                    <a:lumOff val="15000"/>
+                  </a:schemeClr>
+                </a:solidFill>
+                <a:effectLst/>
+                <a:latin typeface="+mn-lt"/>
+                <a:ea typeface="+mn-ea"/>
+                <a:cs typeface="+mn-cs"/>
+              </a:defRPr>
+            </a:lvl3pPr>
+            <a:lvl4pPr marL="1543050" indent="-171450" algn="l" defTabSz="457200" rtl="0" eaLnBrk="1" latinLnBrk="0" hangingPunct="1">
+              <a:spcBef>
+                <a:spcPct val="20000"/>
+              </a:spcBef>
+              <a:spcAft>
+                <a:spcPts val="600"/>
+              </a:spcAft>
+              <a:buClr>
+                <a:schemeClr val="accent1"/>
+              </a:buClr>
+              <a:buSzPct val="115000"/>
+              <a:buFont typeface="Arial"/>
+              <a:buChar char="•"/>
+              <a:defRPr sz="1600" kern="1200" cap="none">
+                <a:solidFill>
+                  <a:schemeClr val="tx1">
+                    <a:lumMod val="85000"/>
+                    <a:lumOff val="15000"/>
+                  </a:schemeClr>
+                </a:solidFill>
+                <a:effectLst/>
+                <a:latin typeface="+mn-lt"/>
+                <a:ea typeface="+mn-ea"/>
+                <a:cs typeface="+mn-cs"/>
+              </a:defRPr>
+            </a:lvl4pPr>
+            <a:lvl5pPr marL="2000250" indent="-171450" algn="l" defTabSz="457200" rtl="0" eaLnBrk="1" latinLnBrk="0" hangingPunct="1">
+              <a:spcBef>
+                <a:spcPct val="20000"/>
+              </a:spcBef>
+              <a:spcAft>
+                <a:spcPts val="600"/>
+              </a:spcAft>
+              <a:buClr>
+                <a:schemeClr val="accent1"/>
+              </a:buClr>
+              <a:buSzPct val="115000"/>
+              <a:buFont typeface="Arial"/>
+              <a:buChar char="•"/>
+              <a:defRPr sz="1400" kern="1200" cap="none">
+                <a:solidFill>
+                  <a:schemeClr val="tx1">
+                    <a:lumMod val="85000"/>
+                    <a:lumOff val="15000"/>
+                  </a:schemeClr>
+                </a:solidFill>
+                <a:effectLst/>
+                <a:latin typeface="+mn-lt"/>
+                <a:ea typeface="+mn-ea"/>
+                <a:cs typeface="+mn-cs"/>
+              </a:defRPr>
+            </a:lvl5pPr>
+            <a:lvl6pPr marL="2514600" indent="-228600" algn="l" defTabSz="457200" rtl="0" eaLnBrk="1" latinLnBrk="0" hangingPunct="1">
+              <a:spcBef>
+                <a:spcPct val="20000"/>
+              </a:spcBef>
+              <a:spcAft>
+                <a:spcPts val="600"/>
+              </a:spcAft>
+              <a:buClr>
+                <a:schemeClr val="accent1"/>
+              </a:buClr>
+              <a:buSzPct val="115000"/>
+              <a:buFont typeface="Arial"/>
+              <a:buChar char="•"/>
+              <a:defRPr sz="1400" kern="1200" cap="none">
+                <a:solidFill>
+                  <a:schemeClr val="tx1">
+                    <a:lumMod val="85000"/>
+                    <a:lumOff val="15000"/>
+                  </a:schemeClr>
+                </a:solidFill>
+                <a:effectLst/>
+                <a:latin typeface="+mn-lt"/>
+                <a:ea typeface="+mn-ea"/>
+                <a:cs typeface="+mn-cs"/>
+              </a:defRPr>
+            </a:lvl6pPr>
+            <a:lvl7pPr marL="2971800" indent="-228600" algn="l" defTabSz="457200" rtl="0" eaLnBrk="1" latinLnBrk="0" hangingPunct="1">
+              <a:spcBef>
+                <a:spcPct val="20000"/>
+              </a:spcBef>
+              <a:spcAft>
+                <a:spcPts val="600"/>
+              </a:spcAft>
+              <a:buClr>
+                <a:schemeClr val="accent1"/>
+              </a:buClr>
+              <a:buSzPct val="115000"/>
+              <a:buFont typeface="Arial"/>
+              <a:buChar char="•"/>
+              <a:defRPr sz="1400" kern="1200" cap="none">
+                <a:solidFill>
+                  <a:schemeClr val="tx1">
+                    <a:lumMod val="85000"/>
+                    <a:lumOff val="15000"/>
+                  </a:schemeClr>
+                </a:solidFill>
+                <a:effectLst/>
+                <a:latin typeface="+mn-lt"/>
+                <a:ea typeface="+mn-ea"/>
+                <a:cs typeface="+mn-cs"/>
+              </a:defRPr>
+            </a:lvl7pPr>
+            <a:lvl8pPr marL="3429000" indent="-228600" algn="l" defTabSz="457200" rtl="0" eaLnBrk="1" latinLnBrk="0" hangingPunct="1">
+              <a:spcBef>
+                <a:spcPct val="20000"/>
+              </a:spcBef>
+              <a:spcAft>
+                <a:spcPts val="600"/>
+              </a:spcAft>
+              <a:buClr>
+                <a:schemeClr val="accent1"/>
+              </a:buClr>
+              <a:buSzPct val="115000"/>
+              <a:buFont typeface="Arial"/>
+              <a:buChar char="•"/>
+              <a:defRPr sz="1400" kern="1200" cap="none">
+                <a:solidFill>
+                  <a:schemeClr val="tx1">
+                    <a:lumMod val="85000"/>
+                    <a:lumOff val="15000"/>
+                  </a:schemeClr>
+                </a:solidFill>
+                <a:effectLst/>
+                <a:latin typeface="+mn-lt"/>
+                <a:ea typeface="+mn-ea"/>
+                <a:cs typeface="+mn-cs"/>
+              </a:defRPr>
+            </a:lvl8pPr>
+            <a:lvl9pPr marL="3886200" indent="-228600" algn="l" defTabSz="457200" rtl="0" eaLnBrk="1" latinLnBrk="0" hangingPunct="1">
+              <a:spcBef>
+                <a:spcPct val="20000"/>
+              </a:spcBef>
+              <a:spcAft>
+                <a:spcPts val="600"/>
+              </a:spcAft>
+              <a:buClr>
+                <a:schemeClr val="accent1"/>
+              </a:buClr>
+              <a:buSzPct val="115000"/>
+              <a:buFont typeface="Arial"/>
+              <a:buChar char="•"/>
+              <a:defRPr sz="1400" kern="1200" cap="none">
+                <a:solidFill>
+                  <a:schemeClr val="tx1">
+                    <a:lumMod val="85000"/>
+                    <a:lumOff val="15000"/>
+                  </a:schemeClr>
+                </a:solidFill>
+                <a:effectLst/>
+                <a:latin typeface="+mn-lt"/>
+                <a:ea typeface="+mn-ea"/>
+                <a:cs typeface="+mn-cs"/>
+              </a:defRPr>
+            </a:lvl9pPr>
+          </a:lstStyle>
+          <a:p>
+            <a:pPr marL="0" indent="0">
+              <a:buNone/>
+            </a:pPr>
+            <a:r>
+              <a:rPr lang="en-US" dirty="0" smtClean="0">
+                <a:solidFill>
+                  <a:srgbClr val="22B14C"/>
+                </a:solidFill>
+                <a:sym typeface="Wingdings" panose="05000000000000000000" pitchFamily="2" charset="2"/>
+              </a:rPr>
+              <a:t></a:t>
+            </a:r>
+            <a:endParaRPr lang="en-US" dirty="0">
+              <a:solidFill>
+                <a:srgbClr val="22B14C"/>
+              </a:solidFill>
+            </a:endParaRPr>
+          </a:p>
+        </p:txBody>
+      </p:sp>
+      <p:sp>
+        <p:nvSpPr>
+          <p:cNvPr id="15" name="Content Placeholder 2"/>
+          <p:cNvSpPr txBox="1">
+            <a:spLocks/>
+          </p:cNvSpPr>
+          <p:nvPr/>
+        </p:nvSpPr>
+        <p:spPr>
+          <a:xfrm rot="11943839" flipH="1" flipV="1">
+            <a:off x="6820409" y="5070314"/>
+            <a:ext cx="536196" cy="524004"/>
+          </a:xfrm>
+          <a:prstGeom prst="rect">
+            <a:avLst/>
+          </a:prstGeom>
+        </p:spPr>
+        <p:txBody>
+          <a:bodyPr vert="horz" lIns="91440" tIns="45720" rIns="91440" bIns="45720" rtlCol="0" anchor="t">
+            <a:normAutofit/>
+          </a:bodyPr>
+          <a:lstStyle>
+            <a:lvl1pPr marL="285750" indent="-285750" algn="l" defTabSz="457200" rtl="0" eaLnBrk="1" latinLnBrk="0" hangingPunct="1">
+              <a:spcBef>
+                <a:spcPct val="20000"/>
+              </a:spcBef>
+              <a:spcAft>
+                <a:spcPts val="600"/>
+              </a:spcAft>
+              <a:buClr>
+                <a:schemeClr val="accent1"/>
+              </a:buClr>
+              <a:buSzPct val="115000"/>
+              <a:buFont typeface="Arial"/>
+              <a:buChar char="•"/>
+              <a:defRPr sz="2400" kern="1200" cap="none">
+                <a:solidFill>
+                  <a:schemeClr val="tx1">
+                    <a:lumMod val="85000"/>
+                    <a:lumOff val="15000"/>
+                  </a:schemeClr>
+                </a:solidFill>
+                <a:effectLst/>
+                <a:latin typeface="+mn-lt"/>
+                <a:ea typeface="+mn-ea"/>
+                <a:cs typeface="+mn-cs"/>
+              </a:defRPr>
+            </a:lvl1pPr>
+            <a:lvl2pPr marL="742950" indent="-285750" algn="l" defTabSz="457200" rtl="0" eaLnBrk="1" latinLnBrk="0" hangingPunct="1">
+              <a:spcBef>
+                <a:spcPct val="20000"/>
+              </a:spcBef>
+              <a:spcAft>
+                <a:spcPts val="600"/>
+              </a:spcAft>
+              <a:buClr>
+                <a:schemeClr val="accent1"/>
+              </a:buClr>
+              <a:buSzPct val="115000"/>
+              <a:buFont typeface="Arial"/>
+              <a:buChar char="•"/>
+              <a:defRPr sz="2000" kern="1200" cap="none">
+                <a:solidFill>
+                  <a:schemeClr val="tx1">
+                    <a:lumMod val="85000"/>
+                    <a:lumOff val="15000"/>
+                  </a:schemeClr>
+                </a:solidFill>
+                <a:effectLst/>
+                <a:latin typeface="+mn-lt"/>
+                <a:ea typeface="+mn-ea"/>
+                <a:cs typeface="+mn-cs"/>
+              </a:defRPr>
+            </a:lvl2pPr>
+            <a:lvl3pPr marL="1200150" indent="-285750" algn="l" defTabSz="457200" rtl="0" eaLnBrk="1" latinLnBrk="0" hangingPunct="1">
+              <a:spcBef>
+                <a:spcPct val="20000"/>
+              </a:spcBef>
+              <a:spcAft>
+                <a:spcPts val="600"/>
+              </a:spcAft>
+              <a:buClr>
+                <a:schemeClr val="accent1"/>
+              </a:buClr>
+              <a:buSzPct val="115000"/>
+              <a:buFont typeface="Arial"/>
+              <a:buChar char="•"/>
+              <a:defRPr sz="1800" kern="1200" cap="none">
+                <a:solidFill>
+                  <a:schemeClr val="tx1">
+                    <a:lumMod val="85000"/>
+                    <a:lumOff val="15000"/>
+                  </a:schemeClr>
+                </a:solidFill>
+                <a:effectLst/>
+                <a:latin typeface="+mn-lt"/>
+                <a:ea typeface="+mn-ea"/>
+                <a:cs typeface="+mn-cs"/>
+              </a:defRPr>
+            </a:lvl3pPr>
+            <a:lvl4pPr marL="1543050" indent="-171450" algn="l" defTabSz="457200" rtl="0" eaLnBrk="1" latinLnBrk="0" hangingPunct="1">
+              <a:spcBef>
+                <a:spcPct val="20000"/>
+              </a:spcBef>
+              <a:spcAft>
+                <a:spcPts val="600"/>
+              </a:spcAft>
+              <a:buClr>
+                <a:schemeClr val="accent1"/>
+              </a:buClr>
+              <a:buSzPct val="115000"/>
+              <a:buFont typeface="Arial"/>
+              <a:buChar char="•"/>
+              <a:defRPr sz="1600" kern="1200" cap="none">
+                <a:solidFill>
+                  <a:schemeClr val="tx1">
+                    <a:lumMod val="85000"/>
+                    <a:lumOff val="15000"/>
+                  </a:schemeClr>
+                </a:solidFill>
+                <a:effectLst/>
+                <a:latin typeface="+mn-lt"/>
+                <a:ea typeface="+mn-ea"/>
+                <a:cs typeface="+mn-cs"/>
+              </a:defRPr>
+            </a:lvl4pPr>
+            <a:lvl5pPr marL="2000250" indent="-171450" algn="l" defTabSz="457200" rtl="0" eaLnBrk="1" latinLnBrk="0" hangingPunct="1">
+              <a:spcBef>
+                <a:spcPct val="20000"/>
+              </a:spcBef>
+              <a:spcAft>
+                <a:spcPts val="600"/>
+              </a:spcAft>
+              <a:buClr>
+                <a:schemeClr val="accent1"/>
+              </a:buClr>
+              <a:buSzPct val="115000"/>
+              <a:buFont typeface="Arial"/>
+              <a:buChar char="•"/>
+              <a:defRPr sz="1400" kern="1200" cap="none">
+                <a:solidFill>
+                  <a:schemeClr val="tx1">
+                    <a:lumMod val="85000"/>
+                    <a:lumOff val="15000"/>
+                  </a:schemeClr>
+                </a:solidFill>
+                <a:effectLst/>
+                <a:latin typeface="+mn-lt"/>
+                <a:ea typeface="+mn-ea"/>
+                <a:cs typeface="+mn-cs"/>
+              </a:defRPr>
+            </a:lvl5pPr>
+            <a:lvl6pPr marL="2514600" indent="-228600" algn="l" defTabSz="457200" rtl="0" eaLnBrk="1" latinLnBrk="0" hangingPunct="1">
+              <a:spcBef>
+                <a:spcPct val="20000"/>
+              </a:spcBef>
+              <a:spcAft>
+                <a:spcPts val="600"/>
+              </a:spcAft>
+              <a:buClr>
+                <a:schemeClr val="accent1"/>
+              </a:buClr>
+              <a:buSzPct val="115000"/>
+              <a:buFont typeface="Arial"/>
+              <a:buChar char="•"/>
+              <a:defRPr sz="1400" kern="1200" cap="none">
+                <a:solidFill>
+                  <a:schemeClr val="tx1">
+                    <a:lumMod val="85000"/>
+                    <a:lumOff val="15000"/>
+                  </a:schemeClr>
+                </a:solidFill>
+                <a:effectLst/>
+                <a:latin typeface="+mn-lt"/>
+                <a:ea typeface="+mn-ea"/>
+                <a:cs typeface="+mn-cs"/>
+              </a:defRPr>
+            </a:lvl6pPr>
+            <a:lvl7pPr marL="2971800" indent="-228600" algn="l" defTabSz="457200" rtl="0" eaLnBrk="1" latinLnBrk="0" hangingPunct="1">
+              <a:spcBef>
+                <a:spcPct val="20000"/>
+              </a:spcBef>
+              <a:spcAft>
+                <a:spcPts val="600"/>
+              </a:spcAft>
+              <a:buClr>
+                <a:schemeClr val="accent1"/>
+              </a:buClr>
+              <a:buSzPct val="115000"/>
+              <a:buFont typeface="Arial"/>
+              <a:buChar char="•"/>
+              <a:defRPr sz="1400" kern="1200" cap="none">
+                <a:solidFill>
+                  <a:schemeClr val="tx1">
+                    <a:lumMod val="85000"/>
+                    <a:lumOff val="15000"/>
+                  </a:schemeClr>
+                </a:solidFill>
+                <a:effectLst/>
+                <a:latin typeface="+mn-lt"/>
+                <a:ea typeface="+mn-ea"/>
+                <a:cs typeface="+mn-cs"/>
+              </a:defRPr>
+            </a:lvl7pPr>
+            <a:lvl8pPr marL="3429000" indent="-228600" algn="l" defTabSz="457200" rtl="0" eaLnBrk="1" latinLnBrk="0" hangingPunct="1">
+              <a:spcBef>
+                <a:spcPct val="20000"/>
+              </a:spcBef>
+              <a:spcAft>
+                <a:spcPts val="600"/>
+              </a:spcAft>
+              <a:buClr>
+                <a:schemeClr val="accent1"/>
+              </a:buClr>
+              <a:buSzPct val="115000"/>
+              <a:buFont typeface="Arial"/>
+              <a:buChar char="•"/>
+              <a:defRPr sz="1400" kern="1200" cap="none">
+                <a:solidFill>
+                  <a:schemeClr val="tx1">
+                    <a:lumMod val="85000"/>
+                    <a:lumOff val="15000"/>
+                  </a:schemeClr>
+                </a:solidFill>
+                <a:effectLst/>
+                <a:latin typeface="+mn-lt"/>
+                <a:ea typeface="+mn-ea"/>
+                <a:cs typeface="+mn-cs"/>
+              </a:defRPr>
+            </a:lvl8pPr>
+            <a:lvl9pPr marL="3886200" indent="-228600" algn="l" defTabSz="457200" rtl="0" eaLnBrk="1" latinLnBrk="0" hangingPunct="1">
+              <a:spcBef>
+                <a:spcPct val="20000"/>
+              </a:spcBef>
+              <a:spcAft>
+                <a:spcPts val="600"/>
+              </a:spcAft>
+              <a:buClr>
+                <a:schemeClr val="accent1"/>
+              </a:buClr>
+              <a:buSzPct val="115000"/>
+              <a:buFont typeface="Arial"/>
+              <a:buChar char="•"/>
+              <a:defRPr sz="1400" kern="1200" cap="none">
+                <a:solidFill>
+                  <a:schemeClr val="tx1">
+                    <a:lumMod val="85000"/>
+                    <a:lumOff val="15000"/>
+                  </a:schemeClr>
+                </a:solidFill>
+                <a:effectLst/>
+                <a:latin typeface="+mn-lt"/>
+                <a:ea typeface="+mn-ea"/>
+                <a:cs typeface="+mn-cs"/>
+              </a:defRPr>
+            </a:lvl9pPr>
+          </a:lstStyle>
+          <a:p>
+            <a:pPr marL="0" indent="0">
+              <a:buNone/>
+            </a:pPr>
+            <a:r>
+              <a:rPr lang="en-US" dirty="0" smtClean="0">
+                <a:solidFill>
+                  <a:srgbClr val="125C28"/>
+                </a:solidFill>
+                <a:sym typeface="Wingdings" panose="05000000000000000000" pitchFamily="2" charset="2"/>
+              </a:rPr>
+              <a:t></a:t>
+            </a:r>
+            <a:endParaRPr lang="en-US" dirty="0">
+              <a:solidFill>
+                <a:srgbClr val="125C28"/>
+              </a:solidFill>
+            </a:endParaRPr>
+          </a:p>
+        </p:txBody>
+      </p:sp>
+      <p:sp>
+        <p:nvSpPr>
+          <p:cNvPr id="16" name="Content Placeholder 2"/>
+          <p:cNvSpPr txBox="1">
+            <a:spLocks/>
+          </p:cNvSpPr>
+          <p:nvPr/>
+        </p:nvSpPr>
+        <p:spPr>
+          <a:xfrm rot="10800000" flipH="1" flipV="1">
+            <a:off x="2539539" y="5199757"/>
+            <a:ext cx="1136312" cy="308352"/>
+          </a:xfrm>
+          <a:prstGeom prst="rect">
+            <a:avLst/>
+          </a:prstGeom>
+        </p:spPr>
+        <p:txBody>
+          <a:bodyPr vert="horz" lIns="91440" tIns="45720" rIns="91440" bIns="45720" rtlCol="0" anchor="t">
+            <a:normAutofit fontScale="85000" lnSpcReduction="10000"/>
+          </a:bodyPr>
+          <a:lstStyle>
+            <a:lvl1pPr marL="285750" indent="-285750" algn="l" defTabSz="457200" rtl="0" eaLnBrk="1" latinLnBrk="0" hangingPunct="1">
+              <a:spcBef>
+                <a:spcPct val="20000"/>
+              </a:spcBef>
+              <a:spcAft>
+                <a:spcPts val="600"/>
+              </a:spcAft>
+              <a:buClr>
+                <a:schemeClr val="accent1"/>
+              </a:buClr>
+              <a:buSzPct val="115000"/>
+              <a:buFont typeface="Arial"/>
+              <a:buChar char="•"/>
+              <a:defRPr sz="2400" kern="1200" cap="none">
+                <a:solidFill>
+                  <a:schemeClr val="tx1">
+                    <a:lumMod val="85000"/>
+                    <a:lumOff val="15000"/>
+                  </a:schemeClr>
+                </a:solidFill>
+                <a:effectLst/>
+                <a:latin typeface="+mn-lt"/>
+                <a:ea typeface="+mn-ea"/>
+                <a:cs typeface="+mn-cs"/>
+              </a:defRPr>
+            </a:lvl1pPr>
+            <a:lvl2pPr marL="742950" indent="-285750" algn="l" defTabSz="457200" rtl="0" eaLnBrk="1" latinLnBrk="0" hangingPunct="1">
+              <a:spcBef>
+                <a:spcPct val="20000"/>
+              </a:spcBef>
+              <a:spcAft>
+                <a:spcPts val="600"/>
+              </a:spcAft>
+              <a:buClr>
+                <a:schemeClr val="accent1"/>
+              </a:buClr>
+              <a:buSzPct val="115000"/>
+              <a:buFont typeface="Arial"/>
+              <a:buChar char="•"/>
+              <a:defRPr sz="2000" kern="1200" cap="none">
+                <a:solidFill>
+                  <a:schemeClr val="tx1">
+                    <a:lumMod val="85000"/>
+                    <a:lumOff val="15000"/>
+                  </a:schemeClr>
+                </a:solidFill>
+                <a:effectLst/>
+                <a:latin typeface="+mn-lt"/>
+                <a:ea typeface="+mn-ea"/>
+                <a:cs typeface="+mn-cs"/>
+              </a:defRPr>
+            </a:lvl2pPr>
+            <a:lvl3pPr marL="1200150" indent="-285750" algn="l" defTabSz="457200" rtl="0" eaLnBrk="1" latinLnBrk="0" hangingPunct="1">
+              <a:spcBef>
+                <a:spcPct val="20000"/>
+              </a:spcBef>
+              <a:spcAft>
+                <a:spcPts val="600"/>
+              </a:spcAft>
+              <a:buClr>
+                <a:schemeClr val="accent1"/>
+              </a:buClr>
+              <a:buSzPct val="115000"/>
+              <a:buFont typeface="Arial"/>
+              <a:buChar char="•"/>
+              <a:defRPr sz="1800" kern="1200" cap="none">
+                <a:solidFill>
+                  <a:schemeClr val="tx1">
+                    <a:lumMod val="85000"/>
+                    <a:lumOff val="15000"/>
+                  </a:schemeClr>
+                </a:solidFill>
+                <a:effectLst/>
+                <a:latin typeface="+mn-lt"/>
+                <a:ea typeface="+mn-ea"/>
+                <a:cs typeface="+mn-cs"/>
+              </a:defRPr>
+            </a:lvl3pPr>
+            <a:lvl4pPr marL="1543050" indent="-171450" algn="l" defTabSz="457200" rtl="0" eaLnBrk="1" latinLnBrk="0" hangingPunct="1">
+              <a:spcBef>
+                <a:spcPct val="20000"/>
+              </a:spcBef>
+              <a:spcAft>
+                <a:spcPts val="600"/>
+              </a:spcAft>
+              <a:buClr>
+                <a:schemeClr val="accent1"/>
+              </a:buClr>
+              <a:buSzPct val="115000"/>
+              <a:buFont typeface="Arial"/>
+              <a:buChar char="•"/>
+              <a:defRPr sz="1600" kern="1200" cap="none">
+                <a:solidFill>
+                  <a:schemeClr val="tx1">
+                    <a:lumMod val="85000"/>
+                    <a:lumOff val="15000"/>
+                  </a:schemeClr>
+                </a:solidFill>
+                <a:effectLst/>
+                <a:latin typeface="+mn-lt"/>
+                <a:ea typeface="+mn-ea"/>
+                <a:cs typeface="+mn-cs"/>
+              </a:defRPr>
+            </a:lvl4pPr>
+            <a:lvl5pPr marL="2000250" indent="-171450" algn="l" defTabSz="457200" rtl="0" eaLnBrk="1" latinLnBrk="0" hangingPunct="1">
+              <a:spcBef>
+                <a:spcPct val="20000"/>
+              </a:spcBef>
+              <a:spcAft>
+                <a:spcPts val="600"/>
+              </a:spcAft>
+              <a:buClr>
+                <a:schemeClr val="accent1"/>
+              </a:buClr>
+              <a:buSzPct val="115000"/>
+              <a:buFont typeface="Arial"/>
+              <a:buChar char="•"/>
+              <a:defRPr sz="1400" kern="1200" cap="none">
+                <a:solidFill>
+                  <a:schemeClr val="tx1">
+                    <a:lumMod val="85000"/>
+                    <a:lumOff val="15000"/>
+                  </a:schemeClr>
+                </a:solidFill>
+                <a:effectLst/>
+                <a:latin typeface="+mn-lt"/>
+                <a:ea typeface="+mn-ea"/>
+                <a:cs typeface="+mn-cs"/>
+              </a:defRPr>
+            </a:lvl5pPr>
+            <a:lvl6pPr marL="2514600" indent="-228600" algn="l" defTabSz="457200" rtl="0" eaLnBrk="1" latinLnBrk="0" hangingPunct="1">
+              <a:spcBef>
+                <a:spcPct val="20000"/>
+              </a:spcBef>
+              <a:spcAft>
+                <a:spcPts val="600"/>
+              </a:spcAft>
+              <a:buClr>
+                <a:schemeClr val="accent1"/>
+              </a:buClr>
+              <a:buSzPct val="115000"/>
+              <a:buFont typeface="Arial"/>
+              <a:buChar char="•"/>
+              <a:defRPr sz="1400" kern="1200" cap="none">
+                <a:solidFill>
+                  <a:schemeClr val="tx1">
+                    <a:lumMod val="85000"/>
+                    <a:lumOff val="15000"/>
+                  </a:schemeClr>
+                </a:solidFill>
+                <a:effectLst/>
+                <a:latin typeface="+mn-lt"/>
+                <a:ea typeface="+mn-ea"/>
+                <a:cs typeface="+mn-cs"/>
+              </a:defRPr>
+            </a:lvl6pPr>
+            <a:lvl7pPr marL="2971800" indent="-228600" algn="l" defTabSz="457200" rtl="0" eaLnBrk="1" latinLnBrk="0" hangingPunct="1">
+              <a:spcBef>
+                <a:spcPct val="20000"/>
+              </a:spcBef>
+              <a:spcAft>
+                <a:spcPts val="600"/>
+              </a:spcAft>
+              <a:buClr>
+                <a:schemeClr val="accent1"/>
+              </a:buClr>
+              <a:buSzPct val="115000"/>
+              <a:buFont typeface="Arial"/>
+              <a:buChar char="•"/>
+              <a:defRPr sz="1400" kern="1200" cap="none">
+                <a:solidFill>
+                  <a:schemeClr val="tx1">
+                    <a:lumMod val="85000"/>
+                    <a:lumOff val="15000"/>
+                  </a:schemeClr>
+                </a:solidFill>
+                <a:effectLst/>
+                <a:latin typeface="+mn-lt"/>
+                <a:ea typeface="+mn-ea"/>
+                <a:cs typeface="+mn-cs"/>
+              </a:defRPr>
+            </a:lvl7pPr>
+            <a:lvl8pPr marL="3429000" indent="-228600" algn="l" defTabSz="457200" rtl="0" eaLnBrk="1" latinLnBrk="0" hangingPunct="1">
+              <a:spcBef>
+                <a:spcPct val="20000"/>
+              </a:spcBef>
+              <a:spcAft>
+                <a:spcPts val="600"/>
+              </a:spcAft>
+              <a:buClr>
+                <a:schemeClr val="accent1"/>
+              </a:buClr>
+              <a:buSzPct val="115000"/>
+              <a:buFont typeface="Arial"/>
+              <a:buChar char="•"/>
+              <a:defRPr sz="1400" kern="1200" cap="none">
+                <a:solidFill>
+                  <a:schemeClr val="tx1">
+                    <a:lumMod val="85000"/>
+                    <a:lumOff val="15000"/>
+                  </a:schemeClr>
+                </a:solidFill>
+                <a:effectLst/>
+                <a:latin typeface="+mn-lt"/>
+                <a:ea typeface="+mn-ea"/>
+                <a:cs typeface="+mn-cs"/>
+              </a:defRPr>
+            </a:lvl8pPr>
+            <a:lvl9pPr marL="3886200" indent="-228600" algn="l" defTabSz="457200" rtl="0" eaLnBrk="1" latinLnBrk="0" hangingPunct="1">
+              <a:spcBef>
+                <a:spcPct val="20000"/>
+              </a:spcBef>
+              <a:spcAft>
+                <a:spcPts val="600"/>
+              </a:spcAft>
+              <a:buClr>
+                <a:schemeClr val="accent1"/>
+              </a:buClr>
+              <a:buSzPct val="115000"/>
+              <a:buFont typeface="Arial"/>
+              <a:buChar char="•"/>
+              <a:defRPr sz="1400" kern="1200" cap="none">
+                <a:solidFill>
+                  <a:schemeClr val="tx1">
+                    <a:lumMod val="85000"/>
+                    <a:lumOff val="15000"/>
+                  </a:schemeClr>
+                </a:solidFill>
+                <a:effectLst/>
+                <a:latin typeface="+mn-lt"/>
+                <a:ea typeface="+mn-ea"/>
+                <a:cs typeface="+mn-cs"/>
+              </a:defRPr>
+            </a:lvl9pPr>
+          </a:lstStyle>
+          <a:p>
+            <a:pPr marL="0" indent="0">
+              <a:buNone/>
+            </a:pPr>
+            <a:r>
+              <a:rPr lang="en-US" sz="1600" dirty="0" smtClean="0">
+                <a:sym typeface="Wingdings" panose="05000000000000000000" pitchFamily="2" charset="2"/>
+              </a:rPr>
+              <a:t>---------------- </a:t>
+            </a:r>
+            <a:endParaRPr lang="en-US" sz="1600" dirty="0"/>
+          </a:p>
+        </p:txBody>
+      </p:sp>
+      <p:sp>
+        <p:nvSpPr>
+          <p:cNvPr id="17" name="Content Placeholder 2"/>
+          <p:cNvSpPr txBox="1">
+            <a:spLocks/>
+          </p:cNvSpPr>
+          <p:nvPr/>
+        </p:nvSpPr>
+        <p:spPr>
+          <a:xfrm rot="765847" flipH="1" flipV="1">
+            <a:off x="2341174" y="5175762"/>
+            <a:ext cx="396731" cy="276317"/>
+          </a:xfrm>
+          <a:prstGeom prst="rect">
+            <a:avLst/>
+          </a:prstGeom>
+        </p:spPr>
+        <p:txBody>
+          <a:bodyPr vert="horz" lIns="91440" tIns="45720" rIns="91440" bIns="45720" rtlCol="0" anchor="t">
+            <a:normAutofit fontScale="92500" lnSpcReduction="20000"/>
+          </a:bodyPr>
+          <a:lstStyle>
+            <a:lvl1pPr marL="285750" indent="-285750" algn="l" defTabSz="457200" rtl="0" eaLnBrk="1" latinLnBrk="0" hangingPunct="1">
+              <a:spcBef>
+                <a:spcPct val="20000"/>
+              </a:spcBef>
+              <a:spcAft>
+                <a:spcPts val="600"/>
+              </a:spcAft>
+              <a:buClr>
+                <a:schemeClr val="accent1"/>
+              </a:buClr>
+              <a:buSzPct val="115000"/>
+              <a:buFont typeface="Arial"/>
+              <a:buChar char="•"/>
+              <a:defRPr sz="2400" kern="1200" cap="none">
+                <a:solidFill>
+                  <a:schemeClr val="tx1">
+                    <a:lumMod val="85000"/>
+                    <a:lumOff val="15000"/>
+                  </a:schemeClr>
+                </a:solidFill>
+                <a:effectLst/>
+                <a:latin typeface="+mn-lt"/>
+                <a:ea typeface="+mn-ea"/>
+                <a:cs typeface="+mn-cs"/>
+              </a:defRPr>
+            </a:lvl1pPr>
+            <a:lvl2pPr marL="742950" indent="-285750" algn="l" defTabSz="457200" rtl="0" eaLnBrk="1" latinLnBrk="0" hangingPunct="1">
+              <a:spcBef>
+                <a:spcPct val="20000"/>
+              </a:spcBef>
+              <a:spcAft>
+                <a:spcPts val="600"/>
+              </a:spcAft>
+              <a:buClr>
+                <a:schemeClr val="accent1"/>
+              </a:buClr>
+              <a:buSzPct val="115000"/>
+              <a:buFont typeface="Arial"/>
+              <a:buChar char="•"/>
+              <a:defRPr sz="2000" kern="1200" cap="none">
+                <a:solidFill>
+                  <a:schemeClr val="tx1">
+                    <a:lumMod val="85000"/>
+                    <a:lumOff val="15000"/>
+                  </a:schemeClr>
+                </a:solidFill>
+                <a:effectLst/>
+                <a:latin typeface="+mn-lt"/>
+                <a:ea typeface="+mn-ea"/>
+                <a:cs typeface="+mn-cs"/>
+              </a:defRPr>
+            </a:lvl2pPr>
+            <a:lvl3pPr marL="1200150" indent="-285750" algn="l" defTabSz="457200" rtl="0" eaLnBrk="1" latinLnBrk="0" hangingPunct="1">
+              <a:spcBef>
+                <a:spcPct val="20000"/>
+              </a:spcBef>
+              <a:spcAft>
+                <a:spcPts val="600"/>
+              </a:spcAft>
+              <a:buClr>
+                <a:schemeClr val="accent1"/>
+              </a:buClr>
+              <a:buSzPct val="115000"/>
+              <a:buFont typeface="Arial"/>
+              <a:buChar char="•"/>
+              <a:defRPr sz="1800" kern="1200" cap="none">
+                <a:solidFill>
+                  <a:schemeClr val="tx1">
+                    <a:lumMod val="85000"/>
+                    <a:lumOff val="15000"/>
+                  </a:schemeClr>
+                </a:solidFill>
+                <a:effectLst/>
+                <a:latin typeface="+mn-lt"/>
+                <a:ea typeface="+mn-ea"/>
+                <a:cs typeface="+mn-cs"/>
+              </a:defRPr>
+            </a:lvl3pPr>
+            <a:lvl4pPr marL="1543050" indent="-171450" algn="l" defTabSz="457200" rtl="0" eaLnBrk="1" latinLnBrk="0" hangingPunct="1">
+              <a:spcBef>
+                <a:spcPct val="20000"/>
+              </a:spcBef>
+              <a:spcAft>
+                <a:spcPts val="600"/>
+              </a:spcAft>
+              <a:buClr>
+                <a:schemeClr val="accent1"/>
+              </a:buClr>
+              <a:buSzPct val="115000"/>
+              <a:buFont typeface="Arial"/>
+              <a:buChar char="•"/>
+              <a:defRPr sz="1600" kern="1200" cap="none">
+                <a:solidFill>
+                  <a:schemeClr val="tx1">
+                    <a:lumMod val="85000"/>
+                    <a:lumOff val="15000"/>
+                  </a:schemeClr>
+                </a:solidFill>
+                <a:effectLst/>
+                <a:latin typeface="+mn-lt"/>
+                <a:ea typeface="+mn-ea"/>
+                <a:cs typeface="+mn-cs"/>
+              </a:defRPr>
+            </a:lvl4pPr>
+            <a:lvl5pPr marL="2000250" indent="-171450" algn="l" defTabSz="457200" rtl="0" eaLnBrk="1" latinLnBrk="0" hangingPunct="1">
+              <a:spcBef>
+                <a:spcPct val="20000"/>
+              </a:spcBef>
+              <a:spcAft>
+                <a:spcPts val="600"/>
+              </a:spcAft>
+              <a:buClr>
+                <a:schemeClr val="accent1"/>
+              </a:buClr>
+              <a:buSzPct val="115000"/>
+              <a:buFont typeface="Arial"/>
+              <a:buChar char="•"/>
+              <a:defRPr sz="1400" kern="1200" cap="none">
+                <a:solidFill>
+                  <a:schemeClr val="tx1">
+                    <a:lumMod val="85000"/>
+                    <a:lumOff val="15000"/>
+                  </a:schemeClr>
+                </a:solidFill>
+                <a:effectLst/>
+                <a:latin typeface="+mn-lt"/>
+                <a:ea typeface="+mn-ea"/>
+                <a:cs typeface="+mn-cs"/>
+              </a:defRPr>
+            </a:lvl5pPr>
+            <a:lvl6pPr marL="2514600" indent="-228600" algn="l" defTabSz="457200" rtl="0" eaLnBrk="1" latinLnBrk="0" hangingPunct="1">
+              <a:spcBef>
+                <a:spcPct val="20000"/>
+              </a:spcBef>
+              <a:spcAft>
+                <a:spcPts val="600"/>
+              </a:spcAft>
+              <a:buClr>
+                <a:schemeClr val="accent1"/>
+              </a:buClr>
+              <a:buSzPct val="115000"/>
+              <a:buFont typeface="Arial"/>
+              <a:buChar char="•"/>
+              <a:defRPr sz="1400" kern="1200" cap="none">
+                <a:solidFill>
+                  <a:schemeClr val="tx1">
+                    <a:lumMod val="85000"/>
+                    <a:lumOff val="15000"/>
+                  </a:schemeClr>
+                </a:solidFill>
+                <a:effectLst/>
+                <a:latin typeface="+mn-lt"/>
+                <a:ea typeface="+mn-ea"/>
+                <a:cs typeface="+mn-cs"/>
+              </a:defRPr>
+            </a:lvl6pPr>
+            <a:lvl7pPr marL="2971800" indent="-228600" algn="l" defTabSz="457200" rtl="0" eaLnBrk="1" latinLnBrk="0" hangingPunct="1">
+              <a:spcBef>
+                <a:spcPct val="20000"/>
+              </a:spcBef>
+              <a:spcAft>
+                <a:spcPts val="600"/>
+              </a:spcAft>
+              <a:buClr>
+                <a:schemeClr val="accent1"/>
+              </a:buClr>
+              <a:buSzPct val="115000"/>
+              <a:buFont typeface="Arial"/>
+              <a:buChar char="•"/>
+              <a:defRPr sz="1400" kern="1200" cap="none">
+                <a:solidFill>
+                  <a:schemeClr val="tx1">
+                    <a:lumMod val="85000"/>
+                    <a:lumOff val="15000"/>
+                  </a:schemeClr>
+                </a:solidFill>
+                <a:effectLst/>
+                <a:latin typeface="+mn-lt"/>
+                <a:ea typeface="+mn-ea"/>
+                <a:cs typeface="+mn-cs"/>
+              </a:defRPr>
+            </a:lvl7pPr>
+            <a:lvl8pPr marL="3429000" indent="-228600" algn="l" defTabSz="457200" rtl="0" eaLnBrk="1" latinLnBrk="0" hangingPunct="1">
+              <a:spcBef>
+                <a:spcPct val="20000"/>
+              </a:spcBef>
+              <a:spcAft>
+                <a:spcPts val="600"/>
+              </a:spcAft>
+              <a:buClr>
+                <a:schemeClr val="accent1"/>
+              </a:buClr>
+              <a:buSzPct val="115000"/>
+              <a:buFont typeface="Arial"/>
+              <a:buChar char="•"/>
+              <a:defRPr sz="1400" kern="1200" cap="none">
+                <a:solidFill>
+                  <a:schemeClr val="tx1">
+                    <a:lumMod val="85000"/>
+                    <a:lumOff val="15000"/>
+                  </a:schemeClr>
+                </a:solidFill>
+                <a:effectLst/>
+                <a:latin typeface="+mn-lt"/>
+                <a:ea typeface="+mn-ea"/>
+                <a:cs typeface="+mn-cs"/>
+              </a:defRPr>
+            </a:lvl8pPr>
+            <a:lvl9pPr marL="3886200" indent="-228600" algn="l" defTabSz="457200" rtl="0" eaLnBrk="1" latinLnBrk="0" hangingPunct="1">
+              <a:spcBef>
+                <a:spcPct val="20000"/>
+              </a:spcBef>
+              <a:spcAft>
+                <a:spcPts val="600"/>
+              </a:spcAft>
+              <a:buClr>
+                <a:schemeClr val="accent1"/>
+              </a:buClr>
+              <a:buSzPct val="115000"/>
+              <a:buFont typeface="Arial"/>
+              <a:buChar char="•"/>
+              <a:defRPr sz="1400" kern="1200" cap="none">
+                <a:solidFill>
+                  <a:schemeClr val="tx1">
+                    <a:lumMod val="85000"/>
+                    <a:lumOff val="15000"/>
+                  </a:schemeClr>
+                </a:solidFill>
+                <a:effectLst/>
+                <a:latin typeface="+mn-lt"/>
+                <a:ea typeface="+mn-ea"/>
+                <a:cs typeface="+mn-cs"/>
+              </a:defRPr>
+            </a:lvl9pPr>
+          </a:lstStyle>
+          <a:p>
+            <a:pPr marL="0" indent="0">
+              <a:buNone/>
+            </a:pPr>
+            <a:r>
+              <a:rPr lang="en-US" sz="1600" dirty="0" smtClean="0">
+                <a:sym typeface="Wingdings" panose="05000000000000000000" pitchFamily="2" charset="2"/>
+              </a:rPr>
+              <a:t></a:t>
+            </a:r>
+            <a:endParaRPr lang="en-US" sz="1600" dirty="0"/>
+          </a:p>
+        </p:txBody>
+      </p:sp>
+    </p:spTree>
+    <p:extLst>
+      <p:ext uri="{BB962C8B-B14F-4D97-AF65-F5344CB8AC3E}">
+        <p14:creationId xmlns:p14="http://schemas.microsoft.com/office/powerpoint/2010/main" val="2331878180"/>
+      </p:ext>
+    </p:extLst>
+  </p:cSld>
+  <p:clrMapOvr>
+    <a:masterClrMapping/>
+  </p:clrMapOvr>
+  <p:timing>
+    <p:tnLst>
+      <p:par>
+        <p:cTn id="1" dur="indefinite" restart="never" nodeType="tmRoot"/>
+      </p:par>
+    </p:tnLst>
+  </p:timing>
+</p:sld>
+</file>
+
+<file path=ppt/slides/slide26.xml><?xml version="1.0" encoding="utf-8"?>
+<p:sld xmlns:a="http://schemas.openxmlformats.org/drawingml/2006/main" xmlns:r="http://schemas.openxmlformats.org/officeDocument/2006/relationships" xmlns:p="http://schemas.openxmlformats.org/presentationml/2006/main">
+  <p:cSld>
+    <p:spTree>
+      <p:nvGrpSpPr>
+        <p:cNvPr id="1" name=""/>
+        <p:cNvGrpSpPr/>
+        <p:nvPr/>
+      </p:nvGrpSpPr>
+      <p:grpSpPr>
+        <a:xfrm>
+          <a:off x="0" y="0"/>
+          <a:ext cx="0" cy="0"/>
+          <a:chOff x="0" y="0"/>
+          <a:chExt cx="0" cy="0"/>
+        </a:xfrm>
+      </p:grpSpPr>
+      <p:sp>
+        <p:nvSpPr>
+          <p:cNvPr id="2" name="Title 1"/>
+          <p:cNvSpPr>
+            <a:spLocks noGrp="1"/>
+          </p:cNvSpPr>
+          <p:nvPr>
+            <p:ph type="title"/>
+          </p:nvPr>
+        </p:nvSpPr>
+        <p:spPr/>
+        <p:txBody>
           <a:bodyPr/>
           <a:lstStyle/>
           <a:p>
@@ -13902,6 +16192,596 @@
     <p:extLst>
       <p:ext uri="{BB962C8B-B14F-4D97-AF65-F5344CB8AC3E}">
         <p14:creationId xmlns:p14="http://schemas.microsoft.com/office/powerpoint/2010/main" val="4285735331"/>
+      </p:ext>
+    </p:extLst>
+  </p:cSld>
+  <p:clrMapOvr>
+    <a:masterClrMapping/>
+  </p:clrMapOvr>
+  <p:timing>
+    <p:tnLst>
+      <p:par>
+        <p:cTn id="1" dur="indefinite" restart="never" nodeType="tmRoot"/>
+      </p:par>
+    </p:tnLst>
+  </p:timing>
+</p:sld>
+</file>
+
+<file path=ppt/slides/slide27.xml><?xml version="1.0" encoding="utf-8"?>
+<p:sld xmlns:a="http://schemas.openxmlformats.org/drawingml/2006/main" xmlns:r="http://schemas.openxmlformats.org/officeDocument/2006/relationships" xmlns:p="http://schemas.openxmlformats.org/presentationml/2006/main">
+  <p:cSld>
+    <p:spTree>
+      <p:nvGrpSpPr>
+        <p:cNvPr id="1" name=""/>
+        <p:cNvGrpSpPr/>
+        <p:nvPr/>
+      </p:nvGrpSpPr>
+      <p:grpSpPr>
+        <a:xfrm>
+          <a:off x="0" y="0"/>
+          <a:ext cx="0" cy="0"/>
+          <a:chOff x="0" y="0"/>
+          <a:chExt cx="0" cy="0"/>
+        </a:xfrm>
+      </p:grpSpPr>
+      <p:sp>
+        <p:nvSpPr>
+          <p:cNvPr id="3" name="Content Placeholder 2"/>
+          <p:cNvSpPr txBox="1">
+            <a:spLocks/>
+          </p:cNvSpPr>
+          <p:nvPr/>
+        </p:nvSpPr>
+        <p:spPr>
+          <a:xfrm>
+            <a:off x="6253913" y="2611390"/>
+            <a:ext cx="4718304" cy="3310128"/>
+          </a:xfrm>
+          <a:prstGeom prst="rect">
+            <a:avLst/>
+          </a:prstGeom>
+        </p:spPr>
+        <p:txBody>
+          <a:bodyPr vert="horz" lIns="91440" tIns="45720" rIns="91440" bIns="45720" rtlCol="0" anchor="t">
+            <a:normAutofit/>
+          </a:bodyPr>
+          <a:lstStyle>
+            <a:lvl1pPr marL="285750" indent="-285750" algn="l" defTabSz="457200" rtl="0" eaLnBrk="1" latinLnBrk="0" hangingPunct="1">
+              <a:spcBef>
+                <a:spcPct val="20000"/>
+              </a:spcBef>
+              <a:spcAft>
+                <a:spcPts val="600"/>
+              </a:spcAft>
+              <a:buClr>
+                <a:schemeClr val="accent1"/>
+              </a:buClr>
+              <a:buSzPct val="115000"/>
+              <a:buFont typeface="Arial"/>
+              <a:buChar char="•"/>
+              <a:defRPr sz="2400" kern="1200" cap="none">
+                <a:solidFill>
+                  <a:schemeClr val="tx1">
+                    <a:lumMod val="85000"/>
+                    <a:lumOff val="15000"/>
+                  </a:schemeClr>
+                </a:solidFill>
+                <a:effectLst/>
+                <a:latin typeface="+mn-lt"/>
+                <a:ea typeface="+mn-ea"/>
+                <a:cs typeface="+mn-cs"/>
+              </a:defRPr>
+            </a:lvl1pPr>
+            <a:lvl2pPr marL="742950" indent="-285750" algn="l" defTabSz="457200" rtl="0" eaLnBrk="1" latinLnBrk="0" hangingPunct="1">
+              <a:spcBef>
+                <a:spcPct val="20000"/>
+              </a:spcBef>
+              <a:spcAft>
+                <a:spcPts val="600"/>
+              </a:spcAft>
+              <a:buClr>
+                <a:schemeClr val="accent1"/>
+              </a:buClr>
+              <a:buSzPct val="115000"/>
+              <a:buFont typeface="Arial"/>
+              <a:buChar char="•"/>
+              <a:defRPr sz="2000" kern="1200" cap="none">
+                <a:solidFill>
+                  <a:schemeClr val="tx1">
+                    <a:lumMod val="85000"/>
+                    <a:lumOff val="15000"/>
+                  </a:schemeClr>
+                </a:solidFill>
+                <a:effectLst/>
+                <a:latin typeface="+mn-lt"/>
+                <a:ea typeface="+mn-ea"/>
+                <a:cs typeface="+mn-cs"/>
+              </a:defRPr>
+            </a:lvl2pPr>
+            <a:lvl3pPr marL="1200150" indent="-285750" algn="l" defTabSz="457200" rtl="0" eaLnBrk="1" latinLnBrk="0" hangingPunct="1">
+              <a:spcBef>
+                <a:spcPct val="20000"/>
+              </a:spcBef>
+              <a:spcAft>
+                <a:spcPts val="600"/>
+              </a:spcAft>
+              <a:buClr>
+                <a:schemeClr val="accent1"/>
+              </a:buClr>
+              <a:buSzPct val="115000"/>
+              <a:buFont typeface="Arial"/>
+              <a:buChar char="•"/>
+              <a:defRPr sz="1800" kern="1200" cap="none">
+                <a:solidFill>
+                  <a:schemeClr val="tx1">
+                    <a:lumMod val="85000"/>
+                    <a:lumOff val="15000"/>
+                  </a:schemeClr>
+                </a:solidFill>
+                <a:effectLst/>
+                <a:latin typeface="+mn-lt"/>
+                <a:ea typeface="+mn-ea"/>
+                <a:cs typeface="+mn-cs"/>
+              </a:defRPr>
+            </a:lvl3pPr>
+            <a:lvl4pPr marL="1543050" indent="-171450" algn="l" defTabSz="457200" rtl="0" eaLnBrk="1" latinLnBrk="0" hangingPunct="1">
+              <a:spcBef>
+                <a:spcPct val="20000"/>
+              </a:spcBef>
+              <a:spcAft>
+                <a:spcPts val="600"/>
+              </a:spcAft>
+              <a:buClr>
+                <a:schemeClr val="accent1"/>
+              </a:buClr>
+              <a:buSzPct val="115000"/>
+              <a:buFont typeface="Arial"/>
+              <a:buChar char="•"/>
+              <a:defRPr sz="1600" kern="1200" cap="none">
+                <a:solidFill>
+                  <a:schemeClr val="tx1">
+                    <a:lumMod val="85000"/>
+                    <a:lumOff val="15000"/>
+                  </a:schemeClr>
+                </a:solidFill>
+                <a:effectLst/>
+                <a:latin typeface="+mn-lt"/>
+                <a:ea typeface="+mn-ea"/>
+                <a:cs typeface="+mn-cs"/>
+              </a:defRPr>
+            </a:lvl4pPr>
+            <a:lvl5pPr marL="2000250" indent="-171450" algn="l" defTabSz="457200" rtl="0" eaLnBrk="1" latinLnBrk="0" hangingPunct="1">
+              <a:spcBef>
+                <a:spcPct val="20000"/>
+              </a:spcBef>
+              <a:spcAft>
+                <a:spcPts val="600"/>
+              </a:spcAft>
+              <a:buClr>
+                <a:schemeClr val="accent1"/>
+              </a:buClr>
+              <a:buSzPct val="115000"/>
+              <a:buFont typeface="Arial"/>
+              <a:buChar char="•"/>
+              <a:defRPr sz="1400" kern="1200" cap="none">
+                <a:solidFill>
+                  <a:schemeClr val="tx1">
+                    <a:lumMod val="85000"/>
+                    <a:lumOff val="15000"/>
+                  </a:schemeClr>
+                </a:solidFill>
+                <a:effectLst/>
+                <a:latin typeface="+mn-lt"/>
+                <a:ea typeface="+mn-ea"/>
+                <a:cs typeface="+mn-cs"/>
+              </a:defRPr>
+            </a:lvl5pPr>
+            <a:lvl6pPr marL="2514600" indent="-228600" algn="l" defTabSz="457200" rtl="0" eaLnBrk="1" latinLnBrk="0" hangingPunct="1">
+              <a:spcBef>
+                <a:spcPct val="20000"/>
+              </a:spcBef>
+              <a:spcAft>
+                <a:spcPts val="600"/>
+              </a:spcAft>
+              <a:buClr>
+                <a:schemeClr val="accent1"/>
+              </a:buClr>
+              <a:buSzPct val="115000"/>
+              <a:buFont typeface="Arial"/>
+              <a:buChar char="•"/>
+              <a:defRPr sz="1400" kern="1200" cap="none">
+                <a:solidFill>
+                  <a:schemeClr val="tx1">
+                    <a:lumMod val="85000"/>
+                    <a:lumOff val="15000"/>
+                  </a:schemeClr>
+                </a:solidFill>
+                <a:effectLst/>
+                <a:latin typeface="+mn-lt"/>
+                <a:ea typeface="+mn-ea"/>
+                <a:cs typeface="+mn-cs"/>
+              </a:defRPr>
+            </a:lvl6pPr>
+            <a:lvl7pPr marL="2971800" indent="-228600" algn="l" defTabSz="457200" rtl="0" eaLnBrk="1" latinLnBrk="0" hangingPunct="1">
+              <a:spcBef>
+                <a:spcPct val="20000"/>
+              </a:spcBef>
+              <a:spcAft>
+                <a:spcPts val="600"/>
+              </a:spcAft>
+              <a:buClr>
+                <a:schemeClr val="accent1"/>
+              </a:buClr>
+              <a:buSzPct val="115000"/>
+              <a:buFont typeface="Arial"/>
+              <a:buChar char="•"/>
+              <a:defRPr sz="1400" kern="1200" cap="none">
+                <a:solidFill>
+                  <a:schemeClr val="tx1">
+                    <a:lumMod val="85000"/>
+                    <a:lumOff val="15000"/>
+                  </a:schemeClr>
+                </a:solidFill>
+                <a:effectLst/>
+                <a:latin typeface="+mn-lt"/>
+                <a:ea typeface="+mn-ea"/>
+                <a:cs typeface="+mn-cs"/>
+              </a:defRPr>
+            </a:lvl7pPr>
+            <a:lvl8pPr marL="3429000" indent="-228600" algn="l" defTabSz="457200" rtl="0" eaLnBrk="1" latinLnBrk="0" hangingPunct="1">
+              <a:spcBef>
+                <a:spcPct val="20000"/>
+              </a:spcBef>
+              <a:spcAft>
+                <a:spcPts val="600"/>
+              </a:spcAft>
+              <a:buClr>
+                <a:schemeClr val="accent1"/>
+              </a:buClr>
+              <a:buSzPct val="115000"/>
+              <a:buFont typeface="Arial"/>
+              <a:buChar char="•"/>
+              <a:defRPr sz="1400" kern="1200" cap="none">
+                <a:solidFill>
+                  <a:schemeClr val="tx1">
+                    <a:lumMod val="85000"/>
+                    <a:lumOff val="15000"/>
+                  </a:schemeClr>
+                </a:solidFill>
+                <a:effectLst/>
+                <a:latin typeface="+mn-lt"/>
+                <a:ea typeface="+mn-ea"/>
+                <a:cs typeface="+mn-cs"/>
+              </a:defRPr>
+            </a:lvl8pPr>
+            <a:lvl9pPr marL="3886200" indent="-228600" algn="l" defTabSz="457200" rtl="0" eaLnBrk="1" latinLnBrk="0" hangingPunct="1">
+              <a:spcBef>
+                <a:spcPct val="20000"/>
+              </a:spcBef>
+              <a:spcAft>
+                <a:spcPts val="600"/>
+              </a:spcAft>
+              <a:buClr>
+                <a:schemeClr val="accent1"/>
+              </a:buClr>
+              <a:buSzPct val="115000"/>
+              <a:buFont typeface="Arial"/>
+              <a:buChar char="•"/>
+              <a:defRPr sz="1400" kern="1200" cap="none">
+                <a:solidFill>
+                  <a:schemeClr val="tx1">
+                    <a:lumMod val="85000"/>
+                    <a:lumOff val="15000"/>
+                  </a:schemeClr>
+                </a:solidFill>
+                <a:effectLst/>
+                <a:latin typeface="+mn-lt"/>
+                <a:ea typeface="+mn-ea"/>
+                <a:cs typeface="+mn-cs"/>
+              </a:defRPr>
+            </a:lvl9pPr>
+          </a:lstStyle>
+          <a:p>
+            <a:pPr lvl="1"/>
+            <a:r>
+              <a:rPr lang="en-US" dirty="0" smtClean="0"/>
+              <a:t>To </a:t>
+            </a:r>
+            <a:r>
+              <a:rPr lang="en-US" dirty="0" smtClean="0"/>
+              <a:t>retrieve your online repositories locally, select “Pull” under the “Repository” heading</a:t>
+            </a:r>
+          </a:p>
+          <a:p>
+            <a:pPr lvl="1"/>
+            <a:r>
+              <a:rPr lang="en-US" dirty="0" smtClean="0"/>
+              <a:t>After </a:t>
+            </a:r>
+          </a:p>
+          <a:p>
+            <a:pPr lvl="1"/>
+            <a:endParaRPr lang="en-US" dirty="0"/>
+          </a:p>
+        </p:txBody>
+      </p:sp>
+      <p:sp>
+        <p:nvSpPr>
+          <p:cNvPr id="4" name="Content Placeholder 2"/>
+          <p:cNvSpPr txBox="1">
+            <a:spLocks/>
+          </p:cNvSpPr>
+          <p:nvPr/>
+        </p:nvSpPr>
+        <p:spPr>
+          <a:xfrm>
+            <a:off x="1298448" y="2560320"/>
+            <a:ext cx="4718304" cy="1288097"/>
+          </a:xfrm>
+          <a:prstGeom prst="rect">
+            <a:avLst/>
+          </a:prstGeom>
+        </p:spPr>
+        <p:txBody>
+          <a:bodyPr>
+            <a:normAutofit fontScale="85000" lnSpcReduction="20000"/>
+          </a:bodyPr>
+          <a:lstStyle>
+            <a:lvl1pPr marL="285750" indent="-285750" algn="l" defTabSz="457200" rtl="0" eaLnBrk="1" latinLnBrk="0" hangingPunct="1">
+              <a:spcBef>
+                <a:spcPct val="20000"/>
+              </a:spcBef>
+              <a:spcAft>
+                <a:spcPts val="600"/>
+              </a:spcAft>
+              <a:buClr>
+                <a:schemeClr val="accent1"/>
+              </a:buClr>
+              <a:buSzPct val="115000"/>
+              <a:buFont typeface="Arial"/>
+              <a:buChar char="•"/>
+              <a:defRPr sz="2400" kern="1200" cap="none">
+                <a:solidFill>
+                  <a:schemeClr val="tx1">
+                    <a:lumMod val="85000"/>
+                    <a:lumOff val="15000"/>
+                  </a:schemeClr>
+                </a:solidFill>
+                <a:effectLst/>
+                <a:latin typeface="+mn-lt"/>
+                <a:ea typeface="+mn-ea"/>
+                <a:cs typeface="+mn-cs"/>
+              </a:defRPr>
+            </a:lvl1pPr>
+            <a:lvl2pPr marL="742950" indent="-285750" algn="l" defTabSz="457200" rtl="0" eaLnBrk="1" latinLnBrk="0" hangingPunct="1">
+              <a:spcBef>
+                <a:spcPct val="20000"/>
+              </a:spcBef>
+              <a:spcAft>
+                <a:spcPts val="600"/>
+              </a:spcAft>
+              <a:buClr>
+                <a:schemeClr val="accent1"/>
+              </a:buClr>
+              <a:buSzPct val="115000"/>
+              <a:buFont typeface="Arial"/>
+              <a:buChar char="•"/>
+              <a:defRPr sz="2000" kern="1200" cap="none">
+                <a:solidFill>
+                  <a:schemeClr val="tx1">
+                    <a:lumMod val="85000"/>
+                    <a:lumOff val="15000"/>
+                  </a:schemeClr>
+                </a:solidFill>
+                <a:effectLst/>
+                <a:latin typeface="+mn-lt"/>
+                <a:ea typeface="+mn-ea"/>
+                <a:cs typeface="+mn-cs"/>
+              </a:defRPr>
+            </a:lvl2pPr>
+            <a:lvl3pPr marL="1200150" indent="-285750" algn="l" defTabSz="457200" rtl="0" eaLnBrk="1" latinLnBrk="0" hangingPunct="1">
+              <a:spcBef>
+                <a:spcPct val="20000"/>
+              </a:spcBef>
+              <a:spcAft>
+                <a:spcPts val="600"/>
+              </a:spcAft>
+              <a:buClr>
+                <a:schemeClr val="accent1"/>
+              </a:buClr>
+              <a:buSzPct val="115000"/>
+              <a:buFont typeface="Arial"/>
+              <a:buChar char="•"/>
+              <a:defRPr sz="1800" kern="1200" cap="none">
+                <a:solidFill>
+                  <a:schemeClr val="tx1">
+                    <a:lumMod val="85000"/>
+                    <a:lumOff val="15000"/>
+                  </a:schemeClr>
+                </a:solidFill>
+                <a:effectLst/>
+                <a:latin typeface="+mn-lt"/>
+                <a:ea typeface="+mn-ea"/>
+                <a:cs typeface="+mn-cs"/>
+              </a:defRPr>
+            </a:lvl3pPr>
+            <a:lvl4pPr marL="1543050" indent="-171450" algn="l" defTabSz="457200" rtl="0" eaLnBrk="1" latinLnBrk="0" hangingPunct="1">
+              <a:spcBef>
+                <a:spcPct val="20000"/>
+              </a:spcBef>
+              <a:spcAft>
+                <a:spcPts val="600"/>
+              </a:spcAft>
+              <a:buClr>
+                <a:schemeClr val="accent1"/>
+              </a:buClr>
+              <a:buSzPct val="115000"/>
+              <a:buFont typeface="Arial"/>
+              <a:buChar char="•"/>
+              <a:defRPr sz="1600" kern="1200" cap="none">
+                <a:solidFill>
+                  <a:schemeClr val="tx1">
+                    <a:lumMod val="85000"/>
+                    <a:lumOff val="15000"/>
+                  </a:schemeClr>
+                </a:solidFill>
+                <a:effectLst/>
+                <a:latin typeface="+mn-lt"/>
+                <a:ea typeface="+mn-ea"/>
+                <a:cs typeface="+mn-cs"/>
+              </a:defRPr>
+            </a:lvl4pPr>
+            <a:lvl5pPr marL="2000250" indent="-171450" algn="l" defTabSz="457200" rtl="0" eaLnBrk="1" latinLnBrk="0" hangingPunct="1">
+              <a:spcBef>
+                <a:spcPct val="20000"/>
+              </a:spcBef>
+              <a:spcAft>
+                <a:spcPts val="600"/>
+              </a:spcAft>
+              <a:buClr>
+                <a:schemeClr val="accent1"/>
+              </a:buClr>
+              <a:buSzPct val="115000"/>
+              <a:buFont typeface="Arial"/>
+              <a:buChar char="•"/>
+              <a:defRPr sz="1400" kern="1200" cap="none">
+                <a:solidFill>
+                  <a:schemeClr val="tx1">
+                    <a:lumMod val="85000"/>
+                    <a:lumOff val="15000"/>
+                  </a:schemeClr>
+                </a:solidFill>
+                <a:effectLst/>
+                <a:latin typeface="+mn-lt"/>
+                <a:ea typeface="+mn-ea"/>
+                <a:cs typeface="+mn-cs"/>
+              </a:defRPr>
+            </a:lvl5pPr>
+            <a:lvl6pPr marL="2514600" indent="-228600" algn="l" defTabSz="457200" rtl="0" eaLnBrk="1" latinLnBrk="0" hangingPunct="1">
+              <a:spcBef>
+                <a:spcPct val="20000"/>
+              </a:spcBef>
+              <a:spcAft>
+                <a:spcPts val="600"/>
+              </a:spcAft>
+              <a:buClr>
+                <a:schemeClr val="accent1"/>
+              </a:buClr>
+              <a:buSzPct val="115000"/>
+              <a:buFont typeface="Arial"/>
+              <a:buChar char="•"/>
+              <a:defRPr sz="1400" kern="1200" cap="none">
+                <a:solidFill>
+                  <a:schemeClr val="tx1">
+                    <a:lumMod val="85000"/>
+                    <a:lumOff val="15000"/>
+                  </a:schemeClr>
+                </a:solidFill>
+                <a:effectLst/>
+                <a:latin typeface="+mn-lt"/>
+                <a:ea typeface="+mn-ea"/>
+                <a:cs typeface="+mn-cs"/>
+              </a:defRPr>
+            </a:lvl6pPr>
+            <a:lvl7pPr marL="2971800" indent="-228600" algn="l" defTabSz="457200" rtl="0" eaLnBrk="1" latinLnBrk="0" hangingPunct="1">
+              <a:spcBef>
+                <a:spcPct val="20000"/>
+              </a:spcBef>
+              <a:spcAft>
+                <a:spcPts val="600"/>
+              </a:spcAft>
+              <a:buClr>
+                <a:schemeClr val="accent1"/>
+              </a:buClr>
+              <a:buSzPct val="115000"/>
+              <a:buFont typeface="Arial"/>
+              <a:buChar char="•"/>
+              <a:defRPr sz="1400" kern="1200" cap="none">
+                <a:solidFill>
+                  <a:schemeClr val="tx1">
+                    <a:lumMod val="85000"/>
+                    <a:lumOff val="15000"/>
+                  </a:schemeClr>
+                </a:solidFill>
+                <a:effectLst/>
+                <a:latin typeface="+mn-lt"/>
+                <a:ea typeface="+mn-ea"/>
+                <a:cs typeface="+mn-cs"/>
+              </a:defRPr>
+            </a:lvl7pPr>
+            <a:lvl8pPr marL="3429000" indent="-228600" algn="l" defTabSz="457200" rtl="0" eaLnBrk="1" latinLnBrk="0" hangingPunct="1">
+              <a:spcBef>
+                <a:spcPct val="20000"/>
+              </a:spcBef>
+              <a:spcAft>
+                <a:spcPts val="600"/>
+              </a:spcAft>
+              <a:buClr>
+                <a:schemeClr val="accent1"/>
+              </a:buClr>
+              <a:buSzPct val="115000"/>
+              <a:buFont typeface="Arial"/>
+              <a:buChar char="•"/>
+              <a:defRPr sz="1400" kern="1200" cap="none">
+                <a:solidFill>
+                  <a:schemeClr val="tx1">
+                    <a:lumMod val="85000"/>
+                    <a:lumOff val="15000"/>
+                  </a:schemeClr>
+                </a:solidFill>
+                <a:effectLst/>
+                <a:latin typeface="+mn-lt"/>
+                <a:ea typeface="+mn-ea"/>
+                <a:cs typeface="+mn-cs"/>
+              </a:defRPr>
+            </a:lvl8pPr>
+            <a:lvl9pPr marL="3886200" indent="-228600" algn="l" defTabSz="457200" rtl="0" eaLnBrk="1" latinLnBrk="0" hangingPunct="1">
+              <a:spcBef>
+                <a:spcPct val="20000"/>
+              </a:spcBef>
+              <a:spcAft>
+                <a:spcPts val="600"/>
+              </a:spcAft>
+              <a:buClr>
+                <a:schemeClr val="accent1"/>
+              </a:buClr>
+              <a:buSzPct val="115000"/>
+              <a:buFont typeface="Arial"/>
+              <a:buChar char="•"/>
+              <a:defRPr sz="1400" kern="1200" cap="none">
+                <a:solidFill>
+                  <a:schemeClr val="tx1">
+                    <a:lumMod val="85000"/>
+                    <a:lumOff val="15000"/>
+                  </a:schemeClr>
+                </a:solidFill>
+                <a:effectLst/>
+                <a:latin typeface="+mn-lt"/>
+                <a:ea typeface="+mn-ea"/>
+                <a:cs typeface="+mn-cs"/>
+              </a:defRPr>
+            </a:lvl9pPr>
+          </a:lstStyle>
+          <a:p>
+            <a:r>
+              <a:rPr lang="en-US" smtClean="0"/>
+              <a:t>Repositories in GitHub Desktop are essentially local copies of your online repositories</a:t>
+            </a:r>
+          </a:p>
+          <a:p>
+            <a:r>
+              <a:rPr lang="en-US" smtClean="0"/>
+              <a:t>They are referred to as “clones”</a:t>
+            </a:r>
+            <a:endParaRPr lang="en-US" dirty="0" smtClean="0"/>
+          </a:p>
+        </p:txBody>
+      </p:sp>
+    </p:spTree>
+    <p:extLst>
+      <p:ext uri="{BB962C8B-B14F-4D97-AF65-F5344CB8AC3E}">
+        <p14:creationId xmlns:p14="http://schemas.microsoft.com/office/powerpoint/2010/main" val="3331918802"/>
       </p:ext>
     </p:extLst>
   </p:cSld>

</xml_diff>

<commit_message>
Updated Section "GitHub Desktop"
Added several new slides explaining how to work with your GitHub account locally using GitHub Desktop.
</commit_message>
<xml_diff>
--- a/Using R Notebook with Version Control.pptx
+++ b/Using R Notebook with Version Control.pptx
@@ -4,6 +4,9 @@
   <p:sldMasterIdLst>
     <p:sldMasterId id="2147483648" r:id="rId1"/>
   </p:sldMasterIdLst>
+  <p:notesMasterIdLst>
+    <p:notesMasterId r:id="rId31"/>
+  </p:notesMasterIdLst>
   <p:sldIdLst>
     <p:sldId id="256" r:id="rId2"/>
     <p:sldId id="277" r:id="rId3"/>
@@ -30,8 +33,10 @@
     <p:sldId id="281" r:id="rId24"/>
     <p:sldId id="282" r:id="rId25"/>
     <p:sldId id="284" r:id="rId26"/>
-    <p:sldId id="264" r:id="rId27"/>
-    <p:sldId id="283" r:id="rId28"/>
+    <p:sldId id="286" r:id="rId27"/>
+    <p:sldId id="285" r:id="rId28"/>
+    <p:sldId id="264" r:id="rId29"/>
+    <p:sldId id="283" r:id="rId30"/>
   </p:sldIdLst>
   <p:sldSz cx="12192000" cy="6858000"/>
   <p:notesSz cx="6858000" cy="9144000"/>
@@ -136,6 +141,440 @@
     </p:ext>
   </p:extLst>
 </p:presentation>
+</file>
+
+<file path=ppt/notesMasters/notesMaster1.xml><?xml version="1.0" encoding="utf-8"?>
+<p:notesMaster xmlns:a="http://schemas.openxmlformats.org/drawingml/2006/main" xmlns:r="http://schemas.openxmlformats.org/officeDocument/2006/relationships" xmlns:p="http://schemas.openxmlformats.org/presentationml/2006/main">
+  <p:cSld>
+    <p:bg>
+      <p:bgRef idx="1001">
+        <a:schemeClr val="bg1"/>
+      </p:bgRef>
+    </p:bg>
+    <p:spTree>
+      <p:nvGrpSpPr>
+        <p:cNvPr id="1" name=""/>
+        <p:cNvGrpSpPr/>
+        <p:nvPr/>
+      </p:nvGrpSpPr>
+      <p:grpSpPr>
+        <a:xfrm>
+          <a:off x="0" y="0"/>
+          <a:ext cx="0" cy="0"/>
+          <a:chOff x="0" y="0"/>
+          <a:chExt cx="0" cy="0"/>
+        </a:xfrm>
+      </p:grpSpPr>
+      <p:sp>
+        <p:nvSpPr>
+          <p:cNvPr id="2" name="Header Placeholder 1"/>
+          <p:cNvSpPr>
+            <a:spLocks noGrp="1"/>
+          </p:cNvSpPr>
+          <p:nvPr>
+            <p:ph type="hdr" sz="quarter"/>
+          </p:nvPr>
+        </p:nvSpPr>
+        <p:spPr>
+          <a:xfrm>
+            <a:off x="0" y="0"/>
+            <a:ext cx="2971800" cy="458788"/>
+          </a:xfrm>
+          <a:prstGeom prst="rect">
+            <a:avLst/>
+          </a:prstGeom>
+        </p:spPr>
+        <p:txBody>
+          <a:bodyPr vert="horz" lIns="91440" tIns="45720" rIns="91440" bIns="45720" rtlCol="0"/>
+          <a:lstStyle>
+            <a:lvl1pPr algn="l">
+              <a:defRPr sz="1200"/>
+            </a:lvl1pPr>
+          </a:lstStyle>
+          <a:p>
+            <a:endParaRPr lang="en-US"/>
+          </a:p>
+        </p:txBody>
+      </p:sp>
+      <p:sp>
+        <p:nvSpPr>
+          <p:cNvPr id="3" name="Date Placeholder 2"/>
+          <p:cNvSpPr>
+            <a:spLocks noGrp="1"/>
+          </p:cNvSpPr>
+          <p:nvPr>
+            <p:ph type="dt" idx="1"/>
+          </p:nvPr>
+        </p:nvSpPr>
+        <p:spPr>
+          <a:xfrm>
+            <a:off x="3884613" y="0"/>
+            <a:ext cx="2971800" cy="458788"/>
+          </a:xfrm>
+          <a:prstGeom prst="rect">
+            <a:avLst/>
+          </a:prstGeom>
+        </p:spPr>
+        <p:txBody>
+          <a:bodyPr vert="horz" lIns="91440" tIns="45720" rIns="91440" bIns="45720" rtlCol="0"/>
+          <a:lstStyle>
+            <a:lvl1pPr algn="r">
+              <a:defRPr sz="1200"/>
+            </a:lvl1pPr>
+          </a:lstStyle>
+          <a:p>
+            <a:fld id="{2D7CF274-F099-4CC1-AFD2-DA3527CC39C1}" type="datetimeFigureOut">
+              <a:rPr lang="en-US" smtClean="0"/>
+              <a:t>1/25/2019</a:t>
+            </a:fld>
+            <a:endParaRPr lang="en-US"/>
+          </a:p>
+        </p:txBody>
+      </p:sp>
+      <p:sp>
+        <p:nvSpPr>
+          <p:cNvPr id="4" name="Slide Image Placeholder 3"/>
+          <p:cNvSpPr>
+            <a:spLocks noGrp="1" noRot="1" noChangeAspect="1"/>
+          </p:cNvSpPr>
+          <p:nvPr>
+            <p:ph type="sldImg" idx="2"/>
+          </p:nvPr>
+        </p:nvSpPr>
+        <p:spPr>
+          <a:xfrm>
+            <a:off x="685800" y="1143000"/>
+            <a:ext cx="5486400" cy="3086100"/>
+          </a:xfrm>
+          <a:prstGeom prst="rect">
+            <a:avLst/>
+          </a:prstGeom>
+          <a:noFill/>
+          <a:ln w="12700">
+            <a:solidFill>
+              <a:prstClr val="black"/>
+            </a:solidFill>
+          </a:ln>
+        </p:spPr>
+        <p:txBody>
+          <a:bodyPr vert="horz" lIns="91440" tIns="45720" rIns="91440" bIns="45720" rtlCol="0" anchor="ctr"/>
+          <a:lstStyle/>
+          <a:p>
+            <a:endParaRPr lang="en-US"/>
+          </a:p>
+        </p:txBody>
+      </p:sp>
+      <p:sp>
+        <p:nvSpPr>
+          <p:cNvPr id="5" name="Notes Placeholder 4"/>
+          <p:cNvSpPr>
+            <a:spLocks noGrp="1"/>
+          </p:cNvSpPr>
+          <p:nvPr>
+            <p:ph type="body" sz="quarter" idx="3"/>
+          </p:nvPr>
+        </p:nvSpPr>
+        <p:spPr>
+          <a:xfrm>
+            <a:off x="685800" y="4400550"/>
+            <a:ext cx="5486400" cy="3600450"/>
+          </a:xfrm>
+          <a:prstGeom prst="rect">
+            <a:avLst/>
+          </a:prstGeom>
+        </p:spPr>
+        <p:txBody>
+          <a:bodyPr vert="horz" lIns="91440" tIns="45720" rIns="91440" bIns="45720" rtlCol="0"/>
+          <a:lstStyle/>
+          <a:p>
+            <a:pPr lvl="0"/>
+            <a:r>
+              <a:rPr lang="en-US" smtClean="0"/>
+              <a:t>Click to edit Master text styles</a:t>
+            </a:r>
+          </a:p>
+          <a:p>
+            <a:pPr lvl="1"/>
+            <a:r>
+              <a:rPr lang="en-US" smtClean="0"/>
+              <a:t>Second level</a:t>
+            </a:r>
+          </a:p>
+          <a:p>
+            <a:pPr lvl="2"/>
+            <a:r>
+              <a:rPr lang="en-US" smtClean="0"/>
+              <a:t>Third level</a:t>
+            </a:r>
+          </a:p>
+          <a:p>
+            <a:pPr lvl="3"/>
+            <a:r>
+              <a:rPr lang="en-US" smtClean="0"/>
+              <a:t>Fourth level</a:t>
+            </a:r>
+          </a:p>
+          <a:p>
+            <a:pPr lvl="4"/>
+            <a:r>
+              <a:rPr lang="en-US" smtClean="0"/>
+              <a:t>Fifth level</a:t>
+            </a:r>
+            <a:endParaRPr lang="en-US"/>
+          </a:p>
+        </p:txBody>
+      </p:sp>
+      <p:sp>
+        <p:nvSpPr>
+          <p:cNvPr id="6" name="Footer Placeholder 5"/>
+          <p:cNvSpPr>
+            <a:spLocks noGrp="1"/>
+          </p:cNvSpPr>
+          <p:nvPr>
+            <p:ph type="ftr" sz="quarter" idx="4"/>
+          </p:nvPr>
+        </p:nvSpPr>
+        <p:spPr>
+          <a:xfrm>
+            <a:off x="0" y="8685213"/>
+            <a:ext cx="2971800" cy="458787"/>
+          </a:xfrm>
+          <a:prstGeom prst="rect">
+            <a:avLst/>
+          </a:prstGeom>
+        </p:spPr>
+        <p:txBody>
+          <a:bodyPr vert="horz" lIns="91440" tIns="45720" rIns="91440" bIns="45720" rtlCol="0" anchor="b"/>
+          <a:lstStyle>
+            <a:lvl1pPr algn="l">
+              <a:defRPr sz="1200"/>
+            </a:lvl1pPr>
+          </a:lstStyle>
+          <a:p>
+            <a:endParaRPr lang="en-US"/>
+          </a:p>
+        </p:txBody>
+      </p:sp>
+      <p:sp>
+        <p:nvSpPr>
+          <p:cNvPr id="7" name="Slide Number Placeholder 6"/>
+          <p:cNvSpPr>
+            <a:spLocks noGrp="1"/>
+          </p:cNvSpPr>
+          <p:nvPr>
+            <p:ph type="sldNum" sz="quarter" idx="5"/>
+          </p:nvPr>
+        </p:nvSpPr>
+        <p:spPr>
+          <a:xfrm>
+            <a:off x="3884613" y="8685213"/>
+            <a:ext cx="2971800" cy="458787"/>
+          </a:xfrm>
+          <a:prstGeom prst="rect">
+            <a:avLst/>
+          </a:prstGeom>
+        </p:spPr>
+        <p:txBody>
+          <a:bodyPr vert="horz" lIns="91440" tIns="45720" rIns="91440" bIns="45720" rtlCol="0" anchor="b"/>
+          <a:lstStyle>
+            <a:lvl1pPr algn="r">
+              <a:defRPr sz="1200"/>
+            </a:lvl1pPr>
+          </a:lstStyle>
+          <a:p>
+            <a:fld id="{B353BB39-829C-4BBE-94EC-D69CBA55947C}" type="slidenum">
+              <a:rPr lang="en-US" smtClean="0"/>
+              <a:t>‹#›</a:t>
+            </a:fld>
+            <a:endParaRPr lang="en-US"/>
+          </a:p>
+        </p:txBody>
+      </p:sp>
+    </p:spTree>
+    <p:extLst>
+      <p:ext uri="{BB962C8B-B14F-4D97-AF65-F5344CB8AC3E}">
+        <p14:creationId xmlns:p14="http://schemas.microsoft.com/office/powerpoint/2010/main" val="3572500981"/>
+      </p:ext>
+    </p:extLst>
+  </p:cSld>
+  <p:clrMap bg1="lt1" tx1="dk1" bg2="lt2" tx2="dk2" accent1="accent1" accent2="accent2" accent3="accent3" accent4="accent4" accent5="accent5" accent6="accent6" hlink="hlink" folHlink="folHlink"/>
+  <p:notesStyle>
+    <a:lvl1pPr marL="0" algn="l" defTabSz="914400" rtl="0" eaLnBrk="1" latinLnBrk="0" hangingPunct="1">
+      <a:defRPr sz="1200" kern="1200">
+        <a:solidFill>
+          <a:schemeClr val="tx1"/>
+        </a:solidFill>
+        <a:latin typeface="+mn-lt"/>
+        <a:ea typeface="+mn-ea"/>
+        <a:cs typeface="+mn-cs"/>
+      </a:defRPr>
+    </a:lvl1pPr>
+    <a:lvl2pPr marL="457200" algn="l" defTabSz="914400" rtl="0" eaLnBrk="1" latinLnBrk="0" hangingPunct="1">
+      <a:defRPr sz="1200" kern="1200">
+        <a:solidFill>
+          <a:schemeClr val="tx1"/>
+        </a:solidFill>
+        <a:latin typeface="+mn-lt"/>
+        <a:ea typeface="+mn-ea"/>
+        <a:cs typeface="+mn-cs"/>
+      </a:defRPr>
+    </a:lvl2pPr>
+    <a:lvl3pPr marL="914400" algn="l" defTabSz="914400" rtl="0" eaLnBrk="1" latinLnBrk="0" hangingPunct="1">
+      <a:defRPr sz="1200" kern="1200">
+        <a:solidFill>
+          <a:schemeClr val="tx1"/>
+        </a:solidFill>
+        <a:latin typeface="+mn-lt"/>
+        <a:ea typeface="+mn-ea"/>
+        <a:cs typeface="+mn-cs"/>
+      </a:defRPr>
+    </a:lvl3pPr>
+    <a:lvl4pPr marL="1371600" algn="l" defTabSz="914400" rtl="0" eaLnBrk="1" latinLnBrk="0" hangingPunct="1">
+      <a:defRPr sz="1200" kern="1200">
+        <a:solidFill>
+          <a:schemeClr val="tx1"/>
+        </a:solidFill>
+        <a:latin typeface="+mn-lt"/>
+        <a:ea typeface="+mn-ea"/>
+        <a:cs typeface="+mn-cs"/>
+      </a:defRPr>
+    </a:lvl4pPr>
+    <a:lvl5pPr marL="1828800" algn="l" defTabSz="914400" rtl="0" eaLnBrk="1" latinLnBrk="0" hangingPunct="1">
+      <a:defRPr sz="1200" kern="1200">
+        <a:solidFill>
+          <a:schemeClr val="tx1"/>
+        </a:solidFill>
+        <a:latin typeface="+mn-lt"/>
+        <a:ea typeface="+mn-ea"/>
+        <a:cs typeface="+mn-cs"/>
+      </a:defRPr>
+    </a:lvl5pPr>
+    <a:lvl6pPr marL="2286000" algn="l" defTabSz="914400" rtl="0" eaLnBrk="1" latinLnBrk="0" hangingPunct="1">
+      <a:defRPr sz="1200" kern="1200">
+        <a:solidFill>
+          <a:schemeClr val="tx1"/>
+        </a:solidFill>
+        <a:latin typeface="+mn-lt"/>
+        <a:ea typeface="+mn-ea"/>
+        <a:cs typeface="+mn-cs"/>
+      </a:defRPr>
+    </a:lvl6pPr>
+    <a:lvl7pPr marL="2743200" algn="l" defTabSz="914400" rtl="0" eaLnBrk="1" latinLnBrk="0" hangingPunct="1">
+      <a:defRPr sz="1200" kern="1200">
+        <a:solidFill>
+          <a:schemeClr val="tx1"/>
+        </a:solidFill>
+        <a:latin typeface="+mn-lt"/>
+        <a:ea typeface="+mn-ea"/>
+        <a:cs typeface="+mn-cs"/>
+      </a:defRPr>
+    </a:lvl7pPr>
+    <a:lvl8pPr marL="3200400" algn="l" defTabSz="914400" rtl="0" eaLnBrk="1" latinLnBrk="0" hangingPunct="1">
+      <a:defRPr sz="1200" kern="1200">
+        <a:solidFill>
+          <a:schemeClr val="tx1"/>
+        </a:solidFill>
+        <a:latin typeface="+mn-lt"/>
+        <a:ea typeface="+mn-ea"/>
+        <a:cs typeface="+mn-cs"/>
+      </a:defRPr>
+    </a:lvl8pPr>
+    <a:lvl9pPr marL="3657600" algn="l" defTabSz="914400" rtl="0" eaLnBrk="1" latinLnBrk="0" hangingPunct="1">
+      <a:defRPr sz="1200" kern="1200">
+        <a:solidFill>
+          <a:schemeClr val="tx1"/>
+        </a:solidFill>
+        <a:latin typeface="+mn-lt"/>
+        <a:ea typeface="+mn-ea"/>
+        <a:cs typeface="+mn-cs"/>
+      </a:defRPr>
+    </a:lvl9pPr>
+  </p:notesStyle>
+</p:notesMaster>
+</file>
+
+<file path=ppt/notesSlides/notesSlide1.xml><?xml version="1.0" encoding="utf-8"?>
+<p:notes xmlns:a="http://schemas.openxmlformats.org/drawingml/2006/main" xmlns:r="http://schemas.openxmlformats.org/officeDocument/2006/relationships" xmlns:p="http://schemas.openxmlformats.org/presentationml/2006/main">
+  <p:cSld>
+    <p:spTree>
+      <p:nvGrpSpPr>
+        <p:cNvPr id="1" name=""/>
+        <p:cNvGrpSpPr/>
+        <p:nvPr/>
+      </p:nvGrpSpPr>
+      <p:grpSpPr>
+        <a:xfrm>
+          <a:off x="0" y="0"/>
+          <a:ext cx="0" cy="0"/>
+          <a:chOff x="0" y="0"/>
+          <a:chExt cx="0" cy="0"/>
+        </a:xfrm>
+      </p:grpSpPr>
+      <p:sp>
+        <p:nvSpPr>
+          <p:cNvPr id="2" name="Slide Image Placeholder 1"/>
+          <p:cNvSpPr>
+            <a:spLocks noGrp="1" noRot="1" noChangeAspect="1"/>
+          </p:cNvSpPr>
+          <p:nvPr>
+            <p:ph type="sldImg"/>
+          </p:nvPr>
+        </p:nvSpPr>
+        <p:spPr/>
+      </p:sp>
+      <p:sp>
+        <p:nvSpPr>
+          <p:cNvPr id="3" name="Notes Placeholder 2"/>
+          <p:cNvSpPr>
+            <a:spLocks noGrp="1"/>
+          </p:cNvSpPr>
+          <p:nvPr>
+            <p:ph type="body" idx="1"/>
+          </p:nvPr>
+        </p:nvSpPr>
+        <p:spPr/>
+        <p:txBody>
+          <a:bodyPr/>
+          <a:lstStyle/>
+          <a:p>
+            <a:endParaRPr lang="en-US" dirty="0"/>
+          </a:p>
+        </p:txBody>
+      </p:sp>
+      <p:sp>
+        <p:nvSpPr>
+          <p:cNvPr id="4" name="Slide Number Placeholder 3"/>
+          <p:cNvSpPr>
+            <a:spLocks noGrp="1"/>
+          </p:cNvSpPr>
+          <p:nvPr>
+            <p:ph type="sldNum" sz="quarter" idx="10"/>
+          </p:nvPr>
+        </p:nvSpPr>
+        <p:spPr/>
+        <p:txBody>
+          <a:bodyPr/>
+          <a:lstStyle/>
+          <a:p>
+            <a:fld id="{B353BB39-829C-4BBE-94EC-D69CBA55947C}" type="slidenum">
+              <a:rPr lang="en-US" smtClean="0"/>
+              <a:t>27</a:t>
+            </a:fld>
+            <a:endParaRPr lang="en-US"/>
+          </a:p>
+        </p:txBody>
+      </p:sp>
+    </p:spTree>
+    <p:extLst>
+      <p:ext uri="{BB962C8B-B14F-4D97-AF65-F5344CB8AC3E}">
+        <p14:creationId xmlns:p14="http://schemas.microsoft.com/office/powerpoint/2010/main" val="94645674"/>
+      </p:ext>
+    </p:extLst>
+  </p:cSld>
+  <p:clrMapOvr>
+    <a:masterClrMapping/>
+  </p:clrMapOvr>
+</p:notes>
 </file>
 
 <file path=ppt/slideLayouts/slideLayout1.xml><?xml version="1.0" encoding="utf-8"?>
@@ -13245,20 +13684,8 @@
           <a:lstStyle/>
           <a:p>
             <a:r>
-              <a:rPr lang="en-US" dirty="0"/>
-              <a:t>GitHub </a:t>
-            </a:r>
-            <a:r>
               <a:rPr lang="en-US" dirty="0" smtClean="0"/>
-              <a:t>Desktop </a:t>
-            </a:r>
-            <a:r>
-              <a:rPr lang="en-US" dirty="0"/>
-              <a:t>–</a:t>
-            </a:r>
-            <a:r>
-              <a:rPr lang="en-US" dirty="0" smtClean="0"/>
-              <a:t> Installation</a:t>
+              <a:t>Installing GitHub Desktop</a:t>
             </a:r>
             <a:endParaRPr lang="en-US" dirty="0"/>
           </a:p>
@@ -13352,17 +13779,17 @@
         <p:spPr/>
         <p:txBody>
           <a:bodyPr>
-            <a:normAutofit fontScale="90000"/>
+            <a:normAutofit/>
           </a:bodyPr>
           <a:lstStyle/>
           <a:p>
             <a:r>
-              <a:rPr lang="en-US" dirty="0"/>
-              <a:t>GitHub Desktop – </a:t>
-            </a:r>
-            <a:r>
               <a:rPr lang="en-US" dirty="0" smtClean="0"/>
-              <a:t>Retrieving our </a:t>
+              <a:t>Retrieving </a:t>
+            </a:r>
+            <a:r>
+              <a:rPr lang="en-US" dirty="0" smtClean="0"/>
+              <a:t>our </a:t>
             </a:r>
             <a:r>
               <a:rPr lang="en-US" dirty="0" smtClean="0"/>
@@ -14393,13 +14820,13 @@
         <p:spPr/>
         <p:txBody>
           <a:bodyPr>
-            <a:normAutofit fontScale="90000"/>
+            <a:normAutofit/>
           </a:bodyPr>
           <a:lstStyle/>
           <a:p>
             <a:r>
               <a:rPr lang="en-US" dirty="0" smtClean="0"/>
-              <a:t>GitHub Desktop – Retrieving Additional Repositories</a:t>
+              <a:t>Retrieving Additional Repositories</a:t>
             </a:r>
             <a:endParaRPr lang="en-US" dirty="0"/>
           </a:p>
@@ -14417,8 +14844,8 @@
         </p:nvSpPr>
         <p:spPr>
           <a:xfrm>
-            <a:off x="1752600" y="2584507"/>
-            <a:ext cx="5689846" cy="3802381"/>
+            <a:off x="1295402" y="2584508"/>
+            <a:ext cx="6046200" cy="1874522"/>
           </a:xfrm>
         </p:spPr>
         <p:txBody>
@@ -14437,59 +14864,6 @@
               <a:rPr lang="en-US" dirty="0" smtClean="0"/>
               <a:t>A box displaying all current cloned (local) repositories appears</a:t>
             </a:r>
-          </a:p>
-          <a:p>
-            <a:pPr lvl="1"/>
-            <a:r>
-              <a:rPr lang="en-US" dirty="0" smtClean="0"/>
-              <a:t>Click the “Add” button (shown in </a:t>
-            </a:r>
-            <a:r>
-              <a:rPr lang="en-US" dirty="0" smtClean="0">
-                <a:solidFill>
-                  <a:srgbClr val="22B14C"/>
-                </a:solidFill>
-              </a:rPr>
-              <a:t>light green</a:t>
-            </a:r>
-            <a:r>
-              <a:rPr lang="en-US" dirty="0" smtClean="0"/>
-              <a:t>)</a:t>
-            </a:r>
-          </a:p>
-          <a:p>
-            <a:pPr lvl="1"/>
-            <a:r>
-              <a:rPr lang="en-US" dirty="0" smtClean="0"/>
-              <a:t>Select “Clone repository…” (shown in </a:t>
-            </a:r>
-            <a:r>
-              <a:rPr lang="en-US" dirty="0" smtClean="0">
-                <a:solidFill>
-                  <a:srgbClr val="125C28"/>
-                </a:solidFill>
-              </a:rPr>
-              <a:t>dark green</a:t>
-            </a:r>
-            <a:r>
-              <a:rPr lang="en-US" dirty="0" smtClean="0"/>
-              <a:t>) to open a </a:t>
-            </a:r>
-            <a:r>
-              <a:rPr lang="en-US" u="sng" dirty="0" smtClean="0"/>
-              <a:t>familiar window</a:t>
-            </a:r>
-          </a:p>
-          <a:p>
-            <a:pPr lvl="1"/>
-            <a:r>
-              <a:rPr lang="en-US" dirty="0" smtClean="0"/>
-              <a:t>Navigate this window identically to the previous slide to select your repository</a:t>
-            </a:r>
-          </a:p>
-          <a:p>
-            <a:pPr lvl="1"/>
-            <a:endParaRPr lang="en-US" dirty="0"/>
           </a:p>
         </p:txBody>
       </p:sp>
@@ -14587,9 +14961,9 @@
           </a:stretch>
         </p:blipFill>
         <p:spPr>
-          <a:xfrm rot="19755233">
-            <a:off x="796404" y="4628664"/>
-            <a:ext cx="1487351" cy="1098956"/>
+          <a:xfrm rot="19444384">
+            <a:off x="922086" y="4695399"/>
+            <a:ext cx="1384007" cy="1022598"/>
           </a:xfrm>
           <a:prstGeom prst="rect">
             <a:avLst/>
@@ -14614,7 +14988,7 @@
         </p:nvSpPr>
         <p:spPr>
           <a:xfrm rot="10800000" flipH="1" flipV="1">
-            <a:off x="6952640" y="3108987"/>
+            <a:off x="6859907" y="3107130"/>
             <a:ext cx="457200" cy="510574"/>
           </a:xfrm>
           <a:prstGeom prst="rect">
@@ -15440,8 +15814,8 @@
           <p:nvPr/>
         </p:nvSpPr>
         <p:spPr>
-          <a:xfrm rot="10800000" flipH="1" flipV="1">
-            <a:off x="2539539" y="5199757"/>
+          <a:xfrm rot="10521647" flipH="1" flipV="1">
+            <a:off x="2565861" y="5201116"/>
             <a:ext cx="1136312" cy="308352"/>
           </a:xfrm>
           <a:prstGeom prst="rect">
@@ -15711,8 +16085,8 @@
           <p:nvPr/>
         </p:nvSpPr>
         <p:spPr>
-          <a:xfrm rot="765847" flipH="1" flipV="1">
-            <a:off x="2341174" y="5175762"/>
+          <a:xfrm flipH="1" flipV="1">
+            <a:off x="2337178" y="5238982"/>
             <a:ext cx="396731" cy="276317"/>
           </a:xfrm>
           <a:prstGeom prst="rect">
@@ -15970,6 +16344,318 @@
               <a:t></a:t>
             </a:r>
             <a:endParaRPr lang="en-US" sz="1600" dirty="0"/>
+          </a:p>
+        </p:txBody>
+      </p:sp>
+      <p:sp>
+        <p:nvSpPr>
+          <p:cNvPr id="19" name="Content Placeholder 2"/>
+          <p:cNvSpPr txBox="1">
+            <a:spLocks/>
+          </p:cNvSpPr>
+          <p:nvPr/>
+        </p:nvSpPr>
+        <p:spPr>
+          <a:xfrm>
+            <a:off x="1772308" y="4294023"/>
+            <a:ext cx="5689846" cy="2001229"/>
+          </a:xfrm>
+          <a:prstGeom prst="rect">
+            <a:avLst/>
+          </a:prstGeom>
+        </p:spPr>
+        <p:txBody>
+          <a:bodyPr vert="horz" lIns="91440" tIns="45720" rIns="91440" bIns="45720" rtlCol="0" anchor="t">
+            <a:normAutofit/>
+          </a:bodyPr>
+          <a:lstStyle>
+            <a:lvl1pPr marL="285750" indent="-285750" algn="l" defTabSz="457200" rtl="0" eaLnBrk="1" latinLnBrk="0" hangingPunct="1">
+              <a:spcBef>
+                <a:spcPct val="20000"/>
+              </a:spcBef>
+              <a:spcAft>
+                <a:spcPts val="600"/>
+              </a:spcAft>
+              <a:buClr>
+                <a:schemeClr val="accent1"/>
+              </a:buClr>
+              <a:buSzPct val="115000"/>
+              <a:buFont typeface="Arial"/>
+              <a:buChar char="•"/>
+              <a:defRPr sz="2400" kern="1200" cap="none">
+                <a:solidFill>
+                  <a:schemeClr val="tx1">
+                    <a:lumMod val="85000"/>
+                    <a:lumOff val="15000"/>
+                  </a:schemeClr>
+                </a:solidFill>
+                <a:effectLst/>
+                <a:latin typeface="+mn-lt"/>
+                <a:ea typeface="+mn-ea"/>
+                <a:cs typeface="+mn-cs"/>
+              </a:defRPr>
+            </a:lvl1pPr>
+            <a:lvl2pPr marL="742950" indent="-285750" algn="l" defTabSz="457200" rtl="0" eaLnBrk="1" latinLnBrk="0" hangingPunct="1">
+              <a:spcBef>
+                <a:spcPct val="20000"/>
+              </a:spcBef>
+              <a:spcAft>
+                <a:spcPts val="600"/>
+              </a:spcAft>
+              <a:buClr>
+                <a:schemeClr val="accent1"/>
+              </a:buClr>
+              <a:buSzPct val="115000"/>
+              <a:buFont typeface="Arial"/>
+              <a:buChar char="•"/>
+              <a:defRPr sz="2000" kern="1200" cap="none">
+                <a:solidFill>
+                  <a:schemeClr val="tx1">
+                    <a:lumMod val="85000"/>
+                    <a:lumOff val="15000"/>
+                  </a:schemeClr>
+                </a:solidFill>
+                <a:effectLst/>
+                <a:latin typeface="+mn-lt"/>
+                <a:ea typeface="+mn-ea"/>
+                <a:cs typeface="+mn-cs"/>
+              </a:defRPr>
+            </a:lvl2pPr>
+            <a:lvl3pPr marL="1200150" indent="-285750" algn="l" defTabSz="457200" rtl="0" eaLnBrk="1" latinLnBrk="0" hangingPunct="1">
+              <a:spcBef>
+                <a:spcPct val="20000"/>
+              </a:spcBef>
+              <a:spcAft>
+                <a:spcPts val="600"/>
+              </a:spcAft>
+              <a:buClr>
+                <a:schemeClr val="accent1"/>
+              </a:buClr>
+              <a:buSzPct val="115000"/>
+              <a:buFont typeface="Arial"/>
+              <a:buChar char="•"/>
+              <a:defRPr sz="1800" kern="1200" cap="none">
+                <a:solidFill>
+                  <a:schemeClr val="tx1">
+                    <a:lumMod val="85000"/>
+                    <a:lumOff val="15000"/>
+                  </a:schemeClr>
+                </a:solidFill>
+                <a:effectLst/>
+                <a:latin typeface="+mn-lt"/>
+                <a:ea typeface="+mn-ea"/>
+                <a:cs typeface="+mn-cs"/>
+              </a:defRPr>
+            </a:lvl3pPr>
+            <a:lvl4pPr marL="1543050" indent="-171450" algn="l" defTabSz="457200" rtl="0" eaLnBrk="1" latinLnBrk="0" hangingPunct="1">
+              <a:spcBef>
+                <a:spcPct val="20000"/>
+              </a:spcBef>
+              <a:spcAft>
+                <a:spcPts val="600"/>
+              </a:spcAft>
+              <a:buClr>
+                <a:schemeClr val="accent1"/>
+              </a:buClr>
+              <a:buSzPct val="115000"/>
+              <a:buFont typeface="Arial"/>
+              <a:buChar char="•"/>
+              <a:defRPr sz="1600" kern="1200" cap="none">
+                <a:solidFill>
+                  <a:schemeClr val="tx1">
+                    <a:lumMod val="85000"/>
+                    <a:lumOff val="15000"/>
+                  </a:schemeClr>
+                </a:solidFill>
+                <a:effectLst/>
+                <a:latin typeface="+mn-lt"/>
+                <a:ea typeface="+mn-ea"/>
+                <a:cs typeface="+mn-cs"/>
+              </a:defRPr>
+            </a:lvl4pPr>
+            <a:lvl5pPr marL="2000250" indent="-171450" algn="l" defTabSz="457200" rtl="0" eaLnBrk="1" latinLnBrk="0" hangingPunct="1">
+              <a:spcBef>
+                <a:spcPct val="20000"/>
+              </a:spcBef>
+              <a:spcAft>
+                <a:spcPts val="600"/>
+              </a:spcAft>
+              <a:buClr>
+                <a:schemeClr val="accent1"/>
+              </a:buClr>
+              <a:buSzPct val="115000"/>
+              <a:buFont typeface="Arial"/>
+              <a:buChar char="•"/>
+              <a:defRPr sz="1400" kern="1200" cap="none">
+                <a:solidFill>
+                  <a:schemeClr val="tx1">
+                    <a:lumMod val="85000"/>
+                    <a:lumOff val="15000"/>
+                  </a:schemeClr>
+                </a:solidFill>
+                <a:effectLst/>
+                <a:latin typeface="+mn-lt"/>
+                <a:ea typeface="+mn-ea"/>
+                <a:cs typeface="+mn-cs"/>
+              </a:defRPr>
+            </a:lvl5pPr>
+            <a:lvl6pPr marL="2514600" indent="-228600" algn="l" defTabSz="457200" rtl="0" eaLnBrk="1" latinLnBrk="0" hangingPunct="1">
+              <a:spcBef>
+                <a:spcPct val="20000"/>
+              </a:spcBef>
+              <a:spcAft>
+                <a:spcPts val="600"/>
+              </a:spcAft>
+              <a:buClr>
+                <a:schemeClr val="accent1"/>
+              </a:buClr>
+              <a:buSzPct val="115000"/>
+              <a:buFont typeface="Arial"/>
+              <a:buChar char="•"/>
+              <a:defRPr sz="1400" kern="1200" cap="none">
+                <a:solidFill>
+                  <a:schemeClr val="tx1">
+                    <a:lumMod val="85000"/>
+                    <a:lumOff val="15000"/>
+                  </a:schemeClr>
+                </a:solidFill>
+                <a:effectLst/>
+                <a:latin typeface="+mn-lt"/>
+                <a:ea typeface="+mn-ea"/>
+                <a:cs typeface="+mn-cs"/>
+              </a:defRPr>
+            </a:lvl6pPr>
+            <a:lvl7pPr marL="2971800" indent="-228600" algn="l" defTabSz="457200" rtl="0" eaLnBrk="1" latinLnBrk="0" hangingPunct="1">
+              <a:spcBef>
+                <a:spcPct val="20000"/>
+              </a:spcBef>
+              <a:spcAft>
+                <a:spcPts val="600"/>
+              </a:spcAft>
+              <a:buClr>
+                <a:schemeClr val="accent1"/>
+              </a:buClr>
+              <a:buSzPct val="115000"/>
+              <a:buFont typeface="Arial"/>
+              <a:buChar char="•"/>
+              <a:defRPr sz="1400" kern="1200" cap="none">
+                <a:solidFill>
+                  <a:schemeClr val="tx1">
+                    <a:lumMod val="85000"/>
+                    <a:lumOff val="15000"/>
+                  </a:schemeClr>
+                </a:solidFill>
+                <a:effectLst/>
+                <a:latin typeface="+mn-lt"/>
+                <a:ea typeface="+mn-ea"/>
+                <a:cs typeface="+mn-cs"/>
+              </a:defRPr>
+            </a:lvl7pPr>
+            <a:lvl8pPr marL="3429000" indent="-228600" algn="l" defTabSz="457200" rtl="0" eaLnBrk="1" latinLnBrk="0" hangingPunct="1">
+              <a:spcBef>
+                <a:spcPct val="20000"/>
+              </a:spcBef>
+              <a:spcAft>
+                <a:spcPts val="600"/>
+              </a:spcAft>
+              <a:buClr>
+                <a:schemeClr val="accent1"/>
+              </a:buClr>
+              <a:buSzPct val="115000"/>
+              <a:buFont typeface="Arial"/>
+              <a:buChar char="•"/>
+              <a:defRPr sz="1400" kern="1200" cap="none">
+                <a:solidFill>
+                  <a:schemeClr val="tx1">
+                    <a:lumMod val="85000"/>
+                    <a:lumOff val="15000"/>
+                  </a:schemeClr>
+                </a:solidFill>
+                <a:effectLst/>
+                <a:latin typeface="+mn-lt"/>
+                <a:ea typeface="+mn-ea"/>
+                <a:cs typeface="+mn-cs"/>
+              </a:defRPr>
+            </a:lvl8pPr>
+            <a:lvl9pPr marL="3886200" indent="-228600" algn="l" defTabSz="457200" rtl="0" eaLnBrk="1" latinLnBrk="0" hangingPunct="1">
+              <a:spcBef>
+                <a:spcPct val="20000"/>
+              </a:spcBef>
+              <a:spcAft>
+                <a:spcPts val="600"/>
+              </a:spcAft>
+              <a:buClr>
+                <a:schemeClr val="accent1"/>
+              </a:buClr>
+              <a:buSzPct val="115000"/>
+              <a:buFont typeface="Arial"/>
+              <a:buChar char="•"/>
+              <a:defRPr sz="1400" kern="1200" cap="none">
+                <a:solidFill>
+                  <a:schemeClr val="tx1">
+                    <a:lumMod val="85000"/>
+                    <a:lumOff val="15000"/>
+                  </a:schemeClr>
+                </a:solidFill>
+                <a:effectLst/>
+                <a:latin typeface="+mn-lt"/>
+                <a:ea typeface="+mn-ea"/>
+                <a:cs typeface="+mn-cs"/>
+              </a:defRPr>
+            </a:lvl9pPr>
+          </a:lstStyle>
+          <a:p>
+            <a:pPr lvl="1"/>
+            <a:r>
+              <a:rPr lang="en-US" sz="1900" dirty="0" smtClean="0"/>
+              <a:t>Click the “Add” button (shown in </a:t>
+            </a:r>
+            <a:r>
+              <a:rPr lang="en-US" sz="1900" dirty="0" smtClean="0">
+                <a:solidFill>
+                  <a:srgbClr val="22B14C"/>
+                </a:solidFill>
+              </a:rPr>
+              <a:t>light green</a:t>
+            </a:r>
+            <a:r>
+              <a:rPr lang="en-US" sz="1900" dirty="0" smtClean="0"/>
+              <a:t>)</a:t>
+            </a:r>
+          </a:p>
+          <a:p>
+            <a:pPr lvl="1"/>
+            <a:r>
+              <a:rPr lang="en-US" sz="1900" dirty="0" smtClean="0"/>
+              <a:t>Select “Clone repository…” (shown in </a:t>
+            </a:r>
+            <a:r>
+              <a:rPr lang="en-US" sz="1900" dirty="0" smtClean="0">
+                <a:solidFill>
+                  <a:srgbClr val="125C28"/>
+                </a:solidFill>
+              </a:rPr>
+              <a:t>dark green</a:t>
+            </a:r>
+            <a:r>
+              <a:rPr lang="en-US" sz="1900" dirty="0" smtClean="0"/>
+              <a:t>) to open a </a:t>
+            </a:r>
+            <a:r>
+              <a:rPr lang="en-US" sz="1900" u="sng" dirty="0" smtClean="0"/>
+              <a:t>familiar window</a:t>
+            </a:r>
+          </a:p>
+          <a:p>
+            <a:pPr lvl="1"/>
+            <a:r>
+              <a:rPr lang="en-US" sz="1900" dirty="0" smtClean="0"/>
+              <a:t>Navigate this window identically to the previous slide to select your repository</a:t>
+            </a:r>
+          </a:p>
+          <a:p>
+            <a:pPr lvl="1"/>
+            <a:endParaRPr lang="en-US" dirty="0"/>
           </a:p>
         </p:txBody>
       </p:sp>
@@ -16027,6 +16713,1968 @@
           <a:p>
             <a:r>
               <a:rPr lang="en-US" dirty="0" smtClean="0"/>
+              <a:t>Creating New Branches</a:t>
+            </a:r>
+            <a:endParaRPr lang="en-US" dirty="0"/>
+          </a:p>
+        </p:txBody>
+      </p:sp>
+      <p:sp>
+        <p:nvSpPr>
+          <p:cNvPr id="3" name="Content Placeholder 2"/>
+          <p:cNvSpPr>
+            <a:spLocks noGrp="1"/>
+          </p:cNvSpPr>
+          <p:nvPr>
+            <p:ph sz="half" idx="1"/>
+          </p:nvPr>
+        </p:nvSpPr>
+        <p:spPr/>
+        <p:txBody>
+          <a:bodyPr/>
+          <a:lstStyle/>
+          <a:p>
+            <a:endParaRPr lang="en-US"/>
+          </a:p>
+        </p:txBody>
+      </p:sp>
+      <p:sp>
+        <p:nvSpPr>
+          <p:cNvPr id="4" name="Content Placeholder 3"/>
+          <p:cNvSpPr>
+            <a:spLocks noGrp="1"/>
+          </p:cNvSpPr>
+          <p:nvPr>
+            <p:ph sz="half" idx="2"/>
+          </p:nvPr>
+        </p:nvSpPr>
+        <p:spPr/>
+        <p:txBody>
+          <a:bodyPr/>
+          <a:lstStyle/>
+          <a:p>
+            <a:endParaRPr lang="en-US"/>
+          </a:p>
+        </p:txBody>
+      </p:sp>
+    </p:spTree>
+    <p:extLst>
+      <p:ext uri="{BB962C8B-B14F-4D97-AF65-F5344CB8AC3E}">
+        <p14:creationId xmlns:p14="http://schemas.microsoft.com/office/powerpoint/2010/main" val="715923481"/>
+      </p:ext>
+    </p:extLst>
+  </p:cSld>
+  <p:clrMapOvr>
+    <a:masterClrMapping/>
+  </p:clrMapOvr>
+</p:sld>
+</file>
+
+<file path=ppt/slides/slide27.xml><?xml version="1.0" encoding="utf-8"?>
+<p:sld xmlns:a="http://schemas.openxmlformats.org/drawingml/2006/main" xmlns:r="http://schemas.openxmlformats.org/officeDocument/2006/relationships" xmlns:p="http://schemas.openxmlformats.org/presentationml/2006/main">
+  <p:cSld>
+    <p:spTree>
+      <p:nvGrpSpPr>
+        <p:cNvPr id="1" name=""/>
+        <p:cNvGrpSpPr/>
+        <p:nvPr/>
+      </p:nvGrpSpPr>
+      <p:grpSpPr>
+        <a:xfrm>
+          <a:off x="0" y="0"/>
+          <a:ext cx="0" cy="0"/>
+          <a:chOff x="0" y="0"/>
+          <a:chExt cx="0" cy="0"/>
+        </a:xfrm>
+      </p:grpSpPr>
+      <p:sp>
+        <p:nvSpPr>
+          <p:cNvPr id="2" name="Title 1"/>
+          <p:cNvSpPr>
+            <a:spLocks noGrp="1"/>
+          </p:cNvSpPr>
+          <p:nvPr>
+            <p:ph type="title"/>
+          </p:nvPr>
+        </p:nvSpPr>
+        <p:spPr/>
+        <p:txBody>
+          <a:bodyPr>
+            <a:normAutofit/>
+          </a:bodyPr>
+          <a:lstStyle/>
+          <a:p>
+            <a:r>
+              <a:rPr lang="en-US" dirty="0" smtClean="0"/>
+              <a:t>Uploading Local Edits – Using “Push”</a:t>
+            </a:r>
+            <a:endParaRPr lang="en-US" dirty="0"/>
+          </a:p>
+        </p:txBody>
+      </p:sp>
+      <p:sp>
+        <p:nvSpPr>
+          <p:cNvPr id="3" name="Content Placeholder 2"/>
+          <p:cNvSpPr>
+            <a:spLocks noGrp="1"/>
+          </p:cNvSpPr>
+          <p:nvPr>
+            <p:ph sz="half" idx="1"/>
+          </p:nvPr>
+        </p:nvSpPr>
+        <p:spPr>
+          <a:xfrm>
+            <a:off x="1298449" y="2560318"/>
+            <a:ext cx="3141618" cy="3183257"/>
+          </a:xfrm>
+        </p:spPr>
+        <p:txBody>
+          <a:bodyPr>
+            <a:normAutofit fontScale="85000" lnSpcReduction="20000"/>
+          </a:bodyPr>
+          <a:lstStyle/>
+          <a:p>
+            <a:r>
+              <a:rPr lang="en-US" sz="2200" dirty="0" smtClean="0"/>
+              <a:t>After making changes to cloned documents locally, GitHub desktop will indicate the number of changed files and display them below</a:t>
+            </a:r>
+          </a:p>
+          <a:p>
+            <a:r>
+              <a:rPr lang="en-US" sz="2200" dirty="0" smtClean="0"/>
+              <a:t>To commit these changes to your current branch, fill out the sections directly below your list of changes and click the “Commit to </a:t>
+            </a:r>
+            <a:r>
+              <a:rPr lang="en-US" sz="2200" b="1" u="sng" dirty="0" err="1" smtClean="0"/>
+              <a:t>YourBranch</a:t>
+            </a:r>
+            <a:r>
+              <a:rPr lang="en-US" sz="2200" dirty="0" smtClean="0"/>
+              <a:t>” button</a:t>
+            </a:r>
+          </a:p>
+          <a:p>
+            <a:endParaRPr lang="en-US" dirty="0"/>
+          </a:p>
+        </p:txBody>
+      </p:sp>
+      <p:pic>
+        <p:nvPicPr>
+          <p:cNvPr id="8" name="Content Placeholder 7"/>
+          <p:cNvPicPr>
+            <a:picLocks noGrp="1" noChangeAspect="1"/>
+          </p:cNvPicPr>
+          <p:nvPr>
+            <p:ph sz="half" idx="2"/>
+          </p:nvPr>
+        </p:nvPicPr>
+        <p:blipFill rotWithShape="1">
+          <a:blip r:embed="rId3">
+            <a:extLst>
+              <a:ext uri="{28A0092B-C50C-407E-A947-70E740481C1C}">
+                <a14:useLocalDpi xmlns:a14="http://schemas.microsoft.com/office/drawing/2010/main" val="0"/>
+              </a:ext>
+            </a:extLst>
+          </a:blip>
+          <a:srcRect r="-3430"/>
+          <a:stretch/>
+        </p:blipFill>
+        <p:spPr>
+          <a:xfrm>
+            <a:off x="4455753" y="4546634"/>
+            <a:ext cx="2223882" cy="1654999"/>
+          </a:xfrm>
+          <a:prstGeom prst="rect">
+            <a:avLst/>
+          </a:prstGeom>
+          <a:ln>
+            <a:solidFill>
+              <a:schemeClr val="tx1">
+                <a:lumMod val="50000"/>
+                <a:lumOff val="50000"/>
+              </a:schemeClr>
+            </a:solidFill>
+          </a:ln>
+        </p:spPr>
+      </p:pic>
+      <p:sp>
+        <p:nvSpPr>
+          <p:cNvPr id="11" name="Content Placeholder 2"/>
+          <p:cNvSpPr txBox="1">
+            <a:spLocks/>
+          </p:cNvSpPr>
+          <p:nvPr/>
+        </p:nvSpPr>
+        <p:spPr>
+          <a:xfrm rot="10800000" flipH="1" flipV="1">
+            <a:off x="3982867" y="3023876"/>
+            <a:ext cx="457200" cy="510574"/>
+          </a:xfrm>
+          <a:prstGeom prst="rect">
+            <a:avLst/>
+          </a:prstGeom>
+        </p:spPr>
+        <p:txBody>
+          <a:bodyPr vert="horz" lIns="91440" tIns="45720" rIns="91440" bIns="45720" rtlCol="0" anchor="t">
+            <a:normAutofit/>
+          </a:bodyPr>
+          <a:lstStyle>
+            <a:lvl1pPr marL="285750" indent="-285750" algn="l" defTabSz="457200" rtl="0" eaLnBrk="1" latinLnBrk="0" hangingPunct="1">
+              <a:spcBef>
+                <a:spcPct val="20000"/>
+              </a:spcBef>
+              <a:spcAft>
+                <a:spcPts val="600"/>
+              </a:spcAft>
+              <a:buClr>
+                <a:schemeClr val="accent1"/>
+              </a:buClr>
+              <a:buSzPct val="115000"/>
+              <a:buFont typeface="Arial"/>
+              <a:buChar char="•"/>
+              <a:defRPr sz="2400" kern="1200" cap="none">
+                <a:solidFill>
+                  <a:schemeClr val="tx1">
+                    <a:lumMod val="85000"/>
+                    <a:lumOff val="15000"/>
+                  </a:schemeClr>
+                </a:solidFill>
+                <a:effectLst/>
+                <a:latin typeface="+mn-lt"/>
+                <a:ea typeface="+mn-ea"/>
+                <a:cs typeface="+mn-cs"/>
+              </a:defRPr>
+            </a:lvl1pPr>
+            <a:lvl2pPr marL="742950" indent="-285750" algn="l" defTabSz="457200" rtl="0" eaLnBrk="1" latinLnBrk="0" hangingPunct="1">
+              <a:spcBef>
+                <a:spcPct val="20000"/>
+              </a:spcBef>
+              <a:spcAft>
+                <a:spcPts val="600"/>
+              </a:spcAft>
+              <a:buClr>
+                <a:schemeClr val="accent1"/>
+              </a:buClr>
+              <a:buSzPct val="115000"/>
+              <a:buFont typeface="Arial"/>
+              <a:buChar char="•"/>
+              <a:defRPr sz="2000" kern="1200" cap="none">
+                <a:solidFill>
+                  <a:schemeClr val="tx1">
+                    <a:lumMod val="85000"/>
+                    <a:lumOff val="15000"/>
+                  </a:schemeClr>
+                </a:solidFill>
+                <a:effectLst/>
+                <a:latin typeface="+mn-lt"/>
+                <a:ea typeface="+mn-ea"/>
+                <a:cs typeface="+mn-cs"/>
+              </a:defRPr>
+            </a:lvl2pPr>
+            <a:lvl3pPr marL="1200150" indent="-285750" algn="l" defTabSz="457200" rtl="0" eaLnBrk="1" latinLnBrk="0" hangingPunct="1">
+              <a:spcBef>
+                <a:spcPct val="20000"/>
+              </a:spcBef>
+              <a:spcAft>
+                <a:spcPts val="600"/>
+              </a:spcAft>
+              <a:buClr>
+                <a:schemeClr val="accent1"/>
+              </a:buClr>
+              <a:buSzPct val="115000"/>
+              <a:buFont typeface="Arial"/>
+              <a:buChar char="•"/>
+              <a:defRPr sz="1800" kern="1200" cap="none">
+                <a:solidFill>
+                  <a:schemeClr val="tx1">
+                    <a:lumMod val="85000"/>
+                    <a:lumOff val="15000"/>
+                  </a:schemeClr>
+                </a:solidFill>
+                <a:effectLst/>
+                <a:latin typeface="+mn-lt"/>
+                <a:ea typeface="+mn-ea"/>
+                <a:cs typeface="+mn-cs"/>
+              </a:defRPr>
+            </a:lvl3pPr>
+            <a:lvl4pPr marL="1543050" indent="-171450" algn="l" defTabSz="457200" rtl="0" eaLnBrk="1" latinLnBrk="0" hangingPunct="1">
+              <a:spcBef>
+                <a:spcPct val="20000"/>
+              </a:spcBef>
+              <a:spcAft>
+                <a:spcPts val="600"/>
+              </a:spcAft>
+              <a:buClr>
+                <a:schemeClr val="accent1"/>
+              </a:buClr>
+              <a:buSzPct val="115000"/>
+              <a:buFont typeface="Arial"/>
+              <a:buChar char="•"/>
+              <a:defRPr sz="1600" kern="1200" cap="none">
+                <a:solidFill>
+                  <a:schemeClr val="tx1">
+                    <a:lumMod val="85000"/>
+                    <a:lumOff val="15000"/>
+                  </a:schemeClr>
+                </a:solidFill>
+                <a:effectLst/>
+                <a:latin typeface="+mn-lt"/>
+                <a:ea typeface="+mn-ea"/>
+                <a:cs typeface="+mn-cs"/>
+              </a:defRPr>
+            </a:lvl4pPr>
+            <a:lvl5pPr marL="2000250" indent="-171450" algn="l" defTabSz="457200" rtl="0" eaLnBrk="1" latinLnBrk="0" hangingPunct="1">
+              <a:spcBef>
+                <a:spcPct val="20000"/>
+              </a:spcBef>
+              <a:spcAft>
+                <a:spcPts val="600"/>
+              </a:spcAft>
+              <a:buClr>
+                <a:schemeClr val="accent1"/>
+              </a:buClr>
+              <a:buSzPct val="115000"/>
+              <a:buFont typeface="Arial"/>
+              <a:buChar char="•"/>
+              <a:defRPr sz="1400" kern="1200" cap="none">
+                <a:solidFill>
+                  <a:schemeClr val="tx1">
+                    <a:lumMod val="85000"/>
+                    <a:lumOff val="15000"/>
+                  </a:schemeClr>
+                </a:solidFill>
+                <a:effectLst/>
+                <a:latin typeface="+mn-lt"/>
+                <a:ea typeface="+mn-ea"/>
+                <a:cs typeface="+mn-cs"/>
+              </a:defRPr>
+            </a:lvl5pPr>
+            <a:lvl6pPr marL="2514600" indent="-228600" algn="l" defTabSz="457200" rtl="0" eaLnBrk="1" latinLnBrk="0" hangingPunct="1">
+              <a:spcBef>
+                <a:spcPct val="20000"/>
+              </a:spcBef>
+              <a:spcAft>
+                <a:spcPts val="600"/>
+              </a:spcAft>
+              <a:buClr>
+                <a:schemeClr val="accent1"/>
+              </a:buClr>
+              <a:buSzPct val="115000"/>
+              <a:buFont typeface="Arial"/>
+              <a:buChar char="•"/>
+              <a:defRPr sz="1400" kern="1200" cap="none">
+                <a:solidFill>
+                  <a:schemeClr val="tx1">
+                    <a:lumMod val="85000"/>
+                    <a:lumOff val="15000"/>
+                  </a:schemeClr>
+                </a:solidFill>
+                <a:effectLst/>
+                <a:latin typeface="+mn-lt"/>
+                <a:ea typeface="+mn-ea"/>
+                <a:cs typeface="+mn-cs"/>
+              </a:defRPr>
+            </a:lvl6pPr>
+            <a:lvl7pPr marL="2971800" indent="-228600" algn="l" defTabSz="457200" rtl="0" eaLnBrk="1" latinLnBrk="0" hangingPunct="1">
+              <a:spcBef>
+                <a:spcPct val="20000"/>
+              </a:spcBef>
+              <a:spcAft>
+                <a:spcPts val="600"/>
+              </a:spcAft>
+              <a:buClr>
+                <a:schemeClr val="accent1"/>
+              </a:buClr>
+              <a:buSzPct val="115000"/>
+              <a:buFont typeface="Arial"/>
+              <a:buChar char="•"/>
+              <a:defRPr sz="1400" kern="1200" cap="none">
+                <a:solidFill>
+                  <a:schemeClr val="tx1">
+                    <a:lumMod val="85000"/>
+                    <a:lumOff val="15000"/>
+                  </a:schemeClr>
+                </a:solidFill>
+                <a:effectLst/>
+                <a:latin typeface="+mn-lt"/>
+                <a:ea typeface="+mn-ea"/>
+                <a:cs typeface="+mn-cs"/>
+              </a:defRPr>
+            </a:lvl7pPr>
+            <a:lvl8pPr marL="3429000" indent="-228600" algn="l" defTabSz="457200" rtl="0" eaLnBrk="1" latinLnBrk="0" hangingPunct="1">
+              <a:spcBef>
+                <a:spcPct val="20000"/>
+              </a:spcBef>
+              <a:spcAft>
+                <a:spcPts val="600"/>
+              </a:spcAft>
+              <a:buClr>
+                <a:schemeClr val="accent1"/>
+              </a:buClr>
+              <a:buSzPct val="115000"/>
+              <a:buFont typeface="Arial"/>
+              <a:buChar char="•"/>
+              <a:defRPr sz="1400" kern="1200" cap="none">
+                <a:solidFill>
+                  <a:schemeClr val="tx1">
+                    <a:lumMod val="85000"/>
+                    <a:lumOff val="15000"/>
+                  </a:schemeClr>
+                </a:solidFill>
+                <a:effectLst/>
+                <a:latin typeface="+mn-lt"/>
+                <a:ea typeface="+mn-ea"/>
+                <a:cs typeface="+mn-cs"/>
+              </a:defRPr>
+            </a:lvl8pPr>
+            <a:lvl9pPr marL="3886200" indent="-228600" algn="l" defTabSz="457200" rtl="0" eaLnBrk="1" latinLnBrk="0" hangingPunct="1">
+              <a:spcBef>
+                <a:spcPct val="20000"/>
+              </a:spcBef>
+              <a:spcAft>
+                <a:spcPts val="600"/>
+              </a:spcAft>
+              <a:buClr>
+                <a:schemeClr val="accent1"/>
+              </a:buClr>
+              <a:buSzPct val="115000"/>
+              <a:buFont typeface="Arial"/>
+              <a:buChar char="•"/>
+              <a:defRPr sz="1400" kern="1200" cap="none">
+                <a:solidFill>
+                  <a:schemeClr val="tx1">
+                    <a:lumMod val="85000"/>
+                    <a:lumOff val="15000"/>
+                  </a:schemeClr>
+                </a:solidFill>
+                <a:effectLst/>
+                <a:latin typeface="+mn-lt"/>
+                <a:ea typeface="+mn-ea"/>
+                <a:cs typeface="+mn-cs"/>
+              </a:defRPr>
+            </a:lvl9pPr>
+          </a:lstStyle>
+          <a:p>
+            <a:pPr marL="0" indent="0">
+              <a:buNone/>
+            </a:pPr>
+            <a:r>
+              <a:rPr lang="en-US" dirty="0" smtClean="0">
+                <a:sym typeface="Wingdings" panose="05000000000000000000" pitchFamily="2" charset="2"/>
+              </a:rPr>
+              <a:t></a:t>
+            </a:r>
+            <a:endParaRPr lang="en-US" dirty="0"/>
+          </a:p>
+        </p:txBody>
+      </p:sp>
+      <p:sp>
+        <p:nvSpPr>
+          <p:cNvPr id="12" name="Content Placeholder 2"/>
+          <p:cNvSpPr txBox="1">
+            <a:spLocks/>
+          </p:cNvSpPr>
+          <p:nvPr/>
+        </p:nvSpPr>
+        <p:spPr>
+          <a:xfrm rot="12790919" flipH="1" flipV="1">
+            <a:off x="3754267" y="5264580"/>
+            <a:ext cx="457200" cy="510574"/>
+          </a:xfrm>
+          <a:prstGeom prst="rect">
+            <a:avLst/>
+          </a:prstGeom>
+        </p:spPr>
+        <p:txBody>
+          <a:bodyPr vert="horz" lIns="91440" tIns="45720" rIns="91440" bIns="45720" rtlCol="0" anchor="t">
+            <a:normAutofit/>
+          </a:bodyPr>
+          <a:lstStyle>
+            <a:lvl1pPr marL="285750" indent="-285750" algn="l" defTabSz="457200" rtl="0" eaLnBrk="1" latinLnBrk="0" hangingPunct="1">
+              <a:spcBef>
+                <a:spcPct val="20000"/>
+              </a:spcBef>
+              <a:spcAft>
+                <a:spcPts val="600"/>
+              </a:spcAft>
+              <a:buClr>
+                <a:schemeClr val="accent1"/>
+              </a:buClr>
+              <a:buSzPct val="115000"/>
+              <a:buFont typeface="Arial"/>
+              <a:buChar char="•"/>
+              <a:defRPr sz="2400" kern="1200" cap="none">
+                <a:solidFill>
+                  <a:schemeClr val="tx1">
+                    <a:lumMod val="85000"/>
+                    <a:lumOff val="15000"/>
+                  </a:schemeClr>
+                </a:solidFill>
+                <a:effectLst/>
+                <a:latin typeface="+mn-lt"/>
+                <a:ea typeface="+mn-ea"/>
+                <a:cs typeface="+mn-cs"/>
+              </a:defRPr>
+            </a:lvl1pPr>
+            <a:lvl2pPr marL="742950" indent="-285750" algn="l" defTabSz="457200" rtl="0" eaLnBrk="1" latinLnBrk="0" hangingPunct="1">
+              <a:spcBef>
+                <a:spcPct val="20000"/>
+              </a:spcBef>
+              <a:spcAft>
+                <a:spcPts val="600"/>
+              </a:spcAft>
+              <a:buClr>
+                <a:schemeClr val="accent1"/>
+              </a:buClr>
+              <a:buSzPct val="115000"/>
+              <a:buFont typeface="Arial"/>
+              <a:buChar char="•"/>
+              <a:defRPr sz="2000" kern="1200" cap="none">
+                <a:solidFill>
+                  <a:schemeClr val="tx1">
+                    <a:lumMod val="85000"/>
+                    <a:lumOff val="15000"/>
+                  </a:schemeClr>
+                </a:solidFill>
+                <a:effectLst/>
+                <a:latin typeface="+mn-lt"/>
+                <a:ea typeface="+mn-ea"/>
+                <a:cs typeface="+mn-cs"/>
+              </a:defRPr>
+            </a:lvl2pPr>
+            <a:lvl3pPr marL="1200150" indent="-285750" algn="l" defTabSz="457200" rtl="0" eaLnBrk="1" latinLnBrk="0" hangingPunct="1">
+              <a:spcBef>
+                <a:spcPct val="20000"/>
+              </a:spcBef>
+              <a:spcAft>
+                <a:spcPts val="600"/>
+              </a:spcAft>
+              <a:buClr>
+                <a:schemeClr val="accent1"/>
+              </a:buClr>
+              <a:buSzPct val="115000"/>
+              <a:buFont typeface="Arial"/>
+              <a:buChar char="•"/>
+              <a:defRPr sz="1800" kern="1200" cap="none">
+                <a:solidFill>
+                  <a:schemeClr val="tx1">
+                    <a:lumMod val="85000"/>
+                    <a:lumOff val="15000"/>
+                  </a:schemeClr>
+                </a:solidFill>
+                <a:effectLst/>
+                <a:latin typeface="+mn-lt"/>
+                <a:ea typeface="+mn-ea"/>
+                <a:cs typeface="+mn-cs"/>
+              </a:defRPr>
+            </a:lvl3pPr>
+            <a:lvl4pPr marL="1543050" indent="-171450" algn="l" defTabSz="457200" rtl="0" eaLnBrk="1" latinLnBrk="0" hangingPunct="1">
+              <a:spcBef>
+                <a:spcPct val="20000"/>
+              </a:spcBef>
+              <a:spcAft>
+                <a:spcPts val="600"/>
+              </a:spcAft>
+              <a:buClr>
+                <a:schemeClr val="accent1"/>
+              </a:buClr>
+              <a:buSzPct val="115000"/>
+              <a:buFont typeface="Arial"/>
+              <a:buChar char="•"/>
+              <a:defRPr sz="1600" kern="1200" cap="none">
+                <a:solidFill>
+                  <a:schemeClr val="tx1">
+                    <a:lumMod val="85000"/>
+                    <a:lumOff val="15000"/>
+                  </a:schemeClr>
+                </a:solidFill>
+                <a:effectLst/>
+                <a:latin typeface="+mn-lt"/>
+                <a:ea typeface="+mn-ea"/>
+                <a:cs typeface="+mn-cs"/>
+              </a:defRPr>
+            </a:lvl4pPr>
+            <a:lvl5pPr marL="2000250" indent="-171450" algn="l" defTabSz="457200" rtl="0" eaLnBrk="1" latinLnBrk="0" hangingPunct="1">
+              <a:spcBef>
+                <a:spcPct val="20000"/>
+              </a:spcBef>
+              <a:spcAft>
+                <a:spcPts val="600"/>
+              </a:spcAft>
+              <a:buClr>
+                <a:schemeClr val="accent1"/>
+              </a:buClr>
+              <a:buSzPct val="115000"/>
+              <a:buFont typeface="Arial"/>
+              <a:buChar char="•"/>
+              <a:defRPr sz="1400" kern="1200" cap="none">
+                <a:solidFill>
+                  <a:schemeClr val="tx1">
+                    <a:lumMod val="85000"/>
+                    <a:lumOff val="15000"/>
+                  </a:schemeClr>
+                </a:solidFill>
+                <a:effectLst/>
+                <a:latin typeface="+mn-lt"/>
+                <a:ea typeface="+mn-ea"/>
+                <a:cs typeface="+mn-cs"/>
+              </a:defRPr>
+            </a:lvl5pPr>
+            <a:lvl6pPr marL="2514600" indent="-228600" algn="l" defTabSz="457200" rtl="0" eaLnBrk="1" latinLnBrk="0" hangingPunct="1">
+              <a:spcBef>
+                <a:spcPct val="20000"/>
+              </a:spcBef>
+              <a:spcAft>
+                <a:spcPts val="600"/>
+              </a:spcAft>
+              <a:buClr>
+                <a:schemeClr val="accent1"/>
+              </a:buClr>
+              <a:buSzPct val="115000"/>
+              <a:buFont typeface="Arial"/>
+              <a:buChar char="•"/>
+              <a:defRPr sz="1400" kern="1200" cap="none">
+                <a:solidFill>
+                  <a:schemeClr val="tx1">
+                    <a:lumMod val="85000"/>
+                    <a:lumOff val="15000"/>
+                  </a:schemeClr>
+                </a:solidFill>
+                <a:effectLst/>
+                <a:latin typeface="+mn-lt"/>
+                <a:ea typeface="+mn-ea"/>
+                <a:cs typeface="+mn-cs"/>
+              </a:defRPr>
+            </a:lvl6pPr>
+            <a:lvl7pPr marL="2971800" indent="-228600" algn="l" defTabSz="457200" rtl="0" eaLnBrk="1" latinLnBrk="0" hangingPunct="1">
+              <a:spcBef>
+                <a:spcPct val="20000"/>
+              </a:spcBef>
+              <a:spcAft>
+                <a:spcPts val="600"/>
+              </a:spcAft>
+              <a:buClr>
+                <a:schemeClr val="accent1"/>
+              </a:buClr>
+              <a:buSzPct val="115000"/>
+              <a:buFont typeface="Arial"/>
+              <a:buChar char="•"/>
+              <a:defRPr sz="1400" kern="1200" cap="none">
+                <a:solidFill>
+                  <a:schemeClr val="tx1">
+                    <a:lumMod val="85000"/>
+                    <a:lumOff val="15000"/>
+                  </a:schemeClr>
+                </a:solidFill>
+                <a:effectLst/>
+                <a:latin typeface="+mn-lt"/>
+                <a:ea typeface="+mn-ea"/>
+                <a:cs typeface="+mn-cs"/>
+              </a:defRPr>
+            </a:lvl7pPr>
+            <a:lvl8pPr marL="3429000" indent="-228600" algn="l" defTabSz="457200" rtl="0" eaLnBrk="1" latinLnBrk="0" hangingPunct="1">
+              <a:spcBef>
+                <a:spcPct val="20000"/>
+              </a:spcBef>
+              <a:spcAft>
+                <a:spcPts val="600"/>
+              </a:spcAft>
+              <a:buClr>
+                <a:schemeClr val="accent1"/>
+              </a:buClr>
+              <a:buSzPct val="115000"/>
+              <a:buFont typeface="Arial"/>
+              <a:buChar char="•"/>
+              <a:defRPr sz="1400" kern="1200" cap="none">
+                <a:solidFill>
+                  <a:schemeClr val="tx1">
+                    <a:lumMod val="85000"/>
+                    <a:lumOff val="15000"/>
+                  </a:schemeClr>
+                </a:solidFill>
+                <a:effectLst/>
+                <a:latin typeface="+mn-lt"/>
+                <a:ea typeface="+mn-ea"/>
+                <a:cs typeface="+mn-cs"/>
+              </a:defRPr>
+            </a:lvl8pPr>
+            <a:lvl9pPr marL="3886200" indent="-228600" algn="l" defTabSz="457200" rtl="0" eaLnBrk="1" latinLnBrk="0" hangingPunct="1">
+              <a:spcBef>
+                <a:spcPct val="20000"/>
+              </a:spcBef>
+              <a:spcAft>
+                <a:spcPts val="600"/>
+              </a:spcAft>
+              <a:buClr>
+                <a:schemeClr val="accent1"/>
+              </a:buClr>
+              <a:buSzPct val="115000"/>
+              <a:buFont typeface="Arial"/>
+              <a:buChar char="•"/>
+              <a:defRPr sz="1400" kern="1200" cap="none">
+                <a:solidFill>
+                  <a:schemeClr val="tx1">
+                    <a:lumMod val="85000"/>
+                    <a:lumOff val="15000"/>
+                  </a:schemeClr>
+                </a:solidFill>
+                <a:effectLst/>
+                <a:latin typeface="+mn-lt"/>
+                <a:ea typeface="+mn-ea"/>
+                <a:cs typeface="+mn-cs"/>
+              </a:defRPr>
+            </a:lvl9pPr>
+          </a:lstStyle>
+          <a:p>
+            <a:pPr marL="0" indent="0">
+              <a:buNone/>
+            </a:pPr>
+            <a:r>
+              <a:rPr lang="en-US" dirty="0" smtClean="0">
+                <a:sym typeface="Wingdings" panose="05000000000000000000" pitchFamily="2" charset="2"/>
+              </a:rPr>
+              <a:t></a:t>
+            </a:r>
+            <a:endParaRPr lang="en-US" dirty="0"/>
+          </a:p>
+        </p:txBody>
+      </p:sp>
+      <p:sp>
+        <p:nvSpPr>
+          <p:cNvPr id="14" name="Content Placeholder 2"/>
+          <p:cNvSpPr txBox="1">
+            <a:spLocks/>
+          </p:cNvSpPr>
+          <p:nvPr/>
+        </p:nvSpPr>
+        <p:spPr>
+          <a:xfrm rot="16200000" flipH="1" flipV="1">
+            <a:off x="9164885" y="3398052"/>
+            <a:ext cx="457200" cy="510574"/>
+          </a:xfrm>
+          <a:prstGeom prst="rect">
+            <a:avLst/>
+          </a:prstGeom>
+        </p:spPr>
+        <p:txBody>
+          <a:bodyPr vert="horz" lIns="91440" tIns="45720" rIns="91440" bIns="45720" rtlCol="0" anchor="t">
+            <a:normAutofit/>
+          </a:bodyPr>
+          <a:lstStyle>
+            <a:lvl1pPr marL="285750" indent="-285750" algn="l" defTabSz="457200" rtl="0" eaLnBrk="1" latinLnBrk="0" hangingPunct="1">
+              <a:spcBef>
+                <a:spcPct val="20000"/>
+              </a:spcBef>
+              <a:spcAft>
+                <a:spcPts val="600"/>
+              </a:spcAft>
+              <a:buClr>
+                <a:schemeClr val="accent1"/>
+              </a:buClr>
+              <a:buSzPct val="115000"/>
+              <a:buFont typeface="Arial"/>
+              <a:buChar char="•"/>
+              <a:defRPr sz="2400" kern="1200" cap="none">
+                <a:solidFill>
+                  <a:schemeClr val="tx1">
+                    <a:lumMod val="85000"/>
+                    <a:lumOff val="15000"/>
+                  </a:schemeClr>
+                </a:solidFill>
+                <a:effectLst/>
+                <a:latin typeface="+mn-lt"/>
+                <a:ea typeface="+mn-ea"/>
+                <a:cs typeface="+mn-cs"/>
+              </a:defRPr>
+            </a:lvl1pPr>
+            <a:lvl2pPr marL="742950" indent="-285750" algn="l" defTabSz="457200" rtl="0" eaLnBrk="1" latinLnBrk="0" hangingPunct="1">
+              <a:spcBef>
+                <a:spcPct val="20000"/>
+              </a:spcBef>
+              <a:spcAft>
+                <a:spcPts val="600"/>
+              </a:spcAft>
+              <a:buClr>
+                <a:schemeClr val="accent1"/>
+              </a:buClr>
+              <a:buSzPct val="115000"/>
+              <a:buFont typeface="Arial"/>
+              <a:buChar char="•"/>
+              <a:defRPr sz="2000" kern="1200" cap="none">
+                <a:solidFill>
+                  <a:schemeClr val="tx1">
+                    <a:lumMod val="85000"/>
+                    <a:lumOff val="15000"/>
+                  </a:schemeClr>
+                </a:solidFill>
+                <a:effectLst/>
+                <a:latin typeface="+mn-lt"/>
+                <a:ea typeface="+mn-ea"/>
+                <a:cs typeface="+mn-cs"/>
+              </a:defRPr>
+            </a:lvl2pPr>
+            <a:lvl3pPr marL="1200150" indent="-285750" algn="l" defTabSz="457200" rtl="0" eaLnBrk="1" latinLnBrk="0" hangingPunct="1">
+              <a:spcBef>
+                <a:spcPct val="20000"/>
+              </a:spcBef>
+              <a:spcAft>
+                <a:spcPts val="600"/>
+              </a:spcAft>
+              <a:buClr>
+                <a:schemeClr val="accent1"/>
+              </a:buClr>
+              <a:buSzPct val="115000"/>
+              <a:buFont typeface="Arial"/>
+              <a:buChar char="•"/>
+              <a:defRPr sz="1800" kern="1200" cap="none">
+                <a:solidFill>
+                  <a:schemeClr val="tx1">
+                    <a:lumMod val="85000"/>
+                    <a:lumOff val="15000"/>
+                  </a:schemeClr>
+                </a:solidFill>
+                <a:effectLst/>
+                <a:latin typeface="+mn-lt"/>
+                <a:ea typeface="+mn-ea"/>
+                <a:cs typeface="+mn-cs"/>
+              </a:defRPr>
+            </a:lvl3pPr>
+            <a:lvl4pPr marL="1543050" indent="-171450" algn="l" defTabSz="457200" rtl="0" eaLnBrk="1" latinLnBrk="0" hangingPunct="1">
+              <a:spcBef>
+                <a:spcPct val="20000"/>
+              </a:spcBef>
+              <a:spcAft>
+                <a:spcPts val="600"/>
+              </a:spcAft>
+              <a:buClr>
+                <a:schemeClr val="accent1"/>
+              </a:buClr>
+              <a:buSzPct val="115000"/>
+              <a:buFont typeface="Arial"/>
+              <a:buChar char="•"/>
+              <a:defRPr sz="1600" kern="1200" cap="none">
+                <a:solidFill>
+                  <a:schemeClr val="tx1">
+                    <a:lumMod val="85000"/>
+                    <a:lumOff val="15000"/>
+                  </a:schemeClr>
+                </a:solidFill>
+                <a:effectLst/>
+                <a:latin typeface="+mn-lt"/>
+                <a:ea typeface="+mn-ea"/>
+                <a:cs typeface="+mn-cs"/>
+              </a:defRPr>
+            </a:lvl4pPr>
+            <a:lvl5pPr marL="2000250" indent="-171450" algn="l" defTabSz="457200" rtl="0" eaLnBrk="1" latinLnBrk="0" hangingPunct="1">
+              <a:spcBef>
+                <a:spcPct val="20000"/>
+              </a:spcBef>
+              <a:spcAft>
+                <a:spcPts val="600"/>
+              </a:spcAft>
+              <a:buClr>
+                <a:schemeClr val="accent1"/>
+              </a:buClr>
+              <a:buSzPct val="115000"/>
+              <a:buFont typeface="Arial"/>
+              <a:buChar char="•"/>
+              <a:defRPr sz="1400" kern="1200" cap="none">
+                <a:solidFill>
+                  <a:schemeClr val="tx1">
+                    <a:lumMod val="85000"/>
+                    <a:lumOff val="15000"/>
+                  </a:schemeClr>
+                </a:solidFill>
+                <a:effectLst/>
+                <a:latin typeface="+mn-lt"/>
+                <a:ea typeface="+mn-ea"/>
+                <a:cs typeface="+mn-cs"/>
+              </a:defRPr>
+            </a:lvl5pPr>
+            <a:lvl6pPr marL="2514600" indent="-228600" algn="l" defTabSz="457200" rtl="0" eaLnBrk="1" latinLnBrk="0" hangingPunct="1">
+              <a:spcBef>
+                <a:spcPct val="20000"/>
+              </a:spcBef>
+              <a:spcAft>
+                <a:spcPts val="600"/>
+              </a:spcAft>
+              <a:buClr>
+                <a:schemeClr val="accent1"/>
+              </a:buClr>
+              <a:buSzPct val="115000"/>
+              <a:buFont typeface="Arial"/>
+              <a:buChar char="•"/>
+              <a:defRPr sz="1400" kern="1200" cap="none">
+                <a:solidFill>
+                  <a:schemeClr val="tx1">
+                    <a:lumMod val="85000"/>
+                    <a:lumOff val="15000"/>
+                  </a:schemeClr>
+                </a:solidFill>
+                <a:effectLst/>
+                <a:latin typeface="+mn-lt"/>
+                <a:ea typeface="+mn-ea"/>
+                <a:cs typeface="+mn-cs"/>
+              </a:defRPr>
+            </a:lvl6pPr>
+            <a:lvl7pPr marL="2971800" indent="-228600" algn="l" defTabSz="457200" rtl="0" eaLnBrk="1" latinLnBrk="0" hangingPunct="1">
+              <a:spcBef>
+                <a:spcPct val="20000"/>
+              </a:spcBef>
+              <a:spcAft>
+                <a:spcPts val="600"/>
+              </a:spcAft>
+              <a:buClr>
+                <a:schemeClr val="accent1"/>
+              </a:buClr>
+              <a:buSzPct val="115000"/>
+              <a:buFont typeface="Arial"/>
+              <a:buChar char="•"/>
+              <a:defRPr sz="1400" kern="1200" cap="none">
+                <a:solidFill>
+                  <a:schemeClr val="tx1">
+                    <a:lumMod val="85000"/>
+                    <a:lumOff val="15000"/>
+                  </a:schemeClr>
+                </a:solidFill>
+                <a:effectLst/>
+                <a:latin typeface="+mn-lt"/>
+                <a:ea typeface="+mn-ea"/>
+                <a:cs typeface="+mn-cs"/>
+              </a:defRPr>
+            </a:lvl7pPr>
+            <a:lvl8pPr marL="3429000" indent="-228600" algn="l" defTabSz="457200" rtl="0" eaLnBrk="1" latinLnBrk="0" hangingPunct="1">
+              <a:spcBef>
+                <a:spcPct val="20000"/>
+              </a:spcBef>
+              <a:spcAft>
+                <a:spcPts val="600"/>
+              </a:spcAft>
+              <a:buClr>
+                <a:schemeClr val="accent1"/>
+              </a:buClr>
+              <a:buSzPct val="115000"/>
+              <a:buFont typeface="Arial"/>
+              <a:buChar char="•"/>
+              <a:defRPr sz="1400" kern="1200" cap="none">
+                <a:solidFill>
+                  <a:schemeClr val="tx1">
+                    <a:lumMod val="85000"/>
+                    <a:lumOff val="15000"/>
+                  </a:schemeClr>
+                </a:solidFill>
+                <a:effectLst/>
+                <a:latin typeface="+mn-lt"/>
+                <a:ea typeface="+mn-ea"/>
+                <a:cs typeface="+mn-cs"/>
+              </a:defRPr>
+            </a:lvl8pPr>
+            <a:lvl9pPr marL="3886200" indent="-228600" algn="l" defTabSz="457200" rtl="0" eaLnBrk="1" latinLnBrk="0" hangingPunct="1">
+              <a:spcBef>
+                <a:spcPct val="20000"/>
+              </a:spcBef>
+              <a:spcAft>
+                <a:spcPts val="600"/>
+              </a:spcAft>
+              <a:buClr>
+                <a:schemeClr val="accent1"/>
+              </a:buClr>
+              <a:buSzPct val="115000"/>
+              <a:buFont typeface="Arial"/>
+              <a:buChar char="•"/>
+              <a:defRPr sz="1400" kern="1200" cap="none">
+                <a:solidFill>
+                  <a:schemeClr val="tx1">
+                    <a:lumMod val="85000"/>
+                    <a:lumOff val="15000"/>
+                  </a:schemeClr>
+                </a:solidFill>
+                <a:effectLst/>
+                <a:latin typeface="+mn-lt"/>
+                <a:ea typeface="+mn-ea"/>
+                <a:cs typeface="+mn-cs"/>
+              </a:defRPr>
+            </a:lvl9pPr>
+          </a:lstStyle>
+          <a:p>
+            <a:pPr marL="0" indent="0">
+              <a:buNone/>
+            </a:pPr>
+            <a:r>
+              <a:rPr lang="en-US" dirty="0" smtClean="0">
+                <a:sym typeface="Wingdings" panose="05000000000000000000" pitchFamily="2" charset="2"/>
+              </a:rPr>
+              <a:t></a:t>
+            </a:r>
+            <a:endParaRPr lang="en-US" dirty="0"/>
+          </a:p>
+        </p:txBody>
+      </p:sp>
+      <p:sp>
+        <p:nvSpPr>
+          <p:cNvPr id="15" name="Content Placeholder 2"/>
+          <p:cNvSpPr txBox="1">
+            <a:spLocks/>
+          </p:cNvSpPr>
+          <p:nvPr/>
+        </p:nvSpPr>
+        <p:spPr>
+          <a:xfrm>
+            <a:off x="6695321" y="2560318"/>
+            <a:ext cx="4359746" cy="1363981"/>
+          </a:xfrm>
+          <a:prstGeom prst="rect">
+            <a:avLst/>
+          </a:prstGeom>
+        </p:spPr>
+        <p:txBody>
+          <a:bodyPr vert="horz" lIns="91440" tIns="45720" rIns="91440" bIns="45720" rtlCol="0" anchor="t">
+            <a:normAutofit lnSpcReduction="10000"/>
+          </a:bodyPr>
+          <a:lstStyle>
+            <a:lvl1pPr marL="285750" indent="-285750" algn="l" defTabSz="457200" rtl="0" eaLnBrk="1" latinLnBrk="0" hangingPunct="1">
+              <a:spcBef>
+                <a:spcPct val="20000"/>
+              </a:spcBef>
+              <a:spcAft>
+                <a:spcPts val="600"/>
+              </a:spcAft>
+              <a:buClr>
+                <a:schemeClr val="accent1"/>
+              </a:buClr>
+              <a:buSzPct val="115000"/>
+              <a:buFont typeface="Arial"/>
+              <a:buChar char="•"/>
+              <a:defRPr sz="2400" kern="1200" cap="none">
+                <a:solidFill>
+                  <a:schemeClr val="tx1">
+                    <a:lumMod val="85000"/>
+                    <a:lumOff val="15000"/>
+                  </a:schemeClr>
+                </a:solidFill>
+                <a:effectLst/>
+                <a:latin typeface="+mn-lt"/>
+                <a:ea typeface="+mn-ea"/>
+                <a:cs typeface="+mn-cs"/>
+              </a:defRPr>
+            </a:lvl1pPr>
+            <a:lvl2pPr marL="742950" indent="-285750" algn="l" defTabSz="457200" rtl="0" eaLnBrk="1" latinLnBrk="0" hangingPunct="1">
+              <a:spcBef>
+                <a:spcPct val="20000"/>
+              </a:spcBef>
+              <a:spcAft>
+                <a:spcPts val="600"/>
+              </a:spcAft>
+              <a:buClr>
+                <a:schemeClr val="accent1"/>
+              </a:buClr>
+              <a:buSzPct val="115000"/>
+              <a:buFont typeface="Arial"/>
+              <a:buChar char="•"/>
+              <a:defRPr sz="2000" kern="1200" cap="none">
+                <a:solidFill>
+                  <a:schemeClr val="tx1">
+                    <a:lumMod val="85000"/>
+                    <a:lumOff val="15000"/>
+                  </a:schemeClr>
+                </a:solidFill>
+                <a:effectLst/>
+                <a:latin typeface="+mn-lt"/>
+                <a:ea typeface="+mn-ea"/>
+                <a:cs typeface="+mn-cs"/>
+              </a:defRPr>
+            </a:lvl2pPr>
+            <a:lvl3pPr marL="1200150" indent="-285750" algn="l" defTabSz="457200" rtl="0" eaLnBrk="1" latinLnBrk="0" hangingPunct="1">
+              <a:spcBef>
+                <a:spcPct val="20000"/>
+              </a:spcBef>
+              <a:spcAft>
+                <a:spcPts val="600"/>
+              </a:spcAft>
+              <a:buClr>
+                <a:schemeClr val="accent1"/>
+              </a:buClr>
+              <a:buSzPct val="115000"/>
+              <a:buFont typeface="Arial"/>
+              <a:buChar char="•"/>
+              <a:defRPr sz="1800" kern="1200" cap="none">
+                <a:solidFill>
+                  <a:schemeClr val="tx1">
+                    <a:lumMod val="85000"/>
+                    <a:lumOff val="15000"/>
+                  </a:schemeClr>
+                </a:solidFill>
+                <a:effectLst/>
+                <a:latin typeface="+mn-lt"/>
+                <a:ea typeface="+mn-ea"/>
+                <a:cs typeface="+mn-cs"/>
+              </a:defRPr>
+            </a:lvl3pPr>
+            <a:lvl4pPr marL="1543050" indent="-171450" algn="l" defTabSz="457200" rtl="0" eaLnBrk="1" latinLnBrk="0" hangingPunct="1">
+              <a:spcBef>
+                <a:spcPct val="20000"/>
+              </a:spcBef>
+              <a:spcAft>
+                <a:spcPts val="600"/>
+              </a:spcAft>
+              <a:buClr>
+                <a:schemeClr val="accent1"/>
+              </a:buClr>
+              <a:buSzPct val="115000"/>
+              <a:buFont typeface="Arial"/>
+              <a:buChar char="•"/>
+              <a:defRPr sz="1600" kern="1200" cap="none">
+                <a:solidFill>
+                  <a:schemeClr val="tx1">
+                    <a:lumMod val="85000"/>
+                    <a:lumOff val="15000"/>
+                  </a:schemeClr>
+                </a:solidFill>
+                <a:effectLst/>
+                <a:latin typeface="+mn-lt"/>
+                <a:ea typeface="+mn-ea"/>
+                <a:cs typeface="+mn-cs"/>
+              </a:defRPr>
+            </a:lvl4pPr>
+            <a:lvl5pPr marL="2000250" indent="-171450" algn="l" defTabSz="457200" rtl="0" eaLnBrk="1" latinLnBrk="0" hangingPunct="1">
+              <a:spcBef>
+                <a:spcPct val="20000"/>
+              </a:spcBef>
+              <a:spcAft>
+                <a:spcPts val="600"/>
+              </a:spcAft>
+              <a:buClr>
+                <a:schemeClr val="accent1"/>
+              </a:buClr>
+              <a:buSzPct val="115000"/>
+              <a:buFont typeface="Arial"/>
+              <a:buChar char="•"/>
+              <a:defRPr sz="1400" kern="1200" cap="none">
+                <a:solidFill>
+                  <a:schemeClr val="tx1">
+                    <a:lumMod val="85000"/>
+                    <a:lumOff val="15000"/>
+                  </a:schemeClr>
+                </a:solidFill>
+                <a:effectLst/>
+                <a:latin typeface="+mn-lt"/>
+                <a:ea typeface="+mn-ea"/>
+                <a:cs typeface="+mn-cs"/>
+              </a:defRPr>
+            </a:lvl5pPr>
+            <a:lvl6pPr marL="2514600" indent="-228600" algn="l" defTabSz="457200" rtl="0" eaLnBrk="1" latinLnBrk="0" hangingPunct="1">
+              <a:spcBef>
+                <a:spcPct val="20000"/>
+              </a:spcBef>
+              <a:spcAft>
+                <a:spcPts val="600"/>
+              </a:spcAft>
+              <a:buClr>
+                <a:schemeClr val="accent1"/>
+              </a:buClr>
+              <a:buSzPct val="115000"/>
+              <a:buFont typeface="Arial"/>
+              <a:buChar char="•"/>
+              <a:defRPr sz="1400" kern="1200" cap="none">
+                <a:solidFill>
+                  <a:schemeClr val="tx1">
+                    <a:lumMod val="85000"/>
+                    <a:lumOff val="15000"/>
+                  </a:schemeClr>
+                </a:solidFill>
+                <a:effectLst/>
+                <a:latin typeface="+mn-lt"/>
+                <a:ea typeface="+mn-ea"/>
+                <a:cs typeface="+mn-cs"/>
+              </a:defRPr>
+            </a:lvl6pPr>
+            <a:lvl7pPr marL="2971800" indent="-228600" algn="l" defTabSz="457200" rtl="0" eaLnBrk="1" latinLnBrk="0" hangingPunct="1">
+              <a:spcBef>
+                <a:spcPct val="20000"/>
+              </a:spcBef>
+              <a:spcAft>
+                <a:spcPts val="600"/>
+              </a:spcAft>
+              <a:buClr>
+                <a:schemeClr val="accent1"/>
+              </a:buClr>
+              <a:buSzPct val="115000"/>
+              <a:buFont typeface="Arial"/>
+              <a:buChar char="•"/>
+              <a:defRPr sz="1400" kern="1200" cap="none">
+                <a:solidFill>
+                  <a:schemeClr val="tx1">
+                    <a:lumMod val="85000"/>
+                    <a:lumOff val="15000"/>
+                  </a:schemeClr>
+                </a:solidFill>
+                <a:effectLst/>
+                <a:latin typeface="+mn-lt"/>
+                <a:ea typeface="+mn-ea"/>
+                <a:cs typeface="+mn-cs"/>
+              </a:defRPr>
+            </a:lvl7pPr>
+            <a:lvl8pPr marL="3429000" indent="-228600" algn="l" defTabSz="457200" rtl="0" eaLnBrk="1" latinLnBrk="0" hangingPunct="1">
+              <a:spcBef>
+                <a:spcPct val="20000"/>
+              </a:spcBef>
+              <a:spcAft>
+                <a:spcPts val="600"/>
+              </a:spcAft>
+              <a:buClr>
+                <a:schemeClr val="accent1"/>
+              </a:buClr>
+              <a:buSzPct val="115000"/>
+              <a:buFont typeface="Arial"/>
+              <a:buChar char="•"/>
+              <a:defRPr sz="1400" kern="1200" cap="none">
+                <a:solidFill>
+                  <a:schemeClr val="tx1">
+                    <a:lumMod val="85000"/>
+                    <a:lumOff val="15000"/>
+                  </a:schemeClr>
+                </a:solidFill>
+                <a:effectLst/>
+                <a:latin typeface="+mn-lt"/>
+                <a:ea typeface="+mn-ea"/>
+                <a:cs typeface="+mn-cs"/>
+              </a:defRPr>
+            </a:lvl8pPr>
+            <a:lvl9pPr marL="3886200" indent="-228600" algn="l" defTabSz="457200" rtl="0" eaLnBrk="1" latinLnBrk="0" hangingPunct="1">
+              <a:spcBef>
+                <a:spcPct val="20000"/>
+              </a:spcBef>
+              <a:spcAft>
+                <a:spcPts val="600"/>
+              </a:spcAft>
+              <a:buClr>
+                <a:schemeClr val="accent1"/>
+              </a:buClr>
+              <a:buSzPct val="115000"/>
+              <a:buFont typeface="Arial"/>
+              <a:buChar char="•"/>
+              <a:defRPr sz="1400" kern="1200" cap="none">
+                <a:solidFill>
+                  <a:schemeClr val="tx1">
+                    <a:lumMod val="85000"/>
+                    <a:lumOff val="15000"/>
+                  </a:schemeClr>
+                </a:solidFill>
+                <a:effectLst/>
+                <a:latin typeface="+mn-lt"/>
+                <a:ea typeface="+mn-ea"/>
+                <a:cs typeface="+mn-cs"/>
+              </a:defRPr>
+            </a:lvl9pPr>
+          </a:lstStyle>
+          <a:p>
+            <a:r>
+              <a:rPr lang="en-US" sz="2100" dirty="0" smtClean="0"/>
+              <a:t>We now want to upload our changes to our GitHub account</a:t>
+            </a:r>
+          </a:p>
+          <a:p>
+            <a:pPr lvl="1"/>
+            <a:r>
+              <a:rPr lang="en-US" sz="1600" dirty="0" smtClean="0"/>
+              <a:t>Select the “Repository” heading from the top navigation panel</a:t>
+            </a:r>
+          </a:p>
+          <a:p>
+            <a:endParaRPr lang="en-US" dirty="0"/>
+          </a:p>
+        </p:txBody>
+      </p:sp>
+      <p:pic>
+        <p:nvPicPr>
+          <p:cNvPr id="9" name="Picture 8"/>
+          <p:cNvPicPr>
+            <a:picLocks noChangeAspect="1"/>
+          </p:cNvPicPr>
+          <p:nvPr/>
+        </p:nvPicPr>
+        <p:blipFill rotWithShape="1">
+          <a:blip r:embed="rId4">
+            <a:extLst>
+              <a:ext uri="{28A0092B-C50C-407E-A947-70E740481C1C}">
+                <a14:useLocalDpi xmlns:a14="http://schemas.microsoft.com/office/drawing/2010/main" val="0"/>
+              </a:ext>
+            </a:extLst>
+          </a:blip>
+          <a:srcRect r="16244" b="15739"/>
+          <a:stretch/>
+        </p:blipFill>
+        <p:spPr>
+          <a:xfrm>
+            <a:off x="4455753" y="2502656"/>
+            <a:ext cx="2223882" cy="1753712"/>
+          </a:xfrm>
+          <a:prstGeom prst="rect">
+            <a:avLst/>
+          </a:prstGeom>
+          <a:ln>
+            <a:solidFill>
+              <a:schemeClr val="tx1">
+                <a:lumMod val="50000"/>
+                <a:lumOff val="50000"/>
+              </a:schemeClr>
+            </a:solidFill>
+          </a:ln>
+        </p:spPr>
+      </p:pic>
+      <p:pic>
+        <p:nvPicPr>
+          <p:cNvPr id="16" name="Picture 15"/>
+          <p:cNvPicPr>
+            <a:picLocks noChangeAspect="1"/>
+          </p:cNvPicPr>
+          <p:nvPr/>
+        </p:nvPicPr>
+        <p:blipFill rotWithShape="1">
+          <a:blip r:embed="rId5">
+            <a:extLst>
+              <a:ext uri="{28A0092B-C50C-407E-A947-70E740481C1C}">
+                <a14:useLocalDpi xmlns:a14="http://schemas.microsoft.com/office/drawing/2010/main" val="0"/>
+              </a:ext>
+            </a:extLst>
+          </a:blip>
+          <a:srcRect t="1" b="49246"/>
+          <a:stretch/>
+        </p:blipFill>
+        <p:spPr>
+          <a:xfrm>
+            <a:off x="8966730" y="4789035"/>
+            <a:ext cx="2377646" cy="1411740"/>
+          </a:xfrm>
+          <a:prstGeom prst="rect">
+            <a:avLst/>
+          </a:prstGeom>
+        </p:spPr>
+      </p:pic>
+      <p:pic>
+        <p:nvPicPr>
+          <p:cNvPr id="17" name="Picture 16"/>
+          <p:cNvPicPr>
+            <a:picLocks noChangeAspect="1"/>
+          </p:cNvPicPr>
+          <p:nvPr/>
+        </p:nvPicPr>
+        <p:blipFill>
+          <a:blip r:embed="rId6">
+            <a:extLst>
+              <a:ext uri="{28A0092B-C50C-407E-A947-70E740481C1C}">
+                <a14:useLocalDpi xmlns:a14="http://schemas.microsoft.com/office/drawing/2010/main" val="0"/>
+              </a:ext>
+            </a:extLst>
+          </a:blip>
+          <a:stretch>
+            <a:fillRect/>
+          </a:stretch>
+        </p:blipFill>
+        <p:spPr>
+          <a:xfrm>
+            <a:off x="7061565" y="3969753"/>
+            <a:ext cx="4282811" cy="746825"/>
+          </a:xfrm>
+          <a:prstGeom prst="rect">
+            <a:avLst/>
+          </a:prstGeom>
+        </p:spPr>
+      </p:pic>
+      <p:sp>
+        <p:nvSpPr>
+          <p:cNvPr id="18" name="Content Placeholder 2"/>
+          <p:cNvSpPr txBox="1">
+            <a:spLocks/>
+          </p:cNvSpPr>
+          <p:nvPr/>
+        </p:nvSpPr>
+        <p:spPr>
+          <a:xfrm>
+            <a:off x="6695321" y="4788720"/>
+            <a:ext cx="2507650" cy="1496352"/>
+          </a:xfrm>
+          <a:prstGeom prst="rect">
+            <a:avLst/>
+          </a:prstGeom>
+        </p:spPr>
+        <p:txBody>
+          <a:bodyPr vert="horz" lIns="91440" tIns="45720" rIns="91440" bIns="45720" rtlCol="0" anchor="t">
+            <a:normAutofit/>
+          </a:bodyPr>
+          <a:lstStyle>
+            <a:lvl1pPr marL="285750" indent="-285750" algn="l" defTabSz="457200" rtl="0" eaLnBrk="1" latinLnBrk="0" hangingPunct="1">
+              <a:spcBef>
+                <a:spcPct val="20000"/>
+              </a:spcBef>
+              <a:spcAft>
+                <a:spcPts val="600"/>
+              </a:spcAft>
+              <a:buClr>
+                <a:schemeClr val="accent1"/>
+              </a:buClr>
+              <a:buSzPct val="115000"/>
+              <a:buFont typeface="Arial"/>
+              <a:buChar char="•"/>
+              <a:defRPr sz="2400" kern="1200" cap="none">
+                <a:solidFill>
+                  <a:schemeClr val="tx1">
+                    <a:lumMod val="85000"/>
+                    <a:lumOff val="15000"/>
+                  </a:schemeClr>
+                </a:solidFill>
+                <a:effectLst/>
+                <a:latin typeface="+mn-lt"/>
+                <a:ea typeface="+mn-ea"/>
+                <a:cs typeface="+mn-cs"/>
+              </a:defRPr>
+            </a:lvl1pPr>
+            <a:lvl2pPr marL="742950" indent="-285750" algn="l" defTabSz="457200" rtl="0" eaLnBrk="1" latinLnBrk="0" hangingPunct="1">
+              <a:spcBef>
+                <a:spcPct val="20000"/>
+              </a:spcBef>
+              <a:spcAft>
+                <a:spcPts val="600"/>
+              </a:spcAft>
+              <a:buClr>
+                <a:schemeClr val="accent1"/>
+              </a:buClr>
+              <a:buSzPct val="115000"/>
+              <a:buFont typeface="Arial"/>
+              <a:buChar char="•"/>
+              <a:defRPr sz="2000" kern="1200" cap="none">
+                <a:solidFill>
+                  <a:schemeClr val="tx1">
+                    <a:lumMod val="85000"/>
+                    <a:lumOff val="15000"/>
+                  </a:schemeClr>
+                </a:solidFill>
+                <a:effectLst/>
+                <a:latin typeface="+mn-lt"/>
+                <a:ea typeface="+mn-ea"/>
+                <a:cs typeface="+mn-cs"/>
+              </a:defRPr>
+            </a:lvl2pPr>
+            <a:lvl3pPr marL="1200150" indent="-285750" algn="l" defTabSz="457200" rtl="0" eaLnBrk="1" latinLnBrk="0" hangingPunct="1">
+              <a:spcBef>
+                <a:spcPct val="20000"/>
+              </a:spcBef>
+              <a:spcAft>
+                <a:spcPts val="600"/>
+              </a:spcAft>
+              <a:buClr>
+                <a:schemeClr val="accent1"/>
+              </a:buClr>
+              <a:buSzPct val="115000"/>
+              <a:buFont typeface="Arial"/>
+              <a:buChar char="•"/>
+              <a:defRPr sz="1800" kern="1200" cap="none">
+                <a:solidFill>
+                  <a:schemeClr val="tx1">
+                    <a:lumMod val="85000"/>
+                    <a:lumOff val="15000"/>
+                  </a:schemeClr>
+                </a:solidFill>
+                <a:effectLst/>
+                <a:latin typeface="+mn-lt"/>
+                <a:ea typeface="+mn-ea"/>
+                <a:cs typeface="+mn-cs"/>
+              </a:defRPr>
+            </a:lvl3pPr>
+            <a:lvl4pPr marL="1543050" indent="-171450" algn="l" defTabSz="457200" rtl="0" eaLnBrk="1" latinLnBrk="0" hangingPunct="1">
+              <a:spcBef>
+                <a:spcPct val="20000"/>
+              </a:spcBef>
+              <a:spcAft>
+                <a:spcPts val="600"/>
+              </a:spcAft>
+              <a:buClr>
+                <a:schemeClr val="accent1"/>
+              </a:buClr>
+              <a:buSzPct val="115000"/>
+              <a:buFont typeface="Arial"/>
+              <a:buChar char="•"/>
+              <a:defRPr sz="1600" kern="1200" cap="none">
+                <a:solidFill>
+                  <a:schemeClr val="tx1">
+                    <a:lumMod val="85000"/>
+                    <a:lumOff val="15000"/>
+                  </a:schemeClr>
+                </a:solidFill>
+                <a:effectLst/>
+                <a:latin typeface="+mn-lt"/>
+                <a:ea typeface="+mn-ea"/>
+                <a:cs typeface="+mn-cs"/>
+              </a:defRPr>
+            </a:lvl4pPr>
+            <a:lvl5pPr marL="2000250" indent="-171450" algn="l" defTabSz="457200" rtl="0" eaLnBrk="1" latinLnBrk="0" hangingPunct="1">
+              <a:spcBef>
+                <a:spcPct val="20000"/>
+              </a:spcBef>
+              <a:spcAft>
+                <a:spcPts val="600"/>
+              </a:spcAft>
+              <a:buClr>
+                <a:schemeClr val="accent1"/>
+              </a:buClr>
+              <a:buSzPct val="115000"/>
+              <a:buFont typeface="Arial"/>
+              <a:buChar char="•"/>
+              <a:defRPr sz="1400" kern="1200" cap="none">
+                <a:solidFill>
+                  <a:schemeClr val="tx1">
+                    <a:lumMod val="85000"/>
+                    <a:lumOff val="15000"/>
+                  </a:schemeClr>
+                </a:solidFill>
+                <a:effectLst/>
+                <a:latin typeface="+mn-lt"/>
+                <a:ea typeface="+mn-ea"/>
+                <a:cs typeface="+mn-cs"/>
+              </a:defRPr>
+            </a:lvl5pPr>
+            <a:lvl6pPr marL="2514600" indent="-228600" algn="l" defTabSz="457200" rtl="0" eaLnBrk="1" latinLnBrk="0" hangingPunct="1">
+              <a:spcBef>
+                <a:spcPct val="20000"/>
+              </a:spcBef>
+              <a:spcAft>
+                <a:spcPts val="600"/>
+              </a:spcAft>
+              <a:buClr>
+                <a:schemeClr val="accent1"/>
+              </a:buClr>
+              <a:buSzPct val="115000"/>
+              <a:buFont typeface="Arial"/>
+              <a:buChar char="•"/>
+              <a:defRPr sz="1400" kern="1200" cap="none">
+                <a:solidFill>
+                  <a:schemeClr val="tx1">
+                    <a:lumMod val="85000"/>
+                    <a:lumOff val="15000"/>
+                  </a:schemeClr>
+                </a:solidFill>
+                <a:effectLst/>
+                <a:latin typeface="+mn-lt"/>
+                <a:ea typeface="+mn-ea"/>
+                <a:cs typeface="+mn-cs"/>
+              </a:defRPr>
+            </a:lvl6pPr>
+            <a:lvl7pPr marL="2971800" indent="-228600" algn="l" defTabSz="457200" rtl="0" eaLnBrk="1" latinLnBrk="0" hangingPunct="1">
+              <a:spcBef>
+                <a:spcPct val="20000"/>
+              </a:spcBef>
+              <a:spcAft>
+                <a:spcPts val="600"/>
+              </a:spcAft>
+              <a:buClr>
+                <a:schemeClr val="accent1"/>
+              </a:buClr>
+              <a:buSzPct val="115000"/>
+              <a:buFont typeface="Arial"/>
+              <a:buChar char="•"/>
+              <a:defRPr sz="1400" kern="1200" cap="none">
+                <a:solidFill>
+                  <a:schemeClr val="tx1">
+                    <a:lumMod val="85000"/>
+                    <a:lumOff val="15000"/>
+                  </a:schemeClr>
+                </a:solidFill>
+                <a:effectLst/>
+                <a:latin typeface="+mn-lt"/>
+                <a:ea typeface="+mn-ea"/>
+                <a:cs typeface="+mn-cs"/>
+              </a:defRPr>
+            </a:lvl7pPr>
+            <a:lvl8pPr marL="3429000" indent="-228600" algn="l" defTabSz="457200" rtl="0" eaLnBrk="1" latinLnBrk="0" hangingPunct="1">
+              <a:spcBef>
+                <a:spcPct val="20000"/>
+              </a:spcBef>
+              <a:spcAft>
+                <a:spcPts val="600"/>
+              </a:spcAft>
+              <a:buClr>
+                <a:schemeClr val="accent1"/>
+              </a:buClr>
+              <a:buSzPct val="115000"/>
+              <a:buFont typeface="Arial"/>
+              <a:buChar char="•"/>
+              <a:defRPr sz="1400" kern="1200" cap="none">
+                <a:solidFill>
+                  <a:schemeClr val="tx1">
+                    <a:lumMod val="85000"/>
+                    <a:lumOff val="15000"/>
+                  </a:schemeClr>
+                </a:solidFill>
+                <a:effectLst/>
+                <a:latin typeface="+mn-lt"/>
+                <a:ea typeface="+mn-ea"/>
+                <a:cs typeface="+mn-cs"/>
+              </a:defRPr>
+            </a:lvl8pPr>
+            <a:lvl9pPr marL="3886200" indent="-228600" algn="l" defTabSz="457200" rtl="0" eaLnBrk="1" latinLnBrk="0" hangingPunct="1">
+              <a:spcBef>
+                <a:spcPct val="20000"/>
+              </a:spcBef>
+              <a:spcAft>
+                <a:spcPts val="600"/>
+              </a:spcAft>
+              <a:buClr>
+                <a:schemeClr val="accent1"/>
+              </a:buClr>
+              <a:buSzPct val="115000"/>
+              <a:buFont typeface="Arial"/>
+              <a:buChar char="•"/>
+              <a:defRPr sz="1400" kern="1200" cap="none">
+                <a:solidFill>
+                  <a:schemeClr val="tx1">
+                    <a:lumMod val="85000"/>
+                    <a:lumOff val="15000"/>
+                  </a:schemeClr>
+                </a:solidFill>
+                <a:effectLst/>
+                <a:latin typeface="+mn-lt"/>
+                <a:ea typeface="+mn-ea"/>
+                <a:cs typeface="+mn-cs"/>
+              </a:defRPr>
+            </a:lvl9pPr>
+          </a:lstStyle>
+          <a:p>
+            <a:pPr lvl="1"/>
+            <a:r>
+              <a:rPr lang="en-US" sz="1600" dirty="0" smtClean="0"/>
+              <a:t>Select the “Repository” heading from the top navigation panel</a:t>
+            </a:r>
+          </a:p>
+          <a:p>
+            <a:endParaRPr lang="en-US" dirty="0"/>
+          </a:p>
+        </p:txBody>
+      </p:sp>
+      <p:sp>
+        <p:nvSpPr>
+          <p:cNvPr id="20" name="Content Placeholder 2"/>
+          <p:cNvSpPr txBox="1">
+            <a:spLocks/>
+          </p:cNvSpPr>
+          <p:nvPr/>
+        </p:nvSpPr>
+        <p:spPr>
+          <a:xfrm rot="11109830" flipH="1" flipV="1">
+            <a:off x="8101997" y="5763114"/>
+            <a:ext cx="457200" cy="510574"/>
+          </a:xfrm>
+          <a:prstGeom prst="rect">
+            <a:avLst/>
+          </a:prstGeom>
+        </p:spPr>
+        <p:txBody>
+          <a:bodyPr vert="horz" lIns="91440" tIns="45720" rIns="91440" bIns="45720" rtlCol="0" anchor="t">
+            <a:normAutofit/>
+          </a:bodyPr>
+          <a:lstStyle>
+            <a:lvl1pPr marL="285750" indent="-285750" algn="l" defTabSz="457200" rtl="0" eaLnBrk="1" latinLnBrk="0" hangingPunct="1">
+              <a:spcBef>
+                <a:spcPct val="20000"/>
+              </a:spcBef>
+              <a:spcAft>
+                <a:spcPts val="600"/>
+              </a:spcAft>
+              <a:buClr>
+                <a:schemeClr val="accent1"/>
+              </a:buClr>
+              <a:buSzPct val="115000"/>
+              <a:buFont typeface="Arial"/>
+              <a:buChar char="•"/>
+              <a:defRPr sz="2400" kern="1200" cap="none">
+                <a:solidFill>
+                  <a:schemeClr val="tx1">
+                    <a:lumMod val="85000"/>
+                    <a:lumOff val="15000"/>
+                  </a:schemeClr>
+                </a:solidFill>
+                <a:effectLst/>
+                <a:latin typeface="+mn-lt"/>
+                <a:ea typeface="+mn-ea"/>
+                <a:cs typeface="+mn-cs"/>
+              </a:defRPr>
+            </a:lvl1pPr>
+            <a:lvl2pPr marL="742950" indent="-285750" algn="l" defTabSz="457200" rtl="0" eaLnBrk="1" latinLnBrk="0" hangingPunct="1">
+              <a:spcBef>
+                <a:spcPct val="20000"/>
+              </a:spcBef>
+              <a:spcAft>
+                <a:spcPts val="600"/>
+              </a:spcAft>
+              <a:buClr>
+                <a:schemeClr val="accent1"/>
+              </a:buClr>
+              <a:buSzPct val="115000"/>
+              <a:buFont typeface="Arial"/>
+              <a:buChar char="•"/>
+              <a:defRPr sz="2000" kern="1200" cap="none">
+                <a:solidFill>
+                  <a:schemeClr val="tx1">
+                    <a:lumMod val="85000"/>
+                    <a:lumOff val="15000"/>
+                  </a:schemeClr>
+                </a:solidFill>
+                <a:effectLst/>
+                <a:latin typeface="+mn-lt"/>
+                <a:ea typeface="+mn-ea"/>
+                <a:cs typeface="+mn-cs"/>
+              </a:defRPr>
+            </a:lvl2pPr>
+            <a:lvl3pPr marL="1200150" indent="-285750" algn="l" defTabSz="457200" rtl="0" eaLnBrk="1" latinLnBrk="0" hangingPunct="1">
+              <a:spcBef>
+                <a:spcPct val="20000"/>
+              </a:spcBef>
+              <a:spcAft>
+                <a:spcPts val="600"/>
+              </a:spcAft>
+              <a:buClr>
+                <a:schemeClr val="accent1"/>
+              </a:buClr>
+              <a:buSzPct val="115000"/>
+              <a:buFont typeface="Arial"/>
+              <a:buChar char="•"/>
+              <a:defRPr sz="1800" kern="1200" cap="none">
+                <a:solidFill>
+                  <a:schemeClr val="tx1">
+                    <a:lumMod val="85000"/>
+                    <a:lumOff val="15000"/>
+                  </a:schemeClr>
+                </a:solidFill>
+                <a:effectLst/>
+                <a:latin typeface="+mn-lt"/>
+                <a:ea typeface="+mn-ea"/>
+                <a:cs typeface="+mn-cs"/>
+              </a:defRPr>
+            </a:lvl3pPr>
+            <a:lvl4pPr marL="1543050" indent="-171450" algn="l" defTabSz="457200" rtl="0" eaLnBrk="1" latinLnBrk="0" hangingPunct="1">
+              <a:spcBef>
+                <a:spcPct val="20000"/>
+              </a:spcBef>
+              <a:spcAft>
+                <a:spcPts val="600"/>
+              </a:spcAft>
+              <a:buClr>
+                <a:schemeClr val="accent1"/>
+              </a:buClr>
+              <a:buSzPct val="115000"/>
+              <a:buFont typeface="Arial"/>
+              <a:buChar char="•"/>
+              <a:defRPr sz="1600" kern="1200" cap="none">
+                <a:solidFill>
+                  <a:schemeClr val="tx1">
+                    <a:lumMod val="85000"/>
+                    <a:lumOff val="15000"/>
+                  </a:schemeClr>
+                </a:solidFill>
+                <a:effectLst/>
+                <a:latin typeface="+mn-lt"/>
+                <a:ea typeface="+mn-ea"/>
+                <a:cs typeface="+mn-cs"/>
+              </a:defRPr>
+            </a:lvl4pPr>
+            <a:lvl5pPr marL="2000250" indent="-171450" algn="l" defTabSz="457200" rtl="0" eaLnBrk="1" latinLnBrk="0" hangingPunct="1">
+              <a:spcBef>
+                <a:spcPct val="20000"/>
+              </a:spcBef>
+              <a:spcAft>
+                <a:spcPts val="600"/>
+              </a:spcAft>
+              <a:buClr>
+                <a:schemeClr val="accent1"/>
+              </a:buClr>
+              <a:buSzPct val="115000"/>
+              <a:buFont typeface="Arial"/>
+              <a:buChar char="•"/>
+              <a:defRPr sz="1400" kern="1200" cap="none">
+                <a:solidFill>
+                  <a:schemeClr val="tx1">
+                    <a:lumMod val="85000"/>
+                    <a:lumOff val="15000"/>
+                  </a:schemeClr>
+                </a:solidFill>
+                <a:effectLst/>
+                <a:latin typeface="+mn-lt"/>
+                <a:ea typeface="+mn-ea"/>
+                <a:cs typeface="+mn-cs"/>
+              </a:defRPr>
+            </a:lvl5pPr>
+            <a:lvl6pPr marL="2514600" indent="-228600" algn="l" defTabSz="457200" rtl="0" eaLnBrk="1" latinLnBrk="0" hangingPunct="1">
+              <a:spcBef>
+                <a:spcPct val="20000"/>
+              </a:spcBef>
+              <a:spcAft>
+                <a:spcPts val="600"/>
+              </a:spcAft>
+              <a:buClr>
+                <a:schemeClr val="accent1"/>
+              </a:buClr>
+              <a:buSzPct val="115000"/>
+              <a:buFont typeface="Arial"/>
+              <a:buChar char="•"/>
+              <a:defRPr sz="1400" kern="1200" cap="none">
+                <a:solidFill>
+                  <a:schemeClr val="tx1">
+                    <a:lumMod val="85000"/>
+                    <a:lumOff val="15000"/>
+                  </a:schemeClr>
+                </a:solidFill>
+                <a:effectLst/>
+                <a:latin typeface="+mn-lt"/>
+                <a:ea typeface="+mn-ea"/>
+                <a:cs typeface="+mn-cs"/>
+              </a:defRPr>
+            </a:lvl6pPr>
+            <a:lvl7pPr marL="2971800" indent="-228600" algn="l" defTabSz="457200" rtl="0" eaLnBrk="1" latinLnBrk="0" hangingPunct="1">
+              <a:spcBef>
+                <a:spcPct val="20000"/>
+              </a:spcBef>
+              <a:spcAft>
+                <a:spcPts val="600"/>
+              </a:spcAft>
+              <a:buClr>
+                <a:schemeClr val="accent1"/>
+              </a:buClr>
+              <a:buSzPct val="115000"/>
+              <a:buFont typeface="Arial"/>
+              <a:buChar char="•"/>
+              <a:defRPr sz="1400" kern="1200" cap="none">
+                <a:solidFill>
+                  <a:schemeClr val="tx1">
+                    <a:lumMod val="85000"/>
+                    <a:lumOff val="15000"/>
+                  </a:schemeClr>
+                </a:solidFill>
+                <a:effectLst/>
+                <a:latin typeface="+mn-lt"/>
+                <a:ea typeface="+mn-ea"/>
+                <a:cs typeface="+mn-cs"/>
+              </a:defRPr>
+            </a:lvl7pPr>
+            <a:lvl8pPr marL="3429000" indent="-228600" algn="l" defTabSz="457200" rtl="0" eaLnBrk="1" latinLnBrk="0" hangingPunct="1">
+              <a:spcBef>
+                <a:spcPct val="20000"/>
+              </a:spcBef>
+              <a:spcAft>
+                <a:spcPts val="600"/>
+              </a:spcAft>
+              <a:buClr>
+                <a:schemeClr val="accent1"/>
+              </a:buClr>
+              <a:buSzPct val="115000"/>
+              <a:buFont typeface="Arial"/>
+              <a:buChar char="•"/>
+              <a:defRPr sz="1400" kern="1200" cap="none">
+                <a:solidFill>
+                  <a:schemeClr val="tx1">
+                    <a:lumMod val="85000"/>
+                    <a:lumOff val="15000"/>
+                  </a:schemeClr>
+                </a:solidFill>
+                <a:effectLst/>
+                <a:latin typeface="+mn-lt"/>
+                <a:ea typeface="+mn-ea"/>
+                <a:cs typeface="+mn-cs"/>
+              </a:defRPr>
+            </a:lvl8pPr>
+            <a:lvl9pPr marL="3886200" indent="-228600" algn="l" defTabSz="457200" rtl="0" eaLnBrk="1" latinLnBrk="0" hangingPunct="1">
+              <a:spcBef>
+                <a:spcPct val="20000"/>
+              </a:spcBef>
+              <a:spcAft>
+                <a:spcPts val="600"/>
+              </a:spcAft>
+              <a:buClr>
+                <a:schemeClr val="accent1"/>
+              </a:buClr>
+              <a:buSzPct val="115000"/>
+              <a:buFont typeface="Arial"/>
+              <a:buChar char="•"/>
+              <a:defRPr sz="1400" kern="1200" cap="none">
+                <a:solidFill>
+                  <a:schemeClr val="tx1">
+                    <a:lumMod val="85000"/>
+                    <a:lumOff val="15000"/>
+                  </a:schemeClr>
+                </a:solidFill>
+                <a:effectLst/>
+                <a:latin typeface="+mn-lt"/>
+                <a:ea typeface="+mn-ea"/>
+                <a:cs typeface="+mn-cs"/>
+              </a:defRPr>
+            </a:lvl9pPr>
+          </a:lstStyle>
+          <a:p>
+            <a:pPr marL="0" indent="0">
+              <a:buNone/>
+            </a:pPr>
+            <a:r>
+              <a:rPr lang="en-US" dirty="0" smtClean="0">
+                <a:sym typeface="Wingdings" panose="05000000000000000000" pitchFamily="2" charset="2"/>
+              </a:rPr>
+              <a:t></a:t>
+            </a:r>
+            <a:endParaRPr lang="en-US" dirty="0"/>
+          </a:p>
+        </p:txBody>
+      </p:sp>
+    </p:spTree>
+    <p:extLst>
+      <p:ext uri="{BB962C8B-B14F-4D97-AF65-F5344CB8AC3E}">
+        <p14:creationId xmlns:p14="http://schemas.microsoft.com/office/powerpoint/2010/main" val="230511513"/>
+      </p:ext>
+    </p:extLst>
+  </p:cSld>
+  <p:clrMapOvr>
+    <a:masterClrMapping/>
+  </p:clrMapOvr>
+  <p:timing>
+    <p:tnLst>
+      <p:par>
+        <p:cTn id="1" dur="indefinite" restart="never" nodeType="tmRoot"/>
+      </p:par>
+    </p:tnLst>
+  </p:timing>
+</p:sld>
+</file>
+
+<file path=ppt/slides/slide28.xml><?xml version="1.0" encoding="utf-8"?>
+<p:sld xmlns:a="http://schemas.openxmlformats.org/drawingml/2006/main" xmlns:r="http://schemas.openxmlformats.org/officeDocument/2006/relationships" xmlns:p="http://schemas.openxmlformats.org/presentationml/2006/main">
+  <p:cSld>
+    <p:spTree>
+      <p:nvGrpSpPr>
+        <p:cNvPr id="1" name=""/>
+        <p:cNvGrpSpPr/>
+        <p:nvPr/>
+      </p:nvGrpSpPr>
+      <p:grpSpPr>
+        <a:xfrm>
+          <a:off x="0" y="0"/>
+          <a:ext cx="0" cy="0"/>
+          <a:chOff x="0" y="0"/>
+          <a:chExt cx="0" cy="0"/>
+        </a:xfrm>
+      </p:grpSpPr>
+      <p:sp>
+        <p:nvSpPr>
+          <p:cNvPr id="2" name="Title 1"/>
+          <p:cNvSpPr>
+            <a:spLocks noGrp="1"/>
+          </p:cNvSpPr>
+          <p:nvPr>
+            <p:ph type="title"/>
+          </p:nvPr>
+        </p:nvSpPr>
+        <p:spPr/>
+        <p:txBody>
+          <a:bodyPr/>
+          <a:lstStyle/>
+          <a:p>
+            <a:r>
+              <a:rPr lang="en-US" dirty="0" smtClean="0"/>
               <a:t>Credits</a:t>
             </a:r>
             <a:endParaRPr lang="en-US" dirty="0"/>
@@ -16208,7 +18856,7 @@
 </p:sld>
 </file>
 
-<file path=ppt/slides/slide27.xml><?xml version="1.0" encoding="utf-8"?>
+<file path=ppt/slides/slide29.xml><?xml version="1.0" encoding="utf-8"?>
 <p:sld xmlns:a="http://schemas.openxmlformats.org/drawingml/2006/main" xmlns:r="http://schemas.openxmlformats.org/officeDocument/2006/relationships" xmlns:p="http://schemas.openxmlformats.org/presentationml/2006/main">
   <p:cSld>
     <p:spTree>
@@ -16225,559 +18873,6 @@
           <a:chExt cx="0" cy="0"/>
         </a:xfrm>
       </p:grpSpPr>
-      <p:sp>
-        <p:nvSpPr>
-          <p:cNvPr id="3" name="Content Placeholder 2"/>
-          <p:cNvSpPr txBox="1">
-            <a:spLocks/>
-          </p:cNvSpPr>
-          <p:nvPr/>
-        </p:nvSpPr>
-        <p:spPr>
-          <a:xfrm>
-            <a:off x="6253913" y="2611390"/>
-            <a:ext cx="4718304" cy="3310128"/>
-          </a:xfrm>
-          <a:prstGeom prst="rect">
-            <a:avLst/>
-          </a:prstGeom>
-        </p:spPr>
-        <p:txBody>
-          <a:bodyPr vert="horz" lIns="91440" tIns="45720" rIns="91440" bIns="45720" rtlCol="0" anchor="t">
-            <a:normAutofit/>
-          </a:bodyPr>
-          <a:lstStyle>
-            <a:lvl1pPr marL="285750" indent="-285750" algn="l" defTabSz="457200" rtl="0" eaLnBrk="1" latinLnBrk="0" hangingPunct="1">
-              <a:spcBef>
-                <a:spcPct val="20000"/>
-              </a:spcBef>
-              <a:spcAft>
-                <a:spcPts val="600"/>
-              </a:spcAft>
-              <a:buClr>
-                <a:schemeClr val="accent1"/>
-              </a:buClr>
-              <a:buSzPct val="115000"/>
-              <a:buFont typeface="Arial"/>
-              <a:buChar char="•"/>
-              <a:defRPr sz="2400" kern="1200" cap="none">
-                <a:solidFill>
-                  <a:schemeClr val="tx1">
-                    <a:lumMod val="85000"/>
-                    <a:lumOff val="15000"/>
-                  </a:schemeClr>
-                </a:solidFill>
-                <a:effectLst/>
-                <a:latin typeface="+mn-lt"/>
-                <a:ea typeface="+mn-ea"/>
-                <a:cs typeface="+mn-cs"/>
-              </a:defRPr>
-            </a:lvl1pPr>
-            <a:lvl2pPr marL="742950" indent="-285750" algn="l" defTabSz="457200" rtl="0" eaLnBrk="1" latinLnBrk="0" hangingPunct="1">
-              <a:spcBef>
-                <a:spcPct val="20000"/>
-              </a:spcBef>
-              <a:spcAft>
-                <a:spcPts val="600"/>
-              </a:spcAft>
-              <a:buClr>
-                <a:schemeClr val="accent1"/>
-              </a:buClr>
-              <a:buSzPct val="115000"/>
-              <a:buFont typeface="Arial"/>
-              <a:buChar char="•"/>
-              <a:defRPr sz="2000" kern="1200" cap="none">
-                <a:solidFill>
-                  <a:schemeClr val="tx1">
-                    <a:lumMod val="85000"/>
-                    <a:lumOff val="15000"/>
-                  </a:schemeClr>
-                </a:solidFill>
-                <a:effectLst/>
-                <a:latin typeface="+mn-lt"/>
-                <a:ea typeface="+mn-ea"/>
-                <a:cs typeface="+mn-cs"/>
-              </a:defRPr>
-            </a:lvl2pPr>
-            <a:lvl3pPr marL="1200150" indent="-285750" algn="l" defTabSz="457200" rtl="0" eaLnBrk="1" latinLnBrk="0" hangingPunct="1">
-              <a:spcBef>
-                <a:spcPct val="20000"/>
-              </a:spcBef>
-              <a:spcAft>
-                <a:spcPts val="600"/>
-              </a:spcAft>
-              <a:buClr>
-                <a:schemeClr val="accent1"/>
-              </a:buClr>
-              <a:buSzPct val="115000"/>
-              <a:buFont typeface="Arial"/>
-              <a:buChar char="•"/>
-              <a:defRPr sz="1800" kern="1200" cap="none">
-                <a:solidFill>
-                  <a:schemeClr val="tx1">
-                    <a:lumMod val="85000"/>
-                    <a:lumOff val="15000"/>
-                  </a:schemeClr>
-                </a:solidFill>
-                <a:effectLst/>
-                <a:latin typeface="+mn-lt"/>
-                <a:ea typeface="+mn-ea"/>
-                <a:cs typeface="+mn-cs"/>
-              </a:defRPr>
-            </a:lvl3pPr>
-            <a:lvl4pPr marL="1543050" indent="-171450" algn="l" defTabSz="457200" rtl="0" eaLnBrk="1" latinLnBrk="0" hangingPunct="1">
-              <a:spcBef>
-                <a:spcPct val="20000"/>
-              </a:spcBef>
-              <a:spcAft>
-                <a:spcPts val="600"/>
-              </a:spcAft>
-              <a:buClr>
-                <a:schemeClr val="accent1"/>
-              </a:buClr>
-              <a:buSzPct val="115000"/>
-              <a:buFont typeface="Arial"/>
-              <a:buChar char="•"/>
-              <a:defRPr sz="1600" kern="1200" cap="none">
-                <a:solidFill>
-                  <a:schemeClr val="tx1">
-                    <a:lumMod val="85000"/>
-                    <a:lumOff val="15000"/>
-                  </a:schemeClr>
-                </a:solidFill>
-                <a:effectLst/>
-                <a:latin typeface="+mn-lt"/>
-                <a:ea typeface="+mn-ea"/>
-                <a:cs typeface="+mn-cs"/>
-              </a:defRPr>
-            </a:lvl4pPr>
-            <a:lvl5pPr marL="2000250" indent="-171450" algn="l" defTabSz="457200" rtl="0" eaLnBrk="1" latinLnBrk="0" hangingPunct="1">
-              <a:spcBef>
-                <a:spcPct val="20000"/>
-              </a:spcBef>
-              <a:spcAft>
-                <a:spcPts val="600"/>
-              </a:spcAft>
-              <a:buClr>
-                <a:schemeClr val="accent1"/>
-              </a:buClr>
-              <a:buSzPct val="115000"/>
-              <a:buFont typeface="Arial"/>
-              <a:buChar char="•"/>
-              <a:defRPr sz="1400" kern="1200" cap="none">
-                <a:solidFill>
-                  <a:schemeClr val="tx1">
-                    <a:lumMod val="85000"/>
-                    <a:lumOff val="15000"/>
-                  </a:schemeClr>
-                </a:solidFill>
-                <a:effectLst/>
-                <a:latin typeface="+mn-lt"/>
-                <a:ea typeface="+mn-ea"/>
-                <a:cs typeface="+mn-cs"/>
-              </a:defRPr>
-            </a:lvl5pPr>
-            <a:lvl6pPr marL="2514600" indent="-228600" algn="l" defTabSz="457200" rtl="0" eaLnBrk="1" latinLnBrk="0" hangingPunct="1">
-              <a:spcBef>
-                <a:spcPct val="20000"/>
-              </a:spcBef>
-              <a:spcAft>
-                <a:spcPts val="600"/>
-              </a:spcAft>
-              <a:buClr>
-                <a:schemeClr val="accent1"/>
-              </a:buClr>
-              <a:buSzPct val="115000"/>
-              <a:buFont typeface="Arial"/>
-              <a:buChar char="•"/>
-              <a:defRPr sz="1400" kern="1200" cap="none">
-                <a:solidFill>
-                  <a:schemeClr val="tx1">
-                    <a:lumMod val="85000"/>
-                    <a:lumOff val="15000"/>
-                  </a:schemeClr>
-                </a:solidFill>
-                <a:effectLst/>
-                <a:latin typeface="+mn-lt"/>
-                <a:ea typeface="+mn-ea"/>
-                <a:cs typeface="+mn-cs"/>
-              </a:defRPr>
-            </a:lvl6pPr>
-            <a:lvl7pPr marL="2971800" indent="-228600" algn="l" defTabSz="457200" rtl="0" eaLnBrk="1" latinLnBrk="0" hangingPunct="1">
-              <a:spcBef>
-                <a:spcPct val="20000"/>
-              </a:spcBef>
-              <a:spcAft>
-                <a:spcPts val="600"/>
-              </a:spcAft>
-              <a:buClr>
-                <a:schemeClr val="accent1"/>
-              </a:buClr>
-              <a:buSzPct val="115000"/>
-              <a:buFont typeface="Arial"/>
-              <a:buChar char="•"/>
-              <a:defRPr sz="1400" kern="1200" cap="none">
-                <a:solidFill>
-                  <a:schemeClr val="tx1">
-                    <a:lumMod val="85000"/>
-                    <a:lumOff val="15000"/>
-                  </a:schemeClr>
-                </a:solidFill>
-                <a:effectLst/>
-                <a:latin typeface="+mn-lt"/>
-                <a:ea typeface="+mn-ea"/>
-                <a:cs typeface="+mn-cs"/>
-              </a:defRPr>
-            </a:lvl7pPr>
-            <a:lvl8pPr marL="3429000" indent="-228600" algn="l" defTabSz="457200" rtl="0" eaLnBrk="1" latinLnBrk="0" hangingPunct="1">
-              <a:spcBef>
-                <a:spcPct val="20000"/>
-              </a:spcBef>
-              <a:spcAft>
-                <a:spcPts val="600"/>
-              </a:spcAft>
-              <a:buClr>
-                <a:schemeClr val="accent1"/>
-              </a:buClr>
-              <a:buSzPct val="115000"/>
-              <a:buFont typeface="Arial"/>
-              <a:buChar char="•"/>
-              <a:defRPr sz="1400" kern="1200" cap="none">
-                <a:solidFill>
-                  <a:schemeClr val="tx1">
-                    <a:lumMod val="85000"/>
-                    <a:lumOff val="15000"/>
-                  </a:schemeClr>
-                </a:solidFill>
-                <a:effectLst/>
-                <a:latin typeface="+mn-lt"/>
-                <a:ea typeface="+mn-ea"/>
-                <a:cs typeface="+mn-cs"/>
-              </a:defRPr>
-            </a:lvl8pPr>
-            <a:lvl9pPr marL="3886200" indent="-228600" algn="l" defTabSz="457200" rtl="0" eaLnBrk="1" latinLnBrk="0" hangingPunct="1">
-              <a:spcBef>
-                <a:spcPct val="20000"/>
-              </a:spcBef>
-              <a:spcAft>
-                <a:spcPts val="600"/>
-              </a:spcAft>
-              <a:buClr>
-                <a:schemeClr val="accent1"/>
-              </a:buClr>
-              <a:buSzPct val="115000"/>
-              <a:buFont typeface="Arial"/>
-              <a:buChar char="•"/>
-              <a:defRPr sz="1400" kern="1200" cap="none">
-                <a:solidFill>
-                  <a:schemeClr val="tx1">
-                    <a:lumMod val="85000"/>
-                    <a:lumOff val="15000"/>
-                  </a:schemeClr>
-                </a:solidFill>
-                <a:effectLst/>
-                <a:latin typeface="+mn-lt"/>
-                <a:ea typeface="+mn-ea"/>
-                <a:cs typeface="+mn-cs"/>
-              </a:defRPr>
-            </a:lvl9pPr>
-          </a:lstStyle>
-          <a:p>
-            <a:pPr lvl="1"/>
-            <a:r>
-              <a:rPr lang="en-US" dirty="0" smtClean="0"/>
-              <a:t>To </a:t>
-            </a:r>
-            <a:r>
-              <a:rPr lang="en-US" dirty="0" smtClean="0"/>
-              <a:t>retrieve your online repositories locally, select “Pull” under the “Repository” heading</a:t>
-            </a:r>
-          </a:p>
-          <a:p>
-            <a:pPr lvl="1"/>
-            <a:r>
-              <a:rPr lang="en-US" dirty="0" smtClean="0"/>
-              <a:t>After </a:t>
-            </a:r>
-          </a:p>
-          <a:p>
-            <a:pPr lvl="1"/>
-            <a:endParaRPr lang="en-US" dirty="0"/>
-          </a:p>
-        </p:txBody>
-      </p:sp>
-      <p:sp>
-        <p:nvSpPr>
-          <p:cNvPr id="4" name="Content Placeholder 2"/>
-          <p:cNvSpPr txBox="1">
-            <a:spLocks/>
-          </p:cNvSpPr>
-          <p:nvPr/>
-        </p:nvSpPr>
-        <p:spPr>
-          <a:xfrm>
-            <a:off x="1298448" y="2560320"/>
-            <a:ext cx="4718304" cy="1288097"/>
-          </a:xfrm>
-          <a:prstGeom prst="rect">
-            <a:avLst/>
-          </a:prstGeom>
-        </p:spPr>
-        <p:txBody>
-          <a:bodyPr>
-            <a:normAutofit fontScale="85000" lnSpcReduction="20000"/>
-          </a:bodyPr>
-          <a:lstStyle>
-            <a:lvl1pPr marL="285750" indent="-285750" algn="l" defTabSz="457200" rtl="0" eaLnBrk="1" latinLnBrk="0" hangingPunct="1">
-              <a:spcBef>
-                <a:spcPct val="20000"/>
-              </a:spcBef>
-              <a:spcAft>
-                <a:spcPts val="600"/>
-              </a:spcAft>
-              <a:buClr>
-                <a:schemeClr val="accent1"/>
-              </a:buClr>
-              <a:buSzPct val="115000"/>
-              <a:buFont typeface="Arial"/>
-              <a:buChar char="•"/>
-              <a:defRPr sz="2400" kern="1200" cap="none">
-                <a:solidFill>
-                  <a:schemeClr val="tx1">
-                    <a:lumMod val="85000"/>
-                    <a:lumOff val="15000"/>
-                  </a:schemeClr>
-                </a:solidFill>
-                <a:effectLst/>
-                <a:latin typeface="+mn-lt"/>
-                <a:ea typeface="+mn-ea"/>
-                <a:cs typeface="+mn-cs"/>
-              </a:defRPr>
-            </a:lvl1pPr>
-            <a:lvl2pPr marL="742950" indent="-285750" algn="l" defTabSz="457200" rtl="0" eaLnBrk="1" latinLnBrk="0" hangingPunct="1">
-              <a:spcBef>
-                <a:spcPct val="20000"/>
-              </a:spcBef>
-              <a:spcAft>
-                <a:spcPts val="600"/>
-              </a:spcAft>
-              <a:buClr>
-                <a:schemeClr val="accent1"/>
-              </a:buClr>
-              <a:buSzPct val="115000"/>
-              <a:buFont typeface="Arial"/>
-              <a:buChar char="•"/>
-              <a:defRPr sz="2000" kern="1200" cap="none">
-                <a:solidFill>
-                  <a:schemeClr val="tx1">
-                    <a:lumMod val="85000"/>
-                    <a:lumOff val="15000"/>
-                  </a:schemeClr>
-                </a:solidFill>
-                <a:effectLst/>
-                <a:latin typeface="+mn-lt"/>
-                <a:ea typeface="+mn-ea"/>
-                <a:cs typeface="+mn-cs"/>
-              </a:defRPr>
-            </a:lvl2pPr>
-            <a:lvl3pPr marL="1200150" indent="-285750" algn="l" defTabSz="457200" rtl="0" eaLnBrk="1" latinLnBrk="0" hangingPunct="1">
-              <a:spcBef>
-                <a:spcPct val="20000"/>
-              </a:spcBef>
-              <a:spcAft>
-                <a:spcPts val="600"/>
-              </a:spcAft>
-              <a:buClr>
-                <a:schemeClr val="accent1"/>
-              </a:buClr>
-              <a:buSzPct val="115000"/>
-              <a:buFont typeface="Arial"/>
-              <a:buChar char="•"/>
-              <a:defRPr sz="1800" kern="1200" cap="none">
-                <a:solidFill>
-                  <a:schemeClr val="tx1">
-                    <a:lumMod val="85000"/>
-                    <a:lumOff val="15000"/>
-                  </a:schemeClr>
-                </a:solidFill>
-                <a:effectLst/>
-                <a:latin typeface="+mn-lt"/>
-                <a:ea typeface="+mn-ea"/>
-                <a:cs typeface="+mn-cs"/>
-              </a:defRPr>
-            </a:lvl3pPr>
-            <a:lvl4pPr marL="1543050" indent="-171450" algn="l" defTabSz="457200" rtl="0" eaLnBrk="1" latinLnBrk="0" hangingPunct="1">
-              <a:spcBef>
-                <a:spcPct val="20000"/>
-              </a:spcBef>
-              <a:spcAft>
-                <a:spcPts val="600"/>
-              </a:spcAft>
-              <a:buClr>
-                <a:schemeClr val="accent1"/>
-              </a:buClr>
-              <a:buSzPct val="115000"/>
-              <a:buFont typeface="Arial"/>
-              <a:buChar char="•"/>
-              <a:defRPr sz="1600" kern="1200" cap="none">
-                <a:solidFill>
-                  <a:schemeClr val="tx1">
-                    <a:lumMod val="85000"/>
-                    <a:lumOff val="15000"/>
-                  </a:schemeClr>
-                </a:solidFill>
-                <a:effectLst/>
-                <a:latin typeface="+mn-lt"/>
-                <a:ea typeface="+mn-ea"/>
-                <a:cs typeface="+mn-cs"/>
-              </a:defRPr>
-            </a:lvl4pPr>
-            <a:lvl5pPr marL="2000250" indent="-171450" algn="l" defTabSz="457200" rtl="0" eaLnBrk="1" latinLnBrk="0" hangingPunct="1">
-              <a:spcBef>
-                <a:spcPct val="20000"/>
-              </a:spcBef>
-              <a:spcAft>
-                <a:spcPts val="600"/>
-              </a:spcAft>
-              <a:buClr>
-                <a:schemeClr val="accent1"/>
-              </a:buClr>
-              <a:buSzPct val="115000"/>
-              <a:buFont typeface="Arial"/>
-              <a:buChar char="•"/>
-              <a:defRPr sz="1400" kern="1200" cap="none">
-                <a:solidFill>
-                  <a:schemeClr val="tx1">
-                    <a:lumMod val="85000"/>
-                    <a:lumOff val="15000"/>
-                  </a:schemeClr>
-                </a:solidFill>
-                <a:effectLst/>
-                <a:latin typeface="+mn-lt"/>
-                <a:ea typeface="+mn-ea"/>
-                <a:cs typeface="+mn-cs"/>
-              </a:defRPr>
-            </a:lvl5pPr>
-            <a:lvl6pPr marL="2514600" indent="-228600" algn="l" defTabSz="457200" rtl="0" eaLnBrk="1" latinLnBrk="0" hangingPunct="1">
-              <a:spcBef>
-                <a:spcPct val="20000"/>
-              </a:spcBef>
-              <a:spcAft>
-                <a:spcPts val="600"/>
-              </a:spcAft>
-              <a:buClr>
-                <a:schemeClr val="accent1"/>
-              </a:buClr>
-              <a:buSzPct val="115000"/>
-              <a:buFont typeface="Arial"/>
-              <a:buChar char="•"/>
-              <a:defRPr sz="1400" kern="1200" cap="none">
-                <a:solidFill>
-                  <a:schemeClr val="tx1">
-                    <a:lumMod val="85000"/>
-                    <a:lumOff val="15000"/>
-                  </a:schemeClr>
-                </a:solidFill>
-                <a:effectLst/>
-                <a:latin typeface="+mn-lt"/>
-                <a:ea typeface="+mn-ea"/>
-                <a:cs typeface="+mn-cs"/>
-              </a:defRPr>
-            </a:lvl6pPr>
-            <a:lvl7pPr marL="2971800" indent="-228600" algn="l" defTabSz="457200" rtl="0" eaLnBrk="1" latinLnBrk="0" hangingPunct="1">
-              <a:spcBef>
-                <a:spcPct val="20000"/>
-              </a:spcBef>
-              <a:spcAft>
-                <a:spcPts val="600"/>
-              </a:spcAft>
-              <a:buClr>
-                <a:schemeClr val="accent1"/>
-              </a:buClr>
-              <a:buSzPct val="115000"/>
-              <a:buFont typeface="Arial"/>
-              <a:buChar char="•"/>
-              <a:defRPr sz="1400" kern="1200" cap="none">
-                <a:solidFill>
-                  <a:schemeClr val="tx1">
-                    <a:lumMod val="85000"/>
-                    <a:lumOff val="15000"/>
-                  </a:schemeClr>
-                </a:solidFill>
-                <a:effectLst/>
-                <a:latin typeface="+mn-lt"/>
-                <a:ea typeface="+mn-ea"/>
-                <a:cs typeface="+mn-cs"/>
-              </a:defRPr>
-            </a:lvl7pPr>
-            <a:lvl8pPr marL="3429000" indent="-228600" algn="l" defTabSz="457200" rtl="0" eaLnBrk="1" latinLnBrk="0" hangingPunct="1">
-              <a:spcBef>
-                <a:spcPct val="20000"/>
-              </a:spcBef>
-              <a:spcAft>
-                <a:spcPts val="600"/>
-              </a:spcAft>
-              <a:buClr>
-                <a:schemeClr val="accent1"/>
-              </a:buClr>
-              <a:buSzPct val="115000"/>
-              <a:buFont typeface="Arial"/>
-              <a:buChar char="•"/>
-              <a:defRPr sz="1400" kern="1200" cap="none">
-                <a:solidFill>
-                  <a:schemeClr val="tx1">
-                    <a:lumMod val="85000"/>
-                    <a:lumOff val="15000"/>
-                  </a:schemeClr>
-                </a:solidFill>
-                <a:effectLst/>
-                <a:latin typeface="+mn-lt"/>
-                <a:ea typeface="+mn-ea"/>
-                <a:cs typeface="+mn-cs"/>
-              </a:defRPr>
-            </a:lvl8pPr>
-            <a:lvl9pPr marL="3886200" indent="-228600" algn="l" defTabSz="457200" rtl="0" eaLnBrk="1" latinLnBrk="0" hangingPunct="1">
-              <a:spcBef>
-                <a:spcPct val="20000"/>
-              </a:spcBef>
-              <a:spcAft>
-                <a:spcPts val="600"/>
-              </a:spcAft>
-              <a:buClr>
-                <a:schemeClr val="accent1"/>
-              </a:buClr>
-              <a:buSzPct val="115000"/>
-              <a:buFont typeface="Arial"/>
-              <a:buChar char="•"/>
-              <a:defRPr sz="1400" kern="1200" cap="none">
-                <a:solidFill>
-                  <a:schemeClr val="tx1">
-                    <a:lumMod val="85000"/>
-                    <a:lumOff val="15000"/>
-                  </a:schemeClr>
-                </a:solidFill>
-                <a:effectLst/>
-                <a:latin typeface="+mn-lt"/>
-                <a:ea typeface="+mn-ea"/>
-                <a:cs typeface="+mn-cs"/>
-              </a:defRPr>
-            </a:lvl9pPr>
-          </a:lstStyle>
-          <a:p>
-            <a:r>
-              <a:rPr lang="en-US" smtClean="0"/>
-              <a:t>Repositories in GitHub Desktop are essentially local copies of your online repositories</a:t>
-            </a:r>
-          </a:p>
-          <a:p>
-            <a:r>
-              <a:rPr lang="en-US" smtClean="0"/>
-              <a:t>They are referred to as “clones”</a:t>
-            </a:r>
-            <a:endParaRPr lang="en-US" dirty="0" smtClean="0"/>
-          </a:p>
-        </p:txBody>
-      </p:sp>
     </p:spTree>
     <p:extLst>
       <p:ext uri="{BB962C8B-B14F-4D97-AF65-F5344CB8AC3E}">
@@ -19568,4 +21663,265 @@
     </a:ext>
   </a:extLst>
 </a:theme>
+</file>
+
+<file path=ppt/theme/theme2.xml><?xml version="1.0" encoding="utf-8"?>
+<a:theme xmlns:a="http://schemas.openxmlformats.org/drawingml/2006/main" name="Office Theme">
+  <a:themeElements>
+    <a:clrScheme name="Office">
+      <a:dk1>
+        <a:sysClr val="windowText" lastClr="000000"/>
+      </a:dk1>
+      <a:lt1>
+        <a:sysClr val="window" lastClr="FFFFFF"/>
+      </a:lt1>
+      <a:dk2>
+        <a:srgbClr val="44546A"/>
+      </a:dk2>
+      <a:lt2>
+        <a:srgbClr val="E7E6E6"/>
+      </a:lt2>
+      <a:accent1>
+        <a:srgbClr val="5B9BD5"/>
+      </a:accent1>
+      <a:accent2>
+        <a:srgbClr val="ED7D31"/>
+      </a:accent2>
+      <a:accent3>
+        <a:srgbClr val="A5A5A5"/>
+      </a:accent3>
+      <a:accent4>
+        <a:srgbClr val="FFC000"/>
+      </a:accent4>
+      <a:accent5>
+        <a:srgbClr val="4472C4"/>
+      </a:accent5>
+      <a:accent6>
+        <a:srgbClr val="70AD47"/>
+      </a:accent6>
+      <a:hlink>
+        <a:srgbClr val="0563C1"/>
+      </a:hlink>
+      <a:folHlink>
+        <a:srgbClr val="954F72"/>
+      </a:folHlink>
+    </a:clrScheme>
+    <a:fontScheme name="Office">
+      <a:majorFont>
+        <a:latin typeface="Calibri Light" panose="020F0302020204030204"/>
+        <a:ea typeface=""/>
+        <a:cs typeface=""/>
+        <a:font script="Jpan" typeface="ＭＳ Ｐゴシック"/>
+        <a:font script="Hang" typeface="맑은 고딕"/>
+        <a:font script="Hans" typeface="宋体"/>
+        <a:font script="Hant" typeface="新細明體"/>
+        <a:font script="Arab" typeface="Times New Roman"/>
+        <a:font script="Hebr" typeface="Times New Roman"/>
+        <a:font script="Thai" typeface="Angsana New"/>
+        <a:font script="Ethi" typeface="Nyala"/>
+        <a:font script="Beng" typeface="Vrinda"/>
+        <a:font script="Gujr" typeface="Shruti"/>
+        <a:font script="Khmr" typeface="MoolBoran"/>
+        <a:font script="Knda" typeface="Tunga"/>
+        <a:font script="Guru" typeface="Raavi"/>
+        <a:font script="Cans" typeface="Euphemia"/>
+        <a:font script="Cher" typeface="Plantagenet Cherokee"/>
+        <a:font script="Yiii" typeface="Microsoft Yi Baiti"/>
+        <a:font script="Tibt" typeface="Microsoft Himalaya"/>
+        <a:font script="Thaa" typeface="MV Boli"/>
+        <a:font script="Deva" typeface="Mangal"/>
+        <a:font script="Telu" typeface="Gautami"/>
+        <a:font script="Taml" typeface="Latha"/>
+        <a:font script="Syrc" typeface="Estrangelo Edessa"/>
+        <a:font script="Orya" typeface="Kalinga"/>
+        <a:font script="Mlym" typeface="Kartika"/>
+        <a:font script="Laoo" typeface="DokChampa"/>
+        <a:font script="Sinh" typeface="Iskoola Pota"/>
+        <a:font script="Mong" typeface="Mongolian Baiti"/>
+        <a:font script="Viet" typeface="Times New Roman"/>
+        <a:font script="Uigh" typeface="Microsoft Uighur"/>
+        <a:font script="Geor" typeface="Sylfaen"/>
+      </a:majorFont>
+      <a:minorFont>
+        <a:latin typeface="Calibri" panose="020F0502020204030204"/>
+        <a:ea typeface=""/>
+        <a:cs typeface=""/>
+        <a:font script="Jpan" typeface="ＭＳ Ｐゴシック"/>
+        <a:font script="Hang" typeface="맑은 고딕"/>
+        <a:font script="Hans" typeface="宋体"/>
+        <a:font script="Hant" typeface="新細明體"/>
+        <a:font script="Arab" typeface="Arial"/>
+        <a:font script="Hebr" typeface="Arial"/>
+        <a:font script="Thai" typeface="Cordia New"/>
+        <a:font script="Ethi" typeface="Nyala"/>
+        <a:font script="Beng" typeface="Vrinda"/>
+        <a:font script="Gujr" typeface="Shruti"/>
+        <a:font script="Khmr" typeface="DaunPenh"/>
+        <a:font script="Knda" typeface="Tunga"/>
+        <a:font script="Guru" typeface="Raavi"/>
+        <a:font script="Cans" typeface="Euphemia"/>
+        <a:font script="Cher" typeface="Plantagenet Cherokee"/>
+        <a:font script="Yiii" typeface="Microsoft Yi Baiti"/>
+        <a:font script="Tibt" typeface="Microsoft Himalaya"/>
+        <a:font script="Thaa" typeface="MV Boli"/>
+        <a:font script="Deva" typeface="Mangal"/>
+        <a:font script="Telu" typeface="Gautami"/>
+        <a:font script="Taml" typeface="Latha"/>
+        <a:font script="Syrc" typeface="Estrangelo Edessa"/>
+        <a:font script="Orya" typeface="Kalinga"/>
+        <a:font script="Mlym" typeface="Kartika"/>
+        <a:font script="Laoo" typeface="DokChampa"/>
+        <a:font script="Sinh" typeface="Iskoola Pota"/>
+        <a:font script="Mong" typeface="Mongolian Baiti"/>
+        <a:font script="Viet" typeface="Arial"/>
+        <a:font script="Uigh" typeface="Microsoft Uighur"/>
+        <a:font script="Geor" typeface="Sylfaen"/>
+      </a:minorFont>
+    </a:fontScheme>
+    <a:fmtScheme name="Office">
+      <a:fillStyleLst>
+        <a:solidFill>
+          <a:schemeClr val="phClr"/>
+        </a:solidFill>
+        <a:gradFill rotWithShape="1">
+          <a:gsLst>
+            <a:gs pos="0">
+              <a:schemeClr val="phClr">
+                <a:lumMod val="110000"/>
+                <a:satMod val="105000"/>
+                <a:tint val="67000"/>
+              </a:schemeClr>
+            </a:gs>
+            <a:gs pos="50000">
+              <a:schemeClr val="phClr">
+                <a:lumMod val="105000"/>
+                <a:satMod val="103000"/>
+                <a:tint val="73000"/>
+              </a:schemeClr>
+            </a:gs>
+            <a:gs pos="100000">
+              <a:schemeClr val="phClr">
+                <a:lumMod val="105000"/>
+                <a:satMod val="109000"/>
+                <a:tint val="81000"/>
+              </a:schemeClr>
+            </a:gs>
+          </a:gsLst>
+          <a:lin ang="5400000" scaled="0"/>
+        </a:gradFill>
+        <a:gradFill rotWithShape="1">
+          <a:gsLst>
+            <a:gs pos="0">
+              <a:schemeClr val="phClr">
+                <a:satMod val="103000"/>
+                <a:lumMod val="102000"/>
+                <a:tint val="94000"/>
+              </a:schemeClr>
+            </a:gs>
+            <a:gs pos="50000">
+              <a:schemeClr val="phClr">
+                <a:satMod val="110000"/>
+                <a:lumMod val="100000"/>
+                <a:shade val="100000"/>
+              </a:schemeClr>
+            </a:gs>
+            <a:gs pos="100000">
+              <a:schemeClr val="phClr">
+                <a:lumMod val="99000"/>
+                <a:satMod val="120000"/>
+                <a:shade val="78000"/>
+              </a:schemeClr>
+            </a:gs>
+          </a:gsLst>
+          <a:lin ang="5400000" scaled="0"/>
+        </a:gradFill>
+      </a:fillStyleLst>
+      <a:lnStyleLst>
+        <a:ln w="6350" cap="flat" cmpd="sng" algn="ctr">
+          <a:solidFill>
+            <a:schemeClr val="phClr"/>
+          </a:solidFill>
+          <a:prstDash val="solid"/>
+          <a:miter lim="800000"/>
+        </a:ln>
+        <a:ln w="12700" cap="flat" cmpd="sng" algn="ctr">
+          <a:solidFill>
+            <a:schemeClr val="phClr"/>
+          </a:solidFill>
+          <a:prstDash val="solid"/>
+          <a:miter lim="800000"/>
+        </a:ln>
+        <a:ln w="19050" cap="flat" cmpd="sng" algn="ctr">
+          <a:solidFill>
+            <a:schemeClr val="phClr"/>
+          </a:solidFill>
+          <a:prstDash val="solid"/>
+          <a:miter lim="800000"/>
+        </a:ln>
+      </a:lnStyleLst>
+      <a:effectStyleLst>
+        <a:effectStyle>
+          <a:effectLst/>
+        </a:effectStyle>
+        <a:effectStyle>
+          <a:effectLst/>
+        </a:effectStyle>
+        <a:effectStyle>
+          <a:effectLst>
+            <a:outerShdw blurRad="57150" dist="19050" dir="5400000" algn="ctr" rotWithShape="0">
+              <a:srgbClr val="000000">
+                <a:alpha val="63000"/>
+              </a:srgbClr>
+            </a:outerShdw>
+          </a:effectLst>
+        </a:effectStyle>
+      </a:effectStyleLst>
+      <a:bgFillStyleLst>
+        <a:solidFill>
+          <a:schemeClr val="phClr"/>
+        </a:solidFill>
+        <a:solidFill>
+          <a:schemeClr val="phClr">
+            <a:tint val="95000"/>
+            <a:satMod val="170000"/>
+          </a:schemeClr>
+        </a:solidFill>
+        <a:gradFill rotWithShape="1">
+          <a:gsLst>
+            <a:gs pos="0">
+              <a:schemeClr val="phClr">
+                <a:tint val="93000"/>
+                <a:satMod val="150000"/>
+                <a:shade val="98000"/>
+                <a:lumMod val="102000"/>
+              </a:schemeClr>
+            </a:gs>
+            <a:gs pos="50000">
+              <a:schemeClr val="phClr">
+                <a:tint val="98000"/>
+                <a:satMod val="130000"/>
+                <a:shade val="90000"/>
+                <a:lumMod val="103000"/>
+              </a:schemeClr>
+            </a:gs>
+            <a:gs pos="100000">
+              <a:schemeClr val="phClr">
+                <a:shade val="63000"/>
+                <a:satMod val="120000"/>
+              </a:schemeClr>
+            </a:gs>
+          </a:gsLst>
+          <a:lin ang="5400000" scaled="0"/>
+        </a:gradFill>
+      </a:bgFillStyleLst>
+    </a:fmtScheme>
+  </a:themeElements>
+  <a:objectDefaults/>
+  <a:extraClrSchemeLst/>
+  <a:extLst>
+    <a:ext uri="{05A4C25C-085E-4340-85A3-A5531E510DB2}">
+      <thm15:themeFamily xmlns:thm15="http://schemas.microsoft.com/office/thememl/2012/main" name="Office Theme" id="{62F939B6-93AF-4DB8-9C6B-D6C7DFDC589F}" vid="{4A3C46E8-61CC-4603-A589-7422A47A8E4A}"/>
+    </a:ext>
+  </a:extLst>
+</a:theme>
 </file>
</xml_diff>